<commit_message>
+ Updating for 7 clusters content
</commit_message>
<xml_diff>
--- a/outputs_figures/ms_figures/fig3_clusters/dendrogram_radial.pptx
+++ b/outputs_figures/ms_figures/fig3_clusters/dendrogram_radial.pptx
@@ -5,20 +5,21 @@
     <p:sldMasterId id="2147483648" r:id="rId1"/>
   </p:sldMasterIdLst>
   <p:notesMasterIdLst>
-    <p:notesMasterId r:id="rId3"/>
+    <p:notesMasterId r:id="rId4"/>
   </p:notesMasterIdLst>
   <p:sldIdLst>
     <p:sldId id="261" r:id="rId2"/>
+    <p:sldId id="262" r:id="rId3"/>
   </p:sldIdLst>
   <p:sldSz cx="12192000" cy="6858000"/>
   <p:notesSz cx="6858000" cy="9144000"/>
   <p:embeddedFontLst>
     <p:embeddedFont>
       <p:font typeface="Calibri" panose="020F0502020204030204" pitchFamily="34" charset="0"/>
-      <p:regular r:id="rId4"/>
-      <p:bold r:id="rId5"/>
-      <p:italic r:id="rId6"/>
-      <p:boldItalic r:id="rId7"/>
+      <p:regular r:id="rId5"/>
+      <p:bold r:id="rId6"/>
+      <p:italic r:id="rId7"/>
+      <p:boldItalic r:id="rId8"/>
     </p:embeddedFont>
   </p:embeddedFontLst>
   <p:defaultTextStyle>
@@ -255,7 +256,7 @@
       <p15:sldGuideLst xmlns:p15="http://schemas.microsoft.com/office/powerpoint/2012/main"/>
     </p:ext>
     <p:ext uri="http://customooxmlschemas.google.com/">
-      <go:slidesCustomData xmlns="" xmlns:mc="http://schemas.openxmlformats.org/markup-compatibility/2006" xmlns:mv="urn:schemas-microsoft-com:mac:vml" xmlns:c="http://schemas.openxmlformats.org/drawingml/2006/chart" xmlns:dgm="http://schemas.openxmlformats.org/drawingml/2006/diagram" xmlns:o="urn:schemas-microsoft-com:office:office" xmlns:v="urn:schemas-microsoft-com:vml" xmlns:pvml="urn:schemas-microsoft-com:office:powerpoint" xmlns:com="http://schemas.openxmlformats.org/drawingml/2006/compatibility" xmlns:p14="http://schemas.microsoft.com/office/powerpoint/2010/main" xmlns:p15="http://schemas.microsoft.com/office/powerpoint/2012/main" xmlns:ahyp="http://schemas.microsoft.com/office/drawing/2018/hyperlinkcolor" xmlns:go="http://customooxmlschemas.google.com/" r:id="rId21" roundtripDataSignature="AMtx7mjkqRRnulKP6R/VTqMqjzmVO72BhA=="/>
+      <go:slidesCustomData xmlns:go="http://customooxmlschemas.google.com/" xmlns:ahyp="http://schemas.microsoft.com/office/drawing/2018/hyperlinkcolor" xmlns:p15="http://schemas.microsoft.com/office/powerpoint/2012/main" xmlns:p14="http://schemas.microsoft.com/office/powerpoint/2010/main" xmlns:com="http://schemas.openxmlformats.org/drawingml/2006/compatibility" xmlns:pvml="urn:schemas-microsoft-com:office:powerpoint" xmlns:v="urn:schemas-microsoft-com:vml" xmlns:o="urn:schemas-microsoft-com:office:office" xmlns:dgm="http://schemas.openxmlformats.org/drawingml/2006/diagram" xmlns:c="http://schemas.openxmlformats.org/drawingml/2006/chart" xmlns:mv="urn:schemas-microsoft-com:mac:vml" xmlns:mc="http://schemas.openxmlformats.org/markup-compatibility/2006" xmlns="" r:id="rId21" roundtripDataSignature="AMtx7mjkqRRnulKP6R/VTqMqjzmVO72BhA=="/>
     </p:ext>
   </p:extLst>
 </p:presentation>
@@ -831,6 +832,144 @@
     <p:extLst>
       <p:ext uri="{BB962C8B-B14F-4D97-AF65-F5344CB8AC3E}">
         <p14:creationId xmlns:p14="http://schemas.microsoft.com/office/powerpoint/2010/main" val="4194237426"/>
+      </p:ext>
+    </p:extLst>
+  </p:cSld>
+  <p:clrMapOvr>
+    <a:masterClrMapping/>
+  </p:clrMapOvr>
+</p:notes>
+</file>
+
+<file path=ppt/notesSlides/notesSlide2.xml><?xml version="1.0" encoding="utf-8"?>
+<p:notes xmlns:a="http://schemas.openxmlformats.org/drawingml/2006/main" xmlns:r="http://schemas.openxmlformats.org/officeDocument/2006/relationships" xmlns:p="http://schemas.openxmlformats.org/presentationml/2006/main" showMasterSp="0" showMasterPhAnim="0">
+  <p:cSld>
+    <p:spTree>
+      <p:nvGrpSpPr>
+        <p:cNvPr id="1" name="Shape 278"/>
+        <p:cNvGrpSpPr/>
+        <p:nvPr/>
+      </p:nvGrpSpPr>
+      <p:grpSpPr>
+        <a:xfrm>
+          <a:off x="0" y="0"/>
+          <a:ext cx="0" cy="0"/>
+          <a:chOff x="0" y="0"/>
+          <a:chExt cx="0" cy="0"/>
+        </a:xfrm>
+      </p:grpSpPr>
+      <p:sp>
+        <p:nvSpPr>
+          <p:cNvPr id="279" name="Google Shape;279;gd33cc45fa0_1_141:notes"/>
+          <p:cNvSpPr>
+            <a:spLocks noGrp="1" noRot="1" noChangeAspect="1"/>
+          </p:cNvSpPr>
+          <p:nvPr>
+            <p:ph type="sldImg" idx="2"/>
+          </p:nvPr>
+        </p:nvSpPr>
+        <p:spPr>
+          <a:xfrm>
+            <a:off x="381000" y="685800"/>
+            <a:ext cx="6096000" cy="3429000"/>
+          </a:xfrm>
+          <a:custGeom>
+            <a:avLst/>
+            <a:gdLst/>
+            <a:ahLst/>
+            <a:cxnLst/>
+            <a:rect l="l" t="t" r="r" b="b"/>
+            <a:pathLst>
+              <a:path w="120000" h="120000" extrusionOk="0">
+                <a:moveTo>
+                  <a:pt x="0" y="0"/>
+                </a:moveTo>
+                <a:lnTo>
+                  <a:pt x="120000" y="0"/>
+                </a:lnTo>
+                <a:lnTo>
+                  <a:pt x="120000" y="120000"/>
+                </a:lnTo>
+                <a:lnTo>
+                  <a:pt x="0" y="120000"/>
+                </a:lnTo>
+                <a:close/>
+              </a:path>
+            </a:pathLst>
+          </a:custGeom>
+        </p:spPr>
+      </p:sp>
+      <p:sp>
+        <p:nvSpPr>
+          <p:cNvPr id="280" name="Google Shape;280;gd33cc45fa0_1_141:notes"/>
+          <p:cNvSpPr txBox="1">
+            <a:spLocks noGrp="1"/>
+          </p:cNvSpPr>
+          <p:nvPr>
+            <p:ph type="body" idx="1"/>
+          </p:nvPr>
+        </p:nvSpPr>
+        <p:spPr>
+          <a:xfrm>
+            <a:off x="685800" y="4343400"/>
+            <a:ext cx="5486400" cy="4114800"/>
+          </a:xfrm>
+          <a:prstGeom prst="rect">
+            <a:avLst/>
+          </a:prstGeom>
+        </p:spPr>
+        <p:txBody>
+          <a:bodyPr spcFirstLastPara="1" wrap="square" lIns="91425" tIns="91425" rIns="91425" bIns="91425" anchor="t" anchorCtr="0">
+            <a:noAutofit/>
+          </a:bodyPr>
+          <a:lstStyle/>
+          <a:p>
+            <a:pPr marL="0" marR="0" lvl="0" indent="0" algn="l" defTabSz="914400" rtl="0" eaLnBrk="1" fontAlgn="auto" latinLnBrk="0" hangingPunct="1">
+              <a:lnSpc>
+                <a:spcPct val="100000"/>
+              </a:lnSpc>
+              <a:spcBef>
+                <a:spcPts val="0"/>
+              </a:spcBef>
+              <a:spcAft>
+                <a:spcPts val="0"/>
+              </a:spcAft>
+              <a:buClr>
+                <a:srgbClr val="000000"/>
+              </a:buClr>
+              <a:buSzPts val="1100"/>
+              <a:buFont typeface="Arial"/>
+              <a:buNone/>
+              <a:tabLst/>
+              <a:defRPr/>
+            </a:pPr>
+            <a:r>
+              <a:rPr lang="en-US" dirty="0">
+                <a:solidFill>
+                  <a:schemeClr val="dk1"/>
+                </a:solidFill>
+              </a:rPr>
+              <a:t>USE!!! PROBABLE TRAITS, k = 8, DIVISIVE with NMDS PLOT</a:t>
+            </a:r>
+          </a:p>
+          <a:p>
+            <a:pPr marL="0" lvl="0" indent="0" algn="l" rtl="0">
+              <a:spcBef>
+                <a:spcPts val="0"/>
+              </a:spcBef>
+              <a:spcAft>
+                <a:spcPts val="0"/>
+              </a:spcAft>
+              <a:buNone/>
+            </a:pPr>
+            <a:endParaRPr dirty="0"/>
+          </a:p>
+        </p:txBody>
+      </p:sp>
+    </p:spTree>
+    <p:extLst>
+      <p:ext uri="{BB962C8B-B14F-4D97-AF65-F5344CB8AC3E}">
+        <p14:creationId xmlns:p14="http://schemas.microsoft.com/office/powerpoint/2010/main" val="340915430"/>
       </p:ext>
     </p:extLst>
   </p:cSld>
@@ -12736,6 +12875,2163 @@
 </p:sld>
 </file>
 
+<file path=ppt/slides/slide2.xml><?xml version="1.0" encoding="utf-8"?>
+<p:sld xmlns:a="http://schemas.openxmlformats.org/drawingml/2006/main" xmlns:r="http://schemas.openxmlformats.org/officeDocument/2006/relationships" xmlns:p="http://schemas.openxmlformats.org/presentationml/2006/main">
+  <p:cSld>
+    <p:spTree>
+      <p:nvGrpSpPr>
+        <p:cNvPr id="1" name="Shape 281"/>
+        <p:cNvGrpSpPr/>
+        <p:nvPr/>
+      </p:nvGrpSpPr>
+      <p:grpSpPr>
+        <a:xfrm>
+          <a:off x="0" y="0"/>
+          <a:ext cx="0" cy="0"/>
+          <a:chOff x="0" y="0"/>
+          <a:chExt cx="0" cy="0"/>
+        </a:xfrm>
+      </p:grpSpPr>
+      <p:pic>
+        <p:nvPicPr>
+          <p:cNvPr id="5" name="Picture 4">
+            <a:extLst>
+              <a:ext uri="{FF2B5EF4-FFF2-40B4-BE49-F238E27FC236}">
+                <a16:creationId xmlns:a16="http://schemas.microsoft.com/office/drawing/2014/main" id="{905AFFCA-9F5A-2A43-AA5A-0DA70F6C91BA}"/>
+              </a:ext>
+            </a:extLst>
+          </p:cNvPr>
+          <p:cNvPicPr>
+            <a:picLocks noChangeAspect="1"/>
+          </p:cNvPicPr>
+          <p:nvPr/>
+        </p:nvPicPr>
+        <p:blipFill>
+          <a:blip r:embed="rId3"/>
+          <a:srcRect t="714" b="714"/>
+          <a:stretch/>
+        </p:blipFill>
+        <p:spPr>
+          <a:xfrm>
+            <a:off x="759975" y="1229327"/>
+            <a:ext cx="4257624" cy="4196800"/>
+          </a:xfrm>
+          <a:prstGeom prst="rect">
+            <a:avLst/>
+          </a:prstGeom>
+        </p:spPr>
+      </p:pic>
+      <p:sp>
+        <p:nvSpPr>
+          <p:cNvPr id="12" name="Google Shape;257;gd33cc45fa0_1_0">
+            <a:extLst>
+              <a:ext uri="{FF2B5EF4-FFF2-40B4-BE49-F238E27FC236}">
+                <a16:creationId xmlns:a16="http://schemas.microsoft.com/office/drawing/2014/main" id="{A2B5E293-3448-F54C-AECB-63767A9721CC}"/>
+              </a:ext>
+            </a:extLst>
+          </p:cNvPr>
+          <p:cNvSpPr txBox="1"/>
+          <p:nvPr/>
+        </p:nvSpPr>
+        <p:spPr>
+          <a:xfrm>
+            <a:off x="-797487" y="1205420"/>
+            <a:ext cx="2118600" cy="369291"/>
+          </a:xfrm>
+          <a:prstGeom prst="rect">
+            <a:avLst/>
+          </a:prstGeom>
+          <a:noFill/>
+          <a:ln>
+            <a:noFill/>
+          </a:ln>
+        </p:spPr>
+        <p:txBody>
+          <a:bodyPr spcFirstLastPara="1" wrap="square" lIns="91425" tIns="45700" rIns="91425" bIns="45700" anchor="t" anchorCtr="0">
+            <a:spAutoFit/>
+          </a:bodyPr>
+          <a:lstStyle/>
+          <a:p>
+            <a:pPr marL="0" marR="0" lvl="0" indent="0" algn="ctr" rtl="0">
+              <a:spcBef>
+                <a:spcPts val="0"/>
+              </a:spcBef>
+              <a:spcAft>
+                <a:spcPts val="0"/>
+              </a:spcAft>
+              <a:buNone/>
+            </a:pPr>
+            <a:r>
+              <a:rPr lang="en-US" sz="1800" dirty="0">
+                <a:solidFill>
+                  <a:schemeClr val="tx1"/>
+                </a:solidFill>
+                <a:latin typeface="Calibri"/>
+                <a:ea typeface="Calibri"/>
+                <a:cs typeface="Calibri"/>
+                <a:sym typeface="Calibri"/>
+              </a:rPr>
+              <a:t>a)</a:t>
+            </a:r>
+            <a:endParaRPr sz="1800" dirty="0">
+              <a:solidFill>
+                <a:schemeClr val="tx1"/>
+              </a:solidFill>
+              <a:latin typeface="Calibri"/>
+              <a:ea typeface="Calibri"/>
+              <a:cs typeface="Calibri"/>
+              <a:sym typeface="Calibri"/>
+            </a:endParaRPr>
+          </a:p>
+        </p:txBody>
+      </p:sp>
+      <p:grpSp>
+        <p:nvGrpSpPr>
+          <p:cNvPr id="14" name="Google Shape;230;gd33cc45fa0_1_0">
+            <a:extLst>
+              <a:ext uri="{FF2B5EF4-FFF2-40B4-BE49-F238E27FC236}">
+                <a16:creationId xmlns:a16="http://schemas.microsoft.com/office/drawing/2014/main" id="{0038C127-6E9E-994D-8E9A-E5B4E896E442}"/>
+              </a:ext>
+            </a:extLst>
+          </p:cNvPr>
+          <p:cNvGrpSpPr/>
+          <p:nvPr/>
+        </p:nvGrpSpPr>
+        <p:grpSpPr>
+          <a:xfrm>
+            <a:off x="2291766" y="2670891"/>
+            <a:ext cx="263516" cy="307736"/>
+            <a:chOff x="5762179" y="1867177"/>
+            <a:chExt cx="253393" cy="288503"/>
+          </a:xfrm>
+        </p:grpSpPr>
+        <p:sp>
+          <p:nvSpPr>
+            <p:cNvPr id="15" name="Google Shape;231;gd33cc45fa0_1_0">
+              <a:extLst>
+                <a:ext uri="{FF2B5EF4-FFF2-40B4-BE49-F238E27FC236}">
+                  <a16:creationId xmlns:a16="http://schemas.microsoft.com/office/drawing/2014/main" id="{9088132D-D7E6-5F42-B32C-79B94E7D3B46}"/>
+                </a:ext>
+              </a:extLst>
+            </p:cNvPr>
+            <p:cNvSpPr/>
+            <p:nvPr/>
+          </p:nvSpPr>
+          <p:spPr>
+            <a:xfrm>
+              <a:off x="5773472" y="1906224"/>
+              <a:ext cx="242100" cy="235200"/>
+            </a:xfrm>
+            <a:prstGeom prst="ellipse">
+              <a:avLst/>
+            </a:prstGeom>
+            <a:solidFill>
+              <a:srgbClr val="A81501"/>
+            </a:solidFill>
+            <a:ln w="12700" cap="flat" cmpd="sng">
+              <a:solidFill>
+                <a:srgbClr val="A81501"/>
+              </a:solidFill>
+              <a:prstDash val="solid"/>
+              <a:miter lim="800000"/>
+              <a:headEnd type="none" w="sm" len="sm"/>
+              <a:tailEnd type="none" w="sm" len="sm"/>
+            </a:ln>
+          </p:spPr>
+          <p:txBody>
+            <a:bodyPr spcFirstLastPara="1" wrap="square" lIns="91425" tIns="45700" rIns="91425" bIns="45700" anchor="ctr" anchorCtr="0">
+              <a:noAutofit/>
+            </a:bodyPr>
+            <a:lstStyle/>
+            <a:p>
+              <a:pPr marL="0" marR="0" lvl="0" indent="0" algn="ctr" rtl="0">
+                <a:spcBef>
+                  <a:spcPts val="0"/>
+                </a:spcBef>
+                <a:spcAft>
+                  <a:spcPts val="0"/>
+                </a:spcAft>
+                <a:buNone/>
+              </a:pPr>
+              <a:endParaRPr>
+                <a:solidFill>
+                  <a:schemeClr val="lt1"/>
+                </a:solidFill>
+                <a:latin typeface="Times" pitchFamily="2" charset="0"/>
+                <a:ea typeface="Calibri"/>
+                <a:cs typeface="Calibri"/>
+                <a:sym typeface="Calibri"/>
+              </a:endParaRPr>
+            </a:p>
+          </p:txBody>
+        </p:sp>
+        <p:sp>
+          <p:nvSpPr>
+            <p:cNvPr id="17" name="Google Shape;232;gd33cc45fa0_1_0">
+              <a:extLst>
+                <a:ext uri="{FF2B5EF4-FFF2-40B4-BE49-F238E27FC236}">
+                  <a16:creationId xmlns:a16="http://schemas.microsoft.com/office/drawing/2014/main" id="{444E4E5C-601B-ED4B-848D-B9CACEFAF4CF}"/>
+                </a:ext>
+              </a:extLst>
+            </p:cNvPr>
+            <p:cNvSpPr txBox="1"/>
+            <p:nvPr/>
+          </p:nvSpPr>
+          <p:spPr>
+            <a:xfrm>
+              <a:off x="5762179" y="1867177"/>
+              <a:ext cx="177540" cy="288503"/>
+            </a:xfrm>
+            <a:prstGeom prst="rect">
+              <a:avLst/>
+            </a:prstGeom>
+            <a:noFill/>
+            <a:ln>
+              <a:noFill/>
+            </a:ln>
+          </p:spPr>
+          <p:txBody>
+            <a:bodyPr spcFirstLastPara="1" wrap="square" lIns="91425" tIns="45700" rIns="91425" bIns="45700" anchor="t" anchorCtr="0">
+              <a:spAutoFit/>
+            </a:bodyPr>
+            <a:lstStyle/>
+            <a:p>
+              <a:pPr marL="0" marR="0" lvl="0" indent="0" algn="l" rtl="0">
+                <a:spcBef>
+                  <a:spcPts val="0"/>
+                </a:spcBef>
+                <a:spcAft>
+                  <a:spcPts val="0"/>
+                </a:spcAft>
+                <a:buNone/>
+              </a:pPr>
+              <a:r>
+                <a:rPr lang="en-US" dirty="0">
+                  <a:solidFill>
+                    <a:schemeClr val="lt1"/>
+                  </a:solidFill>
+                  <a:latin typeface="Times" pitchFamily="2" charset="0"/>
+                  <a:cs typeface="Calibri"/>
+                  <a:sym typeface="Calibri"/>
+                </a:rPr>
+                <a:t>6</a:t>
+              </a:r>
+              <a:endParaRPr dirty="0">
+                <a:latin typeface="Times" pitchFamily="2" charset="0"/>
+              </a:endParaRPr>
+            </a:p>
+          </p:txBody>
+        </p:sp>
+      </p:grpSp>
+      <p:grpSp>
+        <p:nvGrpSpPr>
+          <p:cNvPr id="18" name="Google Shape;227;gd33cc45fa0_1_0">
+            <a:extLst>
+              <a:ext uri="{FF2B5EF4-FFF2-40B4-BE49-F238E27FC236}">
+                <a16:creationId xmlns:a16="http://schemas.microsoft.com/office/drawing/2014/main" id="{786DF2E1-8C76-3347-BE3E-3859ECC9780B}"/>
+              </a:ext>
+            </a:extLst>
+          </p:cNvPr>
+          <p:cNvGrpSpPr/>
+          <p:nvPr/>
+        </p:nvGrpSpPr>
+        <p:grpSpPr>
+          <a:xfrm>
+            <a:off x="2123788" y="3500323"/>
+            <a:ext cx="255548" cy="307736"/>
+            <a:chOff x="5355277" y="1411738"/>
+            <a:chExt cx="255548" cy="307736"/>
+          </a:xfrm>
+        </p:grpSpPr>
+        <p:sp>
+          <p:nvSpPr>
+            <p:cNvPr id="19" name="Google Shape;228;gd33cc45fa0_1_0">
+              <a:extLst>
+                <a:ext uri="{FF2B5EF4-FFF2-40B4-BE49-F238E27FC236}">
+                  <a16:creationId xmlns:a16="http://schemas.microsoft.com/office/drawing/2014/main" id="{1E5919ED-7451-2D4D-919C-E3376FD1FFA2}"/>
+                </a:ext>
+              </a:extLst>
+            </p:cNvPr>
+            <p:cNvSpPr/>
+            <p:nvPr/>
+          </p:nvSpPr>
+          <p:spPr>
+            <a:xfrm>
+              <a:off x="5368725" y="1478743"/>
+              <a:ext cx="242100" cy="235200"/>
+            </a:xfrm>
+            <a:prstGeom prst="ellipse">
+              <a:avLst/>
+            </a:prstGeom>
+            <a:solidFill>
+              <a:srgbClr val="C76829"/>
+            </a:solidFill>
+            <a:ln w="12700" cap="flat" cmpd="sng">
+              <a:solidFill>
+                <a:srgbClr val="C76829"/>
+              </a:solidFill>
+              <a:prstDash val="solid"/>
+              <a:miter lim="800000"/>
+              <a:headEnd type="none" w="sm" len="sm"/>
+              <a:tailEnd type="none" w="sm" len="sm"/>
+            </a:ln>
+          </p:spPr>
+          <p:txBody>
+            <a:bodyPr spcFirstLastPara="1" wrap="square" lIns="91425" tIns="45700" rIns="91425" bIns="45700" anchor="ctr" anchorCtr="0">
+              <a:noAutofit/>
+            </a:bodyPr>
+            <a:lstStyle/>
+            <a:p>
+              <a:pPr marL="0" marR="0" lvl="0" indent="0" algn="ctr" rtl="0">
+                <a:spcBef>
+                  <a:spcPts val="0"/>
+                </a:spcBef>
+                <a:spcAft>
+                  <a:spcPts val="0"/>
+                </a:spcAft>
+                <a:buNone/>
+              </a:pPr>
+              <a:endParaRPr>
+                <a:solidFill>
+                  <a:schemeClr val="lt1"/>
+                </a:solidFill>
+                <a:latin typeface="Times" pitchFamily="2" charset="0"/>
+                <a:ea typeface="Calibri"/>
+                <a:cs typeface="Calibri"/>
+                <a:sym typeface="Calibri"/>
+              </a:endParaRPr>
+            </a:p>
+          </p:txBody>
+        </p:sp>
+        <p:sp>
+          <p:nvSpPr>
+            <p:cNvPr id="20" name="Google Shape;229;gd33cc45fa0_1_0">
+              <a:extLst>
+                <a:ext uri="{FF2B5EF4-FFF2-40B4-BE49-F238E27FC236}">
+                  <a16:creationId xmlns:a16="http://schemas.microsoft.com/office/drawing/2014/main" id="{1BB6457D-7B3C-BD48-A099-80FC048FCE30}"/>
+                </a:ext>
+              </a:extLst>
+            </p:cNvPr>
+            <p:cNvSpPr txBox="1"/>
+            <p:nvPr/>
+          </p:nvSpPr>
+          <p:spPr>
+            <a:xfrm>
+              <a:off x="5355277" y="1411738"/>
+              <a:ext cx="161400" cy="307736"/>
+            </a:xfrm>
+            <a:prstGeom prst="rect">
+              <a:avLst/>
+            </a:prstGeom>
+            <a:noFill/>
+            <a:ln>
+              <a:noFill/>
+            </a:ln>
+          </p:spPr>
+          <p:txBody>
+            <a:bodyPr spcFirstLastPara="1" wrap="square" lIns="91425" tIns="45700" rIns="91425" bIns="45700" anchor="t" anchorCtr="0">
+              <a:spAutoFit/>
+            </a:bodyPr>
+            <a:lstStyle/>
+            <a:p>
+              <a:pPr marL="0" marR="0" lvl="0" indent="0" algn="l" rtl="0">
+                <a:spcBef>
+                  <a:spcPts val="0"/>
+                </a:spcBef>
+                <a:spcAft>
+                  <a:spcPts val="0"/>
+                </a:spcAft>
+                <a:buNone/>
+              </a:pPr>
+              <a:r>
+                <a:rPr lang="en-US" dirty="0">
+                  <a:solidFill>
+                    <a:schemeClr val="lt1"/>
+                  </a:solidFill>
+                  <a:latin typeface="Times" pitchFamily="2" charset="0"/>
+                  <a:cs typeface="Calibri"/>
+                  <a:sym typeface="Calibri"/>
+                </a:rPr>
+                <a:t>5</a:t>
+              </a:r>
+              <a:endParaRPr dirty="0">
+                <a:latin typeface="Times" pitchFamily="2" charset="0"/>
+              </a:endParaRPr>
+            </a:p>
+          </p:txBody>
+        </p:sp>
+      </p:grpSp>
+      <p:grpSp>
+        <p:nvGrpSpPr>
+          <p:cNvPr id="21" name="Google Shape;221;gd33cc45fa0_1_0">
+            <a:extLst>
+              <a:ext uri="{FF2B5EF4-FFF2-40B4-BE49-F238E27FC236}">
+                <a16:creationId xmlns:a16="http://schemas.microsoft.com/office/drawing/2014/main" id="{79F1B55F-F2B0-5448-9F8D-62D6A46FA7DF}"/>
+              </a:ext>
+            </a:extLst>
+          </p:cNvPr>
+          <p:cNvGrpSpPr/>
+          <p:nvPr/>
+        </p:nvGrpSpPr>
+        <p:grpSpPr>
+          <a:xfrm>
+            <a:off x="3356449" y="3675996"/>
+            <a:ext cx="255548" cy="307736"/>
+            <a:chOff x="4816862" y="3587618"/>
+            <a:chExt cx="255548" cy="307736"/>
+          </a:xfrm>
+        </p:grpSpPr>
+        <p:sp>
+          <p:nvSpPr>
+            <p:cNvPr id="22" name="Google Shape;222;gd33cc45fa0_1_0">
+              <a:extLst>
+                <a:ext uri="{FF2B5EF4-FFF2-40B4-BE49-F238E27FC236}">
+                  <a16:creationId xmlns:a16="http://schemas.microsoft.com/office/drawing/2014/main" id="{13D9339E-2ABC-1E45-A65E-F03F0A9EB673}"/>
+                </a:ext>
+              </a:extLst>
+            </p:cNvPr>
+            <p:cNvSpPr/>
+            <p:nvPr/>
+          </p:nvSpPr>
+          <p:spPr>
+            <a:xfrm>
+              <a:off x="4830310" y="3654623"/>
+              <a:ext cx="242100" cy="235200"/>
+            </a:xfrm>
+            <a:prstGeom prst="ellipse">
+              <a:avLst/>
+            </a:prstGeom>
+            <a:solidFill>
+              <a:srgbClr val="D6A104"/>
+            </a:solidFill>
+            <a:ln w="12700" cap="flat" cmpd="sng">
+              <a:solidFill>
+                <a:srgbClr val="D6A104"/>
+              </a:solidFill>
+              <a:prstDash val="solid"/>
+              <a:miter lim="800000"/>
+              <a:headEnd type="none" w="sm" len="sm"/>
+              <a:tailEnd type="none" w="sm" len="sm"/>
+            </a:ln>
+          </p:spPr>
+          <p:txBody>
+            <a:bodyPr spcFirstLastPara="1" wrap="square" lIns="91425" tIns="45700" rIns="91425" bIns="45700" anchor="ctr" anchorCtr="0">
+              <a:noAutofit/>
+            </a:bodyPr>
+            <a:lstStyle/>
+            <a:p>
+              <a:pPr marL="0" marR="0" lvl="0" indent="0" algn="ctr" rtl="0">
+                <a:spcBef>
+                  <a:spcPts val="0"/>
+                </a:spcBef>
+                <a:spcAft>
+                  <a:spcPts val="0"/>
+                </a:spcAft>
+                <a:buNone/>
+              </a:pPr>
+              <a:endParaRPr>
+                <a:solidFill>
+                  <a:schemeClr val="lt1"/>
+                </a:solidFill>
+                <a:latin typeface="Times" pitchFamily="2" charset="0"/>
+                <a:ea typeface="Calibri"/>
+                <a:cs typeface="Calibri"/>
+                <a:sym typeface="Calibri"/>
+              </a:endParaRPr>
+            </a:p>
+          </p:txBody>
+        </p:sp>
+        <p:sp>
+          <p:nvSpPr>
+            <p:cNvPr id="23" name="Google Shape;223;gd33cc45fa0_1_0">
+              <a:extLst>
+                <a:ext uri="{FF2B5EF4-FFF2-40B4-BE49-F238E27FC236}">
+                  <a16:creationId xmlns:a16="http://schemas.microsoft.com/office/drawing/2014/main" id="{EA4E0248-751B-3E4E-A1EC-3B2D780A3E4E}"/>
+                </a:ext>
+              </a:extLst>
+            </p:cNvPr>
+            <p:cNvSpPr txBox="1"/>
+            <p:nvPr/>
+          </p:nvSpPr>
+          <p:spPr>
+            <a:xfrm>
+              <a:off x="4816862" y="3587618"/>
+              <a:ext cx="161400" cy="307736"/>
+            </a:xfrm>
+            <a:prstGeom prst="rect">
+              <a:avLst/>
+            </a:prstGeom>
+            <a:noFill/>
+            <a:ln>
+              <a:noFill/>
+            </a:ln>
+          </p:spPr>
+          <p:txBody>
+            <a:bodyPr spcFirstLastPara="1" wrap="square" lIns="91425" tIns="45700" rIns="91425" bIns="45700" anchor="t" anchorCtr="0">
+              <a:spAutoFit/>
+            </a:bodyPr>
+            <a:lstStyle/>
+            <a:p>
+              <a:pPr marL="0" marR="0" lvl="0" indent="0" algn="l" rtl="0">
+                <a:spcBef>
+                  <a:spcPts val="0"/>
+                </a:spcBef>
+                <a:spcAft>
+                  <a:spcPts val="0"/>
+                </a:spcAft>
+                <a:buNone/>
+              </a:pPr>
+              <a:r>
+                <a:rPr lang="en-US" dirty="0">
+                  <a:solidFill>
+                    <a:schemeClr val="lt1"/>
+                  </a:solidFill>
+                  <a:latin typeface="Times" pitchFamily="2" charset="0"/>
+                  <a:cs typeface="Calibri"/>
+                  <a:sym typeface="Calibri"/>
+                </a:rPr>
+                <a:t>2</a:t>
+              </a:r>
+              <a:endParaRPr dirty="0">
+                <a:latin typeface="Times" pitchFamily="2" charset="0"/>
+              </a:endParaRPr>
+            </a:p>
+          </p:txBody>
+        </p:sp>
+      </p:grpSp>
+      <p:grpSp>
+        <p:nvGrpSpPr>
+          <p:cNvPr id="24" name="Google Shape;218;gd33cc45fa0_1_0">
+            <a:extLst>
+              <a:ext uri="{FF2B5EF4-FFF2-40B4-BE49-F238E27FC236}">
+                <a16:creationId xmlns:a16="http://schemas.microsoft.com/office/drawing/2014/main" id="{F90BB495-5408-1740-BAED-C573012F8B20}"/>
+              </a:ext>
+            </a:extLst>
+          </p:cNvPr>
+          <p:cNvGrpSpPr/>
+          <p:nvPr/>
+        </p:nvGrpSpPr>
+        <p:grpSpPr>
+          <a:xfrm>
+            <a:off x="3556763" y="3098995"/>
+            <a:ext cx="275269" cy="308730"/>
+            <a:chOff x="6762450" y="4020259"/>
+            <a:chExt cx="264694" cy="289434"/>
+          </a:xfrm>
+        </p:grpSpPr>
+        <p:sp>
+          <p:nvSpPr>
+            <p:cNvPr id="25" name="Google Shape;219;gd33cc45fa0_1_0">
+              <a:extLst>
+                <a:ext uri="{FF2B5EF4-FFF2-40B4-BE49-F238E27FC236}">
+                  <a16:creationId xmlns:a16="http://schemas.microsoft.com/office/drawing/2014/main" id="{E1970BC3-4F95-A848-AE66-E40E9D013210}"/>
+                </a:ext>
+              </a:extLst>
+            </p:cNvPr>
+            <p:cNvSpPr/>
+            <p:nvPr/>
+          </p:nvSpPr>
+          <p:spPr>
+            <a:xfrm>
+              <a:off x="6785044" y="4074493"/>
+              <a:ext cx="242100" cy="235200"/>
+            </a:xfrm>
+            <a:prstGeom prst="ellipse">
+              <a:avLst/>
+            </a:prstGeom>
+            <a:solidFill>
+              <a:srgbClr val="88A251"/>
+            </a:solidFill>
+            <a:ln w="12700" cap="flat" cmpd="sng">
+              <a:solidFill>
+                <a:srgbClr val="88A251"/>
+              </a:solidFill>
+              <a:prstDash val="solid"/>
+              <a:miter lim="800000"/>
+              <a:headEnd type="none" w="sm" len="sm"/>
+              <a:tailEnd type="none" w="sm" len="sm"/>
+            </a:ln>
+          </p:spPr>
+          <p:txBody>
+            <a:bodyPr spcFirstLastPara="1" wrap="square" lIns="91425" tIns="45700" rIns="91425" bIns="45700" anchor="ctr" anchorCtr="0">
+              <a:noAutofit/>
+            </a:bodyPr>
+            <a:lstStyle/>
+            <a:p>
+              <a:pPr marL="0" marR="0" lvl="0" indent="0" algn="ctr" rtl="0">
+                <a:spcBef>
+                  <a:spcPts val="0"/>
+                </a:spcBef>
+                <a:spcAft>
+                  <a:spcPts val="0"/>
+                </a:spcAft>
+                <a:buNone/>
+              </a:pPr>
+              <a:endParaRPr>
+                <a:solidFill>
+                  <a:schemeClr val="lt1"/>
+                </a:solidFill>
+                <a:latin typeface="Times" pitchFamily="2" charset="0"/>
+                <a:ea typeface="Calibri"/>
+                <a:cs typeface="Calibri"/>
+                <a:sym typeface="Calibri"/>
+              </a:endParaRPr>
+            </a:p>
+          </p:txBody>
+        </p:sp>
+        <p:sp>
+          <p:nvSpPr>
+            <p:cNvPr id="26" name="Google Shape;220;gd33cc45fa0_1_0">
+              <a:extLst>
+                <a:ext uri="{FF2B5EF4-FFF2-40B4-BE49-F238E27FC236}">
+                  <a16:creationId xmlns:a16="http://schemas.microsoft.com/office/drawing/2014/main" id="{08419916-3FFA-154A-83E9-FCBDE963F254}"/>
+                </a:ext>
+              </a:extLst>
+            </p:cNvPr>
+            <p:cNvSpPr txBox="1"/>
+            <p:nvPr/>
+          </p:nvSpPr>
+          <p:spPr>
+            <a:xfrm>
+              <a:off x="6762450" y="4020259"/>
+              <a:ext cx="253200" cy="288502"/>
+            </a:xfrm>
+            <a:prstGeom prst="rect">
+              <a:avLst/>
+            </a:prstGeom>
+            <a:noFill/>
+            <a:ln>
+              <a:noFill/>
+            </a:ln>
+          </p:spPr>
+          <p:txBody>
+            <a:bodyPr spcFirstLastPara="1" wrap="square" lIns="91425" tIns="45700" rIns="91425" bIns="45700" anchor="t" anchorCtr="0">
+              <a:spAutoFit/>
+            </a:bodyPr>
+            <a:lstStyle/>
+            <a:p>
+              <a:pPr marL="0" marR="0" lvl="0" indent="0" algn="l" rtl="0">
+                <a:spcBef>
+                  <a:spcPts val="0"/>
+                </a:spcBef>
+                <a:spcAft>
+                  <a:spcPts val="0"/>
+                </a:spcAft>
+                <a:buNone/>
+              </a:pPr>
+              <a:r>
+                <a:rPr lang="en-US" dirty="0">
+                  <a:solidFill>
+                    <a:schemeClr val="lt1"/>
+                  </a:solidFill>
+                  <a:latin typeface="Times" pitchFamily="2" charset="0"/>
+                  <a:cs typeface="Calibri"/>
+                  <a:sym typeface="Calibri"/>
+                </a:rPr>
+                <a:t>4</a:t>
+              </a:r>
+              <a:endParaRPr dirty="0">
+                <a:latin typeface="Times" pitchFamily="2" charset="0"/>
+              </a:endParaRPr>
+            </a:p>
+          </p:txBody>
+        </p:sp>
+      </p:grpSp>
+      <p:grpSp>
+        <p:nvGrpSpPr>
+          <p:cNvPr id="27" name="Google Shape;215;gd33cc45fa0_1_0">
+            <a:extLst>
+              <a:ext uri="{FF2B5EF4-FFF2-40B4-BE49-F238E27FC236}">
+                <a16:creationId xmlns:a16="http://schemas.microsoft.com/office/drawing/2014/main" id="{AC1625EF-58A6-BB4C-8B79-C6C0EC63FB53}"/>
+              </a:ext>
+            </a:extLst>
+          </p:cNvPr>
+          <p:cNvGrpSpPr/>
+          <p:nvPr/>
+        </p:nvGrpSpPr>
+        <p:grpSpPr>
+          <a:xfrm>
+            <a:off x="3394162" y="2688060"/>
+            <a:ext cx="255548" cy="307736"/>
+            <a:chOff x="7162109" y="3579562"/>
+            <a:chExt cx="255548" cy="307736"/>
+          </a:xfrm>
+        </p:grpSpPr>
+        <p:sp>
+          <p:nvSpPr>
+            <p:cNvPr id="28" name="Google Shape;216;gd33cc45fa0_1_0">
+              <a:extLst>
+                <a:ext uri="{FF2B5EF4-FFF2-40B4-BE49-F238E27FC236}">
+                  <a16:creationId xmlns:a16="http://schemas.microsoft.com/office/drawing/2014/main" id="{ED8B2608-CF43-9A42-95CA-AA3E31B183F7}"/>
+                </a:ext>
+              </a:extLst>
+            </p:cNvPr>
+            <p:cNvSpPr/>
+            <p:nvPr/>
+          </p:nvSpPr>
+          <p:spPr>
+            <a:xfrm>
+              <a:off x="7175557" y="3646567"/>
+              <a:ext cx="242100" cy="235200"/>
+            </a:xfrm>
+            <a:prstGeom prst="ellipse">
+              <a:avLst/>
+            </a:prstGeom>
+            <a:solidFill>
+              <a:srgbClr val="4781A2"/>
+            </a:solidFill>
+            <a:ln w="12700" cap="flat" cmpd="sng">
+              <a:solidFill>
+                <a:srgbClr val="4781A2"/>
+              </a:solidFill>
+              <a:prstDash val="solid"/>
+              <a:miter lim="800000"/>
+              <a:headEnd type="none" w="sm" len="sm"/>
+              <a:tailEnd type="none" w="sm" len="sm"/>
+            </a:ln>
+          </p:spPr>
+          <p:txBody>
+            <a:bodyPr spcFirstLastPara="1" wrap="square" lIns="91425" tIns="45700" rIns="91425" bIns="45700" anchor="ctr" anchorCtr="0">
+              <a:noAutofit/>
+            </a:bodyPr>
+            <a:lstStyle/>
+            <a:p>
+              <a:pPr marL="0" marR="0" lvl="0" indent="0" algn="ctr" rtl="0">
+                <a:spcBef>
+                  <a:spcPts val="0"/>
+                </a:spcBef>
+                <a:spcAft>
+                  <a:spcPts val="0"/>
+                </a:spcAft>
+                <a:buNone/>
+              </a:pPr>
+              <a:endParaRPr>
+                <a:solidFill>
+                  <a:schemeClr val="lt1"/>
+                </a:solidFill>
+                <a:latin typeface="Times" pitchFamily="2" charset="0"/>
+                <a:ea typeface="Calibri"/>
+                <a:cs typeface="Calibri"/>
+                <a:sym typeface="Calibri"/>
+              </a:endParaRPr>
+            </a:p>
+          </p:txBody>
+        </p:sp>
+        <p:sp>
+          <p:nvSpPr>
+            <p:cNvPr id="29" name="Google Shape;217;gd33cc45fa0_1_0">
+              <a:extLst>
+                <a:ext uri="{FF2B5EF4-FFF2-40B4-BE49-F238E27FC236}">
+                  <a16:creationId xmlns:a16="http://schemas.microsoft.com/office/drawing/2014/main" id="{9227393D-573C-2F41-A688-BFB44BDC406D}"/>
+                </a:ext>
+              </a:extLst>
+            </p:cNvPr>
+            <p:cNvSpPr txBox="1"/>
+            <p:nvPr/>
+          </p:nvSpPr>
+          <p:spPr>
+            <a:xfrm>
+              <a:off x="7162109" y="3579562"/>
+              <a:ext cx="161400" cy="307736"/>
+            </a:xfrm>
+            <a:prstGeom prst="rect">
+              <a:avLst/>
+            </a:prstGeom>
+            <a:noFill/>
+            <a:ln>
+              <a:noFill/>
+            </a:ln>
+          </p:spPr>
+          <p:txBody>
+            <a:bodyPr spcFirstLastPara="1" wrap="square" lIns="91425" tIns="45700" rIns="91425" bIns="45700" anchor="t" anchorCtr="0">
+              <a:spAutoFit/>
+            </a:bodyPr>
+            <a:lstStyle/>
+            <a:p>
+              <a:pPr marL="0" marR="0" lvl="0" indent="0" algn="l" rtl="0">
+                <a:spcBef>
+                  <a:spcPts val="0"/>
+                </a:spcBef>
+                <a:spcAft>
+                  <a:spcPts val="0"/>
+                </a:spcAft>
+                <a:buNone/>
+              </a:pPr>
+              <a:r>
+                <a:rPr lang="en-US" dirty="0">
+                  <a:solidFill>
+                    <a:schemeClr val="lt1"/>
+                  </a:solidFill>
+                  <a:latin typeface="Times" pitchFamily="2" charset="0"/>
+                  <a:cs typeface="Calibri"/>
+                  <a:sym typeface="Calibri"/>
+                </a:rPr>
+                <a:t>3</a:t>
+              </a:r>
+              <a:endParaRPr dirty="0">
+                <a:latin typeface="Times" pitchFamily="2" charset="0"/>
+              </a:endParaRPr>
+            </a:p>
+          </p:txBody>
+        </p:sp>
+      </p:grpSp>
+      <p:grpSp>
+        <p:nvGrpSpPr>
+          <p:cNvPr id="30" name="Google Shape;212;gd33cc45fa0_1_0">
+            <a:extLst>
+              <a:ext uri="{FF2B5EF4-FFF2-40B4-BE49-F238E27FC236}">
+                <a16:creationId xmlns:a16="http://schemas.microsoft.com/office/drawing/2014/main" id="{287846D2-0AAF-EB4C-AD7A-12366D4B0E75}"/>
+              </a:ext>
+            </a:extLst>
+          </p:cNvPr>
+          <p:cNvGrpSpPr/>
+          <p:nvPr/>
+        </p:nvGrpSpPr>
+        <p:grpSpPr>
+          <a:xfrm>
+            <a:off x="2903518" y="2417063"/>
+            <a:ext cx="255548" cy="307736"/>
+            <a:chOff x="6371135" y="2064326"/>
+            <a:chExt cx="255548" cy="307736"/>
+          </a:xfrm>
+        </p:grpSpPr>
+        <p:sp>
+          <p:nvSpPr>
+            <p:cNvPr id="31" name="Google Shape;213;gd33cc45fa0_1_0">
+              <a:extLst>
+                <a:ext uri="{FF2B5EF4-FFF2-40B4-BE49-F238E27FC236}">
+                  <a16:creationId xmlns:a16="http://schemas.microsoft.com/office/drawing/2014/main" id="{A8E8E3E9-51DD-364A-B781-497108F49BF5}"/>
+                </a:ext>
+              </a:extLst>
+            </p:cNvPr>
+            <p:cNvSpPr/>
+            <p:nvPr/>
+          </p:nvSpPr>
+          <p:spPr>
+            <a:xfrm>
+              <a:off x="6384583" y="2131331"/>
+              <a:ext cx="242100" cy="235200"/>
+            </a:xfrm>
+            <a:prstGeom prst="ellipse">
+              <a:avLst/>
+            </a:prstGeom>
+            <a:solidFill>
+              <a:srgbClr val="3E597D"/>
+            </a:solidFill>
+            <a:ln w="12700" cap="flat" cmpd="sng">
+              <a:solidFill>
+                <a:srgbClr val="3E597D"/>
+              </a:solidFill>
+              <a:prstDash val="solid"/>
+              <a:miter lim="800000"/>
+              <a:headEnd type="none" w="sm" len="sm"/>
+              <a:tailEnd type="none" w="sm" len="sm"/>
+            </a:ln>
+          </p:spPr>
+          <p:txBody>
+            <a:bodyPr spcFirstLastPara="1" wrap="square" lIns="91425" tIns="45700" rIns="91425" bIns="45700" anchor="ctr" anchorCtr="0">
+              <a:noAutofit/>
+            </a:bodyPr>
+            <a:lstStyle/>
+            <a:p>
+              <a:pPr marL="0" marR="0" lvl="0" indent="0" algn="ctr" rtl="0">
+                <a:spcBef>
+                  <a:spcPts val="0"/>
+                </a:spcBef>
+                <a:spcAft>
+                  <a:spcPts val="0"/>
+                </a:spcAft>
+                <a:buNone/>
+              </a:pPr>
+              <a:endParaRPr>
+                <a:solidFill>
+                  <a:schemeClr val="lt1"/>
+                </a:solidFill>
+                <a:latin typeface="Times" pitchFamily="2" charset="0"/>
+                <a:ea typeface="Calibri"/>
+                <a:cs typeface="Calibri"/>
+                <a:sym typeface="Calibri"/>
+              </a:endParaRPr>
+            </a:p>
+          </p:txBody>
+        </p:sp>
+        <p:sp>
+          <p:nvSpPr>
+            <p:cNvPr id="32" name="Google Shape;214;gd33cc45fa0_1_0">
+              <a:extLst>
+                <a:ext uri="{FF2B5EF4-FFF2-40B4-BE49-F238E27FC236}">
+                  <a16:creationId xmlns:a16="http://schemas.microsoft.com/office/drawing/2014/main" id="{86C24C1C-4A4D-BE44-BB02-BD81C0E20DAF}"/>
+                </a:ext>
+              </a:extLst>
+            </p:cNvPr>
+            <p:cNvSpPr txBox="1"/>
+            <p:nvPr/>
+          </p:nvSpPr>
+          <p:spPr>
+            <a:xfrm>
+              <a:off x="6371135" y="2064326"/>
+              <a:ext cx="161400" cy="307736"/>
+            </a:xfrm>
+            <a:prstGeom prst="rect">
+              <a:avLst/>
+            </a:prstGeom>
+            <a:noFill/>
+            <a:ln>
+              <a:noFill/>
+            </a:ln>
+          </p:spPr>
+          <p:txBody>
+            <a:bodyPr spcFirstLastPara="1" wrap="square" lIns="91425" tIns="45700" rIns="91425" bIns="45700" anchor="t" anchorCtr="0">
+              <a:spAutoFit/>
+            </a:bodyPr>
+            <a:lstStyle/>
+            <a:p>
+              <a:pPr marL="0" marR="0" lvl="0" indent="0" algn="l" rtl="0">
+                <a:spcBef>
+                  <a:spcPts val="0"/>
+                </a:spcBef>
+                <a:spcAft>
+                  <a:spcPts val="0"/>
+                </a:spcAft>
+                <a:buNone/>
+              </a:pPr>
+              <a:r>
+                <a:rPr lang="en-US" dirty="0">
+                  <a:solidFill>
+                    <a:schemeClr val="lt1"/>
+                  </a:solidFill>
+                  <a:latin typeface="Times" pitchFamily="2" charset="0"/>
+                  <a:ea typeface="Calibri"/>
+                  <a:cs typeface="Calibri"/>
+                  <a:sym typeface="Calibri"/>
+                </a:rPr>
+                <a:t>1</a:t>
+              </a:r>
+              <a:endParaRPr dirty="0">
+                <a:latin typeface="Times" pitchFamily="2" charset="0"/>
+              </a:endParaRPr>
+            </a:p>
+          </p:txBody>
+        </p:sp>
+      </p:grpSp>
+      <p:sp>
+        <p:nvSpPr>
+          <p:cNvPr id="34" name="Google Shape;167;p2">
+            <a:extLst>
+              <a:ext uri="{FF2B5EF4-FFF2-40B4-BE49-F238E27FC236}">
+                <a16:creationId xmlns:a16="http://schemas.microsoft.com/office/drawing/2014/main" id="{E466C6F1-0458-E94A-9666-7319E488DA3E}"/>
+              </a:ext>
+            </a:extLst>
+          </p:cNvPr>
+          <p:cNvSpPr/>
+          <p:nvPr/>
+        </p:nvSpPr>
+        <p:spPr>
+          <a:xfrm>
+            <a:off x="366665" y="1378078"/>
+            <a:ext cx="1828623" cy="1038985"/>
+          </a:xfrm>
+          <a:prstGeom prst="ellipse">
+            <a:avLst/>
+          </a:prstGeom>
+          <a:solidFill>
+            <a:srgbClr val="A81501"/>
+          </a:solidFill>
+          <a:ln>
+            <a:noFill/>
+          </a:ln>
+        </p:spPr>
+        <p:txBody>
+          <a:bodyPr spcFirstLastPara="1" wrap="square" lIns="91425" tIns="45700" rIns="91425" bIns="45700" anchor="ctr" anchorCtr="0">
+            <a:noAutofit/>
+          </a:bodyPr>
+          <a:lstStyle/>
+          <a:p>
+            <a:pPr marL="0" marR="0" lvl="0" indent="0" algn="ctr" rtl="0">
+              <a:spcBef>
+                <a:spcPts val="0"/>
+              </a:spcBef>
+              <a:spcAft>
+                <a:spcPts val="0"/>
+              </a:spcAft>
+              <a:buNone/>
+            </a:pPr>
+            <a:endParaRPr>
+              <a:solidFill>
+                <a:schemeClr val="lt1"/>
+              </a:solidFill>
+              <a:latin typeface="Calibri"/>
+              <a:ea typeface="Calibri"/>
+              <a:cs typeface="Calibri"/>
+              <a:sym typeface="Calibri"/>
+            </a:endParaRPr>
+          </a:p>
+        </p:txBody>
+      </p:sp>
+      <p:sp>
+        <p:nvSpPr>
+          <p:cNvPr id="35" name="Google Shape;168;p2">
+            <a:extLst>
+              <a:ext uri="{FF2B5EF4-FFF2-40B4-BE49-F238E27FC236}">
+                <a16:creationId xmlns:a16="http://schemas.microsoft.com/office/drawing/2014/main" id="{FA88B3F4-82C7-3D4B-9BE1-226C5AE9965F}"/>
+              </a:ext>
+            </a:extLst>
+          </p:cNvPr>
+          <p:cNvSpPr txBox="1"/>
+          <p:nvPr/>
+        </p:nvSpPr>
+        <p:spPr>
+          <a:xfrm>
+            <a:off x="366665" y="1703796"/>
+            <a:ext cx="1828623" cy="738623"/>
+          </a:xfrm>
+          <a:prstGeom prst="rect">
+            <a:avLst/>
+          </a:prstGeom>
+          <a:noFill/>
+          <a:ln>
+            <a:noFill/>
+          </a:ln>
+        </p:spPr>
+        <p:txBody>
+          <a:bodyPr spcFirstLastPara="1" wrap="square" lIns="91425" tIns="45700" rIns="91425" bIns="45700" anchor="t" anchorCtr="0">
+            <a:spAutoFit/>
+          </a:bodyPr>
+          <a:lstStyle/>
+          <a:p>
+            <a:pPr marL="0" marR="0" lvl="0" indent="0" algn="ctr" rtl="0">
+              <a:spcBef>
+                <a:spcPts val="0"/>
+              </a:spcBef>
+              <a:spcAft>
+                <a:spcPts val="0"/>
+              </a:spcAft>
+              <a:buNone/>
+            </a:pPr>
+            <a:r>
+              <a:rPr lang="en-US" dirty="0">
+                <a:solidFill>
+                  <a:schemeClr val="lt1"/>
+                </a:solidFill>
+                <a:latin typeface="Calibri"/>
+                <a:ea typeface="Calibri"/>
+                <a:cs typeface="Calibri"/>
+                <a:sym typeface="Calibri"/>
+              </a:rPr>
+              <a:t>Diel migrating continental shelf taxa</a:t>
+            </a:r>
+          </a:p>
+          <a:p>
+            <a:pPr marL="0" marR="0" lvl="0" indent="0" algn="ctr" rtl="0">
+              <a:spcBef>
+                <a:spcPts val="0"/>
+              </a:spcBef>
+              <a:spcAft>
+                <a:spcPts val="0"/>
+              </a:spcAft>
+              <a:buNone/>
+            </a:pPr>
+            <a:r>
+              <a:rPr lang="en-US" dirty="0">
+                <a:solidFill>
+                  <a:schemeClr val="lt1"/>
+                </a:solidFill>
+                <a:latin typeface="Calibri"/>
+                <a:cs typeface="Calibri"/>
+                <a:sym typeface="Calibri"/>
+              </a:rPr>
+              <a:t>(72)</a:t>
+            </a:r>
+            <a:endParaRPr dirty="0"/>
+          </a:p>
+        </p:txBody>
+      </p:sp>
+      <p:sp>
+        <p:nvSpPr>
+          <p:cNvPr id="37" name="Google Shape;169;p2">
+            <a:extLst>
+              <a:ext uri="{FF2B5EF4-FFF2-40B4-BE49-F238E27FC236}">
+                <a16:creationId xmlns:a16="http://schemas.microsoft.com/office/drawing/2014/main" id="{CA10AA7F-0BFC-D841-A3D8-A071E4445737}"/>
+              </a:ext>
+            </a:extLst>
+          </p:cNvPr>
+          <p:cNvSpPr/>
+          <p:nvPr/>
+        </p:nvSpPr>
+        <p:spPr>
+          <a:xfrm>
+            <a:off x="138622" y="4018681"/>
+            <a:ext cx="1935480" cy="1005432"/>
+          </a:xfrm>
+          <a:prstGeom prst="ellipse">
+            <a:avLst/>
+          </a:prstGeom>
+          <a:solidFill>
+            <a:srgbClr val="C76829"/>
+          </a:solidFill>
+          <a:ln>
+            <a:noFill/>
+          </a:ln>
+        </p:spPr>
+        <p:txBody>
+          <a:bodyPr spcFirstLastPara="1" wrap="square" lIns="91425" tIns="45700" rIns="91425" bIns="45700" anchor="ctr" anchorCtr="0">
+            <a:noAutofit/>
+          </a:bodyPr>
+          <a:lstStyle/>
+          <a:p>
+            <a:pPr marL="0" marR="0" lvl="0" indent="0" algn="ctr" rtl="0">
+              <a:spcBef>
+                <a:spcPts val="0"/>
+              </a:spcBef>
+              <a:spcAft>
+                <a:spcPts val="0"/>
+              </a:spcAft>
+              <a:buNone/>
+            </a:pPr>
+            <a:endParaRPr>
+              <a:solidFill>
+                <a:schemeClr val="lt1"/>
+              </a:solidFill>
+              <a:latin typeface="Calibri"/>
+              <a:ea typeface="Calibri"/>
+              <a:cs typeface="Calibri"/>
+              <a:sym typeface="Calibri"/>
+            </a:endParaRPr>
+          </a:p>
+        </p:txBody>
+      </p:sp>
+      <p:sp>
+        <p:nvSpPr>
+          <p:cNvPr id="38" name="Google Shape;170;p2">
+            <a:extLst>
+              <a:ext uri="{FF2B5EF4-FFF2-40B4-BE49-F238E27FC236}">
+                <a16:creationId xmlns:a16="http://schemas.microsoft.com/office/drawing/2014/main" id="{01DA6036-3081-1346-AE35-C0786A8DE16A}"/>
+              </a:ext>
+            </a:extLst>
+          </p:cNvPr>
+          <p:cNvSpPr txBox="1"/>
+          <p:nvPr/>
+        </p:nvSpPr>
+        <p:spPr>
+          <a:xfrm>
+            <a:off x="62422" y="4326130"/>
+            <a:ext cx="2074814" cy="738623"/>
+          </a:xfrm>
+          <a:prstGeom prst="rect">
+            <a:avLst/>
+          </a:prstGeom>
+          <a:noFill/>
+          <a:ln>
+            <a:noFill/>
+          </a:ln>
+        </p:spPr>
+        <p:txBody>
+          <a:bodyPr spcFirstLastPara="1" wrap="square" lIns="91425" tIns="45700" rIns="91425" bIns="45700" anchor="t" anchorCtr="0">
+            <a:spAutoFit/>
+          </a:bodyPr>
+          <a:lstStyle/>
+          <a:p>
+            <a:pPr marL="0" marR="0" lvl="0" indent="0" algn="ctr" rtl="0">
+              <a:spcBef>
+                <a:spcPts val="0"/>
+              </a:spcBef>
+              <a:spcAft>
+                <a:spcPts val="0"/>
+              </a:spcAft>
+              <a:buNone/>
+            </a:pPr>
+            <a:r>
+              <a:rPr lang="en-US" dirty="0">
+                <a:solidFill>
+                  <a:schemeClr val="lt1"/>
+                </a:solidFill>
+                <a:latin typeface="Calibri"/>
+                <a:ea typeface="Calibri"/>
+                <a:cs typeface="Calibri"/>
+                <a:sym typeface="Calibri"/>
+              </a:rPr>
+              <a:t>Seasonal &amp; diel migrating coastal </a:t>
+            </a:r>
+            <a:r>
+              <a:rPr lang="en-US" dirty="0" err="1">
+                <a:solidFill>
+                  <a:schemeClr val="lt1"/>
+                </a:solidFill>
+                <a:latin typeface="Calibri"/>
+                <a:ea typeface="Calibri"/>
+                <a:cs typeface="Calibri"/>
+                <a:sym typeface="Calibri"/>
+              </a:rPr>
+              <a:t>pelagics</a:t>
+            </a:r>
+            <a:endParaRPr lang="en-US" dirty="0">
+              <a:solidFill>
+                <a:schemeClr val="lt1"/>
+              </a:solidFill>
+              <a:latin typeface="Calibri"/>
+              <a:ea typeface="Calibri"/>
+              <a:cs typeface="Calibri"/>
+              <a:sym typeface="Calibri"/>
+            </a:endParaRPr>
+          </a:p>
+          <a:p>
+            <a:pPr marL="0" marR="0" lvl="0" indent="0" algn="ctr" rtl="0">
+              <a:spcBef>
+                <a:spcPts val="0"/>
+              </a:spcBef>
+              <a:spcAft>
+                <a:spcPts val="0"/>
+              </a:spcAft>
+              <a:buNone/>
+            </a:pPr>
+            <a:r>
+              <a:rPr lang="en-US" dirty="0">
+                <a:solidFill>
+                  <a:schemeClr val="lt1"/>
+                </a:solidFill>
+                <a:latin typeface="Calibri"/>
+                <a:cs typeface="Calibri"/>
+                <a:sym typeface="Calibri"/>
+              </a:rPr>
+              <a:t>(55)</a:t>
+            </a:r>
+            <a:endParaRPr dirty="0"/>
+          </a:p>
+        </p:txBody>
+      </p:sp>
+      <p:sp>
+        <p:nvSpPr>
+          <p:cNvPr id="41" name="Google Shape;172;p2">
+            <a:extLst>
+              <a:ext uri="{FF2B5EF4-FFF2-40B4-BE49-F238E27FC236}">
+                <a16:creationId xmlns:a16="http://schemas.microsoft.com/office/drawing/2014/main" id="{EA319015-4BAE-1B48-BB5E-BA71A455A198}"/>
+              </a:ext>
+            </a:extLst>
+          </p:cNvPr>
+          <p:cNvSpPr/>
+          <p:nvPr/>
+        </p:nvSpPr>
+        <p:spPr>
+          <a:xfrm>
+            <a:off x="3869920" y="4430328"/>
+            <a:ext cx="1540989" cy="1019706"/>
+          </a:xfrm>
+          <a:prstGeom prst="ellipse">
+            <a:avLst/>
+          </a:prstGeom>
+          <a:solidFill>
+            <a:srgbClr val="D6A104"/>
+          </a:solidFill>
+          <a:ln>
+            <a:noFill/>
+          </a:ln>
+        </p:spPr>
+        <p:txBody>
+          <a:bodyPr spcFirstLastPara="1" wrap="square" lIns="91425" tIns="45700" rIns="91425" bIns="45700" anchor="ctr" anchorCtr="0">
+            <a:noAutofit/>
+          </a:bodyPr>
+          <a:lstStyle/>
+          <a:p>
+            <a:pPr marL="0" marR="0" lvl="0" indent="0" algn="ctr" rtl="0">
+              <a:spcBef>
+                <a:spcPts val="0"/>
+              </a:spcBef>
+              <a:spcAft>
+                <a:spcPts val="0"/>
+              </a:spcAft>
+              <a:buNone/>
+            </a:pPr>
+            <a:endParaRPr>
+              <a:solidFill>
+                <a:schemeClr val="lt1"/>
+              </a:solidFill>
+              <a:latin typeface="Calibri"/>
+              <a:ea typeface="Calibri"/>
+              <a:cs typeface="Calibri"/>
+              <a:sym typeface="Calibri"/>
+            </a:endParaRPr>
+          </a:p>
+        </p:txBody>
+      </p:sp>
+      <p:sp>
+        <p:nvSpPr>
+          <p:cNvPr id="49" name="Google Shape;198;p2">
+            <a:extLst>
+              <a:ext uri="{FF2B5EF4-FFF2-40B4-BE49-F238E27FC236}">
+                <a16:creationId xmlns:a16="http://schemas.microsoft.com/office/drawing/2014/main" id="{C0983C24-5D9B-864B-B8E0-711AE73BDF6C}"/>
+              </a:ext>
+            </a:extLst>
+          </p:cNvPr>
+          <p:cNvSpPr txBox="1"/>
+          <p:nvPr/>
+        </p:nvSpPr>
+        <p:spPr>
+          <a:xfrm>
+            <a:off x="3854762" y="4721433"/>
+            <a:ext cx="1556147" cy="738623"/>
+          </a:xfrm>
+          <a:prstGeom prst="rect">
+            <a:avLst/>
+          </a:prstGeom>
+          <a:noFill/>
+          <a:ln>
+            <a:noFill/>
+          </a:ln>
+        </p:spPr>
+        <p:txBody>
+          <a:bodyPr spcFirstLastPara="1" wrap="square" lIns="91425" tIns="45700" rIns="91425" bIns="45700" anchor="t" anchorCtr="0">
+            <a:spAutoFit/>
+          </a:bodyPr>
+          <a:lstStyle/>
+          <a:p>
+            <a:pPr marL="0" marR="0" lvl="0" indent="0" algn="ctr" rtl="0">
+              <a:spcBef>
+                <a:spcPts val="0"/>
+              </a:spcBef>
+              <a:spcAft>
+                <a:spcPts val="0"/>
+              </a:spcAft>
+              <a:buNone/>
+            </a:pPr>
+            <a:r>
+              <a:rPr lang="en-US" dirty="0">
+                <a:solidFill>
+                  <a:schemeClr val="lt1"/>
+                </a:solidFill>
+                <a:latin typeface="Calibri"/>
+                <a:ea typeface="Calibri"/>
+                <a:cs typeface="Calibri"/>
+                <a:sym typeface="Calibri"/>
+              </a:rPr>
+              <a:t>Diel migrating mesopelagic</a:t>
+            </a:r>
+          </a:p>
+          <a:p>
+            <a:pPr marL="0" marR="0" lvl="0" indent="0" algn="ctr" rtl="0">
+              <a:spcBef>
+                <a:spcPts val="0"/>
+              </a:spcBef>
+              <a:spcAft>
+                <a:spcPts val="0"/>
+              </a:spcAft>
+              <a:buNone/>
+            </a:pPr>
+            <a:r>
+              <a:rPr lang="en-US" dirty="0">
+                <a:solidFill>
+                  <a:schemeClr val="lt1"/>
+                </a:solidFill>
+                <a:latin typeface="Calibri"/>
+                <a:cs typeface="Calibri"/>
+                <a:sym typeface="Calibri"/>
+              </a:rPr>
+              <a:t>(88)</a:t>
+            </a:r>
+            <a:endParaRPr dirty="0"/>
+          </a:p>
+        </p:txBody>
+      </p:sp>
+      <p:sp>
+        <p:nvSpPr>
+          <p:cNvPr id="55" name="Google Shape;190;p2">
+            <a:extLst>
+              <a:ext uri="{FF2B5EF4-FFF2-40B4-BE49-F238E27FC236}">
+                <a16:creationId xmlns:a16="http://schemas.microsoft.com/office/drawing/2014/main" id="{C2518440-A5B0-4144-904D-09F12DABBD5B}"/>
+              </a:ext>
+            </a:extLst>
+          </p:cNvPr>
+          <p:cNvSpPr/>
+          <p:nvPr/>
+        </p:nvSpPr>
+        <p:spPr>
+          <a:xfrm>
+            <a:off x="4915009" y="3009141"/>
+            <a:ext cx="1294012" cy="1009540"/>
+          </a:xfrm>
+          <a:prstGeom prst="ellipse">
+            <a:avLst/>
+          </a:prstGeom>
+          <a:solidFill>
+            <a:srgbClr val="88A251"/>
+          </a:solidFill>
+          <a:ln>
+            <a:noFill/>
+          </a:ln>
+        </p:spPr>
+        <p:txBody>
+          <a:bodyPr spcFirstLastPara="1" wrap="square" lIns="91425" tIns="45700" rIns="91425" bIns="45700" anchor="ctr" anchorCtr="0">
+            <a:noAutofit/>
+          </a:bodyPr>
+          <a:lstStyle/>
+          <a:p>
+            <a:pPr marL="0" marR="0" lvl="0" indent="0" algn="ctr" rtl="0">
+              <a:spcBef>
+                <a:spcPts val="0"/>
+              </a:spcBef>
+              <a:spcAft>
+                <a:spcPts val="0"/>
+              </a:spcAft>
+              <a:buNone/>
+            </a:pPr>
+            <a:endParaRPr>
+              <a:solidFill>
+                <a:schemeClr val="lt1"/>
+              </a:solidFill>
+              <a:latin typeface="Calibri"/>
+              <a:ea typeface="Calibri"/>
+              <a:cs typeface="Calibri"/>
+              <a:sym typeface="Calibri"/>
+            </a:endParaRPr>
+          </a:p>
+        </p:txBody>
+      </p:sp>
+      <p:sp>
+        <p:nvSpPr>
+          <p:cNvPr id="56" name="Google Shape;191;p2">
+            <a:extLst>
+              <a:ext uri="{FF2B5EF4-FFF2-40B4-BE49-F238E27FC236}">
+                <a16:creationId xmlns:a16="http://schemas.microsoft.com/office/drawing/2014/main" id="{1C3AC8E6-3EC1-1D4A-AE33-00868E607A3C}"/>
+              </a:ext>
+            </a:extLst>
+          </p:cNvPr>
+          <p:cNvSpPr txBox="1"/>
+          <p:nvPr/>
+        </p:nvSpPr>
+        <p:spPr>
+          <a:xfrm>
+            <a:off x="4752245" y="3315740"/>
+            <a:ext cx="1611856" cy="738623"/>
+          </a:xfrm>
+          <a:prstGeom prst="rect">
+            <a:avLst/>
+          </a:prstGeom>
+          <a:noFill/>
+          <a:ln>
+            <a:noFill/>
+          </a:ln>
+        </p:spPr>
+        <p:txBody>
+          <a:bodyPr spcFirstLastPara="1" wrap="square" lIns="91425" tIns="45700" rIns="91425" bIns="45700" anchor="t" anchorCtr="0">
+            <a:spAutoFit/>
+          </a:bodyPr>
+          <a:lstStyle/>
+          <a:p>
+            <a:pPr marL="0" marR="0" lvl="0" indent="0" algn="ctr" rtl="0">
+              <a:spcBef>
+                <a:spcPts val="0"/>
+              </a:spcBef>
+              <a:spcAft>
+                <a:spcPts val="0"/>
+              </a:spcAft>
+              <a:buNone/>
+            </a:pPr>
+            <a:r>
+              <a:rPr lang="en-US" dirty="0">
+                <a:solidFill>
+                  <a:schemeClr val="lt1"/>
+                </a:solidFill>
+                <a:latin typeface="Calibri"/>
+                <a:ea typeface="Calibri"/>
+                <a:cs typeface="Calibri"/>
+                <a:sym typeface="Calibri"/>
+              </a:rPr>
+              <a:t>Coast to shelf </a:t>
+            </a:r>
+            <a:r>
+              <a:rPr lang="en-US" dirty="0" err="1">
+                <a:solidFill>
+                  <a:schemeClr val="lt1"/>
+                </a:solidFill>
+                <a:latin typeface="Calibri"/>
+                <a:ea typeface="Calibri"/>
+                <a:cs typeface="Calibri"/>
+                <a:sym typeface="Calibri"/>
+              </a:rPr>
+              <a:t>demersals</a:t>
+            </a:r>
+            <a:endParaRPr lang="en-US" dirty="0">
+              <a:solidFill>
+                <a:schemeClr val="lt1"/>
+              </a:solidFill>
+              <a:latin typeface="Calibri"/>
+              <a:ea typeface="Calibri"/>
+              <a:cs typeface="Calibri"/>
+              <a:sym typeface="Calibri"/>
+            </a:endParaRPr>
+          </a:p>
+          <a:p>
+            <a:pPr marL="0" marR="0" lvl="0" indent="0" algn="ctr" rtl="0">
+              <a:spcBef>
+                <a:spcPts val="0"/>
+              </a:spcBef>
+              <a:spcAft>
+                <a:spcPts val="0"/>
+              </a:spcAft>
+              <a:buNone/>
+            </a:pPr>
+            <a:r>
+              <a:rPr lang="en-US" dirty="0">
+                <a:solidFill>
+                  <a:schemeClr val="lt1"/>
+                </a:solidFill>
+                <a:latin typeface="Calibri"/>
+                <a:ea typeface="Calibri"/>
+                <a:cs typeface="Calibri"/>
+                <a:sym typeface="Calibri"/>
+              </a:rPr>
+              <a:t>(14)</a:t>
+            </a:r>
+            <a:endParaRPr dirty="0">
+              <a:solidFill>
+                <a:schemeClr val="lt1"/>
+              </a:solidFill>
+              <a:latin typeface="Calibri"/>
+              <a:ea typeface="Calibri"/>
+              <a:cs typeface="Calibri"/>
+              <a:sym typeface="Calibri"/>
+            </a:endParaRPr>
+          </a:p>
+        </p:txBody>
+      </p:sp>
+      <p:sp>
+        <p:nvSpPr>
+          <p:cNvPr id="60" name="Google Shape;173;p2">
+            <a:extLst>
+              <a:ext uri="{FF2B5EF4-FFF2-40B4-BE49-F238E27FC236}">
+                <a16:creationId xmlns:a16="http://schemas.microsoft.com/office/drawing/2014/main" id="{4E7BD754-C909-DC43-AE78-59B7A86E15C7}"/>
+              </a:ext>
+            </a:extLst>
+          </p:cNvPr>
+          <p:cNvSpPr/>
+          <p:nvPr/>
+        </p:nvSpPr>
+        <p:spPr>
+          <a:xfrm>
+            <a:off x="4210646" y="1742194"/>
+            <a:ext cx="2101350" cy="945866"/>
+          </a:xfrm>
+          <a:prstGeom prst="ellipse">
+            <a:avLst/>
+          </a:prstGeom>
+          <a:solidFill>
+            <a:srgbClr val="4781A2"/>
+          </a:solidFill>
+          <a:ln>
+            <a:noFill/>
+          </a:ln>
+        </p:spPr>
+        <p:txBody>
+          <a:bodyPr spcFirstLastPara="1" wrap="square" lIns="91425" tIns="45700" rIns="91425" bIns="45700" anchor="ctr" anchorCtr="0">
+            <a:noAutofit/>
+          </a:bodyPr>
+          <a:lstStyle/>
+          <a:p>
+            <a:pPr marL="0" marR="0" lvl="0" indent="0" algn="ctr" rtl="0">
+              <a:spcBef>
+                <a:spcPts val="0"/>
+              </a:spcBef>
+              <a:spcAft>
+                <a:spcPts val="0"/>
+              </a:spcAft>
+              <a:buNone/>
+            </a:pPr>
+            <a:endParaRPr>
+              <a:solidFill>
+                <a:schemeClr val="lt1"/>
+              </a:solidFill>
+              <a:latin typeface="Calibri"/>
+              <a:ea typeface="Calibri"/>
+              <a:cs typeface="Calibri"/>
+              <a:sym typeface="Calibri"/>
+            </a:endParaRPr>
+          </a:p>
+        </p:txBody>
+      </p:sp>
+      <p:sp>
+        <p:nvSpPr>
+          <p:cNvPr id="61" name="Google Shape;174;p2">
+            <a:extLst>
+              <a:ext uri="{FF2B5EF4-FFF2-40B4-BE49-F238E27FC236}">
+                <a16:creationId xmlns:a16="http://schemas.microsoft.com/office/drawing/2014/main" id="{EE8AD8D3-6D0D-9744-B857-77C75986CB34}"/>
+              </a:ext>
+            </a:extLst>
+          </p:cNvPr>
+          <p:cNvSpPr txBox="1"/>
+          <p:nvPr/>
+        </p:nvSpPr>
+        <p:spPr>
+          <a:xfrm>
+            <a:off x="4261424" y="1997355"/>
+            <a:ext cx="1942678" cy="738623"/>
+          </a:xfrm>
+          <a:prstGeom prst="rect">
+            <a:avLst/>
+          </a:prstGeom>
+          <a:noFill/>
+          <a:ln>
+            <a:noFill/>
+          </a:ln>
+        </p:spPr>
+        <p:txBody>
+          <a:bodyPr spcFirstLastPara="1" wrap="square" lIns="91425" tIns="45700" rIns="91425" bIns="45700" anchor="t" anchorCtr="0">
+            <a:spAutoFit/>
+          </a:bodyPr>
+          <a:lstStyle/>
+          <a:p>
+            <a:pPr marL="0" marR="0" lvl="0" indent="0" algn="ctr" rtl="0">
+              <a:spcBef>
+                <a:spcPts val="0"/>
+              </a:spcBef>
+              <a:spcAft>
+                <a:spcPts val="0"/>
+              </a:spcAft>
+              <a:buNone/>
+            </a:pPr>
+            <a:r>
+              <a:rPr lang="en-US" dirty="0">
+                <a:solidFill>
+                  <a:schemeClr val="lt1"/>
+                </a:solidFill>
+                <a:latin typeface="Calibri"/>
+                <a:ea typeface="Calibri"/>
+                <a:cs typeface="Calibri"/>
+                <a:sym typeface="Calibri"/>
+              </a:rPr>
+              <a:t>Seasonal migrant, coast to shelf </a:t>
+            </a:r>
+            <a:r>
+              <a:rPr lang="en-US" dirty="0" err="1">
+                <a:solidFill>
+                  <a:schemeClr val="lt1"/>
+                </a:solidFill>
+                <a:latin typeface="Calibri"/>
+                <a:ea typeface="Calibri"/>
+                <a:cs typeface="Calibri"/>
+                <a:sym typeface="Calibri"/>
+              </a:rPr>
+              <a:t>epipelagics</a:t>
+            </a:r>
+            <a:endParaRPr lang="en-US" dirty="0">
+              <a:solidFill>
+                <a:schemeClr val="lt1"/>
+              </a:solidFill>
+              <a:latin typeface="Calibri"/>
+              <a:ea typeface="Calibri"/>
+              <a:cs typeface="Calibri"/>
+              <a:sym typeface="Calibri"/>
+            </a:endParaRPr>
+          </a:p>
+          <a:p>
+            <a:pPr marL="0" marR="0" lvl="0" indent="0" algn="ctr" rtl="0">
+              <a:spcBef>
+                <a:spcPts val="0"/>
+              </a:spcBef>
+              <a:spcAft>
+                <a:spcPts val="0"/>
+              </a:spcAft>
+              <a:buNone/>
+            </a:pPr>
+            <a:r>
+              <a:rPr lang="en-US" dirty="0">
+                <a:solidFill>
+                  <a:schemeClr val="lt1"/>
+                </a:solidFill>
+                <a:latin typeface="Calibri"/>
+                <a:ea typeface="Calibri"/>
+                <a:cs typeface="Calibri"/>
+                <a:sym typeface="Calibri"/>
+              </a:rPr>
+              <a:t>(53)</a:t>
+            </a:r>
+            <a:endParaRPr dirty="0">
+              <a:solidFill>
+                <a:schemeClr val="lt1"/>
+              </a:solidFill>
+              <a:latin typeface="Calibri"/>
+              <a:ea typeface="Calibri"/>
+              <a:cs typeface="Calibri"/>
+              <a:sym typeface="Calibri"/>
+            </a:endParaRPr>
+          </a:p>
+        </p:txBody>
+      </p:sp>
+      <p:sp>
+        <p:nvSpPr>
+          <p:cNvPr id="63" name="Google Shape;177;p2">
+            <a:extLst>
+              <a:ext uri="{FF2B5EF4-FFF2-40B4-BE49-F238E27FC236}">
+                <a16:creationId xmlns:a16="http://schemas.microsoft.com/office/drawing/2014/main" id="{0DDCDA92-FC0B-C64D-A5DE-F07AAE08C82C}"/>
+              </a:ext>
+            </a:extLst>
+          </p:cNvPr>
+          <p:cNvSpPr/>
+          <p:nvPr/>
+        </p:nvSpPr>
+        <p:spPr>
+          <a:xfrm>
+            <a:off x="2588599" y="665490"/>
+            <a:ext cx="1480201" cy="1065841"/>
+          </a:xfrm>
+          <a:prstGeom prst="ellipse">
+            <a:avLst/>
+          </a:prstGeom>
+          <a:solidFill>
+            <a:srgbClr val="3E597D"/>
+          </a:solidFill>
+          <a:ln>
+            <a:noFill/>
+          </a:ln>
+        </p:spPr>
+        <p:txBody>
+          <a:bodyPr spcFirstLastPara="1" wrap="square" lIns="91425" tIns="45700" rIns="91425" bIns="45700" anchor="ctr" anchorCtr="0">
+            <a:noAutofit/>
+          </a:bodyPr>
+          <a:lstStyle/>
+          <a:p>
+            <a:pPr marL="0" marR="0" lvl="0" indent="0" algn="ctr" rtl="0">
+              <a:spcBef>
+                <a:spcPts val="0"/>
+              </a:spcBef>
+              <a:spcAft>
+                <a:spcPts val="0"/>
+              </a:spcAft>
+              <a:buNone/>
+            </a:pPr>
+            <a:endParaRPr>
+              <a:solidFill>
+                <a:schemeClr val="lt1"/>
+              </a:solidFill>
+              <a:latin typeface="Calibri"/>
+              <a:ea typeface="Calibri"/>
+              <a:cs typeface="Calibri"/>
+              <a:sym typeface="Calibri"/>
+            </a:endParaRPr>
+          </a:p>
+        </p:txBody>
+      </p:sp>
+      <p:sp>
+        <p:nvSpPr>
+          <p:cNvPr id="64" name="Google Shape;178;p2">
+            <a:extLst>
+              <a:ext uri="{FF2B5EF4-FFF2-40B4-BE49-F238E27FC236}">
+                <a16:creationId xmlns:a16="http://schemas.microsoft.com/office/drawing/2014/main" id="{2E787736-1FA6-6841-B0B2-D2F44DC537CE}"/>
+              </a:ext>
+            </a:extLst>
+          </p:cNvPr>
+          <p:cNvSpPr txBox="1"/>
+          <p:nvPr/>
+        </p:nvSpPr>
+        <p:spPr>
+          <a:xfrm>
+            <a:off x="2485937" y="1033356"/>
+            <a:ext cx="1724709" cy="738623"/>
+          </a:xfrm>
+          <a:prstGeom prst="rect">
+            <a:avLst/>
+          </a:prstGeom>
+          <a:noFill/>
+          <a:ln>
+            <a:noFill/>
+          </a:ln>
+        </p:spPr>
+        <p:txBody>
+          <a:bodyPr spcFirstLastPara="1" wrap="square" lIns="91425" tIns="45700" rIns="91425" bIns="45700" anchor="t" anchorCtr="0">
+            <a:spAutoFit/>
+          </a:bodyPr>
+          <a:lstStyle/>
+          <a:p>
+            <a:pPr marL="0" marR="0" lvl="0" indent="0" algn="ctr" rtl="0">
+              <a:spcBef>
+                <a:spcPts val="0"/>
+              </a:spcBef>
+              <a:spcAft>
+                <a:spcPts val="0"/>
+              </a:spcAft>
+              <a:buNone/>
+            </a:pPr>
+            <a:r>
+              <a:rPr lang="en-US" dirty="0">
+                <a:solidFill>
+                  <a:schemeClr val="lt1"/>
+                </a:solidFill>
+                <a:latin typeface="Calibri"/>
+                <a:ea typeface="Calibri"/>
+                <a:cs typeface="Calibri"/>
+                <a:sym typeface="Calibri"/>
+              </a:rPr>
+              <a:t>Non-diel migrant </a:t>
+            </a:r>
+            <a:r>
+              <a:rPr lang="en-US" dirty="0" err="1">
+                <a:solidFill>
+                  <a:schemeClr val="lt1"/>
+                </a:solidFill>
+                <a:latin typeface="Calibri"/>
+                <a:ea typeface="Calibri"/>
+                <a:cs typeface="Calibri"/>
+                <a:sym typeface="Calibri"/>
+              </a:rPr>
+              <a:t>mesopelagics</a:t>
+            </a:r>
+            <a:r>
+              <a:rPr lang="en-US" dirty="0">
+                <a:solidFill>
+                  <a:schemeClr val="lt1"/>
+                </a:solidFill>
+                <a:latin typeface="Calibri"/>
+                <a:ea typeface="Calibri"/>
+                <a:cs typeface="Calibri"/>
+                <a:sym typeface="Calibri"/>
+              </a:rPr>
+              <a:t> </a:t>
+            </a:r>
+          </a:p>
+          <a:p>
+            <a:pPr marL="0" marR="0" lvl="0" indent="0" algn="ctr" rtl="0">
+              <a:spcBef>
+                <a:spcPts val="0"/>
+              </a:spcBef>
+              <a:spcAft>
+                <a:spcPts val="0"/>
+              </a:spcAft>
+              <a:buNone/>
+            </a:pPr>
+            <a:r>
+              <a:rPr lang="en-US" dirty="0">
+                <a:solidFill>
+                  <a:schemeClr val="lt1"/>
+                </a:solidFill>
+                <a:latin typeface="Calibri"/>
+                <a:ea typeface="Calibri"/>
+                <a:cs typeface="Calibri"/>
+                <a:sym typeface="Calibri"/>
+              </a:rPr>
+              <a:t>(12)</a:t>
+            </a:r>
+            <a:endParaRPr dirty="0">
+              <a:solidFill>
+                <a:schemeClr val="lt1"/>
+              </a:solidFill>
+              <a:latin typeface="Calibri"/>
+              <a:ea typeface="Calibri"/>
+              <a:cs typeface="Calibri"/>
+              <a:sym typeface="Calibri"/>
+            </a:endParaRPr>
+          </a:p>
+        </p:txBody>
+      </p:sp>
+      <p:pic>
+        <p:nvPicPr>
+          <p:cNvPr id="67" name="Google Shape;124;p1">
+            <a:extLst>
+              <a:ext uri="{FF2B5EF4-FFF2-40B4-BE49-F238E27FC236}">
+                <a16:creationId xmlns:a16="http://schemas.microsoft.com/office/drawing/2014/main" id="{D8EA03A8-6B00-2C49-A6FA-036C1F515610}"/>
+              </a:ext>
+            </a:extLst>
+          </p:cNvPr>
+          <p:cNvPicPr preferRelativeResize="0"/>
+          <p:nvPr/>
+        </p:nvPicPr>
+        <p:blipFill rotWithShape="1">
+          <a:blip r:embed="rId4">
+            <a:alphaModFix/>
+          </a:blip>
+          <a:srcRect/>
+          <a:stretch/>
+        </p:blipFill>
+        <p:spPr>
+          <a:xfrm>
+            <a:off x="3038016" y="665491"/>
+            <a:ext cx="597559" cy="447592"/>
+          </a:xfrm>
+          <a:prstGeom prst="rect">
+            <a:avLst/>
+          </a:prstGeom>
+          <a:noFill/>
+          <a:ln>
+            <a:noFill/>
+          </a:ln>
+        </p:spPr>
+      </p:pic>
+      <p:pic>
+        <p:nvPicPr>
+          <p:cNvPr id="68" name="Google Shape;130;p1">
+            <a:extLst>
+              <a:ext uri="{FF2B5EF4-FFF2-40B4-BE49-F238E27FC236}">
+                <a16:creationId xmlns:a16="http://schemas.microsoft.com/office/drawing/2014/main" id="{C74128A3-3C35-1644-846C-397F58605B25}"/>
+              </a:ext>
+            </a:extLst>
+          </p:cNvPr>
+          <p:cNvPicPr preferRelativeResize="0"/>
+          <p:nvPr/>
+        </p:nvPicPr>
+        <p:blipFill rotWithShape="1">
+          <a:blip r:embed="rId5">
+            <a:alphaModFix/>
+          </a:blip>
+          <a:srcRect t="12447" b="48885"/>
+          <a:stretch/>
+        </p:blipFill>
+        <p:spPr>
+          <a:xfrm>
+            <a:off x="4576540" y="1732445"/>
+            <a:ext cx="1336654" cy="365930"/>
+          </a:xfrm>
+          <a:prstGeom prst="rect">
+            <a:avLst/>
+          </a:prstGeom>
+          <a:noFill/>
+          <a:ln>
+            <a:noFill/>
+          </a:ln>
+        </p:spPr>
+      </p:pic>
+      <p:pic>
+        <p:nvPicPr>
+          <p:cNvPr id="69" name="Google Shape;197;p2">
+            <a:extLst>
+              <a:ext uri="{FF2B5EF4-FFF2-40B4-BE49-F238E27FC236}">
+                <a16:creationId xmlns:a16="http://schemas.microsoft.com/office/drawing/2014/main" id="{B8AB4EAA-F908-6749-87D5-E4ECC164B3A0}"/>
+              </a:ext>
+            </a:extLst>
+          </p:cNvPr>
+          <p:cNvPicPr preferRelativeResize="0"/>
+          <p:nvPr/>
+        </p:nvPicPr>
+        <p:blipFill rotWithShape="1">
+          <a:blip r:embed="rId6">
+            <a:alphaModFix/>
+          </a:blip>
+          <a:srcRect/>
+          <a:stretch/>
+        </p:blipFill>
+        <p:spPr>
+          <a:xfrm>
+            <a:off x="5103470" y="3057477"/>
+            <a:ext cx="914775" cy="371523"/>
+          </a:xfrm>
+          <a:prstGeom prst="rect">
+            <a:avLst/>
+          </a:prstGeom>
+          <a:noFill/>
+          <a:ln>
+            <a:noFill/>
+          </a:ln>
+        </p:spPr>
+      </p:pic>
+      <p:pic>
+        <p:nvPicPr>
+          <p:cNvPr id="70" name="Google Shape;194;p2">
+            <a:extLst>
+              <a:ext uri="{FF2B5EF4-FFF2-40B4-BE49-F238E27FC236}">
+                <a16:creationId xmlns:a16="http://schemas.microsoft.com/office/drawing/2014/main" id="{328B4732-9B31-6046-9315-3D41CDF2EC2C}"/>
+              </a:ext>
+            </a:extLst>
+          </p:cNvPr>
+          <p:cNvPicPr preferRelativeResize="0"/>
+          <p:nvPr/>
+        </p:nvPicPr>
+        <p:blipFill rotWithShape="1">
+          <a:blip r:embed="rId7">
+            <a:alphaModFix/>
+          </a:blip>
+          <a:srcRect/>
+          <a:stretch/>
+        </p:blipFill>
+        <p:spPr>
+          <a:xfrm rot="21104814">
+            <a:off x="4149888" y="4394543"/>
+            <a:ext cx="978010" cy="473271"/>
+          </a:xfrm>
+          <a:prstGeom prst="rect">
+            <a:avLst/>
+          </a:prstGeom>
+          <a:noFill/>
+          <a:ln>
+            <a:noFill/>
+          </a:ln>
+        </p:spPr>
+      </p:pic>
+      <p:pic>
+        <p:nvPicPr>
+          <p:cNvPr id="72" name="Google Shape;182;p2">
+            <a:extLst>
+              <a:ext uri="{FF2B5EF4-FFF2-40B4-BE49-F238E27FC236}">
+                <a16:creationId xmlns:a16="http://schemas.microsoft.com/office/drawing/2014/main" id="{C3553E02-2938-C245-8F24-5BBED158FCA2}"/>
+              </a:ext>
+            </a:extLst>
+          </p:cNvPr>
+          <p:cNvPicPr preferRelativeResize="0"/>
+          <p:nvPr/>
+        </p:nvPicPr>
+        <p:blipFill rotWithShape="1">
+          <a:blip r:embed="rId8">
+            <a:alphaModFix/>
+            <a:duotone>
+              <a:schemeClr val="accent3">
+                <a:shade val="45000"/>
+                <a:satMod val="135000"/>
+              </a:schemeClr>
+              <a:prstClr val="white"/>
+            </a:duotone>
+          </a:blip>
+          <a:srcRect/>
+          <a:stretch/>
+        </p:blipFill>
+        <p:spPr>
+          <a:xfrm>
+            <a:off x="718187" y="3869614"/>
+            <a:ext cx="881752" cy="625653"/>
+          </a:xfrm>
+          <a:prstGeom prst="rect">
+            <a:avLst/>
+          </a:prstGeom>
+          <a:noFill/>
+          <a:ln>
+            <a:noFill/>
+          </a:ln>
+        </p:spPr>
+      </p:pic>
+      <p:pic>
+        <p:nvPicPr>
+          <p:cNvPr id="73" name="Google Shape;200;p2">
+            <a:extLst>
+              <a:ext uri="{FF2B5EF4-FFF2-40B4-BE49-F238E27FC236}">
+                <a16:creationId xmlns:a16="http://schemas.microsoft.com/office/drawing/2014/main" id="{AF487E2F-41D9-D343-B90A-B4FB29DB106E}"/>
+              </a:ext>
+            </a:extLst>
+          </p:cNvPr>
+          <p:cNvPicPr preferRelativeResize="0"/>
+          <p:nvPr/>
+        </p:nvPicPr>
+        <p:blipFill rotWithShape="1">
+          <a:blip r:embed="rId9">
+            <a:alphaModFix/>
+          </a:blip>
+          <a:srcRect/>
+          <a:stretch/>
+        </p:blipFill>
+        <p:spPr>
+          <a:xfrm>
+            <a:off x="946342" y="1392918"/>
+            <a:ext cx="763617" cy="461623"/>
+          </a:xfrm>
+          <a:prstGeom prst="rect">
+            <a:avLst/>
+          </a:prstGeom>
+          <a:noFill/>
+          <a:ln>
+            <a:noFill/>
+          </a:ln>
+        </p:spPr>
+      </p:pic>
+      <p:pic>
+        <p:nvPicPr>
+          <p:cNvPr id="6" name="Picture 5" descr="Chart, radar chart&#10;&#10;Description automatically generated">
+            <a:extLst>
+              <a:ext uri="{FF2B5EF4-FFF2-40B4-BE49-F238E27FC236}">
+                <a16:creationId xmlns:a16="http://schemas.microsoft.com/office/drawing/2014/main" id="{312DC0A5-FCFA-EDA3-DBEB-FCE6843D37CD}"/>
+              </a:ext>
+            </a:extLst>
+          </p:cNvPr>
+          <p:cNvPicPr>
+            <a:picLocks noChangeAspect="1"/>
+          </p:cNvPicPr>
+          <p:nvPr/>
+        </p:nvPicPr>
+        <p:blipFill>
+          <a:blip r:embed="rId10"/>
+          <a:stretch>
+            <a:fillRect/>
+          </a:stretch>
+        </p:blipFill>
+        <p:spPr>
+          <a:xfrm>
+            <a:off x="6325042" y="-113260"/>
+            <a:ext cx="6858000" cy="6858000"/>
+          </a:xfrm>
+          <a:prstGeom prst="rect">
+            <a:avLst/>
+          </a:prstGeom>
+        </p:spPr>
+      </p:pic>
+      <p:sp>
+        <p:nvSpPr>
+          <p:cNvPr id="46" name="Google Shape;257;gd33cc45fa0_1_0">
+            <a:extLst>
+              <a:ext uri="{FF2B5EF4-FFF2-40B4-BE49-F238E27FC236}">
+                <a16:creationId xmlns:a16="http://schemas.microsoft.com/office/drawing/2014/main" id="{101A7282-FCD2-F591-6F0D-CB111EF8C5E7}"/>
+              </a:ext>
+            </a:extLst>
+          </p:cNvPr>
+          <p:cNvSpPr txBox="1"/>
+          <p:nvPr/>
+        </p:nvSpPr>
+        <p:spPr>
+          <a:xfrm>
+            <a:off x="6575061" y="1178043"/>
+            <a:ext cx="717855" cy="369291"/>
+          </a:xfrm>
+          <a:prstGeom prst="rect">
+            <a:avLst/>
+          </a:prstGeom>
+          <a:noFill/>
+          <a:ln>
+            <a:noFill/>
+          </a:ln>
+        </p:spPr>
+        <p:txBody>
+          <a:bodyPr spcFirstLastPara="1" wrap="square" lIns="91425" tIns="45700" rIns="91425" bIns="45700" anchor="t" anchorCtr="0">
+            <a:spAutoFit/>
+          </a:bodyPr>
+          <a:lstStyle/>
+          <a:p>
+            <a:pPr marL="0" marR="0" lvl="0" indent="0" algn="ctr" rtl="0">
+              <a:spcBef>
+                <a:spcPts val="0"/>
+              </a:spcBef>
+              <a:spcAft>
+                <a:spcPts val="0"/>
+              </a:spcAft>
+              <a:buNone/>
+            </a:pPr>
+            <a:r>
+              <a:rPr lang="en-US" sz="1800" dirty="0">
+                <a:solidFill>
+                  <a:schemeClr val="tx1"/>
+                </a:solidFill>
+                <a:latin typeface="Calibri"/>
+                <a:ea typeface="Calibri"/>
+                <a:cs typeface="Calibri"/>
+                <a:sym typeface="Calibri"/>
+              </a:rPr>
+              <a:t>b)</a:t>
+            </a:r>
+            <a:endParaRPr sz="1800" dirty="0">
+              <a:solidFill>
+                <a:schemeClr val="tx1"/>
+              </a:solidFill>
+              <a:latin typeface="Calibri"/>
+              <a:ea typeface="Calibri"/>
+              <a:cs typeface="Calibri"/>
+              <a:sym typeface="Calibri"/>
+            </a:endParaRPr>
+          </a:p>
+        </p:txBody>
+      </p:sp>
+    </p:spTree>
+    <p:extLst>
+      <p:ext uri="{BB962C8B-B14F-4D97-AF65-F5344CB8AC3E}">
+        <p14:creationId xmlns:p14="http://schemas.microsoft.com/office/powerpoint/2010/main" val="4063802132"/>
+      </p:ext>
+    </p:extLst>
+  </p:cSld>
+  <p:clrMapOvr>
+    <a:masterClrMapping/>
+  </p:clrMapOvr>
+</p:sld>
+</file>
+
 <file path=ppt/theme/theme1.xml><?xml version="1.0" encoding="utf-8"?>
 <a:theme xmlns:a="http://schemas.openxmlformats.org/drawingml/2006/main" name="Office Theme">
   <a:themeElements>

</xml_diff>

<commit_message>
+ Working on clusters, Figure 3, outputs
</commit_message>
<xml_diff>
--- a/outputs_figures/ms_figures/fig3_clusters/dendrogram_radial.pptx
+++ b/outputs_figures/ms_figures/fig3_clusters/dendrogram_radial.pptx
@@ -9,7 +9,7 @@
   </p:notesMasterIdLst>
   <p:sldIdLst>
     <p:sldId id="261" r:id="rId2"/>
-    <p:sldId id="262" r:id="rId3"/>
+    <p:sldId id="263" r:id="rId3"/>
   </p:sldIdLst>
   <p:sldSz cx="12192000" cy="6858000"/>
   <p:notesSz cx="6858000" cy="9144000"/>
@@ -256,7 +256,7 @@
       <p15:sldGuideLst xmlns:p15="http://schemas.microsoft.com/office/powerpoint/2012/main"/>
     </p:ext>
     <p:ext uri="http://customooxmlschemas.google.com/">
-      <go:slidesCustomData xmlns:go="http://customooxmlschemas.google.com/" xmlns:ahyp="http://schemas.microsoft.com/office/drawing/2018/hyperlinkcolor" xmlns:p15="http://schemas.microsoft.com/office/powerpoint/2012/main" xmlns:p14="http://schemas.microsoft.com/office/powerpoint/2010/main" xmlns:com="http://schemas.openxmlformats.org/drawingml/2006/compatibility" xmlns:pvml="urn:schemas-microsoft-com:office:powerpoint" xmlns:v="urn:schemas-microsoft-com:vml" xmlns:o="urn:schemas-microsoft-com:office:office" xmlns:dgm="http://schemas.openxmlformats.org/drawingml/2006/diagram" xmlns:c="http://schemas.openxmlformats.org/drawingml/2006/chart" xmlns:mv="urn:schemas-microsoft-com:mac:vml" xmlns:mc="http://schemas.openxmlformats.org/markup-compatibility/2006" xmlns="" r:id="rId21" roundtripDataSignature="AMtx7mjkqRRnulKP6R/VTqMqjzmVO72BhA=="/>
+      <go:slidesCustomData xmlns="" xmlns:mc="http://schemas.openxmlformats.org/markup-compatibility/2006" xmlns:mv="urn:schemas-microsoft-com:mac:vml" xmlns:c="http://schemas.openxmlformats.org/drawingml/2006/chart" xmlns:dgm="http://schemas.openxmlformats.org/drawingml/2006/diagram" xmlns:o="urn:schemas-microsoft-com:office:office" xmlns:v="urn:schemas-microsoft-com:vml" xmlns:pvml="urn:schemas-microsoft-com:office:powerpoint" xmlns:com="http://schemas.openxmlformats.org/drawingml/2006/compatibility" xmlns:p14="http://schemas.microsoft.com/office/powerpoint/2010/main" xmlns:p15="http://schemas.microsoft.com/office/powerpoint/2012/main" xmlns:ahyp="http://schemas.microsoft.com/office/drawing/2018/hyperlinkcolor" xmlns:go="http://customooxmlschemas.google.com/" r:id="rId21" roundtripDataSignature="AMtx7mjkqRRnulKP6R/VTqMqjzmVO72BhA=="/>
     </p:ext>
   </p:extLst>
 </p:presentation>
@@ -969,7 +969,7 @@
     </p:spTree>
     <p:extLst>
       <p:ext uri="{BB962C8B-B14F-4D97-AF65-F5344CB8AC3E}">
-        <p14:creationId xmlns:p14="http://schemas.microsoft.com/office/powerpoint/2010/main" val="340915430"/>
+        <p14:creationId xmlns:p14="http://schemas.microsoft.com/office/powerpoint/2010/main" val="2574240880"/>
       </p:ext>
     </p:extLst>
   </p:cSld>
@@ -10720,6 +10720,2434 @@
 </file>
 
 <file path=ppt/slides/slide1.xml><?xml version="1.0" encoding="utf-8"?>
+<p:sld xmlns:a="http://schemas.openxmlformats.org/drawingml/2006/main" xmlns:r="http://schemas.openxmlformats.org/officeDocument/2006/relationships" xmlns:p="http://schemas.openxmlformats.org/presentationml/2006/main">
+  <p:cSld>
+    <p:spTree>
+      <p:nvGrpSpPr>
+        <p:cNvPr id="1" name="Shape 281"/>
+        <p:cNvGrpSpPr/>
+        <p:nvPr/>
+      </p:nvGrpSpPr>
+      <p:grpSpPr>
+        <a:xfrm>
+          <a:off x="0" y="0"/>
+          <a:ext cx="0" cy="0"/>
+          <a:chOff x="0" y="0"/>
+          <a:chExt cx="0" cy="0"/>
+        </a:xfrm>
+      </p:grpSpPr>
+      <p:pic>
+        <p:nvPicPr>
+          <p:cNvPr id="5" name="Picture 4">
+            <a:extLst>
+              <a:ext uri="{FF2B5EF4-FFF2-40B4-BE49-F238E27FC236}">
+                <a16:creationId xmlns:a16="http://schemas.microsoft.com/office/drawing/2014/main" id="{905AFFCA-9F5A-2A43-AA5A-0DA70F6C91BA}"/>
+              </a:ext>
+            </a:extLst>
+          </p:cNvPr>
+          <p:cNvPicPr>
+            <a:picLocks noChangeAspect="1"/>
+          </p:cNvPicPr>
+          <p:nvPr/>
+        </p:nvPicPr>
+        <p:blipFill>
+          <a:blip r:embed="rId3"/>
+          <a:srcRect t="714" b="714"/>
+          <a:stretch/>
+        </p:blipFill>
+        <p:spPr>
+          <a:xfrm>
+            <a:off x="160934" y="362700"/>
+            <a:ext cx="6023949" cy="5937891"/>
+          </a:xfrm>
+          <a:prstGeom prst="rect">
+            <a:avLst/>
+          </a:prstGeom>
+        </p:spPr>
+      </p:pic>
+      <p:pic>
+        <p:nvPicPr>
+          <p:cNvPr id="7" name="Picture 6" descr="Chart&#10;&#10;Description automatically generated">
+            <a:extLst>
+              <a:ext uri="{FF2B5EF4-FFF2-40B4-BE49-F238E27FC236}">
+                <a16:creationId xmlns:a16="http://schemas.microsoft.com/office/drawing/2014/main" id="{8AB3D435-ADD5-364F-A74D-C4AB6326B275}"/>
+              </a:ext>
+            </a:extLst>
+          </p:cNvPr>
+          <p:cNvPicPr>
+            <a:picLocks noChangeAspect="1"/>
+          </p:cNvPicPr>
+          <p:nvPr/>
+        </p:nvPicPr>
+        <p:blipFill rotWithShape="1">
+          <a:blip r:embed="rId4"/>
+          <a:srcRect t="12424" r="13247" b="12961"/>
+          <a:stretch/>
+        </p:blipFill>
+        <p:spPr>
+          <a:xfrm>
+            <a:off x="6671360" y="1002324"/>
+            <a:ext cx="5374101" cy="4622256"/>
+          </a:xfrm>
+          <a:prstGeom prst="rect">
+            <a:avLst/>
+          </a:prstGeom>
+        </p:spPr>
+      </p:pic>
+      <p:sp>
+        <p:nvSpPr>
+          <p:cNvPr id="12" name="Google Shape;257;gd33cc45fa0_1_0">
+            <a:extLst>
+              <a:ext uri="{FF2B5EF4-FFF2-40B4-BE49-F238E27FC236}">
+                <a16:creationId xmlns:a16="http://schemas.microsoft.com/office/drawing/2014/main" id="{A2B5E293-3448-F54C-AECB-63767A9721CC}"/>
+              </a:ext>
+            </a:extLst>
+          </p:cNvPr>
+          <p:cNvSpPr txBox="1"/>
+          <p:nvPr/>
+        </p:nvSpPr>
+        <p:spPr>
+          <a:xfrm>
+            <a:off x="-752166" y="358044"/>
+            <a:ext cx="2118600" cy="369291"/>
+          </a:xfrm>
+          <a:prstGeom prst="rect">
+            <a:avLst/>
+          </a:prstGeom>
+          <a:noFill/>
+          <a:ln>
+            <a:noFill/>
+          </a:ln>
+        </p:spPr>
+        <p:txBody>
+          <a:bodyPr spcFirstLastPara="1" wrap="square" lIns="91425" tIns="45700" rIns="91425" bIns="45700" anchor="t" anchorCtr="0">
+            <a:spAutoFit/>
+          </a:bodyPr>
+          <a:lstStyle/>
+          <a:p>
+            <a:pPr marL="0" marR="0" lvl="0" indent="0" algn="ctr" rtl="0">
+              <a:spcBef>
+                <a:spcPts val="0"/>
+              </a:spcBef>
+              <a:spcAft>
+                <a:spcPts val="0"/>
+              </a:spcAft>
+              <a:buNone/>
+            </a:pPr>
+            <a:r>
+              <a:rPr lang="en-US" sz="1800" dirty="0">
+                <a:solidFill>
+                  <a:schemeClr val="tx1"/>
+                </a:solidFill>
+                <a:latin typeface="Calibri"/>
+                <a:ea typeface="Calibri"/>
+                <a:cs typeface="Calibri"/>
+                <a:sym typeface="Calibri"/>
+              </a:rPr>
+              <a:t>a)</a:t>
+            </a:r>
+            <a:endParaRPr sz="1800" dirty="0">
+              <a:solidFill>
+                <a:schemeClr val="tx1"/>
+              </a:solidFill>
+              <a:latin typeface="Calibri"/>
+              <a:ea typeface="Calibri"/>
+              <a:cs typeface="Calibri"/>
+              <a:sym typeface="Calibri"/>
+            </a:endParaRPr>
+          </a:p>
+        </p:txBody>
+      </p:sp>
+      <p:sp>
+        <p:nvSpPr>
+          <p:cNvPr id="13" name="Google Shape;257;gd33cc45fa0_1_0">
+            <a:extLst>
+              <a:ext uri="{FF2B5EF4-FFF2-40B4-BE49-F238E27FC236}">
+                <a16:creationId xmlns:a16="http://schemas.microsoft.com/office/drawing/2014/main" id="{69362292-D34A-5244-AC91-02A3868E7C08}"/>
+              </a:ext>
+            </a:extLst>
+          </p:cNvPr>
+          <p:cNvSpPr txBox="1"/>
+          <p:nvPr/>
+        </p:nvSpPr>
+        <p:spPr>
+          <a:xfrm>
+            <a:off x="6863159" y="1178043"/>
+            <a:ext cx="717855" cy="369291"/>
+          </a:xfrm>
+          <a:prstGeom prst="rect">
+            <a:avLst/>
+          </a:prstGeom>
+          <a:noFill/>
+          <a:ln>
+            <a:noFill/>
+          </a:ln>
+        </p:spPr>
+        <p:txBody>
+          <a:bodyPr spcFirstLastPara="1" wrap="square" lIns="91425" tIns="45700" rIns="91425" bIns="45700" anchor="t" anchorCtr="0">
+            <a:spAutoFit/>
+          </a:bodyPr>
+          <a:lstStyle/>
+          <a:p>
+            <a:pPr marL="0" marR="0" lvl="0" indent="0" algn="ctr" rtl="0">
+              <a:spcBef>
+                <a:spcPts val="0"/>
+              </a:spcBef>
+              <a:spcAft>
+                <a:spcPts val="0"/>
+              </a:spcAft>
+              <a:buNone/>
+            </a:pPr>
+            <a:r>
+              <a:rPr lang="en-US" sz="1800" dirty="0">
+                <a:solidFill>
+                  <a:schemeClr val="tx1"/>
+                </a:solidFill>
+                <a:latin typeface="Calibri"/>
+                <a:ea typeface="Calibri"/>
+                <a:cs typeface="Calibri"/>
+                <a:sym typeface="Calibri"/>
+              </a:rPr>
+              <a:t>b)</a:t>
+            </a:r>
+            <a:endParaRPr sz="1800" dirty="0">
+              <a:solidFill>
+                <a:schemeClr val="tx1"/>
+              </a:solidFill>
+              <a:latin typeface="Calibri"/>
+              <a:ea typeface="Calibri"/>
+              <a:cs typeface="Calibri"/>
+              <a:sym typeface="Calibri"/>
+            </a:endParaRPr>
+          </a:p>
+        </p:txBody>
+      </p:sp>
+      <p:grpSp>
+        <p:nvGrpSpPr>
+          <p:cNvPr id="14" name="Google Shape;230;gd33cc45fa0_1_0">
+            <a:extLst>
+              <a:ext uri="{FF2B5EF4-FFF2-40B4-BE49-F238E27FC236}">
+                <a16:creationId xmlns:a16="http://schemas.microsoft.com/office/drawing/2014/main" id="{0038C127-6E9E-994D-8E9A-E5B4E896E442}"/>
+              </a:ext>
+            </a:extLst>
+          </p:cNvPr>
+          <p:cNvGrpSpPr/>
+          <p:nvPr/>
+        </p:nvGrpSpPr>
+        <p:grpSpPr>
+          <a:xfrm>
+            <a:off x="2973422" y="2354034"/>
+            <a:ext cx="255318" cy="307736"/>
+            <a:chOff x="5770063" y="1882553"/>
+            <a:chExt cx="245509" cy="288503"/>
+          </a:xfrm>
+        </p:grpSpPr>
+        <p:sp>
+          <p:nvSpPr>
+            <p:cNvPr id="15" name="Google Shape;231;gd33cc45fa0_1_0">
+              <a:extLst>
+                <a:ext uri="{FF2B5EF4-FFF2-40B4-BE49-F238E27FC236}">
+                  <a16:creationId xmlns:a16="http://schemas.microsoft.com/office/drawing/2014/main" id="{9088132D-D7E6-5F42-B32C-79B94E7D3B46}"/>
+                </a:ext>
+              </a:extLst>
+            </p:cNvPr>
+            <p:cNvSpPr/>
+            <p:nvPr/>
+          </p:nvSpPr>
+          <p:spPr>
+            <a:xfrm>
+              <a:off x="5773472" y="1906224"/>
+              <a:ext cx="242100" cy="235200"/>
+            </a:xfrm>
+            <a:prstGeom prst="ellipse">
+              <a:avLst/>
+            </a:prstGeom>
+            <a:solidFill>
+              <a:srgbClr val="DD3F20"/>
+            </a:solidFill>
+            <a:ln w="12700" cap="flat" cmpd="sng">
+              <a:solidFill>
+                <a:srgbClr val="DD3F20"/>
+              </a:solidFill>
+              <a:prstDash val="solid"/>
+              <a:miter lim="800000"/>
+              <a:headEnd type="none" w="sm" len="sm"/>
+              <a:tailEnd type="none" w="sm" len="sm"/>
+            </a:ln>
+          </p:spPr>
+          <p:txBody>
+            <a:bodyPr spcFirstLastPara="1" wrap="square" lIns="91425" tIns="45700" rIns="91425" bIns="45700" anchor="ctr" anchorCtr="0">
+              <a:noAutofit/>
+            </a:bodyPr>
+            <a:lstStyle/>
+            <a:p>
+              <a:pPr marL="0" marR="0" lvl="0" indent="0" algn="ctr" rtl="0">
+                <a:spcBef>
+                  <a:spcPts val="0"/>
+                </a:spcBef>
+                <a:spcAft>
+                  <a:spcPts val="0"/>
+                </a:spcAft>
+                <a:buNone/>
+              </a:pPr>
+              <a:endParaRPr>
+                <a:solidFill>
+                  <a:schemeClr val="lt1"/>
+                </a:solidFill>
+                <a:latin typeface="Times" pitchFamily="2" charset="0"/>
+                <a:ea typeface="Calibri"/>
+                <a:cs typeface="Calibri"/>
+                <a:sym typeface="Calibri"/>
+              </a:endParaRPr>
+            </a:p>
+          </p:txBody>
+        </p:sp>
+        <p:sp>
+          <p:nvSpPr>
+            <p:cNvPr id="17" name="Google Shape;232;gd33cc45fa0_1_0">
+              <a:extLst>
+                <a:ext uri="{FF2B5EF4-FFF2-40B4-BE49-F238E27FC236}">
+                  <a16:creationId xmlns:a16="http://schemas.microsoft.com/office/drawing/2014/main" id="{444E4E5C-601B-ED4B-848D-B9CACEFAF4CF}"/>
+                </a:ext>
+              </a:extLst>
+            </p:cNvPr>
+            <p:cNvSpPr txBox="1"/>
+            <p:nvPr/>
+          </p:nvSpPr>
+          <p:spPr>
+            <a:xfrm>
+              <a:off x="5770063" y="1882553"/>
+              <a:ext cx="177540" cy="288503"/>
+            </a:xfrm>
+            <a:prstGeom prst="rect">
+              <a:avLst/>
+            </a:prstGeom>
+            <a:noFill/>
+            <a:ln>
+              <a:noFill/>
+            </a:ln>
+          </p:spPr>
+          <p:txBody>
+            <a:bodyPr spcFirstLastPara="1" wrap="square" lIns="91425" tIns="45700" rIns="91425" bIns="45700" anchor="t" anchorCtr="0">
+              <a:spAutoFit/>
+            </a:bodyPr>
+            <a:lstStyle/>
+            <a:p>
+              <a:pPr marL="0" marR="0" lvl="0" indent="0" algn="l" rtl="0">
+                <a:spcBef>
+                  <a:spcPts val="0"/>
+                </a:spcBef>
+                <a:spcAft>
+                  <a:spcPts val="0"/>
+                </a:spcAft>
+                <a:buNone/>
+              </a:pPr>
+              <a:r>
+                <a:rPr lang="en-US" dirty="0">
+                  <a:solidFill>
+                    <a:schemeClr val="lt1"/>
+                  </a:solidFill>
+                  <a:latin typeface="Times" pitchFamily="2" charset="0"/>
+                  <a:cs typeface="Calibri"/>
+                  <a:sym typeface="Calibri"/>
+                </a:rPr>
+                <a:t>7</a:t>
+              </a:r>
+              <a:endParaRPr dirty="0">
+                <a:latin typeface="Times" pitchFamily="2" charset="0"/>
+              </a:endParaRPr>
+            </a:p>
+          </p:txBody>
+        </p:sp>
+      </p:grpSp>
+      <p:grpSp>
+        <p:nvGrpSpPr>
+          <p:cNvPr id="18" name="Google Shape;227;gd33cc45fa0_1_0">
+            <a:extLst>
+              <a:ext uri="{FF2B5EF4-FFF2-40B4-BE49-F238E27FC236}">
+                <a16:creationId xmlns:a16="http://schemas.microsoft.com/office/drawing/2014/main" id="{786DF2E1-8C76-3347-BE3E-3859ECC9780B}"/>
+              </a:ext>
+            </a:extLst>
+          </p:cNvPr>
+          <p:cNvGrpSpPr/>
+          <p:nvPr/>
+        </p:nvGrpSpPr>
+        <p:grpSpPr>
+          <a:xfrm>
+            <a:off x="2438982" y="2723669"/>
+            <a:ext cx="242100" cy="307736"/>
+            <a:chOff x="5368725" y="1437354"/>
+            <a:chExt cx="242100" cy="307736"/>
+          </a:xfrm>
+        </p:grpSpPr>
+        <p:sp>
+          <p:nvSpPr>
+            <p:cNvPr id="19" name="Google Shape;228;gd33cc45fa0_1_0">
+              <a:extLst>
+                <a:ext uri="{FF2B5EF4-FFF2-40B4-BE49-F238E27FC236}">
+                  <a16:creationId xmlns:a16="http://schemas.microsoft.com/office/drawing/2014/main" id="{1E5919ED-7451-2D4D-919C-E3376FD1FFA2}"/>
+                </a:ext>
+              </a:extLst>
+            </p:cNvPr>
+            <p:cNvSpPr/>
+            <p:nvPr/>
+          </p:nvSpPr>
+          <p:spPr>
+            <a:xfrm>
+              <a:off x="5368725" y="1478743"/>
+              <a:ext cx="242100" cy="235200"/>
+            </a:xfrm>
+            <a:prstGeom prst="ellipse">
+              <a:avLst/>
+            </a:prstGeom>
+            <a:solidFill>
+              <a:srgbClr val="EDA418"/>
+            </a:solidFill>
+            <a:ln w="12700" cap="flat" cmpd="sng">
+              <a:solidFill>
+                <a:srgbClr val="EDA418"/>
+              </a:solidFill>
+              <a:prstDash val="solid"/>
+              <a:miter lim="800000"/>
+              <a:headEnd type="none" w="sm" len="sm"/>
+              <a:tailEnd type="none" w="sm" len="sm"/>
+            </a:ln>
+          </p:spPr>
+          <p:txBody>
+            <a:bodyPr spcFirstLastPara="1" wrap="square" lIns="91425" tIns="45700" rIns="91425" bIns="45700" anchor="ctr" anchorCtr="0">
+              <a:noAutofit/>
+            </a:bodyPr>
+            <a:lstStyle/>
+            <a:p>
+              <a:pPr marL="0" marR="0" lvl="0" indent="0" algn="ctr" rtl="0">
+                <a:spcBef>
+                  <a:spcPts val="0"/>
+                </a:spcBef>
+                <a:spcAft>
+                  <a:spcPts val="0"/>
+                </a:spcAft>
+                <a:buNone/>
+              </a:pPr>
+              <a:endParaRPr dirty="0">
+                <a:solidFill>
+                  <a:schemeClr val="lt1"/>
+                </a:solidFill>
+                <a:latin typeface="Times" pitchFamily="2" charset="0"/>
+                <a:ea typeface="Calibri"/>
+                <a:cs typeface="Calibri"/>
+                <a:sym typeface="Calibri"/>
+              </a:endParaRPr>
+            </a:p>
+          </p:txBody>
+        </p:sp>
+        <p:sp>
+          <p:nvSpPr>
+            <p:cNvPr id="20" name="Google Shape;229;gd33cc45fa0_1_0">
+              <a:extLst>
+                <a:ext uri="{FF2B5EF4-FFF2-40B4-BE49-F238E27FC236}">
+                  <a16:creationId xmlns:a16="http://schemas.microsoft.com/office/drawing/2014/main" id="{1BB6457D-7B3C-BD48-A099-80FC048FCE30}"/>
+                </a:ext>
+              </a:extLst>
+            </p:cNvPr>
+            <p:cNvSpPr txBox="1"/>
+            <p:nvPr/>
+          </p:nvSpPr>
+          <p:spPr>
+            <a:xfrm>
+              <a:off x="5369859" y="1437354"/>
+              <a:ext cx="161400" cy="307736"/>
+            </a:xfrm>
+            <a:prstGeom prst="rect">
+              <a:avLst/>
+            </a:prstGeom>
+            <a:noFill/>
+            <a:ln>
+              <a:noFill/>
+            </a:ln>
+          </p:spPr>
+          <p:txBody>
+            <a:bodyPr spcFirstLastPara="1" wrap="square" lIns="91425" tIns="45700" rIns="91425" bIns="45700" anchor="t" anchorCtr="0">
+              <a:spAutoFit/>
+            </a:bodyPr>
+            <a:lstStyle/>
+            <a:p>
+              <a:pPr marL="0" marR="0" lvl="0" indent="0" algn="l" rtl="0">
+                <a:spcBef>
+                  <a:spcPts val="0"/>
+                </a:spcBef>
+                <a:spcAft>
+                  <a:spcPts val="0"/>
+                </a:spcAft>
+                <a:buNone/>
+              </a:pPr>
+              <a:r>
+                <a:rPr lang="en-US" dirty="0">
+                  <a:solidFill>
+                    <a:schemeClr val="lt1"/>
+                  </a:solidFill>
+                  <a:latin typeface="Times" pitchFamily="2" charset="0"/>
+                  <a:cs typeface="Calibri"/>
+                  <a:sym typeface="Calibri"/>
+                </a:rPr>
+                <a:t>4</a:t>
+              </a:r>
+              <a:endParaRPr dirty="0">
+                <a:latin typeface="Times" pitchFamily="2" charset="0"/>
+              </a:endParaRPr>
+            </a:p>
+          </p:txBody>
+        </p:sp>
+      </p:grpSp>
+      <p:grpSp>
+        <p:nvGrpSpPr>
+          <p:cNvPr id="21" name="Google Shape;221;gd33cc45fa0_1_0">
+            <a:extLst>
+              <a:ext uri="{FF2B5EF4-FFF2-40B4-BE49-F238E27FC236}">
+                <a16:creationId xmlns:a16="http://schemas.microsoft.com/office/drawing/2014/main" id="{79F1B55F-F2B0-5448-9F8D-62D6A46FA7DF}"/>
+              </a:ext>
+            </a:extLst>
+          </p:cNvPr>
+          <p:cNvGrpSpPr/>
+          <p:nvPr/>
+        </p:nvGrpSpPr>
+        <p:grpSpPr>
+          <a:xfrm>
+            <a:off x="2471511" y="3560000"/>
+            <a:ext cx="247871" cy="307736"/>
+            <a:chOff x="4824539" y="3620090"/>
+            <a:chExt cx="247871" cy="307736"/>
+          </a:xfrm>
+        </p:grpSpPr>
+        <p:sp>
+          <p:nvSpPr>
+            <p:cNvPr id="22" name="Google Shape;222;gd33cc45fa0_1_0">
+              <a:extLst>
+                <a:ext uri="{FF2B5EF4-FFF2-40B4-BE49-F238E27FC236}">
+                  <a16:creationId xmlns:a16="http://schemas.microsoft.com/office/drawing/2014/main" id="{13D9339E-2ABC-1E45-A65E-F03F0A9EB673}"/>
+                </a:ext>
+              </a:extLst>
+            </p:cNvPr>
+            <p:cNvSpPr/>
+            <p:nvPr/>
+          </p:nvSpPr>
+          <p:spPr>
+            <a:xfrm>
+              <a:off x="4830310" y="3654623"/>
+              <a:ext cx="242100" cy="235200"/>
+            </a:xfrm>
+            <a:prstGeom prst="ellipse">
+              <a:avLst/>
+            </a:prstGeom>
+            <a:solidFill>
+              <a:srgbClr val="EDD846"/>
+            </a:solidFill>
+            <a:ln w="12700" cap="flat" cmpd="sng">
+              <a:solidFill>
+                <a:srgbClr val="EDD846"/>
+              </a:solidFill>
+              <a:prstDash val="solid"/>
+              <a:miter lim="800000"/>
+              <a:headEnd type="none" w="sm" len="sm"/>
+              <a:tailEnd type="none" w="sm" len="sm"/>
+            </a:ln>
+          </p:spPr>
+          <p:txBody>
+            <a:bodyPr spcFirstLastPara="1" wrap="square" lIns="91425" tIns="45700" rIns="91425" bIns="45700" anchor="ctr" anchorCtr="0">
+              <a:noAutofit/>
+            </a:bodyPr>
+            <a:lstStyle/>
+            <a:p>
+              <a:pPr marL="0" marR="0" lvl="0" indent="0" algn="ctr" rtl="0">
+                <a:spcBef>
+                  <a:spcPts val="0"/>
+                </a:spcBef>
+                <a:spcAft>
+                  <a:spcPts val="0"/>
+                </a:spcAft>
+                <a:buNone/>
+              </a:pPr>
+              <a:endParaRPr>
+                <a:solidFill>
+                  <a:schemeClr val="lt1"/>
+                </a:solidFill>
+                <a:latin typeface="Times" pitchFamily="2" charset="0"/>
+                <a:ea typeface="Calibri"/>
+                <a:cs typeface="Calibri"/>
+                <a:sym typeface="Calibri"/>
+              </a:endParaRPr>
+            </a:p>
+          </p:txBody>
+        </p:sp>
+        <p:sp>
+          <p:nvSpPr>
+            <p:cNvPr id="23" name="Google Shape;223;gd33cc45fa0_1_0">
+              <a:extLst>
+                <a:ext uri="{FF2B5EF4-FFF2-40B4-BE49-F238E27FC236}">
+                  <a16:creationId xmlns:a16="http://schemas.microsoft.com/office/drawing/2014/main" id="{EA4E0248-751B-3E4E-A1EC-3B2D780A3E4E}"/>
+                </a:ext>
+              </a:extLst>
+            </p:cNvPr>
+            <p:cNvSpPr txBox="1"/>
+            <p:nvPr/>
+          </p:nvSpPr>
+          <p:spPr>
+            <a:xfrm>
+              <a:off x="4824539" y="3620090"/>
+              <a:ext cx="161400" cy="307736"/>
+            </a:xfrm>
+            <a:prstGeom prst="rect">
+              <a:avLst/>
+            </a:prstGeom>
+            <a:noFill/>
+            <a:ln>
+              <a:noFill/>
+            </a:ln>
+          </p:spPr>
+          <p:txBody>
+            <a:bodyPr spcFirstLastPara="1" wrap="square" lIns="91425" tIns="45700" rIns="91425" bIns="45700" anchor="t" anchorCtr="0">
+              <a:spAutoFit/>
+            </a:bodyPr>
+            <a:lstStyle/>
+            <a:p>
+              <a:pPr marL="0" marR="0" lvl="0" indent="0" algn="l" rtl="0">
+                <a:spcBef>
+                  <a:spcPts val="0"/>
+                </a:spcBef>
+                <a:spcAft>
+                  <a:spcPts val="0"/>
+                </a:spcAft>
+                <a:buNone/>
+              </a:pPr>
+              <a:r>
+                <a:rPr lang="en-US" dirty="0">
+                  <a:solidFill>
+                    <a:schemeClr val="lt1"/>
+                  </a:solidFill>
+                  <a:latin typeface="Times" pitchFamily="2" charset="0"/>
+                  <a:cs typeface="Calibri"/>
+                  <a:sym typeface="Calibri"/>
+                </a:rPr>
+                <a:t>5</a:t>
+              </a:r>
+              <a:endParaRPr dirty="0">
+                <a:latin typeface="Times" pitchFamily="2" charset="0"/>
+              </a:endParaRPr>
+            </a:p>
+          </p:txBody>
+        </p:sp>
+      </p:grpSp>
+      <p:grpSp>
+        <p:nvGrpSpPr>
+          <p:cNvPr id="24" name="Google Shape;218;gd33cc45fa0_1_0">
+            <a:extLst>
+              <a:ext uri="{FF2B5EF4-FFF2-40B4-BE49-F238E27FC236}">
+                <a16:creationId xmlns:a16="http://schemas.microsoft.com/office/drawing/2014/main" id="{F90BB495-5408-1740-BAED-C573012F8B20}"/>
+              </a:ext>
+            </a:extLst>
+          </p:cNvPr>
+          <p:cNvGrpSpPr/>
+          <p:nvPr/>
+        </p:nvGrpSpPr>
+        <p:grpSpPr>
+          <a:xfrm>
+            <a:off x="3655969" y="3560000"/>
+            <a:ext cx="263316" cy="307736"/>
+            <a:chOff x="6779494" y="4047842"/>
+            <a:chExt cx="253200" cy="288502"/>
+          </a:xfrm>
+        </p:grpSpPr>
+        <p:sp>
+          <p:nvSpPr>
+            <p:cNvPr id="25" name="Google Shape;219;gd33cc45fa0_1_0">
+              <a:extLst>
+                <a:ext uri="{FF2B5EF4-FFF2-40B4-BE49-F238E27FC236}">
+                  <a16:creationId xmlns:a16="http://schemas.microsoft.com/office/drawing/2014/main" id="{E1970BC3-4F95-A848-AE66-E40E9D013210}"/>
+                </a:ext>
+              </a:extLst>
+            </p:cNvPr>
+            <p:cNvSpPr/>
+            <p:nvPr/>
+          </p:nvSpPr>
+          <p:spPr>
+            <a:xfrm>
+              <a:off x="6785044" y="4074493"/>
+              <a:ext cx="242100" cy="235200"/>
+            </a:xfrm>
+            <a:prstGeom prst="ellipse">
+              <a:avLst/>
+            </a:prstGeom>
+            <a:solidFill>
+              <a:srgbClr val="59A082"/>
+            </a:solidFill>
+            <a:ln w="12700" cap="flat" cmpd="sng">
+              <a:solidFill>
+                <a:srgbClr val="59A082"/>
+              </a:solidFill>
+              <a:prstDash val="solid"/>
+              <a:miter lim="800000"/>
+              <a:headEnd type="none" w="sm" len="sm"/>
+              <a:tailEnd type="none" w="sm" len="sm"/>
+            </a:ln>
+          </p:spPr>
+          <p:txBody>
+            <a:bodyPr spcFirstLastPara="1" wrap="square" lIns="91425" tIns="45700" rIns="91425" bIns="45700" anchor="ctr" anchorCtr="0">
+              <a:noAutofit/>
+            </a:bodyPr>
+            <a:lstStyle/>
+            <a:p>
+              <a:pPr marL="0" marR="0" lvl="0" indent="0" algn="ctr" rtl="0">
+                <a:spcBef>
+                  <a:spcPts val="0"/>
+                </a:spcBef>
+                <a:spcAft>
+                  <a:spcPts val="0"/>
+                </a:spcAft>
+                <a:buNone/>
+              </a:pPr>
+              <a:endParaRPr>
+                <a:solidFill>
+                  <a:schemeClr val="lt1"/>
+                </a:solidFill>
+                <a:latin typeface="Times" pitchFamily="2" charset="0"/>
+                <a:ea typeface="Calibri"/>
+                <a:cs typeface="Calibri"/>
+                <a:sym typeface="Calibri"/>
+              </a:endParaRPr>
+            </a:p>
+          </p:txBody>
+        </p:sp>
+        <p:sp>
+          <p:nvSpPr>
+            <p:cNvPr id="26" name="Google Shape;220;gd33cc45fa0_1_0">
+              <a:extLst>
+                <a:ext uri="{FF2B5EF4-FFF2-40B4-BE49-F238E27FC236}">
+                  <a16:creationId xmlns:a16="http://schemas.microsoft.com/office/drawing/2014/main" id="{08419916-3FFA-154A-83E9-FCBDE963F254}"/>
+                </a:ext>
+              </a:extLst>
+            </p:cNvPr>
+            <p:cNvSpPr txBox="1"/>
+            <p:nvPr/>
+          </p:nvSpPr>
+          <p:spPr>
+            <a:xfrm>
+              <a:off x="6779494" y="4047842"/>
+              <a:ext cx="253200" cy="288502"/>
+            </a:xfrm>
+            <a:prstGeom prst="rect">
+              <a:avLst/>
+            </a:prstGeom>
+            <a:noFill/>
+            <a:ln>
+              <a:noFill/>
+            </a:ln>
+          </p:spPr>
+          <p:txBody>
+            <a:bodyPr spcFirstLastPara="1" wrap="square" lIns="91425" tIns="45700" rIns="91425" bIns="45700" anchor="t" anchorCtr="0">
+              <a:spAutoFit/>
+            </a:bodyPr>
+            <a:lstStyle/>
+            <a:p>
+              <a:pPr marL="0" marR="0" lvl="0" indent="0" algn="l" rtl="0">
+                <a:spcBef>
+                  <a:spcPts val="0"/>
+                </a:spcBef>
+                <a:spcAft>
+                  <a:spcPts val="0"/>
+                </a:spcAft>
+                <a:buNone/>
+              </a:pPr>
+              <a:r>
+                <a:rPr lang="en-US" dirty="0">
+                  <a:solidFill>
+                    <a:schemeClr val="lt1"/>
+                  </a:solidFill>
+                  <a:latin typeface="Times" pitchFamily="2" charset="0"/>
+                  <a:cs typeface="Calibri"/>
+                  <a:sym typeface="Calibri"/>
+                </a:rPr>
+                <a:t>2</a:t>
+              </a:r>
+              <a:endParaRPr dirty="0">
+                <a:latin typeface="Times" pitchFamily="2" charset="0"/>
+              </a:endParaRPr>
+            </a:p>
+          </p:txBody>
+        </p:sp>
+      </p:grpSp>
+      <p:grpSp>
+        <p:nvGrpSpPr>
+          <p:cNvPr id="27" name="Google Shape;215;gd33cc45fa0_1_0">
+            <a:extLst>
+              <a:ext uri="{FF2B5EF4-FFF2-40B4-BE49-F238E27FC236}">
+                <a16:creationId xmlns:a16="http://schemas.microsoft.com/office/drawing/2014/main" id="{AC1625EF-58A6-BB4C-8B79-C6C0EC63FB53}"/>
+              </a:ext>
+            </a:extLst>
+          </p:cNvPr>
+          <p:cNvGrpSpPr/>
+          <p:nvPr/>
+        </p:nvGrpSpPr>
+        <p:grpSpPr>
+          <a:xfrm>
+            <a:off x="3764405" y="2929740"/>
+            <a:ext cx="242100" cy="307736"/>
+            <a:chOff x="7175557" y="3610299"/>
+            <a:chExt cx="242100" cy="307736"/>
+          </a:xfrm>
+        </p:grpSpPr>
+        <p:sp>
+          <p:nvSpPr>
+            <p:cNvPr id="28" name="Google Shape;216;gd33cc45fa0_1_0">
+              <a:extLst>
+                <a:ext uri="{FF2B5EF4-FFF2-40B4-BE49-F238E27FC236}">
+                  <a16:creationId xmlns:a16="http://schemas.microsoft.com/office/drawing/2014/main" id="{ED8B2608-CF43-9A42-95CA-AA3E31B183F7}"/>
+                </a:ext>
+              </a:extLst>
+            </p:cNvPr>
+            <p:cNvSpPr/>
+            <p:nvPr/>
+          </p:nvSpPr>
+          <p:spPr>
+            <a:xfrm>
+              <a:off x="7175557" y="3646567"/>
+              <a:ext cx="242100" cy="235200"/>
+            </a:xfrm>
+            <a:prstGeom prst="ellipse">
+              <a:avLst/>
+            </a:prstGeom>
+            <a:solidFill>
+              <a:srgbClr val="0A718F"/>
+            </a:solidFill>
+            <a:ln w="12700" cap="flat" cmpd="sng">
+              <a:solidFill>
+                <a:srgbClr val="0A718F"/>
+              </a:solidFill>
+              <a:prstDash val="solid"/>
+              <a:miter lim="800000"/>
+              <a:headEnd type="none" w="sm" len="sm"/>
+              <a:tailEnd type="none" w="sm" len="sm"/>
+            </a:ln>
+          </p:spPr>
+          <p:txBody>
+            <a:bodyPr spcFirstLastPara="1" wrap="square" lIns="91425" tIns="45700" rIns="91425" bIns="45700" anchor="ctr" anchorCtr="0">
+              <a:noAutofit/>
+            </a:bodyPr>
+            <a:lstStyle/>
+            <a:p>
+              <a:pPr marL="0" marR="0" lvl="0" indent="0" algn="ctr" rtl="0">
+                <a:spcBef>
+                  <a:spcPts val="0"/>
+                </a:spcBef>
+                <a:spcAft>
+                  <a:spcPts val="0"/>
+                </a:spcAft>
+                <a:buNone/>
+              </a:pPr>
+              <a:endParaRPr>
+                <a:solidFill>
+                  <a:schemeClr val="lt1"/>
+                </a:solidFill>
+                <a:latin typeface="Times" pitchFamily="2" charset="0"/>
+                <a:ea typeface="Calibri"/>
+                <a:cs typeface="Calibri"/>
+                <a:sym typeface="Calibri"/>
+              </a:endParaRPr>
+            </a:p>
+          </p:txBody>
+        </p:sp>
+        <p:sp>
+          <p:nvSpPr>
+            <p:cNvPr id="29" name="Google Shape;217;gd33cc45fa0_1_0">
+              <a:extLst>
+                <a:ext uri="{FF2B5EF4-FFF2-40B4-BE49-F238E27FC236}">
+                  <a16:creationId xmlns:a16="http://schemas.microsoft.com/office/drawing/2014/main" id="{9227393D-573C-2F41-A688-BFB44BDC406D}"/>
+                </a:ext>
+              </a:extLst>
+            </p:cNvPr>
+            <p:cNvSpPr txBox="1"/>
+            <p:nvPr/>
+          </p:nvSpPr>
+          <p:spPr>
+            <a:xfrm>
+              <a:off x="7175557" y="3610299"/>
+              <a:ext cx="161400" cy="307736"/>
+            </a:xfrm>
+            <a:prstGeom prst="rect">
+              <a:avLst/>
+            </a:prstGeom>
+            <a:noFill/>
+            <a:ln>
+              <a:noFill/>
+            </a:ln>
+          </p:spPr>
+          <p:txBody>
+            <a:bodyPr spcFirstLastPara="1" wrap="square" lIns="91425" tIns="45700" rIns="91425" bIns="45700" anchor="t" anchorCtr="0">
+              <a:spAutoFit/>
+            </a:bodyPr>
+            <a:lstStyle/>
+            <a:p>
+              <a:pPr marL="0" marR="0" lvl="0" indent="0" algn="l" rtl="0">
+                <a:spcBef>
+                  <a:spcPts val="0"/>
+                </a:spcBef>
+                <a:spcAft>
+                  <a:spcPts val="0"/>
+                </a:spcAft>
+                <a:buNone/>
+              </a:pPr>
+              <a:r>
+                <a:rPr lang="en-US" dirty="0">
+                  <a:solidFill>
+                    <a:schemeClr val="lt1"/>
+                  </a:solidFill>
+                  <a:latin typeface="Times" pitchFamily="2" charset="0"/>
+                  <a:cs typeface="Calibri"/>
+                  <a:sym typeface="Calibri"/>
+                </a:rPr>
+                <a:t>3</a:t>
+              </a:r>
+              <a:endParaRPr dirty="0">
+                <a:latin typeface="Times" pitchFamily="2" charset="0"/>
+              </a:endParaRPr>
+            </a:p>
+          </p:txBody>
+        </p:sp>
+      </p:grpSp>
+      <p:grpSp>
+        <p:nvGrpSpPr>
+          <p:cNvPr id="30" name="Google Shape;212;gd33cc45fa0_1_0">
+            <a:extLst>
+              <a:ext uri="{FF2B5EF4-FFF2-40B4-BE49-F238E27FC236}">
+                <a16:creationId xmlns:a16="http://schemas.microsoft.com/office/drawing/2014/main" id="{287846D2-0AAF-EB4C-AD7A-12366D4B0E75}"/>
+              </a:ext>
+            </a:extLst>
+          </p:cNvPr>
+          <p:cNvGrpSpPr/>
+          <p:nvPr/>
+        </p:nvGrpSpPr>
+        <p:grpSpPr>
+          <a:xfrm>
+            <a:off x="3309416" y="2380324"/>
+            <a:ext cx="242100" cy="307736"/>
+            <a:chOff x="6384583" y="2095900"/>
+            <a:chExt cx="242100" cy="307736"/>
+          </a:xfrm>
+        </p:grpSpPr>
+        <p:sp>
+          <p:nvSpPr>
+            <p:cNvPr id="31" name="Google Shape;213;gd33cc45fa0_1_0">
+              <a:extLst>
+                <a:ext uri="{FF2B5EF4-FFF2-40B4-BE49-F238E27FC236}">
+                  <a16:creationId xmlns:a16="http://schemas.microsoft.com/office/drawing/2014/main" id="{A8E8E3E9-51DD-364A-B781-497108F49BF5}"/>
+                </a:ext>
+              </a:extLst>
+            </p:cNvPr>
+            <p:cNvSpPr/>
+            <p:nvPr/>
+          </p:nvSpPr>
+          <p:spPr>
+            <a:xfrm>
+              <a:off x="6384583" y="2131331"/>
+              <a:ext cx="242100" cy="235200"/>
+            </a:xfrm>
+            <a:prstGeom prst="ellipse">
+              <a:avLst/>
+            </a:prstGeom>
+            <a:solidFill>
+              <a:srgbClr val="00486F"/>
+            </a:solidFill>
+            <a:ln w="12700" cap="flat" cmpd="sng">
+              <a:solidFill>
+                <a:srgbClr val="00486F"/>
+              </a:solidFill>
+              <a:prstDash val="solid"/>
+              <a:miter lim="800000"/>
+              <a:headEnd type="none" w="sm" len="sm"/>
+              <a:tailEnd type="none" w="sm" len="sm"/>
+            </a:ln>
+          </p:spPr>
+          <p:txBody>
+            <a:bodyPr spcFirstLastPara="1" wrap="square" lIns="91425" tIns="45700" rIns="91425" bIns="45700" anchor="ctr" anchorCtr="0">
+              <a:noAutofit/>
+            </a:bodyPr>
+            <a:lstStyle/>
+            <a:p>
+              <a:pPr marL="0" marR="0" lvl="0" indent="0" algn="ctr" rtl="0">
+                <a:spcBef>
+                  <a:spcPts val="0"/>
+                </a:spcBef>
+                <a:spcAft>
+                  <a:spcPts val="0"/>
+                </a:spcAft>
+                <a:buNone/>
+              </a:pPr>
+              <a:endParaRPr>
+                <a:solidFill>
+                  <a:schemeClr val="lt1"/>
+                </a:solidFill>
+                <a:latin typeface="Times" pitchFamily="2" charset="0"/>
+                <a:ea typeface="Calibri"/>
+                <a:cs typeface="Calibri"/>
+                <a:sym typeface="Calibri"/>
+              </a:endParaRPr>
+            </a:p>
+          </p:txBody>
+        </p:sp>
+        <p:sp>
+          <p:nvSpPr>
+            <p:cNvPr id="32" name="Google Shape;214;gd33cc45fa0_1_0">
+              <a:extLst>
+                <a:ext uri="{FF2B5EF4-FFF2-40B4-BE49-F238E27FC236}">
+                  <a16:creationId xmlns:a16="http://schemas.microsoft.com/office/drawing/2014/main" id="{86C24C1C-4A4D-BE44-BB02-BD81C0E20DAF}"/>
+                </a:ext>
+              </a:extLst>
+            </p:cNvPr>
+            <p:cNvSpPr txBox="1"/>
+            <p:nvPr/>
+          </p:nvSpPr>
+          <p:spPr>
+            <a:xfrm>
+              <a:off x="6384583" y="2095900"/>
+              <a:ext cx="161400" cy="307736"/>
+            </a:xfrm>
+            <a:prstGeom prst="rect">
+              <a:avLst/>
+            </a:prstGeom>
+            <a:noFill/>
+            <a:ln>
+              <a:noFill/>
+            </a:ln>
+          </p:spPr>
+          <p:txBody>
+            <a:bodyPr spcFirstLastPara="1" wrap="square" lIns="91425" tIns="45700" rIns="91425" bIns="45700" anchor="t" anchorCtr="0">
+              <a:spAutoFit/>
+            </a:bodyPr>
+            <a:lstStyle/>
+            <a:p>
+              <a:pPr marL="0" marR="0" lvl="0" indent="0" algn="l" rtl="0">
+                <a:spcBef>
+                  <a:spcPts val="0"/>
+                </a:spcBef>
+                <a:spcAft>
+                  <a:spcPts val="0"/>
+                </a:spcAft>
+                <a:buNone/>
+              </a:pPr>
+              <a:r>
+                <a:rPr lang="en-US" dirty="0">
+                  <a:solidFill>
+                    <a:schemeClr val="lt1"/>
+                  </a:solidFill>
+                  <a:latin typeface="Times" pitchFamily="2" charset="0"/>
+                  <a:ea typeface="Calibri"/>
+                  <a:cs typeface="Calibri"/>
+                  <a:sym typeface="Calibri"/>
+                </a:rPr>
+                <a:t>1</a:t>
+              </a:r>
+              <a:endParaRPr dirty="0">
+                <a:latin typeface="Times" pitchFamily="2" charset="0"/>
+              </a:endParaRPr>
+            </a:p>
+          </p:txBody>
+        </p:sp>
+      </p:grpSp>
+      <p:sp>
+        <p:nvSpPr>
+          <p:cNvPr id="34" name="Google Shape;167;p2">
+            <a:extLst>
+              <a:ext uri="{FF2B5EF4-FFF2-40B4-BE49-F238E27FC236}">
+                <a16:creationId xmlns:a16="http://schemas.microsoft.com/office/drawing/2014/main" id="{E466C6F1-0458-E94A-9666-7319E488DA3E}"/>
+              </a:ext>
+            </a:extLst>
+          </p:cNvPr>
+          <p:cNvSpPr/>
+          <p:nvPr/>
+        </p:nvSpPr>
+        <p:spPr>
+          <a:xfrm>
+            <a:off x="2204621" y="166376"/>
+            <a:ext cx="1333201" cy="1038985"/>
+          </a:xfrm>
+          <a:prstGeom prst="ellipse">
+            <a:avLst/>
+          </a:prstGeom>
+          <a:solidFill>
+            <a:srgbClr val="DD3F20"/>
+          </a:solidFill>
+          <a:ln>
+            <a:solidFill>
+              <a:srgbClr val="DD3F20"/>
+            </a:solidFill>
+          </a:ln>
+        </p:spPr>
+        <p:txBody>
+          <a:bodyPr spcFirstLastPara="1" wrap="square" lIns="91425" tIns="45700" rIns="91425" bIns="45700" anchor="ctr" anchorCtr="0">
+            <a:noAutofit/>
+          </a:bodyPr>
+          <a:lstStyle/>
+          <a:p>
+            <a:pPr marL="0" marR="0" lvl="0" indent="0" algn="ctr" rtl="0">
+              <a:spcBef>
+                <a:spcPts val="0"/>
+              </a:spcBef>
+              <a:spcAft>
+                <a:spcPts val="0"/>
+              </a:spcAft>
+              <a:buNone/>
+            </a:pPr>
+            <a:endParaRPr>
+              <a:solidFill>
+                <a:schemeClr val="lt1"/>
+              </a:solidFill>
+              <a:latin typeface="Calibri"/>
+              <a:ea typeface="Calibri"/>
+              <a:cs typeface="Calibri"/>
+              <a:sym typeface="Calibri"/>
+            </a:endParaRPr>
+          </a:p>
+        </p:txBody>
+      </p:sp>
+      <p:sp>
+        <p:nvSpPr>
+          <p:cNvPr id="35" name="Google Shape;168;p2">
+            <a:extLst>
+              <a:ext uri="{FF2B5EF4-FFF2-40B4-BE49-F238E27FC236}">
+                <a16:creationId xmlns:a16="http://schemas.microsoft.com/office/drawing/2014/main" id="{FA88B3F4-82C7-3D4B-9BE1-226C5AE9965F}"/>
+              </a:ext>
+            </a:extLst>
+          </p:cNvPr>
+          <p:cNvSpPr txBox="1"/>
+          <p:nvPr/>
+        </p:nvSpPr>
+        <p:spPr>
+          <a:xfrm>
+            <a:off x="1960836" y="492094"/>
+            <a:ext cx="1828623" cy="738623"/>
+          </a:xfrm>
+          <a:prstGeom prst="rect">
+            <a:avLst/>
+          </a:prstGeom>
+          <a:noFill/>
+          <a:ln>
+            <a:noFill/>
+          </a:ln>
+        </p:spPr>
+        <p:txBody>
+          <a:bodyPr spcFirstLastPara="1" wrap="square" lIns="91425" tIns="45700" rIns="91425" bIns="45700" anchor="t" anchorCtr="0">
+            <a:spAutoFit/>
+          </a:bodyPr>
+          <a:lstStyle/>
+          <a:p>
+            <a:pPr lvl="0" algn="ctr"/>
+            <a:r>
+              <a:rPr lang="en-US" dirty="0">
+                <a:solidFill>
+                  <a:schemeClr val="lt1"/>
+                </a:solidFill>
+                <a:latin typeface="Calibri"/>
+                <a:ea typeface="Calibri"/>
+                <a:cs typeface="Calibri"/>
+                <a:sym typeface="Calibri"/>
+              </a:rPr>
+              <a:t>Coast to shelf </a:t>
+            </a:r>
+            <a:r>
+              <a:rPr lang="en-US" dirty="0" err="1">
+                <a:solidFill>
+                  <a:schemeClr val="lt1"/>
+                </a:solidFill>
+                <a:latin typeface="Calibri"/>
+                <a:ea typeface="Calibri"/>
+                <a:cs typeface="Calibri"/>
+                <a:sym typeface="Calibri"/>
+              </a:rPr>
+              <a:t>demersals</a:t>
+            </a:r>
+            <a:endParaRPr lang="en-US" dirty="0">
+              <a:solidFill>
+                <a:schemeClr val="lt1"/>
+              </a:solidFill>
+              <a:latin typeface="Calibri"/>
+              <a:ea typeface="Calibri"/>
+              <a:cs typeface="Calibri"/>
+              <a:sym typeface="Calibri"/>
+            </a:endParaRPr>
+          </a:p>
+          <a:p>
+            <a:pPr lvl="0" algn="ctr"/>
+            <a:r>
+              <a:rPr lang="en-US" dirty="0">
+                <a:solidFill>
+                  <a:schemeClr val="lt1"/>
+                </a:solidFill>
+                <a:latin typeface="Calibri"/>
+                <a:ea typeface="Calibri"/>
+                <a:cs typeface="Calibri"/>
+                <a:sym typeface="Calibri"/>
+              </a:rPr>
+              <a:t>(14)</a:t>
+            </a:r>
+            <a:endParaRPr dirty="0"/>
+          </a:p>
+        </p:txBody>
+      </p:sp>
+      <p:sp>
+        <p:nvSpPr>
+          <p:cNvPr id="37" name="Google Shape;169;p2">
+            <a:extLst>
+              <a:ext uri="{FF2B5EF4-FFF2-40B4-BE49-F238E27FC236}">
+                <a16:creationId xmlns:a16="http://schemas.microsoft.com/office/drawing/2014/main" id="{CA10AA7F-0BFC-D841-A3D8-A071E4445737}"/>
+              </a:ext>
+            </a:extLst>
+          </p:cNvPr>
+          <p:cNvSpPr/>
+          <p:nvPr/>
+        </p:nvSpPr>
+        <p:spPr>
+          <a:xfrm>
+            <a:off x="12783" y="2132252"/>
+            <a:ext cx="1935480" cy="1196755"/>
+          </a:xfrm>
+          <a:prstGeom prst="ellipse">
+            <a:avLst/>
+          </a:prstGeom>
+          <a:solidFill>
+            <a:srgbClr val="EDA418"/>
+          </a:solidFill>
+          <a:ln>
+            <a:solidFill>
+              <a:srgbClr val="EDA418"/>
+            </a:solidFill>
+          </a:ln>
+        </p:spPr>
+        <p:txBody>
+          <a:bodyPr spcFirstLastPara="1" wrap="square" lIns="91425" tIns="45700" rIns="91425" bIns="45700" anchor="ctr" anchorCtr="0">
+            <a:noAutofit/>
+          </a:bodyPr>
+          <a:lstStyle/>
+          <a:p>
+            <a:pPr marL="0" marR="0" lvl="0" indent="0" algn="ctr" rtl="0">
+              <a:spcBef>
+                <a:spcPts val="0"/>
+              </a:spcBef>
+              <a:spcAft>
+                <a:spcPts val="0"/>
+              </a:spcAft>
+              <a:buNone/>
+            </a:pPr>
+            <a:endParaRPr>
+              <a:solidFill>
+                <a:schemeClr val="lt1"/>
+              </a:solidFill>
+              <a:latin typeface="Calibri"/>
+              <a:ea typeface="Calibri"/>
+              <a:cs typeface="Calibri"/>
+              <a:sym typeface="Calibri"/>
+            </a:endParaRPr>
+          </a:p>
+        </p:txBody>
+      </p:sp>
+      <p:sp>
+        <p:nvSpPr>
+          <p:cNvPr id="38" name="Google Shape;170;p2">
+            <a:extLst>
+              <a:ext uri="{FF2B5EF4-FFF2-40B4-BE49-F238E27FC236}">
+                <a16:creationId xmlns:a16="http://schemas.microsoft.com/office/drawing/2014/main" id="{01DA6036-3081-1346-AE35-C0786A8DE16A}"/>
+              </a:ext>
+            </a:extLst>
+          </p:cNvPr>
+          <p:cNvSpPr txBox="1"/>
+          <p:nvPr/>
+        </p:nvSpPr>
+        <p:spPr>
+          <a:xfrm>
+            <a:off x="-59317" y="2431502"/>
+            <a:ext cx="2074814" cy="954067"/>
+          </a:xfrm>
+          <a:prstGeom prst="rect">
+            <a:avLst/>
+          </a:prstGeom>
+          <a:noFill/>
+          <a:ln>
+            <a:noFill/>
+          </a:ln>
+        </p:spPr>
+        <p:txBody>
+          <a:bodyPr spcFirstLastPara="1" wrap="square" lIns="91425" tIns="45700" rIns="91425" bIns="45700" anchor="t" anchorCtr="0">
+            <a:spAutoFit/>
+          </a:bodyPr>
+          <a:lstStyle/>
+          <a:p>
+            <a:pPr marL="0" marR="0" lvl="0" indent="0" algn="ctr" rtl="0">
+              <a:spcBef>
+                <a:spcPts val="0"/>
+              </a:spcBef>
+              <a:spcAft>
+                <a:spcPts val="0"/>
+              </a:spcAft>
+              <a:buNone/>
+            </a:pPr>
+            <a:r>
+              <a:rPr lang="en-US" dirty="0">
+                <a:solidFill>
+                  <a:schemeClr val="lt1"/>
+                </a:solidFill>
+                <a:latin typeface="Calibri"/>
+                <a:ea typeface="Calibri"/>
+                <a:cs typeface="Calibri"/>
+                <a:sym typeface="Calibri"/>
+              </a:rPr>
+              <a:t>Seasonal &amp; non-diel migrating coast to shelf </a:t>
+            </a:r>
+            <a:r>
+              <a:rPr lang="en-US" dirty="0" err="1">
+                <a:solidFill>
+                  <a:schemeClr val="lt1"/>
+                </a:solidFill>
+                <a:latin typeface="Calibri"/>
+                <a:ea typeface="Calibri"/>
+                <a:cs typeface="Calibri"/>
+                <a:sym typeface="Calibri"/>
+              </a:rPr>
+              <a:t>epipelagics</a:t>
+            </a:r>
+            <a:endParaRPr lang="en-US" dirty="0">
+              <a:solidFill>
+                <a:schemeClr val="lt1"/>
+              </a:solidFill>
+              <a:latin typeface="Calibri"/>
+              <a:ea typeface="Calibri"/>
+              <a:cs typeface="Calibri"/>
+              <a:sym typeface="Calibri"/>
+            </a:endParaRPr>
+          </a:p>
+          <a:p>
+            <a:pPr marL="0" marR="0" lvl="0" indent="0" algn="ctr" rtl="0">
+              <a:spcBef>
+                <a:spcPts val="0"/>
+              </a:spcBef>
+              <a:spcAft>
+                <a:spcPts val="0"/>
+              </a:spcAft>
+              <a:buNone/>
+            </a:pPr>
+            <a:r>
+              <a:rPr lang="en-US" dirty="0">
+                <a:solidFill>
+                  <a:schemeClr val="lt1"/>
+                </a:solidFill>
+                <a:latin typeface="Calibri"/>
+                <a:cs typeface="Calibri"/>
+                <a:sym typeface="Calibri"/>
+              </a:rPr>
+              <a:t>(51)</a:t>
+            </a:r>
+            <a:endParaRPr dirty="0"/>
+          </a:p>
+        </p:txBody>
+      </p:sp>
+      <p:sp>
+        <p:nvSpPr>
+          <p:cNvPr id="41" name="Google Shape;172;p2">
+            <a:extLst>
+              <a:ext uri="{FF2B5EF4-FFF2-40B4-BE49-F238E27FC236}">
+                <a16:creationId xmlns:a16="http://schemas.microsoft.com/office/drawing/2014/main" id="{EA319015-4BAE-1B48-BB5E-BA71A455A198}"/>
+              </a:ext>
+            </a:extLst>
+          </p:cNvPr>
+          <p:cNvSpPr/>
+          <p:nvPr/>
+        </p:nvSpPr>
+        <p:spPr>
+          <a:xfrm>
+            <a:off x="55125" y="4149874"/>
+            <a:ext cx="1925392" cy="1067199"/>
+          </a:xfrm>
+          <a:prstGeom prst="ellipse">
+            <a:avLst/>
+          </a:prstGeom>
+          <a:solidFill>
+            <a:srgbClr val="EDD846"/>
+          </a:solidFill>
+          <a:ln>
+            <a:solidFill>
+              <a:srgbClr val="EDD846"/>
+            </a:solidFill>
+          </a:ln>
+        </p:spPr>
+        <p:txBody>
+          <a:bodyPr spcFirstLastPara="1" wrap="square" lIns="91425" tIns="45700" rIns="91425" bIns="45700" anchor="ctr" anchorCtr="0">
+            <a:noAutofit/>
+          </a:bodyPr>
+          <a:lstStyle/>
+          <a:p>
+            <a:pPr marL="0" marR="0" lvl="0" indent="0" algn="ctr" rtl="0">
+              <a:spcBef>
+                <a:spcPts val="0"/>
+              </a:spcBef>
+              <a:spcAft>
+                <a:spcPts val="0"/>
+              </a:spcAft>
+              <a:buNone/>
+            </a:pPr>
+            <a:endParaRPr>
+              <a:solidFill>
+                <a:schemeClr val="lt1"/>
+              </a:solidFill>
+              <a:latin typeface="Calibri"/>
+              <a:ea typeface="Calibri"/>
+              <a:cs typeface="Calibri"/>
+              <a:sym typeface="Calibri"/>
+            </a:endParaRPr>
+          </a:p>
+        </p:txBody>
+      </p:sp>
+      <p:sp>
+        <p:nvSpPr>
+          <p:cNvPr id="49" name="Google Shape;198;p2">
+            <a:extLst>
+              <a:ext uri="{FF2B5EF4-FFF2-40B4-BE49-F238E27FC236}">
+                <a16:creationId xmlns:a16="http://schemas.microsoft.com/office/drawing/2014/main" id="{C0983C24-5D9B-864B-B8E0-711AE73BDF6C}"/>
+              </a:ext>
+            </a:extLst>
+          </p:cNvPr>
+          <p:cNvSpPr txBox="1"/>
+          <p:nvPr/>
+        </p:nvSpPr>
+        <p:spPr>
+          <a:xfrm>
+            <a:off x="15367" y="4480853"/>
+            <a:ext cx="2043058" cy="738623"/>
+          </a:xfrm>
+          <a:prstGeom prst="rect">
+            <a:avLst/>
+          </a:prstGeom>
+          <a:noFill/>
+          <a:ln>
+            <a:noFill/>
+          </a:ln>
+        </p:spPr>
+        <p:txBody>
+          <a:bodyPr spcFirstLastPara="1" wrap="square" lIns="91425" tIns="45700" rIns="91425" bIns="45700" anchor="t" anchorCtr="0">
+            <a:spAutoFit/>
+          </a:bodyPr>
+          <a:lstStyle/>
+          <a:p>
+            <a:pPr lvl="0" algn="ctr"/>
+            <a:r>
+              <a:rPr lang="en-US" dirty="0">
+                <a:solidFill>
+                  <a:schemeClr val="lt1"/>
+                </a:solidFill>
+                <a:latin typeface="Calibri"/>
+                <a:ea typeface="Calibri"/>
+                <a:cs typeface="Calibri"/>
+                <a:sym typeface="Calibri"/>
+              </a:rPr>
+              <a:t>Seasonal &amp; diel migrating oceanic </a:t>
+            </a:r>
+            <a:r>
+              <a:rPr lang="en-US" dirty="0" err="1">
+                <a:solidFill>
+                  <a:schemeClr val="lt1"/>
+                </a:solidFill>
+                <a:latin typeface="Calibri"/>
+                <a:ea typeface="Calibri"/>
+                <a:cs typeface="Calibri"/>
+                <a:sym typeface="Calibri"/>
+              </a:rPr>
+              <a:t>epipelagics</a:t>
+            </a:r>
+            <a:r>
+              <a:rPr lang="en-US" dirty="0">
+                <a:solidFill>
+                  <a:schemeClr val="lt1"/>
+                </a:solidFill>
+                <a:latin typeface="Calibri"/>
+                <a:ea typeface="Calibri"/>
+                <a:cs typeface="Calibri"/>
+                <a:sym typeface="Calibri"/>
+              </a:rPr>
+              <a:t> </a:t>
+            </a:r>
+          </a:p>
+          <a:p>
+            <a:pPr lvl="0" algn="ctr"/>
+            <a:r>
+              <a:rPr lang="en-US" dirty="0">
+                <a:solidFill>
+                  <a:schemeClr val="lt1"/>
+                </a:solidFill>
+                <a:latin typeface="Calibri"/>
+                <a:cs typeface="Calibri"/>
+                <a:sym typeface="Calibri"/>
+              </a:rPr>
+              <a:t>(55)</a:t>
+            </a:r>
+            <a:endParaRPr dirty="0"/>
+          </a:p>
+        </p:txBody>
+      </p:sp>
+      <p:sp>
+        <p:nvSpPr>
+          <p:cNvPr id="55" name="Google Shape;190;p2">
+            <a:extLst>
+              <a:ext uri="{FF2B5EF4-FFF2-40B4-BE49-F238E27FC236}">
+                <a16:creationId xmlns:a16="http://schemas.microsoft.com/office/drawing/2014/main" id="{C2518440-A5B0-4144-904D-09F12DABBD5B}"/>
+              </a:ext>
+            </a:extLst>
+          </p:cNvPr>
+          <p:cNvSpPr/>
+          <p:nvPr/>
+        </p:nvSpPr>
+        <p:spPr>
+          <a:xfrm>
+            <a:off x="4533108" y="4492515"/>
+            <a:ext cx="2004123" cy="1009540"/>
+          </a:xfrm>
+          <a:prstGeom prst="ellipse">
+            <a:avLst/>
+          </a:prstGeom>
+          <a:solidFill>
+            <a:srgbClr val="59A082"/>
+          </a:solidFill>
+          <a:ln>
+            <a:solidFill>
+              <a:srgbClr val="59A082"/>
+            </a:solidFill>
+          </a:ln>
+        </p:spPr>
+        <p:txBody>
+          <a:bodyPr spcFirstLastPara="1" wrap="square" lIns="91425" tIns="45700" rIns="91425" bIns="45700" anchor="ctr" anchorCtr="0">
+            <a:noAutofit/>
+          </a:bodyPr>
+          <a:lstStyle/>
+          <a:p>
+            <a:pPr marL="0" marR="0" lvl="0" indent="0" algn="ctr" rtl="0">
+              <a:spcBef>
+                <a:spcPts val="0"/>
+              </a:spcBef>
+              <a:spcAft>
+                <a:spcPts val="0"/>
+              </a:spcAft>
+              <a:buNone/>
+            </a:pPr>
+            <a:endParaRPr>
+              <a:solidFill>
+                <a:schemeClr val="lt1"/>
+              </a:solidFill>
+              <a:latin typeface="Calibri"/>
+              <a:ea typeface="Calibri"/>
+              <a:cs typeface="Calibri"/>
+              <a:sym typeface="Calibri"/>
+            </a:endParaRPr>
+          </a:p>
+        </p:txBody>
+      </p:sp>
+      <p:sp>
+        <p:nvSpPr>
+          <p:cNvPr id="56" name="Google Shape;191;p2">
+            <a:extLst>
+              <a:ext uri="{FF2B5EF4-FFF2-40B4-BE49-F238E27FC236}">
+                <a16:creationId xmlns:a16="http://schemas.microsoft.com/office/drawing/2014/main" id="{1C3AC8E6-3EC1-1D4A-AE33-00868E607A3C}"/>
+              </a:ext>
+            </a:extLst>
+          </p:cNvPr>
+          <p:cNvSpPr txBox="1"/>
+          <p:nvPr/>
+        </p:nvSpPr>
+        <p:spPr>
+          <a:xfrm>
+            <a:off x="4418809" y="4763680"/>
+            <a:ext cx="2232719" cy="738623"/>
+          </a:xfrm>
+          <a:prstGeom prst="rect">
+            <a:avLst/>
+          </a:prstGeom>
+          <a:noFill/>
+          <a:ln>
+            <a:noFill/>
+          </a:ln>
+        </p:spPr>
+        <p:txBody>
+          <a:bodyPr spcFirstLastPara="1" wrap="square" lIns="91425" tIns="45700" rIns="91425" bIns="45700" anchor="t" anchorCtr="0">
+            <a:spAutoFit/>
+          </a:bodyPr>
+          <a:lstStyle/>
+          <a:p>
+            <a:pPr marL="0" marR="0" lvl="0" indent="0" algn="ctr" rtl="0">
+              <a:spcBef>
+                <a:spcPts val="0"/>
+              </a:spcBef>
+              <a:spcAft>
+                <a:spcPts val="0"/>
+              </a:spcAft>
+              <a:buNone/>
+            </a:pPr>
+            <a:r>
+              <a:rPr lang="en-US" dirty="0">
+                <a:solidFill>
+                  <a:schemeClr val="lt1"/>
+                </a:solidFill>
+                <a:latin typeface="Calibri"/>
+                <a:ea typeface="Calibri"/>
+                <a:cs typeface="Calibri"/>
+                <a:sym typeface="Calibri"/>
+              </a:rPr>
+              <a:t>Seasonal &amp; diel migrant, oceanic </a:t>
+            </a:r>
+            <a:r>
+              <a:rPr lang="en-US" dirty="0" err="1">
+                <a:solidFill>
+                  <a:schemeClr val="lt1"/>
+                </a:solidFill>
+                <a:latin typeface="Calibri"/>
+                <a:ea typeface="Calibri"/>
+                <a:cs typeface="Calibri"/>
+                <a:sym typeface="Calibri"/>
+              </a:rPr>
+              <a:t>mesopelagics</a:t>
+            </a:r>
+            <a:endParaRPr lang="en-US" dirty="0">
+              <a:solidFill>
+                <a:schemeClr val="lt1"/>
+              </a:solidFill>
+              <a:latin typeface="Calibri"/>
+              <a:ea typeface="Calibri"/>
+              <a:cs typeface="Calibri"/>
+              <a:sym typeface="Calibri"/>
+            </a:endParaRPr>
+          </a:p>
+          <a:p>
+            <a:pPr marL="0" marR="0" lvl="0" indent="0" algn="ctr" rtl="0">
+              <a:spcBef>
+                <a:spcPts val="0"/>
+              </a:spcBef>
+              <a:spcAft>
+                <a:spcPts val="0"/>
+              </a:spcAft>
+              <a:buNone/>
+            </a:pPr>
+            <a:r>
+              <a:rPr lang="en-US" dirty="0">
+                <a:solidFill>
+                  <a:schemeClr val="lt1"/>
+                </a:solidFill>
+                <a:latin typeface="Calibri"/>
+                <a:ea typeface="Calibri"/>
+                <a:cs typeface="Calibri"/>
+                <a:sym typeface="Calibri"/>
+              </a:rPr>
+              <a:t>(88)</a:t>
+            </a:r>
+            <a:endParaRPr dirty="0">
+              <a:solidFill>
+                <a:schemeClr val="lt1"/>
+              </a:solidFill>
+              <a:latin typeface="Calibri"/>
+              <a:ea typeface="Calibri"/>
+              <a:cs typeface="Calibri"/>
+              <a:sym typeface="Calibri"/>
+            </a:endParaRPr>
+          </a:p>
+        </p:txBody>
+      </p:sp>
+      <p:sp>
+        <p:nvSpPr>
+          <p:cNvPr id="60" name="Google Shape;173;p2">
+            <a:extLst>
+              <a:ext uri="{FF2B5EF4-FFF2-40B4-BE49-F238E27FC236}">
+                <a16:creationId xmlns:a16="http://schemas.microsoft.com/office/drawing/2014/main" id="{4E7BD754-C909-DC43-AE78-59B7A86E15C7}"/>
+              </a:ext>
+            </a:extLst>
+          </p:cNvPr>
+          <p:cNvSpPr/>
+          <p:nvPr/>
+        </p:nvSpPr>
+        <p:spPr>
+          <a:xfrm>
+            <a:off x="5045325" y="1958258"/>
+            <a:ext cx="2101350" cy="945866"/>
+          </a:xfrm>
+          <a:prstGeom prst="ellipse">
+            <a:avLst/>
+          </a:prstGeom>
+          <a:solidFill>
+            <a:srgbClr val="0A718F"/>
+          </a:solidFill>
+          <a:ln>
+            <a:solidFill>
+              <a:srgbClr val="0A718F"/>
+            </a:solidFill>
+          </a:ln>
+        </p:spPr>
+        <p:txBody>
+          <a:bodyPr spcFirstLastPara="1" wrap="square" lIns="91425" tIns="45700" rIns="91425" bIns="45700" anchor="ctr" anchorCtr="0">
+            <a:noAutofit/>
+          </a:bodyPr>
+          <a:lstStyle/>
+          <a:p>
+            <a:pPr marL="0" marR="0" lvl="0" indent="0" algn="ctr" rtl="0">
+              <a:spcBef>
+                <a:spcPts val="0"/>
+              </a:spcBef>
+              <a:spcAft>
+                <a:spcPts val="0"/>
+              </a:spcAft>
+              <a:buNone/>
+            </a:pPr>
+            <a:endParaRPr>
+              <a:solidFill>
+                <a:schemeClr val="lt1"/>
+              </a:solidFill>
+              <a:latin typeface="Calibri"/>
+              <a:ea typeface="Calibri"/>
+              <a:cs typeface="Calibri"/>
+              <a:sym typeface="Calibri"/>
+            </a:endParaRPr>
+          </a:p>
+        </p:txBody>
+      </p:sp>
+      <p:sp>
+        <p:nvSpPr>
+          <p:cNvPr id="61" name="Google Shape;174;p2">
+            <a:extLst>
+              <a:ext uri="{FF2B5EF4-FFF2-40B4-BE49-F238E27FC236}">
+                <a16:creationId xmlns:a16="http://schemas.microsoft.com/office/drawing/2014/main" id="{EE8AD8D3-6D0D-9744-B857-77C75986CB34}"/>
+              </a:ext>
+            </a:extLst>
+          </p:cNvPr>
+          <p:cNvSpPr txBox="1"/>
+          <p:nvPr/>
+        </p:nvSpPr>
+        <p:spPr>
+          <a:xfrm>
+            <a:off x="5096103" y="2213419"/>
+            <a:ext cx="2070404" cy="738623"/>
+          </a:xfrm>
+          <a:prstGeom prst="rect">
+            <a:avLst/>
+          </a:prstGeom>
+          <a:noFill/>
+          <a:ln>
+            <a:noFill/>
+          </a:ln>
+        </p:spPr>
+        <p:txBody>
+          <a:bodyPr spcFirstLastPara="1" wrap="square" lIns="91425" tIns="45700" rIns="91425" bIns="45700" anchor="t" anchorCtr="0">
+            <a:spAutoFit/>
+          </a:bodyPr>
+          <a:lstStyle/>
+          <a:p>
+            <a:pPr marL="0" marR="0" lvl="0" indent="0" algn="ctr" rtl="0">
+              <a:spcBef>
+                <a:spcPts val="0"/>
+              </a:spcBef>
+              <a:spcAft>
+                <a:spcPts val="0"/>
+              </a:spcAft>
+              <a:buNone/>
+            </a:pPr>
+            <a:r>
+              <a:rPr lang="en-US" dirty="0">
+                <a:solidFill>
+                  <a:schemeClr val="lt1"/>
+                </a:solidFill>
+                <a:latin typeface="Calibri"/>
+                <a:ea typeface="Calibri"/>
+                <a:cs typeface="Calibri"/>
+                <a:sym typeface="Calibri"/>
+              </a:rPr>
+              <a:t>Resident diel migrant, coast to shelf </a:t>
+            </a:r>
+            <a:r>
+              <a:rPr lang="en-US" dirty="0" err="1">
+                <a:solidFill>
+                  <a:schemeClr val="lt1"/>
+                </a:solidFill>
+                <a:latin typeface="Calibri"/>
+                <a:ea typeface="Calibri"/>
+                <a:cs typeface="Calibri"/>
+                <a:sym typeface="Calibri"/>
+              </a:rPr>
+              <a:t>epipelagics</a:t>
+            </a:r>
+            <a:endParaRPr lang="en-US" dirty="0">
+              <a:solidFill>
+                <a:schemeClr val="lt1"/>
+              </a:solidFill>
+              <a:latin typeface="Calibri"/>
+              <a:ea typeface="Calibri"/>
+              <a:cs typeface="Calibri"/>
+              <a:sym typeface="Calibri"/>
+            </a:endParaRPr>
+          </a:p>
+          <a:p>
+            <a:pPr marL="0" marR="0" lvl="0" indent="0" algn="ctr" rtl="0">
+              <a:spcBef>
+                <a:spcPts val="0"/>
+              </a:spcBef>
+              <a:spcAft>
+                <a:spcPts val="0"/>
+              </a:spcAft>
+              <a:buNone/>
+            </a:pPr>
+            <a:r>
+              <a:rPr lang="en-US" dirty="0">
+                <a:solidFill>
+                  <a:schemeClr val="lt1"/>
+                </a:solidFill>
+                <a:latin typeface="Calibri"/>
+                <a:ea typeface="Calibri"/>
+                <a:cs typeface="Calibri"/>
+                <a:sym typeface="Calibri"/>
+              </a:rPr>
+              <a:t>(28)</a:t>
+            </a:r>
+            <a:endParaRPr dirty="0">
+              <a:solidFill>
+                <a:schemeClr val="lt1"/>
+              </a:solidFill>
+              <a:latin typeface="Calibri"/>
+              <a:ea typeface="Calibri"/>
+              <a:cs typeface="Calibri"/>
+              <a:sym typeface="Calibri"/>
+            </a:endParaRPr>
+          </a:p>
+        </p:txBody>
+      </p:sp>
+      <p:sp>
+        <p:nvSpPr>
+          <p:cNvPr id="63" name="Google Shape;177;p2">
+            <a:extLst>
+              <a:ext uri="{FF2B5EF4-FFF2-40B4-BE49-F238E27FC236}">
+                <a16:creationId xmlns:a16="http://schemas.microsoft.com/office/drawing/2014/main" id="{0DDCDA92-FC0B-C64D-A5DE-F07AAE08C82C}"/>
+              </a:ext>
+            </a:extLst>
+          </p:cNvPr>
+          <p:cNvSpPr/>
+          <p:nvPr/>
+        </p:nvSpPr>
+        <p:spPr>
+          <a:xfrm>
+            <a:off x="4107129" y="727257"/>
+            <a:ext cx="1934646" cy="1065841"/>
+          </a:xfrm>
+          <a:prstGeom prst="ellipse">
+            <a:avLst/>
+          </a:prstGeom>
+          <a:solidFill>
+            <a:srgbClr val="00486F"/>
+          </a:solidFill>
+          <a:ln>
+            <a:solidFill>
+              <a:srgbClr val="00486F"/>
+            </a:solidFill>
+          </a:ln>
+        </p:spPr>
+        <p:txBody>
+          <a:bodyPr spcFirstLastPara="1" wrap="square" lIns="91425" tIns="45700" rIns="91425" bIns="45700" anchor="ctr" anchorCtr="0">
+            <a:noAutofit/>
+          </a:bodyPr>
+          <a:lstStyle/>
+          <a:p>
+            <a:pPr marL="0" marR="0" lvl="0" indent="0" algn="ctr" rtl="0">
+              <a:spcBef>
+                <a:spcPts val="0"/>
+              </a:spcBef>
+              <a:spcAft>
+                <a:spcPts val="0"/>
+              </a:spcAft>
+              <a:buNone/>
+            </a:pPr>
+            <a:endParaRPr>
+              <a:solidFill>
+                <a:schemeClr val="lt1"/>
+              </a:solidFill>
+              <a:latin typeface="Calibri"/>
+              <a:ea typeface="Calibri"/>
+              <a:cs typeface="Calibri"/>
+              <a:sym typeface="Calibri"/>
+            </a:endParaRPr>
+          </a:p>
+        </p:txBody>
+      </p:sp>
+      <p:sp>
+        <p:nvSpPr>
+          <p:cNvPr id="64" name="Google Shape;178;p2">
+            <a:extLst>
+              <a:ext uri="{FF2B5EF4-FFF2-40B4-BE49-F238E27FC236}">
+                <a16:creationId xmlns:a16="http://schemas.microsoft.com/office/drawing/2014/main" id="{2E787736-1FA6-6841-B0B2-D2F44DC537CE}"/>
+              </a:ext>
+            </a:extLst>
+          </p:cNvPr>
+          <p:cNvSpPr txBox="1"/>
+          <p:nvPr/>
+        </p:nvSpPr>
+        <p:spPr>
+          <a:xfrm>
+            <a:off x="4004467" y="1095123"/>
+            <a:ext cx="2101350" cy="738623"/>
+          </a:xfrm>
+          <a:prstGeom prst="rect">
+            <a:avLst/>
+          </a:prstGeom>
+          <a:noFill/>
+          <a:ln>
+            <a:noFill/>
+          </a:ln>
+        </p:spPr>
+        <p:txBody>
+          <a:bodyPr spcFirstLastPara="1" wrap="square" lIns="91425" tIns="45700" rIns="91425" bIns="45700" anchor="t" anchorCtr="0">
+            <a:spAutoFit/>
+          </a:bodyPr>
+          <a:lstStyle/>
+          <a:p>
+            <a:pPr lvl="0" algn="ctr"/>
+            <a:r>
+              <a:rPr lang="en-US" dirty="0">
+                <a:solidFill>
+                  <a:schemeClr val="lt1"/>
+                </a:solidFill>
+                <a:latin typeface="Calibri"/>
+                <a:ea typeface="Calibri"/>
+                <a:cs typeface="Calibri"/>
+                <a:sym typeface="Calibri"/>
+              </a:rPr>
+              <a:t>Seasonal &amp; diel migrant, continental shelf broad</a:t>
+            </a:r>
+          </a:p>
+          <a:p>
+            <a:pPr marL="0" marR="0" lvl="0" indent="0" algn="ctr" rtl="0">
+              <a:spcBef>
+                <a:spcPts val="0"/>
+              </a:spcBef>
+              <a:spcAft>
+                <a:spcPts val="0"/>
+              </a:spcAft>
+              <a:buNone/>
+            </a:pPr>
+            <a:r>
+              <a:rPr lang="en-US" dirty="0">
+                <a:solidFill>
+                  <a:schemeClr val="lt1"/>
+                </a:solidFill>
+                <a:latin typeface="Calibri"/>
+                <a:ea typeface="Calibri"/>
+                <a:cs typeface="Calibri"/>
+                <a:sym typeface="Calibri"/>
+              </a:rPr>
+              <a:t>(44)</a:t>
+            </a:r>
+            <a:endParaRPr dirty="0">
+              <a:solidFill>
+                <a:schemeClr val="lt1"/>
+              </a:solidFill>
+              <a:latin typeface="Calibri"/>
+              <a:ea typeface="Calibri"/>
+              <a:cs typeface="Calibri"/>
+              <a:sym typeface="Calibri"/>
+            </a:endParaRPr>
+          </a:p>
+        </p:txBody>
+      </p:sp>
+      <p:pic>
+        <p:nvPicPr>
+          <p:cNvPr id="68" name="Google Shape;130;p1">
+            <a:extLst>
+              <a:ext uri="{FF2B5EF4-FFF2-40B4-BE49-F238E27FC236}">
+                <a16:creationId xmlns:a16="http://schemas.microsoft.com/office/drawing/2014/main" id="{C74128A3-3C35-1644-846C-397F58605B25}"/>
+              </a:ext>
+            </a:extLst>
+          </p:cNvPr>
+          <p:cNvPicPr preferRelativeResize="0"/>
+          <p:nvPr/>
+        </p:nvPicPr>
+        <p:blipFill rotWithShape="1">
+          <a:blip r:embed="rId5">
+            <a:alphaModFix/>
+          </a:blip>
+          <a:srcRect t="12447" b="48885"/>
+          <a:stretch/>
+        </p:blipFill>
+        <p:spPr>
+          <a:xfrm>
+            <a:off x="5589739" y="1585651"/>
+            <a:ext cx="1336654" cy="365930"/>
+          </a:xfrm>
+          <a:prstGeom prst="rect">
+            <a:avLst/>
+          </a:prstGeom>
+          <a:noFill/>
+          <a:ln>
+            <a:noFill/>
+          </a:ln>
+        </p:spPr>
+      </p:pic>
+      <p:pic>
+        <p:nvPicPr>
+          <p:cNvPr id="69" name="Google Shape;197;p2">
+            <a:extLst>
+              <a:ext uri="{FF2B5EF4-FFF2-40B4-BE49-F238E27FC236}">
+                <a16:creationId xmlns:a16="http://schemas.microsoft.com/office/drawing/2014/main" id="{B8AB4EAA-F908-6749-87D5-E4ECC164B3A0}"/>
+              </a:ext>
+            </a:extLst>
+          </p:cNvPr>
+          <p:cNvPicPr preferRelativeResize="0"/>
+          <p:nvPr/>
+        </p:nvPicPr>
+        <p:blipFill rotWithShape="1">
+          <a:blip r:embed="rId6">
+            <a:alphaModFix/>
+            <a:grayscl/>
+          </a:blip>
+          <a:srcRect/>
+          <a:stretch/>
+        </p:blipFill>
+        <p:spPr>
+          <a:xfrm>
+            <a:off x="2422374" y="268329"/>
+            <a:ext cx="914775" cy="371523"/>
+          </a:xfrm>
+          <a:prstGeom prst="rect">
+            <a:avLst/>
+          </a:prstGeom>
+          <a:noFill/>
+          <a:ln>
+            <a:noFill/>
+          </a:ln>
+        </p:spPr>
+      </p:pic>
+      <p:pic>
+        <p:nvPicPr>
+          <p:cNvPr id="72" name="Google Shape;182;p2">
+            <a:extLst>
+              <a:ext uri="{FF2B5EF4-FFF2-40B4-BE49-F238E27FC236}">
+                <a16:creationId xmlns:a16="http://schemas.microsoft.com/office/drawing/2014/main" id="{C3553E02-2938-C245-8F24-5BBED158FCA2}"/>
+              </a:ext>
+            </a:extLst>
+          </p:cNvPr>
+          <p:cNvPicPr preferRelativeResize="0"/>
+          <p:nvPr/>
+        </p:nvPicPr>
+        <p:blipFill rotWithShape="1">
+          <a:blip r:embed="rId7">
+            <a:alphaModFix/>
+            <a:grayscl/>
+          </a:blip>
+          <a:srcRect/>
+          <a:stretch/>
+        </p:blipFill>
+        <p:spPr>
+          <a:xfrm>
+            <a:off x="509856" y="2008038"/>
+            <a:ext cx="985838" cy="658619"/>
+          </a:xfrm>
+          <a:prstGeom prst="rect">
+            <a:avLst/>
+          </a:prstGeom>
+          <a:noFill/>
+          <a:ln>
+            <a:noFill/>
+          </a:ln>
+        </p:spPr>
+      </p:pic>
+      <p:pic>
+        <p:nvPicPr>
+          <p:cNvPr id="73" name="Google Shape;200;p2">
+            <a:extLst>
+              <a:ext uri="{FF2B5EF4-FFF2-40B4-BE49-F238E27FC236}">
+                <a16:creationId xmlns:a16="http://schemas.microsoft.com/office/drawing/2014/main" id="{AF487E2F-41D9-D343-B90A-B4FB29DB106E}"/>
+              </a:ext>
+            </a:extLst>
+          </p:cNvPr>
+          <p:cNvPicPr preferRelativeResize="0"/>
+          <p:nvPr/>
+        </p:nvPicPr>
+        <p:blipFill rotWithShape="1">
+          <a:blip r:embed="rId8">
+            <a:alphaModFix/>
+            <a:grayscl/>
+          </a:blip>
+          <a:srcRect/>
+          <a:stretch/>
+        </p:blipFill>
+        <p:spPr>
+          <a:xfrm>
+            <a:off x="4667377" y="752197"/>
+            <a:ext cx="763617" cy="461623"/>
+          </a:xfrm>
+          <a:prstGeom prst="rect">
+            <a:avLst/>
+          </a:prstGeom>
+          <a:noFill/>
+          <a:ln>
+            <a:noFill/>
+          </a:ln>
+        </p:spPr>
+      </p:pic>
+      <p:pic>
+        <p:nvPicPr>
+          <p:cNvPr id="43" name="Google Shape;194;p2">
+            <a:extLst>
+              <a:ext uri="{FF2B5EF4-FFF2-40B4-BE49-F238E27FC236}">
+                <a16:creationId xmlns:a16="http://schemas.microsoft.com/office/drawing/2014/main" id="{C72C5A8D-321B-EE09-AE5E-C1D2ED02C576}"/>
+              </a:ext>
+            </a:extLst>
+          </p:cNvPr>
+          <p:cNvPicPr preferRelativeResize="0"/>
+          <p:nvPr/>
+        </p:nvPicPr>
+        <p:blipFill rotWithShape="1">
+          <a:blip r:embed="rId9">
+            <a:alphaModFix/>
+          </a:blip>
+          <a:srcRect/>
+          <a:stretch/>
+        </p:blipFill>
+        <p:spPr>
+          <a:xfrm rot="21104814">
+            <a:off x="5067729" y="4428663"/>
+            <a:ext cx="978010" cy="473271"/>
+          </a:xfrm>
+          <a:prstGeom prst="rect">
+            <a:avLst/>
+          </a:prstGeom>
+          <a:noFill/>
+          <a:ln>
+            <a:noFill/>
+          </a:ln>
+        </p:spPr>
+      </p:pic>
+      <p:sp>
+        <p:nvSpPr>
+          <p:cNvPr id="48" name="Google Shape;169;p2">
+            <a:extLst>
+              <a:ext uri="{FF2B5EF4-FFF2-40B4-BE49-F238E27FC236}">
+                <a16:creationId xmlns:a16="http://schemas.microsoft.com/office/drawing/2014/main" id="{7457EAAD-C6D5-91C8-5D71-E9C1B50331B1}"/>
+              </a:ext>
+            </a:extLst>
+          </p:cNvPr>
+          <p:cNvSpPr/>
+          <p:nvPr/>
+        </p:nvSpPr>
+        <p:spPr>
+          <a:xfrm>
+            <a:off x="877496" y="1009320"/>
+            <a:ext cx="1381851" cy="1038985"/>
+          </a:xfrm>
+          <a:prstGeom prst="ellipse">
+            <a:avLst/>
+          </a:prstGeom>
+          <a:solidFill>
+            <a:srgbClr val="E76E01"/>
+          </a:solidFill>
+          <a:ln>
+            <a:solidFill>
+              <a:srgbClr val="E76E01"/>
+            </a:solidFill>
+          </a:ln>
+        </p:spPr>
+        <p:txBody>
+          <a:bodyPr spcFirstLastPara="1" wrap="square" lIns="91425" tIns="45700" rIns="91425" bIns="45700" anchor="ctr" anchorCtr="0">
+            <a:noAutofit/>
+          </a:bodyPr>
+          <a:lstStyle/>
+          <a:p>
+            <a:pPr marL="0" marR="0" lvl="0" indent="0" algn="ctr" rtl="0">
+              <a:spcBef>
+                <a:spcPts val="0"/>
+              </a:spcBef>
+              <a:spcAft>
+                <a:spcPts val="0"/>
+              </a:spcAft>
+              <a:buNone/>
+            </a:pPr>
+            <a:endParaRPr>
+              <a:solidFill>
+                <a:schemeClr val="lt1"/>
+              </a:solidFill>
+              <a:latin typeface="Calibri"/>
+              <a:ea typeface="Calibri"/>
+              <a:cs typeface="Calibri"/>
+              <a:sym typeface="Calibri"/>
+            </a:endParaRPr>
+          </a:p>
+        </p:txBody>
+      </p:sp>
+      <p:sp>
+        <p:nvSpPr>
+          <p:cNvPr id="50" name="Google Shape;170;p2">
+            <a:extLst>
+              <a:ext uri="{FF2B5EF4-FFF2-40B4-BE49-F238E27FC236}">
+                <a16:creationId xmlns:a16="http://schemas.microsoft.com/office/drawing/2014/main" id="{3844CD62-C5F6-E05B-7D31-652956DDE756}"/>
+              </a:ext>
+            </a:extLst>
+          </p:cNvPr>
+          <p:cNvSpPr txBox="1"/>
+          <p:nvPr/>
+        </p:nvSpPr>
+        <p:spPr>
+          <a:xfrm>
+            <a:off x="519708" y="1358522"/>
+            <a:ext cx="2074814" cy="738623"/>
+          </a:xfrm>
+          <a:prstGeom prst="rect">
+            <a:avLst/>
+          </a:prstGeom>
+          <a:noFill/>
+          <a:ln>
+            <a:noFill/>
+          </a:ln>
+        </p:spPr>
+        <p:txBody>
+          <a:bodyPr spcFirstLastPara="1" wrap="square" lIns="91425" tIns="45700" rIns="91425" bIns="45700" anchor="t" anchorCtr="0">
+            <a:spAutoFit/>
+          </a:bodyPr>
+          <a:lstStyle/>
+          <a:p>
+            <a:pPr lvl="0" algn="ctr"/>
+            <a:r>
+              <a:rPr lang="en-US" dirty="0">
+                <a:solidFill>
+                  <a:schemeClr val="lt1"/>
+                </a:solidFill>
+                <a:latin typeface="Calibri"/>
+                <a:ea typeface="Calibri"/>
+                <a:cs typeface="Calibri"/>
+                <a:sym typeface="Calibri"/>
+              </a:rPr>
+              <a:t>Non-diel migrant </a:t>
+            </a:r>
+            <a:r>
+              <a:rPr lang="en-US" dirty="0" err="1">
+                <a:solidFill>
+                  <a:schemeClr val="lt1"/>
+                </a:solidFill>
+                <a:latin typeface="Calibri"/>
+                <a:ea typeface="Calibri"/>
+                <a:cs typeface="Calibri"/>
+                <a:sym typeface="Calibri"/>
+              </a:rPr>
+              <a:t>mesopelagics</a:t>
+            </a:r>
+            <a:r>
+              <a:rPr lang="en-US" dirty="0">
+                <a:solidFill>
+                  <a:schemeClr val="lt1"/>
+                </a:solidFill>
+                <a:latin typeface="Calibri"/>
+                <a:ea typeface="Calibri"/>
+                <a:cs typeface="Calibri"/>
+                <a:sym typeface="Calibri"/>
+              </a:rPr>
+              <a:t> </a:t>
+            </a:r>
+          </a:p>
+          <a:p>
+            <a:pPr lvl="0" algn="ctr"/>
+            <a:r>
+              <a:rPr lang="en-US" dirty="0">
+                <a:solidFill>
+                  <a:schemeClr val="lt1"/>
+                </a:solidFill>
+                <a:latin typeface="Calibri"/>
+                <a:ea typeface="Calibri"/>
+                <a:cs typeface="Calibri"/>
+                <a:sym typeface="Calibri"/>
+              </a:rPr>
+              <a:t>(12)</a:t>
+            </a:r>
+            <a:endParaRPr dirty="0"/>
+          </a:p>
+        </p:txBody>
+      </p:sp>
+      <p:grpSp>
+        <p:nvGrpSpPr>
+          <p:cNvPr id="52" name="Google Shape;227;gd33cc45fa0_1_0">
+            <a:extLst>
+              <a:ext uri="{FF2B5EF4-FFF2-40B4-BE49-F238E27FC236}">
+                <a16:creationId xmlns:a16="http://schemas.microsoft.com/office/drawing/2014/main" id="{5151D4B0-6596-14C7-5931-844C6C778A79}"/>
+              </a:ext>
+            </a:extLst>
+          </p:cNvPr>
+          <p:cNvGrpSpPr/>
+          <p:nvPr/>
+        </p:nvGrpSpPr>
+        <p:grpSpPr>
+          <a:xfrm>
+            <a:off x="2717228" y="2178647"/>
+            <a:ext cx="242100" cy="307736"/>
+            <a:chOff x="5368725" y="1437354"/>
+            <a:chExt cx="242100" cy="307736"/>
+          </a:xfrm>
+        </p:grpSpPr>
+        <p:sp>
+          <p:nvSpPr>
+            <p:cNvPr id="53" name="Google Shape;228;gd33cc45fa0_1_0">
+              <a:extLst>
+                <a:ext uri="{FF2B5EF4-FFF2-40B4-BE49-F238E27FC236}">
+                  <a16:creationId xmlns:a16="http://schemas.microsoft.com/office/drawing/2014/main" id="{742AF622-3FF2-F197-15D2-C34820AB1E68}"/>
+                </a:ext>
+              </a:extLst>
+            </p:cNvPr>
+            <p:cNvSpPr/>
+            <p:nvPr/>
+          </p:nvSpPr>
+          <p:spPr>
+            <a:xfrm>
+              <a:off x="5368725" y="1478743"/>
+              <a:ext cx="242100" cy="235200"/>
+            </a:xfrm>
+            <a:prstGeom prst="ellipse">
+              <a:avLst/>
+            </a:prstGeom>
+            <a:solidFill>
+              <a:srgbClr val="E76E01"/>
+            </a:solidFill>
+            <a:ln w="12700" cap="flat" cmpd="sng">
+              <a:solidFill>
+                <a:srgbClr val="E76E01"/>
+              </a:solidFill>
+              <a:prstDash val="solid"/>
+              <a:miter lim="800000"/>
+              <a:headEnd type="none" w="sm" len="sm"/>
+              <a:tailEnd type="none" w="sm" len="sm"/>
+            </a:ln>
+          </p:spPr>
+          <p:txBody>
+            <a:bodyPr spcFirstLastPara="1" wrap="square" lIns="91425" tIns="45700" rIns="91425" bIns="45700" anchor="ctr" anchorCtr="0">
+              <a:noAutofit/>
+            </a:bodyPr>
+            <a:lstStyle/>
+            <a:p>
+              <a:pPr marL="0" marR="0" lvl="0" indent="0" algn="ctr" rtl="0">
+                <a:spcBef>
+                  <a:spcPts val="0"/>
+                </a:spcBef>
+                <a:spcAft>
+                  <a:spcPts val="0"/>
+                </a:spcAft>
+                <a:buNone/>
+              </a:pPr>
+              <a:endParaRPr dirty="0">
+                <a:solidFill>
+                  <a:schemeClr val="lt1"/>
+                </a:solidFill>
+                <a:latin typeface="Times" pitchFamily="2" charset="0"/>
+                <a:ea typeface="Calibri"/>
+                <a:cs typeface="Calibri"/>
+                <a:sym typeface="Calibri"/>
+              </a:endParaRPr>
+            </a:p>
+          </p:txBody>
+        </p:sp>
+        <p:sp>
+          <p:nvSpPr>
+            <p:cNvPr id="54" name="Google Shape;229;gd33cc45fa0_1_0">
+              <a:extLst>
+                <a:ext uri="{FF2B5EF4-FFF2-40B4-BE49-F238E27FC236}">
+                  <a16:creationId xmlns:a16="http://schemas.microsoft.com/office/drawing/2014/main" id="{94350360-AAA5-7C01-8BD1-2B1AAB955255}"/>
+                </a:ext>
+              </a:extLst>
+            </p:cNvPr>
+            <p:cNvSpPr txBox="1"/>
+            <p:nvPr/>
+          </p:nvSpPr>
+          <p:spPr>
+            <a:xfrm>
+              <a:off x="5369859" y="1437354"/>
+              <a:ext cx="161400" cy="307736"/>
+            </a:xfrm>
+            <a:prstGeom prst="rect">
+              <a:avLst/>
+            </a:prstGeom>
+            <a:noFill/>
+            <a:ln>
+              <a:noFill/>
+            </a:ln>
+          </p:spPr>
+          <p:txBody>
+            <a:bodyPr spcFirstLastPara="1" wrap="square" lIns="91425" tIns="45700" rIns="91425" bIns="45700" anchor="t" anchorCtr="0">
+              <a:spAutoFit/>
+            </a:bodyPr>
+            <a:lstStyle/>
+            <a:p>
+              <a:pPr marL="0" marR="0" lvl="0" indent="0" algn="l" rtl="0">
+                <a:spcBef>
+                  <a:spcPts val="0"/>
+                </a:spcBef>
+                <a:spcAft>
+                  <a:spcPts val="0"/>
+                </a:spcAft>
+                <a:buNone/>
+              </a:pPr>
+              <a:r>
+                <a:rPr lang="en-US" dirty="0">
+                  <a:solidFill>
+                    <a:schemeClr val="lt1"/>
+                  </a:solidFill>
+                  <a:latin typeface="Times" pitchFamily="2" charset="0"/>
+                  <a:cs typeface="Calibri"/>
+                  <a:sym typeface="Calibri"/>
+                </a:rPr>
+                <a:t>6</a:t>
+              </a:r>
+              <a:endParaRPr dirty="0">
+                <a:latin typeface="Times" pitchFamily="2" charset="0"/>
+              </a:endParaRPr>
+            </a:p>
+          </p:txBody>
+        </p:sp>
+      </p:grpSp>
+      <p:pic>
+        <p:nvPicPr>
+          <p:cNvPr id="57" name="Google Shape;124;p1">
+            <a:extLst>
+              <a:ext uri="{FF2B5EF4-FFF2-40B4-BE49-F238E27FC236}">
+                <a16:creationId xmlns:a16="http://schemas.microsoft.com/office/drawing/2014/main" id="{33C76115-5F95-FEF7-221F-FD97C3AEDE7C}"/>
+              </a:ext>
+            </a:extLst>
+          </p:cNvPr>
+          <p:cNvPicPr preferRelativeResize="0"/>
+          <p:nvPr/>
+        </p:nvPicPr>
+        <p:blipFill rotWithShape="1">
+          <a:blip r:embed="rId10">
+            <a:alphaModFix/>
+            <a:grayscl/>
+          </a:blip>
+          <a:srcRect/>
+          <a:stretch/>
+        </p:blipFill>
+        <p:spPr>
+          <a:xfrm>
+            <a:off x="1289392" y="1007864"/>
+            <a:ext cx="597559" cy="447592"/>
+          </a:xfrm>
+          <a:prstGeom prst="rect">
+            <a:avLst/>
+          </a:prstGeom>
+          <a:noFill/>
+          <a:ln>
+            <a:noFill/>
+          </a:ln>
+        </p:spPr>
+      </p:pic>
+    </p:spTree>
+    <p:extLst>
+      <p:ext uri="{BB962C8B-B14F-4D97-AF65-F5344CB8AC3E}">
+        <p14:creationId xmlns:p14="http://schemas.microsoft.com/office/powerpoint/2010/main" val="171510935"/>
+      </p:ext>
+    </p:extLst>
+  </p:cSld>
+  <p:clrMapOvr>
+    <a:masterClrMapping/>
+  </p:clrMapOvr>
+</p:sld>
+</file>
+
+<file path=ppt/slides/slide2.xml><?xml version="1.0" encoding="utf-8"?>
 <p:sld xmlns:a="http://schemas.openxmlformats.org/drawingml/2006/main" xmlns:r="http://schemas.openxmlformats.org/officeDocument/2006/relationships" xmlns:p="http://schemas.openxmlformats.org/presentationml/2006/main">
   <p:cSld>
     <p:spTree>
@@ -12865,2164 +15293,7 @@
     </p:spTree>
     <p:extLst>
       <p:ext uri="{BB962C8B-B14F-4D97-AF65-F5344CB8AC3E}">
-        <p14:creationId xmlns:p14="http://schemas.microsoft.com/office/powerpoint/2010/main" val="171510935"/>
-      </p:ext>
-    </p:extLst>
-  </p:cSld>
-  <p:clrMapOvr>
-    <a:masterClrMapping/>
-  </p:clrMapOvr>
-</p:sld>
-</file>
-
-<file path=ppt/slides/slide2.xml><?xml version="1.0" encoding="utf-8"?>
-<p:sld xmlns:a="http://schemas.openxmlformats.org/drawingml/2006/main" xmlns:r="http://schemas.openxmlformats.org/officeDocument/2006/relationships" xmlns:p="http://schemas.openxmlformats.org/presentationml/2006/main">
-  <p:cSld>
-    <p:spTree>
-      <p:nvGrpSpPr>
-        <p:cNvPr id="1" name="Shape 281"/>
-        <p:cNvGrpSpPr/>
-        <p:nvPr/>
-      </p:nvGrpSpPr>
-      <p:grpSpPr>
-        <a:xfrm>
-          <a:off x="0" y="0"/>
-          <a:ext cx="0" cy="0"/>
-          <a:chOff x="0" y="0"/>
-          <a:chExt cx="0" cy="0"/>
-        </a:xfrm>
-      </p:grpSpPr>
-      <p:pic>
-        <p:nvPicPr>
-          <p:cNvPr id="5" name="Picture 4">
-            <a:extLst>
-              <a:ext uri="{FF2B5EF4-FFF2-40B4-BE49-F238E27FC236}">
-                <a16:creationId xmlns:a16="http://schemas.microsoft.com/office/drawing/2014/main" id="{905AFFCA-9F5A-2A43-AA5A-0DA70F6C91BA}"/>
-              </a:ext>
-            </a:extLst>
-          </p:cNvPr>
-          <p:cNvPicPr>
-            <a:picLocks noChangeAspect="1"/>
-          </p:cNvPicPr>
-          <p:nvPr/>
-        </p:nvPicPr>
-        <p:blipFill>
-          <a:blip r:embed="rId3"/>
-          <a:srcRect t="714" b="714"/>
-          <a:stretch/>
-        </p:blipFill>
-        <p:spPr>
-          <a:xfrm>
-            <a:off x="759975" y="1229327"/>
-            <a:ext cx="4257624" cy="4196800"/>
-          </a:xfrm>
-          <a:prstGeom prst="rect">
-            <a:avLst/>
-          </a:prstGeom>
-        </p:spPr>
-      </p:pic>
-      <p:sp>
-        <p:nvSpPr>
-          <p:cNvPr id="12" name="Google Shape;257;gd33cc45fa0_1_0">
-            <a:extLst>
-              <a:ext uri="{FF2B5EF4-FFF2-40B4-BE49-F238E27FC236}">
-                <a16:creationId xmlns:a16="http://schemas.microsoft.com/office/drawing/2014/main" id="{A2B5E293-3448-F54C-AECB-63767A9721CC}"/>
-              </a:ext>
-            </a:extLst>
-          </p:cNvPr>
-          <p:cNvSpPr txBox="1"/>
-          <p:nvPr/>
-        </p:nvSpPr>
-        <p:spPr>
-          <a:xfrm>
-            <a:off x="-797487" y="1205420"/>
-            <a:ext cx="2118600" cy="369291"/>
-          </a:xfrm>
-          <a:prstGeom prst="rect">
-            <a:avLst/>
-          </a:prstGeom>
-          <a:noFill/>
-          <a:ln>
-            <a:noFill/>
-          </a:ln>
-        </p:spPr>
-        <p:txBody>
-          <a:bodyPr spcFirstLastPara="1" wrap="square" lIns="91425" tIns="45700" rIns="91425" bIns="45700" anchor="t" anchorCtr="0">
-            <a:spAutoFit/>
-          </a:bodyPr>
-          <a:lstStyle/>
-          <a:p>
-            <a:pPr marL="0" marR="0" lvl="0" indent="0" algn="ctr" rtl="0">
-              <a:spcBef>
-                <a:spcPts val="0"/>
-              </a:spcBef>
-              <a:spcAft>
-                <a:spcPts val="0"/>
-              </a:spcAft>
-              <a:buNone/>
-            </a:pPr>
-            <a:r>
-              <a:rPr lang="en-US" sz="1800" dirty="0">
-                <a:solidFill>
-                  <a:schemeClr val="tx1"/>
-                </a:solidFill>
-                <a:latin typeface="Calibri"/>
-                <a:ea typeface="Calibri"/>
-                <a:cs typeface="Calibri"/>
-                <a:sym typeface="Calibri"/>
-              </a:rPr>
-              <a:t>a)</a:t>
-            </a:r>
-            <a:endParaRPr sz="1800" dirty="0">
-              <a:solidFill>
-                <a:schemeClr val="tx1"/>
-              </a:solidFill>
-              <a:latin typeface="Calibri"/>
-              <a:ea typeface="Calibri"/>
-              <a:cs typeface="Calibri"/>
-              <a:sym typeface="Calibri"/>
-            </a:endParaRPr>
-          </a:p>
-        </p:txBody>
-      </p:sp>
-      <p:grpSp>
-        <p:nvGrpSpPr>
-          <p:cNvPr id="14" name="Google Shape;230;gd33cc45fa0_1_0">
-            <a:extLst>
-              <a:ext uri="{FF2B5EF4-FFF2-40B4-BE49-F238E27FC236}">
-                <a16:creationId xmlns:a16="http://schemas.microsoft.com/office/drawing/2014/main" id="{0038C127-6E9E-994D-8E9A-E5B4E896E442}"/>
-              </a:ext>
-            </a:extLst>
-          </p:cNvPr>
-          <p:cNvGrpSpPr/>
-          <p:nvPr/>
-        </p:nvGrpSpPr>
-        <p:grpSpPr>
-          <a:xfrm>
-            <a:off x="2291766" y="2670891"/>
-            <a:ext cx="263516" cy="307736"/>
-            <a:chOff x="5762179" y="1867177"/>
-            <a:chExt cx="253393" cy="288503"/>
-          </a:xfrm>
-        </p:grpSpPr>
-        <p:sp>
-          <p:nvSpPr>
-            <p:cNvPr id="15" name="Google Shape;231;gd33cc45fa0_1_0">
-              <a:extLst>
-                <a:ext uri="{FF2B5EF4-FFF2-40B4-BE49-F238E27FC236}">
-                  <a16:creationId xmlns:a16="http://schemas.microsoft.com/office/drawing/2014/main" id="{9088132D-D7E6-5F42-B32C-79B94E7D3B46}"/>
-                </a:ext>
-              </a:extLst>
-            </p:cNvPr>
-            <p:cNvSpPr/>
-            <p:nvPr/>
-          </p:nvSpPr>
-          <p:spPr>
-            <a:xfrm>
-              <a:off x="5773472" y="1906224"/>
-              <a:ext cx="242100" cy="235200"/>
-            </a:xfrm>
-            <a:prstGeom prst="ellipse">
-              <a:avLst/>
-            </a:prstGeom>
-            <a:solidFill>
-              <a:srgbClr val="A81501"/>
-            </a:solidFill>
-            <a:ln w="12700" cap="flat" cmpd="sng">
-              <a:solidFill>
-                <a:srgbClr val="A81501"/>
-              </a:solidFill>
-              <a:prstDash val="solid"/>
-              <a:miter lim="800000"/>
-              <a:headEnd type="none" w="sm" len="sm"/>
-              <a:tailEnd type="none" w="sm" len="sm"/>
-            </a:ln>
-          </p:spPr>
-          <p:txBody>
-            <a:bodyPr spcFirstLastPara="1" wrap="square" lIns="91425" tIns="45700" rIns="91425" bIns="45700" anchor="ctr" anchorCtr="0">
-              <a:noAutofit/>
-            </a:bodyPr>
-            <a:lstStyle/>
-            <a:p>
-              <a:pPr marL="0" marR="0" lvl="0" indent="0" algn="ctr" rtl="0">
-                <a:spcBef>
-                  <a:spcPts val="0"/>
-                </a:spcBef>
-                <a:spcAft>
-                  <a:spcPts val="0"/>
-                </a:spcAft>
-                <a:buNone/>
-              </a:pPr>
-              <a:endParaRPr>
-                <a:solidFill>
-                  <a:schemeClr val="lt1"/>
-                </a:solidFill>
-                <a:latin typeface="Times" pitchFamily="2" charset="0"/>
-                <a:ea typeface="Calibri"/>
-                <a:cs typeface="Calibri"/>
-                <a:sym typeface="Calibri"/>
-              </a:endParaRPr>
-            </a:p>
-          </p:txBody>
-        </p:sp>
-        <p:sp>
-          <p:nvSpPr>
-            <p:cNvPr id="17" name="Google Shape;232;gd33cc45fa0_1_0">
-              <a:extLst>
-                <a:ext uri="{FF2B5EF4-FFF2-40B4-BE49-F238E27FC236}">
-                  <a16:creationId xmlns:a16="http://schemas.microsoft.com/office/drawing/2014/main" id="{444E4E5C-601B-ED4B-848D-B9CACEFAF4CF}"/>
-                </a:ext>
-              </a:extLst>
-            </p:cNvPr>
-            <p:cNvSpPr txBox="1"/>
-            <p:nvPr/>
-          </p:nvSpPr>
-          <p:spPr>
-            <a:xfrm>
-              <a:off x="5762179" y="1867177"/>
-              <a:ext cx="177540" cy="288503"/>
-            </a:xfrm>
-            <a:prstGeom prst="rect">
-              <a:avLst/>
-            </a:prstGeom>
-            <a:noFill/>
-            <a:ln>
-              <a:noFill/>
-            </a:ln>
-          </p:spPr>
-          <p:txBody>
-            <a:bodyPr spcFirstLastPara="1" wrap="square" lIns="91425" tIns="45700" rIns="91425" bIns="45700" anchor="t" anchorCtr="0">
-              <a:spAutoFit/>
-            </a:bodyPr>
-            <a:lstStyle/>
-            <a:p>
-              <a:pPr marL="0" marR="0" lvl="0" indent="0" algn="l" rtl="0">
-                <a:spcBef>
-                  <a:spcPts val="0"/>
-                </a:spcBef>
-                <a:spcAft>
-                  <a:spcPts val="0"/>
-                </a:spcAft>
-                <a:buNone/>
-              </a:pPr>
-              <a:r>
-                <a:rPr lang="en-US" dirty="0">
-                  <a:solidFill>
-                    <a:schemeClr val="lt1"/>
-                  </a:solidFill>
-                  <a:latin typeface="Times" pitchFamily="2" charset="0"/>
-                  <a:cs typeface="Calibri"/>
-                  <a:sym typeface="Calibri"/>
-                </a:rPr>
-                <a:t>6</a:t>
-              </a:r>
-              <a:endParaRPr dirty="0">
-                <a:latin typeface="Times" pitchFamily="2" charset="0"/>
-              </a:endParaRPr>
-            </a:p>
-          </p:txBody>
-        </p:sp>
-      </p:grpSp>
-      <p:grpSp>
-        <p:nvGrpSpPr>
-          <p:cNvPr id="18" name="Google Shape;227;gd33cc45fa0_1_0">
-            <a:extLst>
-              <a:ext uri="{FF2B5EF4-FFF2-40B4-BE49-F238E27FC236}">
-                <a16:creationId xmlns:a16="http://schemas.microsoft.com/office/drawing/2014/main" id="{786DF2E1-8C76-3347-BE3E-3859ECC9780B}"/>
-              </a:ext>
-            </a:extLst>
-          </p:cNvPr>
-          <p:cNvGrpSpPr/>
-          <p:nvPr/>
-        </p:nvGrpSpPr>
-        <p:grpSpPr>
-          <a:xfrm>
-            <a:off x="2123788" y="3500323"/>
-            <a:ext cx="255548" cy="307736"/>
-            <a:chOff x="5355277" y="1411738"/>
-            <a:chExt cx="255548" cy="307736"/>
-          </a:xfrm>
-        </p:grpSpPr>
-        <p:sp>
-          <p:nvSpPr>
-            <p:cNvPr id="19" name="Google Shape;228;gd33cc45fa0_1_0">
-              <a:extLst>
-                <a:ext uri="{FF2B5EF4-FFF2-40B4-BE49-F238E27FC236}">
-                  <a16:creationId xmlns:a16="http://schemas.microsoft.com/office/drawing/2014/main" id="{1E5919ED-7451-2D4D-919C-E3376FD1FFA2}"/>
-                </a:ext>
-              </a:extLst>
-            </p:cNvPr>
-            <p:cNvSpPr/>
-            <p:nvPr/>
-          </p:nvSpPr>
-          <p:spPr>
-            <a:xfrm>
-              <a:off x="5368725" y="1478743"/>
-              <a:ext cx="242100" cy="235200"/>
-            </a:xfrm>
-            <a:prstGeom prst="ellipse">
-              <a:avLst/>
-            </a:prstGeom>
-            <a:solidFill>
-              <a:srgbClr val="C76829"/>
-            </a:solidFill>
-            <a:ln w="12700" cap="flat" cmpd="sng">
-              <a:solidFill>
-                <a:srgbClr val="C76829"/>
-              </a:solidFill>
-              <a:prstDash val="solid"/>
-              <a:miter lim="800000"/>
-              <a:headEnd type="none" w="sm" len="sm"/>
-              <a:tailEnd type="none" w="sm" len="sm"/>
-            </a:ln>
-          </p:spPr>
-          <p:txBody>
-            <a:bodyPr spcFirstLastPara="1" wrap="square" lIns="91425" tIns="45700" rIns="91425" bIns="45700" anchor="ctr" anchorCtr="0">
-              <a:noAutofit/>
-            </a:bodyPr>
-            <a:lstStyle/>
-            <a:p>
-              <a:pPr marL="0" marR="0" lvl="0" indent="0" algn="ctr" rtl="0">
-                <a:spcBef>
-                  <a:spcPts val="0"/>
-                </a:spcBef>
-                <a:spcAft>
-                  <a:spcPts val="0"/>
-                </a:spcAft>
-                <a:buNone/>
-              </a:pPr>
-              <a:endParaRPr>
-                <a:solidFill>
-                  <a:schemeClr val="lt1"/>
-                </a:solidFill>
-                <a:latin typeface="Times" pitchFamily="2" charset="0"/>
-                <a:ea typeface="Calibri"/>
-                <a:cs typeface="Calibri"/>
-                <a:sym typeface="Calibri"/>
-              </a:endParaRPr>
-            </a:p>
-          </p:txBody>
-        </p:sp>
-        <p:sp>
-          <p:nvSpPr>
-            <p:cNvPr id="20" name="Google Shape;229;gd33cc45fa0_1_0">
-              <a:extLst>
-                <a:ext uri="{FF2B5EF4-FFF2-40B4-BE49-F238E27FC236}">
-                  <a16:creationId xmlns:a16="http://schemas.microsoft.com/office/drawing/2014/main" id="{1BB6457D-7B3C-BD48-A099-80FC048FCE30}"/>
-                </a:ext>
-              </a:extLst>
-            </p:cNvPr>
-            <p:cNvSpPr txBox="1"/>
-            <p:nvPr/>
-          </p:nvSpPr>
-          <p:spPr>
-            <a:xfrm>
-              <a:off x="5355277" y="1411738"/>
-              <a:ext cx="161400" cy="307736"/>
-            </a:xfrm>
-            <a:prstGeom prst="rect">
-              <a:avLst/>
-            </a:prstGeom>
-            <a:noFill/>
-            <a:ln>
-              <a:noFill/>
-            </a:ln>
-          </p:spPr>
-          <p:txBody>
-            <a:bodyPr spcFirstLastPara="1" wrap="square" lIns="91425" tIns="45700" rIns="91425" bIns="45700" anchor="t" anchorCtr="0">
-              <a:spAutoFit/>
-            </a:bodyPr>
-            <a:lstStyle/>
-            <a:p>
-              <a:pPr marL="0" marR="0" lvl="0" indent="0" algn="l" rtl="0">
-                <a:spcBef>
-                  <a:spcPts val="0"/>
-                </a:spcBef>
-                <a:spcAft>
-                  <a:spcPts val="0"/>
-                </a:spcAft>
-                <a:buNone/>
-              </a:pPr>
-              <a:r>
-                <a:rPr lang="en-US" dirty="0">
-                  <a:solidFill>
-                    <a:schemeClr val="lt1"/>
-                  </a:solidFill>
-                  <a:latin typeface="Times" pitchFamily="2" charset="0"/>
-                  <a:cs typeface="Calibri"/>
-                  <a:sym typeface="Calibri"/>
-                </a:rPr>
-                <a:t>5</a:t>
-              </a:r>
-              <a:endParaRPr dirty="0">
-                <a:latin typeface="Times" pitchFamily="2" charset="0"/>
-              </a:endParaRPr>
-            </a:p>
-          </p:txBody>
-        </p:sp>
-      </p:grpSp>
-      <p:grpSp>
-        <p:nvGrpSpPr>
-          <p:cNvPr id="21" name="Google Shape;221;gd33cc45fa0_1_0">
-            <a:extLst>
-              <a:ext uri="{FF2B5EF4-FFF2-40B4-BE49-F238E27FC236}">
-                <a16:creationId xmlns:a16="http://schemas.microsoft.com/office/drawing/2014/main" id="{79F1B55F-F2B0-5448-9F8D-62D6A46FA7DF}"/>
-              </a:ext>
-            </a:extLst>
-          </p:cNvPr>
-          <p:cNvGrpSpPr/>
-          <p:nvPr/>
-        </p:nvGrpSpPr>
-        <p:grpSpPr>
-          <a:xfrm>
-            <a:off x="3356449" y="3675996"/>
-            <a:ext cx="255548" cy="307736"/>
-            <a:chOff x="4816862" y="3587618"/>
-            <a:chExt cx="255548" cy="307736"/>
-          </a:xfrm>
-        </p:grpSpPr>
-        <p:sp>
-          <p:nvSpPr>
-            <p:cNvPr id="22" name="Google Shape;222;gd33cc45fa0_1_0">
-              <a:extLst>
-                <a:ext uri="{FF2B5EF4-FFF2-40B4-BE49-F238E27FC236}">
-                  <a16:creationId xmlns:a16="http://schemas.microsoft.com/office/drawing/2014/main" id="{13D9339E-2ABC-1E45-A65E-F03F0A9EB673}"/>
-                </a:ext>
-              </a:extLst>
-            </p:cNvPr>
-            <p:cNvSpPr/>
-            <p:nvPr/>
-          </p:nvSpPr>
-          <p:spPr>
-            <a:xfrm>
-              <a:off x="4830310" y="3654623"/>
-              <a:ext cx="242100" cy="235200"/>
-            </a:xfrm>
-            <a:prstGeom prst="ellipse">
-              <a:avLst/>
-            </a:prstGeom>
-            <a:solidFill>
-              <a:srgbClr val="D6A104"/>
-            </a:solidFill>
-            <a:ln w="12700" cap="flat" cmpd="sng">
-              <a:solidFill>
-                <a:srgbClr val="D6A104"/>
-              </a:solidFill>
-              <a:prstDash val="solid"/>
-              <a:miter lim="800000"/>
-              <a:headEnd type="none" w="sm" len="sm"/>
-              <a:tailEnd type="none" w="sm" len="sm"/>
-            </a:ln>
-          </p:spPr>
-          <p:txBody>
-            <a:bodyPr spcFirstLastPara="1" wrap="square" lIns="91425" tIns="45700" rIns="91425" bIns="45700" anchor="ctr" anchorCtr="0">
-              <a:noAutofit/>
-            </a:bodyPr>
-            <a:lstStyle/>
-            <a:p>
-              <a:pPr marL="0" marR="0" lvl="0" indent="0" algn="ctr" rtl="0">
-                <a:spcBef>
-                  <a:spcPts val="0"/>
-                </a:spcBef>
-                <a:spcAft>
-                  <a:spcPts val="0"/>
-                </a:spcAft>
-                <a:buNone/>
-              </a:pPr>
-              <a:endParaRPr>
-                <a:solidFill>
-                  <a:schemeClr val="lt1"/>
-                </a:solidFill>
-                <a:latin typeface="Times" pitchFamily="2" charset="0"/>
-                <a:ea typeface="Calibri"/>
-                <a:cs typeface="Calibri"/>
-                <a:sym typeface="Calibri"/>
-              </a:endParaRPr>
-            </a:p>
-          </p:txBody>
-        </p:sp>
-        <p:sp>
-          <p:nvSpPr>
-            <p:cNvPr id="23" name="Google Shape;223;gd33cc45fa0_1_0">
-              <a:extLst>
-                <a:ext uri="{FF2B5EF4-FFF2-40B4-BE49-F238E27FC236}">
-                  <a16:creationId xmlns:a16="http://schemas.microsoft.com/office/drawing/2014/main" id="{EA4E0248-751B-3E4E-A1EC-3B2D780A3E4E}"/>
-                </a:ext>
-              </a:extLst>
-            </p:cNvPr>
-            <p:cNvSpPr txBox="1"/>
-            <p:nvPr/>
-          </p:nvSpPr>
-          <p:spPr>
-            <a:xfrm>
-              <a:off x="4816862" y="3587618"/>
-              <a:ext cx="161400" cy="307736"/>
-            </a:xfrm>
-            <a:prstGeom prst="rect">
-              <a:avLst/>
-            </a:prstGeom>
-            <a:noFill/>
-            <a:ln>
-              <a:noFill/>
-            </a:ln>
-          </p:spPr>
-          <p:txBody>
-            <a:bodyPr spcFirstLastPara="1" wrap="square" lIns="91425" tIns="45700" rIns="91425" bIns="45700" anchor="t" anchorCtr="0">
-              <a:spAutoFit/>
-            </a:bodyPr>
-            <a:lstStyle/>
-            <a:p>
-              <a:pPr marL="0" marR="0" lvl="0" indent="0" algn="l" rtl="0">
-                <a:spcBef>
-                  <a:spcPts val="0"/>
-                </a:spcBef>
-                <a:spcAft>
-                  <a:spcPts val="0"/>
-                </a:spcAft>
-                <a:buNone/>
-              </a:pPr>
-              <a:r>
-                <a:rPr lang="en-US" dirty="0">
-                  <a:solidFill>
-                    <a:schemeClr val="lt1"/>
-                  </a:solidFill>
-                  <a:latin typeface="Times" pitchFamily="2" charset="0"/>
-                  <a:cs typeface="Calibri"/>
-                  <a:sym typeface="Calibri"/>
-                </a:rPr>
-                <a:t>2</a:t>
-              </a:r>
-              <a:endParaRPr dirty="0">
-                <a:latin typeface="Times" pitchFamily="2" charset="0"/>
-              </a:endParaRPr>
-            </a:p>
-          </p:txBody>
-        </p:sp>
-      </p:grpSp>
-      <p:grpSp>
-        <p:nvGrpSpPr>
-          <p:cNvPr id="24" name="Google Shape;218;gd33cc45fa0_1_0">
-            <a:extLst>
-              <a:ext uri="{FF2B5EF4-FFF2-40B4-BE49-F238E27FC236}">
-                <a16:creationId xmlns:a16="http://schemas.microsoft.com/office/drawing/2014/main" id="{F90BB495-5408-1740-BAED-C573012F8B20}"/>
-              </a:ext>
-            </a:extLst>
-          </p:cNvPr>
-          <p:cNvGrpSpPr/>
-          <p:nvPr/>
-        </p:nvGrpSpPr>
-        <p:grpSpPr>
-          <a:xfrm>
-            <a:off x="3556763" y="3098995"/>
-            <a:ext cx="275269" cy="308730"/>
-            <a:chOff x="6762450" y="4020259"/>
-            <a:chExt cx="264694" cy="289434"/>
-          </a:xfrm>
-        </p:grpSpPr>
-        <p:sp>
-          <p:nvSpPr>
-            <p:cNvPr id="25" name="Google Shape;219;gd33cc45fa0_1_0">
-              <a:extLst>
-                <a:ext uri="{FF2B5EF4-FFF2-40B4-BE49-F238E27FC236}">
-                  <a16:creationId xmlns:a16="http://schemas.microsoft.com/office/drawing/2014/main" id="{E1970BC3-4F95-A848-AE66-E40E9D013210}"/>
-                </a:ext>
-              </a:extLst>
-            </p:cNvPr>
-            <p:cNvSpPr/>
-            <p:nvPr/>
-          </p:nvSpPr>
-          <p:spPr>
-            <a:xfrm>
-              <a:off x="6785044" y="4074493"/>
-              <a:ext cx="242100" cy="235200"/>
-            </a:xfrm>
-            <a:prstGeom prst="ellipse">
-              <a:avLst/>
-            </a:prstGeom>
-            <a:solidFill>
-              <a:srgbClr val="88A251"/>
-            </a:solidFill>
-            <a:ln w="12700" cap="flat" cmpd="sng">
-              <a:solidFill>
-                <a:srgbClr val="88A251"/>
-              </a:solidFill>
-              <a:prstDash val="solid"/>
-              <a:miter lim="800000"/>
-              <a:headEnd type="none" w="sm" len="sm"/>
-              <a:tailEnd type="none" w="sm" len="sm"/>
-            </a:ln>
-          </p:spPr>
-          <p:txBody>
-            <a:bodyPr spcFirstLastPara="1" wrap="square" lIns="91425" tIns="45700" rIns="91425" bIns="45700" anchor="ctr" anchorCtr="0">
-              <a:noAutofit/>
-            </a:bodyPr>
-            <a:lstStyle/>
-            <a:p>
-              <a:pPr marL="0" marR="0" lvl="0" indent="0" algn="ctr" rtl="0">
-                <a:spcBef>
-                  <a:spcPts val="0"/>
-                </a:spcBef>
-                <a:spcAft>
-                  <a:spcPts val="0"/>
-                </a:spcAft>
-                <a:buNone/>
-              </a:pPr>
-              <a:endParaRPr>
-                <a:solidFill>
-                  <a:schemeClr val="lt1"/>
-                </a:solidFill>
-                <a:latin typeface="Times" pitchFamily="2" charset="0"/>
-                <a:ea typeface="Calibri"/>
-                <a:cs typeface="Calibri"/>
-                <a:sym typeface="Calibri"/>
-              </a:endParaRPr>
-            </a:p>
-          </p:txBody>
-        </p:sp>
-        <p:sp>
-          <p:nvSpPr>
-            <p:cNvPr id="26" name="Google Shape;220;gd33cc45fa0_1_0">
-              <a:extLst>
-                <a:ext uri="{FF2B5EF4-FFF2-40B4-BE49-F238E27FC236}">
-                  <a16:creationId xmlns:a16="http://schemas.microsoft.com/office/drawing/2014/main" id="{08419916-3FFA-154A-83E9-FCBDE963F254}"/>
-                </a:ext>
-              </a:extLst>
-            </p:cNvPr>
-            <p:cNvSpPr txBox="1"/>
-            <p:nvPr/>
-          </p:nvSpPr>
-          <p:spPr>
-            <a:xfrm>
-              <a:off x="6762450" y="4020259"/>
-              <a:ext cx="253200" cy="288502"/>
-            </a:xfrm>
-            <a:prstGeom prst="rect">
-              <a:avLst/>
-            </a:prstGeom>
-            <a:noFill/>
-            <a:ln>
-              <a:noFill/>
-            </a:ln>
-          </p:spPr>
-          <p:txBody>
-            <a:bodyPr spcFirstLastPara="1" wrap="square" lIns="91425" tIns="45700" rIns="91425" bIns="45700" anchor="t" anchorCtr="0">
-              <a:spAutoFit/>
-            </a:bodyPr>
-            <a:lstStyle/>
-            <a:p>
-              <a:pPr marL="0" marR="0" lvl="0" indent="0" algn="l" rtl="0">
-                <a:spcBef>
-                  <a:spcPts val="0"/>
-                </a:spcBef>
-                <a:spcAft>
-                  <a:spcPts val="0"/>
-                </a:spcAft>
-                <a:buNone/>
-              </a:pPr>
-              <a:r>
-                <a:rPr lang="en-US" dirty="0">
-                  <a:solidFill>
-                    <a:schemeClr val="lt1"/>
-                  </a:solidFill>
-                  <a:latin typeface="Times" pitchFamily="2" charset="0"/>
-                  <a:cs typeface="Calibri"/>
-                  <a:sym typeface="Calibri"/>
-                </a:rPr>
-                <a:t>4</a:t>
-              </a:r>
-              <a:endParaRPr dirty="0">
-                <a:latin typeface="Times" pitchFamily="2" charset="0"/>
-              </a:endParaRPr>
-            </a:p>
-          </p:txBody>
-        </p:sp>
-      </p:grpSp>
-      <p:grpSp>
-        <p:nvGrpSpPr>
-          <p:cNvPr id="27" name="Google Shape;215;gd33cc45fa0_1_0">
-            <a:extLst>
-              <a:ext uri="{FF2B5EF4-FFF2-40B4-BE49-F238E27FC236}">
-                <a16:creationId xmlns:a16="http://schemas.microsoft.com/office/drawing/2014/main" id="{AC1625EF-58A6-BB4C-8B79-C6C0EC63FB53}"/>
-              </a:ext>
-            </a:extLst>
-          </p:cNvPr>
-          <p:cNvGrpSpPr/>
-          <p:nvPr/>
-        </p:nvGrpSpPr>
-        <p:grpSpPr>
-          <a:xfrm>
-            <a:off x="3394162" y="2688060"/>
-            <a:ext cx="255548" cy="307736"/>
-            <a:chOff x="7162109" y="3579562"/>
-            <a:chExt cx="255548" cy="307736"/>
-          </a:xfrm>
-        </p:grpSpPr>
-        <p:sp>
-          <p:nvSpPr>
-            <p:cNvPr id="28" name="Google Shape;216;gd33cc45fa0_1_0">
-              <a:extLst>
-                <a:ext uri="{FF2B5EF4-FFF2-40B4-BE49-F238E27FC236}">
-                  <a16:creationId xmlns:a16="http://schemas.microsoft.com/office/drawing/2014/main" id="{ED8B2608-CF43-9A42-95CA-AA3E31B183F7}"/>
-                </a:ext>
-              </a:extLst>
-            </p:cNvPr>
-            <p:cNvSpPr/>
-            <p:nvPr/>
-          </p:nvSpPr>
-          <p:spPr>
-            <a:xfrm>
-              <a:off x="7175557" y="3646567"/>
-              <a:ext cx="242100" cy="235200"/>
-            </a:xfrm>
-            <a:prstGeom prst="ellipse">
-              <a:avLst/>
-            </a:prstGeom>
-            <a:solidFill>
-              <a:srgbClr val="4781A2"/>
-            </a:solidFill>
-            <a:ln w="12700" cap="flat" cmpd="sng">
-              <a:solidFill>
-                <a:srgbClr val="4781A2"/>
-              </a:solidFill>
-              <a:prstDash val="solid"/>
-              <a:miter lim="800000"/>
-              <a:headEnd type="none" w="sm" len="sm"/>
-              <a:tailEnd type="none" w="sm" len="sm"/>
-            </a:ln>
-          </p:spPr>
-          <p:txBody>
-            <a:bodyPr spcFirstLastPara="1" wrap="square" lIns="91425" tIns="45700" rIns="91425" bIns="45700" anchor="ctr" anchorCtr="0">
-              <a:noAutofit/>
-            </a:bodyPr>
-            <a:lstStyle/>
-            <a:p>
-              <a:pPr marL="0" marR="0" lvl="0" indent="0" algn="ctr" rtl="0">
-                <a:spcBef>
-                  <a:spcPts val="0"/>
-                </a:spcBef>
-                <a:spcAft>
-                  <a:spcPts val="0"/>
-                </a:spcAft>
-                <a:buNone/>
-              </a:pPr>
-              <a:endParaRPr>
-                <a:solidFill>
-                  <a:schemeClr val="lt1"/>
-                </a:solidFill>
-                <a:latin typeface="Times" pitchFamily="2" charset="0"/>
-                <a:ea typeface="Calibri"/>
-                <a:cs typeface="Calibri"/>
-                <a:sym typeface="Calibri"/>
-              </a:endParaRPr>
-            </a:p>
-          </p:txBody>
-        </p:sp>
-        <p:sp>
-          <p:nvSpPr>
-            <p:cNvPr id="29" name="Google Shape;217;gd33cc45fa0_1_0">
-              <a:extLst>
-                <a:ext uri="{FF2B5EF4-FFF2-40B4-BE49-F238E27FC236}">
-                  <a16:creationId xmlns:a16="http://schemas.microsoft.com/office/drawing/2014/main" id="{9227393D-573C-2F41-A688-BFB44BDC406D}"/>
-                </a:ext>
-              </a:extLst>
-            </p:cNvPr>
-            <p:cNvSpPr txBox="1"/>
-            <p:nvPr/>
-          </p:nvSpPr>
-          <p:spPr>
-            <a:xfrm>
-              <a:off x="7162109" y="3579562"/>
-              <a:ext cx="161400" cy="307736"/>
-            </a:xfrm>
-            <a:prstGeom prst="rect">
-              <a:avLst/>
-            </a:prstGeom>
-            <a:noFill/>
-            <a:ln>
-              <a:noFill/>
-            </a:ln>
-          </p:spPr>
-          <p:txBody>
-            <a:bodyPr spcFirstLastPara="1" wrap="square" lIns="91425" tIns="45700" rIns="91425" bIns="45700" anchor="t" anchorCtr="0">
-              <a:spAutoFit/>
-            </a:bodyPr>
-            <a:lstStyle/>
-            <a:p>
-              <a:pPr marL="0" marR="0" lvl="0" indent="0" algn="l" rtl="0">
-                <a:spcBef>
-                  <a:spcPts val="0"/>
-                </a:spcBef>
-                <a:spcAft>
-                  <a:spcPts val="0"/>
-                </a:spcAft>
-                <a:buNone/>
-              </a:pPr>
-              <a:r>
-                <a:rPr lang="en-US" dirty="0">
-                  <a:solidFill>
-                    <a:schemeClr val="lt1"/>
-                  </a:solidFill>
-                  <a:latin typeface="Times" pitchFamily="2" charset="0"/>
-                  <a:cs typeface="Calibri"/>
-                  <a:sym typeface="Calibri"/>
-                </a:rPr>
-                <a:t>3</a:t>
-              </a:r>
-              <a:endParaRPr dirty="0">
-                <a:latin typeface="Times" pitchFamily="2" charset="0"/>
-              </a:endParaRPr>
-            </a:p>
-          </p:txBody>
-        </p:sp>
-      </p:grpSp>
-      <p:grpSp>
-        <p:nvGrpSpPr>
-          <p:cNvPr id="30" name="Google Shape;212;gd33cc45fa0_1_0">
-            <a:extLst>
-              <a:ext uri="{FF2B5EF4-FFF2-40B4-BE49-F238E27FC236}">
-                <a16:creationId xmlns:a16="http://schemas.microsoft.com/office/drawing/2014/main" id="{287846D2-0AAF-EB4C-AD7A-12366D4B0E75}"/>
-              </a:ext>
-            </a:extLst>
-          </p:cNvPr>
-          <p:cNvGrpSpPr/>
-          <p:nvPr/>
-        </p:nvGrpSpPr>
-        <p:grpSpPr>
-          <a:xfrm>
-            <a:off x="2903518" y="2417063"/>
-            <a:ext cx="255548" cy="307736"/>
-            <a:chOff x="6371135" y="2064326"/>
-            <a:chExt cx="255548" cy="307736"/>
-          </a:xfrm>
-        </p:grpSpPr>
-        <p:sp>
-          <p:nvSpPr>
-            <p:cNvPr id="31" name="Google Shape;213;gd33cc45fa0_1_0">
-              <a:extLst>
-                <a:ext uri="{FF2B5EF4-FFF2-40B4-BE49-F238E27FC236}">
-                  <a16:creationId xmlns:a16="http://schemas.microsoft.com/office/drawing/2014/main" id="{A8E8E3E9-51DD-364A-B781-497108F49BF5}"/>
-                </a:ext>
-              </a:extLst>
-            </p:cNvPr>
-            <p:cNvSpPr/>
-            <p:nvPr/>
-          </p:nvSpPr>
-          <p:spPr>
-            <a:xfrm>
-              <a:off x="6384583" y="2131331"/>
-              <a:ext cx="242100" cy="235200"/>
-            </a:xfrm>
-            <a:prstGeom prst="ellipse">
-              <a:avLst/>
-            </a:prstGeom>
-            <a:solidFill>
-              <a:srgbClr val="3E597D"/>
-            </a:solidFill>
-            <a:ln w="12700" cap="flat" cmpd="sng">
-              <a:solidFill>
-                <a:srgbClr val="3E597D"/>
-              </a:solidFill>
-              <a:prstDash val="solid"/>
-              <a:miter lim="800000"/>
-              <a:headEnd type="none" w="sm" len="sm"/>
-              <a:tailEnd type="none" w="sm" len="sm"/>
-            </a:ln>
-          </p:spPr>
-          <p:txBody>
-            <a:bodyPr spcFirstLastPara="1" wrap="square" lIns="91425" tIns="45700" rIns="91425" bIns="45700" anchor="ctr" anchorCtr="0">
-              <a:noAutofit/>
-            </a:bodyPr>
-            <a:lstStyle/>
-            <a:p>
-              <a:pPr marL="0" marR="0" lvl="0" indent="0" algn="ctr" rtl="0">
-                <a:spcBef>
-                  <a:spcPts val="0"/>
-                </a:spcBef>
-                <a:spcAft>
-                  <a:spcPts val="0"/>
-                </a:spcAft>
-                <a:buNone/>
-              </a:pPr>
-              <a:endParaRPr>
-                <a:solidFill>
-                  <a:schemeClr val="lt1"/>
-                </a:solidFill>
-                <a:latin typeface="Times" pitchFamily="2" charset="0"/>
-                <a:ea typeface="Calibri"/>
-                <a:cs typeface="Calibri"/>
-                <a:sym typeface="Calibri"/>
-              </a:endParaRPr>
-            </a:p>
-          </p:txBody>
-        </p:sp>
-        <p:sp>
-          <p:nvSpPr>
-            <p:cNvPr id="32" name="Google Shape;214;gd33cc45fa0_1_0">
-              <a:extLst>
-                <a:ext uri="{FF2B5EF4-FFF2-40B4-BE49-F238E27FC236}">
-                  <a16:creationId xmlns:a16="http://schemas.microsoft.com/office/drawing/2014/main" id="{86C24C1C-4A4D-BE44-BB02-BD81C0E20DAF}"/>
-                </a:ext>
-              </a:extLst>
-            </p:cNvPr>
-            <p:cNvSpPr txBox="1"/>
-            <p:nvPr/>
-          </p:nvSpPr>
-          <p:spPr>
-            <a:xfrm>
-              <a:off x="6371135" y="2064326"/>
-              <a:ext cx="161400" cy="307736"/>
-            </a:xfrm>
-            <a:prstGeom prst="rect">
-              <a:avLst/>
-            </a:prstGeom>
-            <a:noFill/>
-            <a:ln>
-              <a:noFill/>
-            </a:ln>
-          </p:spPr>
-          <p:txBody>
-            <a:bodyPr spcFirstLastPara="1" wrap="square" lIns="91425" tIns="45700" rIns="91425" bIns="45700" anchor="t" anchorCtr="0">
-              <a:spAutoFit/>
-            </a:bodyPr>
-            <a:lstStyle/>
-            <a:p>
-              <a:pPr marL="0" marR="0" lvl="0" indent="0" algn="l" rtl="0">
-                <a:spcBef>
-                  <a:spcPts val="0"/>
-                </a:spcBef>
-                <a:spcAft>
-                  <a:spcPts val="0"/>
-                </a:spcAft>
-                <a:buNone/>
-              </a:pPr>
-              <a:r>
-                <a:rPr lang="en-US" dirty="0">
-                  <a:solidFill>
-                    <a:schemeClr val="lt1"/>
-                  </a:solidFill>
-                  <a:latin typeface="Times" pitchFamily="2" charset="0"/>
-                  <a:ea typeface="Calibri"/>
-                  <a:cs typeface="Calibri"/>
-                  <a:sym typeface="Calibri"/>
-                </a:rPr>
-                <a:t>1</a:t>
-              </a:r>
-              <a:endParaRPr dirty="0">
-                <a:latin typeface="Times" pitchFamily="2" charset="0"/>
-              </a:endParaRPr>
-            </a:p>
-          </p:txBody>
-        </p:sp>
-      </p:grpSp>
-      <p:sp>
-        <p:nvSpPr>
-          <p:cNvPr id="34" name="Google Shape;167;p2">
-            <a:extLst>
-              <a:ext uri="{FF2B5EF4-FFF2-40B4-BE49-F238E27FC236}">
-                <a16:creationId xmlns:a16="http://schemas.microsoft.com/office/drawing/2014/main" id="{E466C6F1-0458-E94A-9666-7319E488DA3E}"/>
-              </a:ext>
-            </a:extLst>
-          </p:cNvPr>
-          <p:cNvSpPr/>
-          <p:nvPr/>
-        </p:nvSpPr>
-        <p:spPr>
-          <a:xfrm>
-            <a:off x="366665" y="1378078"/>
-            <a:ext cx="1828623" cy="1038985"/>
-          </a:xfrm>
-          <a:prstGeom prst="ellipse">
-            <a:avLst/>
-          </a:prstGeom>
-          <a:solidFill>
-            <a:srgbClr val="A81501"/>
-          </a:solidFill>
-          <a:ln>
-            <a:noFill/>
-          </a:ln>
-        </p:spPr>
-        <p:txBody>
-          <a:bodyPr spcFirstLastPara="1" wrap="square" lIns="91425" tIns="45700" rIns="91425" bIns="45700" anchor="ctr" anchorCtr="0">
-            <a:noAutofit/>
-          </a:bodyPr>
-          <a:lstStyle/>
-          <a:p>
-            <a:pPr marL="0" marR="0" lvl="0" indent="0" algn="ctr" rtl="0">
-              <a:spcBef>
-                <a:spcPts val="0"/>
-              </a:spcBef>
-              <a:spcAft>
-                <a:spcPts val="0"/>
-              </a:spcAft>
-              <a:buNone/>
-            </a:pPr>
-            <a:endParaRPr>
-              <a:solidFill>
-                <a:schemeClr val="lt1"/>
-              </a:solidFill>
-              <a:latin typeface="Calibri"/>
-              <a:ea typeface="Calibri"/>
-              <a:cs typeface="Calibri"/>
-              <a:sym typeface="Calibri"/>
-            </a:endParaRPr>
-          </a:p>
-        </p:txBody>
-      </p:sp>
-      <p:sp>
-        <p:nvSpPr>
-          <p:cNvPr id="35" name="Google Shape;168;p2">
-            <a:extLst>
-              <a:ext uri="{FF2B5EF4-FFF2-40B4-BE49-F238E27FC236}">
-                <a16:creationId xmlns:a16="http://schemas.microsoft.com/office/drawing/2014/main" id="{FA88B3F4-82C7-3D4B-9BE1-226C5AE9965F}"/>
-              </a:ext>
-            </a:extLst>
-          </p:cNvPr>
-          <p:cNvSpPr txBox="1"/>
-          <p:nvPr/>
-        </p:nvSpPr>
-        <p:spPr>
-          <a:xfrm>
-            <a:off x="366665" y="1703796"/>
-            <a:ext cx="1828623" cy="738623"/>
-          </a:xfrm>
-          <a:prstGeom prst="rect">
-            <a:avLst/>
-          </a:prstGeom>
-          <a:noFill/>
-          <a:ln>
-            <a:noFill/>
-          </a:ln>
-        </p:spPr>
-        <p:txBody>
-          <a:bodyPr spcFirstLastPara="1" wrap="square" lIns="91425" tIns="45700" rIns="91425" bIns="45700" anchor="t" anchorCtr="0">
-            <a:spAutoFit/>
-          </a:bodyPr>
-          <a:lstStyle/>
-          <a:p>
-            <a:pPr marL="0" marR="0" lvl="0" indent="0" algn="ctr" rtl="0">
-              <a:spcBef>
-                <a:spcPts val="0"/>
-              </a:spcBef>
-              <a:spcAft>
-                <a:spcPts val="0"/>
-              </a:spcAft>
-              <a:buNone/>
-            </a:pPr>
-            <a:r>
-              <a:rPr lang="en-US" dirty="0">
-                <a:solidFill>
-                  <a:schemeClr val="lt1"/>
-                </a:solidFill>
-                <a:latin typeface="Calibri"/>
-                <a:ea typeface="Calibri"/>
-                <a:cs typeface="Calibri"/>
-                <a:sym typeface="Calibri"/>
-              </a:rPr>
-              <a:t>Diel migrating continental shelf taxa</a:t>
-            </a:r>
-          </a:p>
-          <a:p>
-            <a:pPr marL="0" marR="0" lvl="0" indent="0" algn="ctr" rtl="0">
-              <a:spcBef>
-                <a:spcPts val="0"/>
-              </a:spcBef>
-              <a:spcAft>
-                <a:spcPts val="0"/>
-              </a:spcAft>
-              <a:buNone/>
-            </a:pPr>
-            <a:r>
-              <a:rPr lang="en-US" dirty="0">
-                <a:solidFill>
-                  <a:schemeClr val="lt1"/>
-                </a:solidFill>
-                <a:latin typeface="Calibri"/>
-                <a:cs typeface="Calibri"/>
-                <a:sym typeface="Calibri"/>
-              </a:rPr>
-              <a:t>(72)</a:t>
-            </a:r>
-            <a:endParaRPr dirty="0"/>
-          </a:p>
-        </p:txBody>
-      </p:sp>
-      <p:sp>
-        <p:nvSpPr>
-          <p:cNvPr id="37" name="Google Shape;169;p2">
-            <a:extLst>
-              <a:ext uri="{FF2B5EF4-FFF2-40B4-BE49-F238E27FC236}">
-                <a16:creationId xmlns:a16="http://schemas.microsoft.com/office/drawing/2014/main" id="{CA10AA7F-0BFC-D841-A3D8-A071E4445737}"/>
-              </a:ext>
-            </a:extLst>
-          </p:cNvPr>
-          <p:cNvSpPr/>
-          <p:nvPr/>
-        </p:nvSpPr>
-        <p:spPr>
-          <a:xfrm>
-            <a:off x="138622" y="4018681"/>
-            <a:ext cx="1935480" cy="1005432"/>
-          </a:xfrm>
-          <a:prstGeom prst="ellipse">
-            <a:avLst/>
-          </a:prstGeom>
-          <a:solidFill>
-            <a:srgbClr val="C76829"/>
-          </a:solidFill>
-          <a:ln>
-            <a:noFill/>
-          </a:ln>
-        </p:spPr>
-        <p:txBody>
-          <a:bodyPr spcFirstLastPara="1" wrap="square" lIns="91425" tIns="45700" rIns="91425" bIns="45700" anchor="ctr" anchorCtr="0">
-            <a:noAutofit/>
-          </a:bodyPr>
-          <a:lstStyle/>
-          <a:p>
-            <a:pPr marL="0" marR="0" lvl="0" indent="0" algn="ctr" rtl="0">
-              <a:spcBef>
-                <a:spcPts val="0"/>
-              </a:spcBef>
-              <a:spcAft>
-                <a:spcPts val="0"/>
-              </a:spcAft>
-              <a:buNone/>
-            </a:pPr>
-            <a:endParaRPr>
-              <a:solidFill>
-                <a:schemeClr val="lt1"/>
-              </a:solidFill>
-              <a:latin typeface="Calibri"/>
-              <a:ea typeface="Calibri"/>
-              <a:cs typeface="Calibri"/>
-              <a:sym typeface="Calibri"/>
-            </a:endParaRPr>
-          </a:p>
-        </p:txBody>
-      </p:sp>
-      <p:sp>
-        <p:nvSpPr>
-          <p:cNvPr id="38" name="Google Shape;170;p2">
-            <a:extLst>
-              <a:ext uri="{FF2B5EF4-FFF2-40B4-BE49-F238E27FC236}">
-                <a16:creationId xmlns:a16="http://schemas.microsoft.com/office/drawing/2014/main" id="{01DA6036-3081-1346-AE35-C0786A8DE16A}"/>
-              </a:ext>
-            </a:extLst>
-          </p:cNvPr>
-          <p:cNvSpPr txBox="1"/>
-          <p:nvPr/>
-        </p:nvSpPr>
-        <p:spPr>
-          <a:xfrm>
-            <a:off x="62422" y="4326130"/>
-            <a:ext cx="2074814" cy="738623"/>
-          </a:xfrm>
-          <a:prstGeom prst="rect">
-            <a:avLst/>
-          </a:prstGeom>
-          <a:noFill/>
-          <a:ln>
-            <a:noFill/>
-          </a:ln>
-        </p:spPr>
-        <p:txBody>
-          <a:bodyPr spcFirstLastPara="1" wrap="square" lIns="91425" tIns="45700" rIns="91425" bIns="45700" anchor="t" anchorCtr="0">
-            <a:spAutoFit/>
-          </a:bodyPr>
-          <a:lstStyle/>
-          <a:p>
-            <a:pPr marL="0" marR="0" lvl="0" indent="0" algn="ctr" rtl="0">
-              <a:spcBef>
-                <a:spcPts val="0"/>
-              </a:spcBef>
-              <a:spcAft>
-                <a:spcPts val="0"/>
-              </a:spcAft>
-              <a:buNone/>
-            </a:pPr>
-            <a:r>
-              <a:rPr lang="en-US" dirty="0">
-                <a:solidFill>
-                  <a:schemeClr val="lt1"/>
-                </a:solidFill>
-                <a:latin typeface="Calibri"/>
-                <a:ea typeface="Calibri"/>
-                <a:cs typeface="Calibri"/>
-                <a:sym typeface="Calibri"/>
-              </a:rPr>
-              <a:t>Seasonal &amp; diel migrating coastal </a:t>
-            </a:r>
-            <a:r>
-              <a:rPr lang="en-US" dirty="0" err="1">
-                <a:solidFill>
-                  <a:schemeClr val="lt1"/>
-                </a:solidFill>
-                <a:latin typeface="Calibri"/>
-                <a:ea typeface="Calibri"/>
-                <a:cs typeface="Calibri"/>
-                <a:sym typeface="Calibri"/>
-              </a:rPr>
-              <a:t>pelagics</a:t>
-            </a:r>
-            <a:endParaRPr lang="en-US" dirty="0">
-              <a:solidFill>
-                <a:schemeClr val="lt1"/>
-              </a:solidFill>
-              <a:latin typeface="Calibri"/>
-              <a:ea typeface="Calibri"/>
-              <a:cs typeface="Calibri"/>
-              <a:sym typeface="Calibri"/>
-            </a:endParaRPr>
-          </a:p>
-          <a:p>
-            <a:pPr marL="0" marR="0" lvl="0" indent="0" algn="ctr" rtl="0">
-              <a:spcBef>
-                <a:spcPts val="0"/>
-              </a:spcBef>
-              <a:spcAft>
-                <a:spcPts val="0"/>
-              </a:spcAft>
-              <a:buNone/>
-            </a:pPr>
-            <a:r>
-              <a:rPr lang="en-US" dirty="0">
-                <a:solidFill>
-                  <a:schemeClr val="lt1"/>
-                </a:solidFill>
-                <a:latin typeface="Calibri"/>
-                <a:cs typeface="Calibri"/>
-                <a:sym typeface="Calibri"/>
-              </a:rPr>
-              <a:t>(55)</a:t>
-            </a:r>
-            <a:endParaRPr dirty="0"/>
-          </a:p>
-        </p:txBody>
-      </p:sp>
-      <p:sp>
-        <p:nvSpPr>
-          <p:cNvPr id="41" name="Google Shape;172;p2">
-            <a:extLst>
-              <a:ext uri="{FF2B5EF4-FFF2-40B4-BE49-F238E27FC236}">
-                <a16:creationId xmlns:a16="http://schemas.microsoft.com/office/drawing/2014/main" id="{EA319015-4BAE-1B48-BB5E-BA71A455A198}"/>
-              </a:ext>
-            </a:extLst>
-          </p:cNvPr>
-          <p:cNvSpPr/>
-          <p:nvPr/>
-        </p:nvSpPr>
-        <p:spPr>
-          <a:xfrm>
-            <a:off x="3869920" y="4430328"/>
-            <a:ext cx="1540989" cy="1019706"/>
-          </a:xfrm>
-          <a:prstGeom prst="ellipse">
-            <a:avLst/>
-          </a:prstGeom>
-          <a:solidFill>
-            <a:srgbClr val="D6A104"/>
-          </a:solidFill>
-          <a:ln>
-            <a:noFill/>
-          </a:ln>
-        </p:spPr>
-        <p:txBody>
-          <a:bodyPr spcFirstLastPara="1" wrap="square" lIns="91425" tIns="45700" rIns="91425" bIns="45700" anchor="ctr" anchorCtr="0">
-            <a:noAutofit/>
-          </a:bodyPr>
-          <a:lstStyle/>
-          <a:p>
-            <a:pPr marL="0" marR="0" lvl="0" indent="0" algn="ctr" rtl="0">
-              <a:spcBef>
-                <a:spcPts val="0"/>
-              </a:spcBef>
-              <a:spcAft>
-                <a:spcPts val="0"/>
-              </a:spcAft>
-              <a:buNone/>
-            </a:pPr>
-            <a:endParaRPr>
-              <a:solidFill>
-                <a:schemeClr val="lt1"/>
-              </a:solidFill>
-              <a:latin typeface="Calibri"/>
-              <a:ea typeface="Calibri"/>
-              <a:cs typeface="Calibri"/>
-              <a:sym typeface="Calibri"/>
-            </a:endParaRPr>
-          </a:p>
-        </p:txBody>
-      </p:sp>
-      <p:sp>
-        <p:nvSpPr>
-          <p:cNvPr id="49" name="Google Shape;198;p2">
-            <a:extLst>
-              <a:ext uri="{FF2B5EF4-FFF2-40B4-BE49-F238E27FC236}">
-                <a16:creationId xmlns:a16="http://schemas.microsoft.com/office/drawing/2014/main" id="{C0983C24-5D9B-864B-B8E0-711AE73BDF6C}"/>
-              </a:ext>
-            </a:extLst>
-          </p:cNvPr>
-          <p:cNvSpPr txBox="1"/>
-          <p:nvPr/>
-        </p:nvSpPr>
-        <p:spPr>
-          <a:xfrm>
-            <a:off x="3854762" y="4721433"/>
-            <a:ext cx="1556147" cy="738623"/>
-          </a:xfrm>
-          <a:prstGeom prst="rect">
-            <a:avLst/>
-          </a:prstGeom>
-          <a:noFill/>
-          <a:ln>
-            <a:noFill/>
-          </a:ln>
-        </p:spPr>
-        <p:txBody>
-          <a:bodyPr spcFirstLastPara="1" wrap="square" lIns="91425" tIns="45700" rIns="91425" bIns="45700" anchor="t" anchorCtr="0">
-            <a:spAutoFit/>
-          </a:bodyPr>
-          <a:lstStyle/>
-          <a:p>
-            <a:pPr marL="0" marR="0" lvl="0" indent="0" algn="ctr" rtl="0">
-              <a:spcBef>
-                <a:spcPts val="0"/>
-              </a:spcBef>
-              <a:spcAft>
-                <a:spcPts val="0"/>
-              </a:spcAft>
-              <a:buNone/>
-            </a:pPr>
-            <a:r>
-              <a:rPr lang="en-US" dirty="0">
-                <a:solidFill>
-                  <a:schemeClr val="lt1"/>
-                </a:solidFill>
-                <a:latin typeface="Calibri"/>
-                <a:ea typeface="Calibri"/>
-                <a:cs typeface="Calibri"/>
-                <a:sym typeface="Calibri"/>
-              </a:rPr>
-              <a:t>Diel migrating mesopelagic</a:t>
-            </a:r>
-          </a:p>
-          <a:p>
-            <a:pPr marL="0" marR="0" lvl="0" indent="0" algn="ctr" rtl="0">
-              <a:spcBef>
-                <a:spcPts val="0"/>
-              </a:spcBef>
-              <a:spcAft>
-                <a:spcPts val="0"/>
-              </a:spcAft>
-              <a:buNone/>
-            </a:pPr>
-            <a:r>
-              <a:rPr lang="en-US" dirty="0">
-                <a:solidFill>
-                  <a:schemeClr val="lt1"/>
-                </a:solidFill>
-                <a:latin typeface="Calibri"/>
-                <a:cs typeface="Calibri"/>
-                <a:sym typeface="Calibri"/>
-              </a:rPr>
-              <a:t>(88)</a:t>
-            </a:r>
-            <a:endParaRPr dirty="0"/>
-          </a:p>
-        </p:txBody>
-      </p:sp>
-      <p:sp>
-        <p:nvSpPr>
-          <p:cNvPr id="55" name="Google Shape;190;p2">
-            <a:extLst>
-              <a:ext uri="{FF2B5EF4-FFF2-40B4-BE49-F238E27FC236}">
-                <a16:creationId xmlns:a16="http://schemas.microsoft.com/office/drawing/2014/main" id="{C2518440-A5B0-4144-904D-09F12DABBD5B}"/>
-              </a:ext>
-            </a:extLst>
-          </p:cNvPr>
-          <p:cNvSpPr/>
-          <p:nvPr/>
-        </p:nvSpPr>
-        <p:spPr>
-          <a:xfrm>
-            <a:off x="4915009" y="3009141"/>
-            <a:ext cx="1294012" cy="1009540"/>
-          </a:xfrm>
-          <a:prstGeom prst="ellipse">
-            <a:avLst/>
-          </a:prstGeom>
-          <a:solidFill>
-            <a:srgbClr val="88A251"/>
-          </a:solidFill>
-          <a:ln>
-            <a:noFill/>
-          </a:ln>
-        </p:spPr>
-        <p:txBody>
-          <a:bodyPr spcFirstLastPara="1" wrap="square" lIns="91425" tIns="45700" rIns="91425" bIns="45700" anchor="ctr" anchorCtr="0">
-            <a:noAutofit/>
-          </a:bodyPr>
-          <a:lstStyle/>
-          <a:p>
-            <a:pPr marL="0" marR="0" lvl="0" indent="0" algn="ctr" rtl="0">
-              <a:spcBef>
-                <a:spcPts val="0"/>
-              </a:spcBef>
-              <a:spcAft>
-                <a:spcPts val="0"/>
-              </a:spcAft>
-              <a:buNone/>
-            </a:pPr>
-            <a:endParaRPr>
-              <a:solidFill>
-                <a:schemeClr val="lt1"/>
-              </a:solidFill>
-              <a:latin typeface="Calibri"/>
-              <a:ea typeface="Calibri"/>
-              <a:cs typeface="Calibri"/>
-              <a:sym typeface="Calibri"/>
-            </a:endParaRPr>
-          </a:p>
-        </p:txBody>
-      </p:sp>
-      <p:sp>
-        <p:nvSpPr>
-          <p:cNvPr id="56" name="Google Shape;191;p2">
-            <a:extLst>
-              <a:ext uri="{FF2B5EF4-FFF2-40B4-BE49-F238E27FC236}">
-                <a16:creationId xmlns:a16="http://schemas.microsoft.com/office/drawing/2014/main" id="{1C3AC8E6-3EC1-1D4A-AE33-00868E607A3C}"/>
-              </a:ext>
-            </a:extLst>
-          </p:cNvPr>
-          <p:cNvSpPr txBox="1"/>
-          <p:nvPr/>
-        </p:nvSpPr>
-        <p:spPr>
-          <a:xfrm>
-            <a:off x="4752245" y="3315740"/>
-            <a:ext cx="1611856" cy="738623"/>
-          </a:xfrm>
-          <a:prstGeom prst="rect">
-            <a:avLst/>
-          </a:prstGeom>
-          <a:noFill/>
-          <a:ln>
-            <a:noFill/>
-          </a:ln>
-        </p:spPr>
-        <p:txBody>
-          <a:bodyPr spcFirstLastPara="1" wrap="square" lIns="91425" tIns="45700" rIns="91425" bIns="45700" anchor="t" anchorCtr="0">
-            <a:spAutoFit/>
-          </a:bodyPr>
-          <a:lstStyle/>
-          <a:p>
-            <a:pPr marL="0" marR="0" lvl="0" indent="0" algn="ctr" rtl="0">
-              <a:spcBef>
-                <a:spcPts val="0"/>
-              </a:spcBef>
-              <a:spcAft>
-                <a:spcPts val="0"/>
-              </a:spcAft>
-              <a:buNone/>
-            </a:pPr>
-            <a:r>
-              <a:rPr lang="en-US" dirty="0">
-                <a:solidFill>
-                  <a:schemeClr val="lt1"/>
-                </a:solidFill>
-                <a:latin typeface="Calibri"/>
-                <a:ea typeface="Calibri"/>
-                <a:cs typeface="Calibri"/>
-                <a:sym typeface="Calibri"/>
-              </a:rPr>
-              <a:t>Coast to shelf </a:t>
-            </a:r>
-            <a:r>
-              <a:rPr lang="en-US" dirty="0" err="1">
-                <a:solidFill>
-                  <a:schemeClr val="lt1"/>
-                </a:solidFill>
-                <a:latin typeface="Calibri"/>
-                <a:ea typeface="Calibri"/>
-                <a:cs typeface="Calibri"/>
-                <a:sym typeface="Calibri"/>
-              </a:rPr>
-              <a:t>demersals</a:t>
-            </a:r>
-            <a:endParaRPr lang="en-US" dirty="0">
-              <a:solidFill>
-                <a:schemeClr val="lt1"/>
-              </a:solidFill>
-              <a:latin typeface="Calibri"/>
-              <a:ea typeface="Calibri"/>
-              <a:cs typeface="Calibri"/>
-              <a:sym typeface="Calibri"/>
-            </a:endParaRPr>
-          </a:p>
-          <a:p>
-            <a:pPr marL="0" marR="0" lvl="0" indent="0" algn="ctr" rtl="0">
-              <a:spcBef>
-                <a:spcPts val="0"/>
-              </a:spcBef>
-              <a:spcAft>
-                <a:spcPts val="0"/>
-              </a:spcAft>
-              <a:buNone/>
-            </a:pPr>
-            <a:r>
-              <a:rPr lang="en-US" dirty="0">
-                <a:solidFill>
-                  <a:schemeClr val="lt1"/>
-                </a:solidFill>
-                <a:latin typeface="Calibri"/>
-                <a:ea typeface="Calibri"/>
-                <a:cs typeface="Calibri"/>
-                <a:sym typeface="Calibri"/>
-              </a:rPr>
-              <a:t>(14)</a:t>
-            </a:r>
-            <a:endParaRPr dirty="0">
-              <a:solidFill>
-                <a:schemeClr val="lt1"/>
-              </a:solidFill>
-              <a:latin typeface="Calibri"/>
-              <a:ea typeface="Calibri"/>
-              <a:cs typeface="Calibri"/>
-              <a:sym typeface="Calibri"/>
-            </a:endParaRPr>
-          </a:p>
-        </p:txBody>
-      </p:sp>
-      <p:sp>
-        <p:nvSpPr>
-          <p:cNvPr id="60" name="Google Shape;173;p2">
-            <a:extLst>
-              <a:ext uri="{FF2B5EF4-FFF2-40B4-BE49-F238E27FC236}">
-                <a16:creationId xmlns:a16="http://schemas.microsoft.com/office/drawing/2014/main" id="{4E7BD754-C909-DC43-AE78-59B7A86E15C7}"/>
-              </a:ext>
-            </a:extLst>
-          </p:cNvPr>
-          <p:cNvSpPr/>
-          <p:nvPr/>
-        </p:nvSpPr>
-        <p:spPr>
-          <a:xfrm>
-            <a:off x="4210646" y="1742194"/>
-            <a:ext cx="2101350" cy="945866"/>
-          </a:xfrm>
-          <a:prstGeom prst="ellipse">
-            <a:avLst/>
-          </a:prstGeom>
-          <a:solidFill>
-            <a:srgbClr val="4781A2"/>
-          </a:solidFill>
-          <a:ln>
-            <a:noFill/>
-          </a:ln>
-        </p:spPr>
-        <p:txBody>
-          <a:bodyPr spcFirstLastPara="1" wrap="square" lIns="91425" tIns="45700" rIns="91425" bIns="45700" anchor="ctr" anchorCtr="0">
-            <a:noAutofit/>
-          </a:bodyPr>
-          <a:lstStyle/>
-          <a:p>
-            <a:pPr marL="0" marR="0" lvl="0" indent="0" algn="ctr" rtl="0">
-              <a:spcBef>
-                <a:spcPts val="0"/>
-              </a:spcBef>
-              <a:spcAft>
-                <a:spcPts val="0"/>
-              </a:spcAft>
-              <a:buNone/>
-            </a:pPr>
-            <a:endParaRPr>
-              <a:solidFill>
-                <a:schemeClr val="lt1"/>
-              </a:solidFill>
-              <a:latin typeface="Calibri"/>
-              <a:ea typeface="Calibri"/>
-              <a:cs typeface="Calibri"/>
-              <a:sym typeface="Calibri"/>
-            </a:endParaRPr>
-          </a:p>
-        </p:txBody>
-      </p:sp>
-      <p:sp>
-        <p:nvSpPr>
-          <p:cNvPr id="61" name="Google Shape;174;p2">
-            <a:extLst>
-              <a:ext uri="{FF2B5EF4-FFF2-40B4-BE49-F238E27FC236}">
-                <a16:creationId xmlns:a16="http://schemas.microsoft.com/office/drawing/2014/main" id="{EE8AD8D3-6D0D-9744-B857-77C75986CB34}"/>
-              </a:ext>
-            </a:extLst>
-          </p:cNvPr>
-          <p:cNvSpPr txBox="1"/>
-          <p:nvPr/>
-        </p:nvSpPr>
-        <p:spPr>
-          <a:xfrm>
-            <a:off x="4261424" y="1997355"/>
-            <a:ext cx="1942678" cy="738623"/>
-          </a:xfrm>
-          <a:prstGeom prst="rect">
-            <a:avLst/>
-          </a:prstGeom>
-          <a:noFill/>
-          <a:ln>
-            <a:noFill/>
-          </a:ln>
-        </p:spPr>
-        <p:txBody>
-          <a:bodyPr spcFirstLastPara="1" wrap="square" lIns="91425" tIns="45700" rIns="91425" bIns="45700" anchor="t" anchorCtr="0">
-            <a:spAutoFit/>
-          </a:bodyPr>
-          <a:lstStyle/>
-          <a:p>
-            <a:pPr marL="0" marR="0" lvl="0" indent="0" algn="ctr" rtl="0">
-              <a:spcBef>
-                <a:spcPts val="0"/>
-              </a:spcBef>
-              <a:spcAft>
-                <a:spcPts val="0"/>
-              </a:spcAft>
-              <a:buNone/>
-            </a:pPr>
-            <a:r>
-              <a:rPr lang="en-US" dirty="0">
-                <a:solidFill>
-                  <a:schemeClr val="lt1"/>
-                </a:solidFill>
-                <a:latin typeface="Calibri"/>
-                <a:ea typeface="Calibri"/>
-                <a:cs typeface="Calibri"/>
-                <a:sym typeface="Calibri"/>
-              </a:rPr>
-              <a:t>Seasonal migrant, coast to shelf </a:t>
-            </a:r>
-            <a:r>
-              <a:rPr lang="en-US" dirty="0" err="1">
-                <a:solidFill>
-                  <a:schemeClr val="lt1"/>
-                </a:solidFill>
-                <a:latin typeface="Calibri"/>
-                <a:ea typeface="Calibri"/>
-                <a:cs typeface="Calibri"/>
-                <a:sym typeface="Calibri"/>
-              </a:rPr>
-              <a:t>epipelagics</a:t>
-            </a:r>
-            <a:endParaRPr lang="en-US" dirty="0">
-              <a:solidFill>
-                <a:schemeClr val="lt1"/>
-              </a:solidFill>
-              <a:latin typeface="Calibri"/>
-              <a:ea typeface="Calibri"/>
-              <a:cs typeface="Calibri"/>
-              <a:sym typeface="Calibri"/>
-            </a:endParaRPr>
-          </a:p>
-          <a:p>
-            <a:pPr marL="0" marR="0" lvl="0" indent="0" algn="ctr" rtl="0">
-              <a:spcBef>
-                <a:spcPts val="0"/>
-              </a:spcBef>
-              <a:spcAft>
-                <a:spcPts val="0"/>
-              </a:spcAft>
-              <a:buNone/>
-            </a:pPr>
-            <a:r>
-              <a:rPr lang="en-US" dirty="0">
-                <a:solidFill>
-                  <a:schemeClr val="lt1"/>
-                </a:solidFill>
-                <a:latin typeface="Calibri"/>
-                <a:ea typeface="Calibri"/>
-                <a:cs typeface="Calibri"/>
-                <a:sym typeface="Calibri"/>
-              </a:rPr>
-              <a:t>(53)</a:t>
-            </a:r>
-            <a:endParaRPr dirty="0">
-              <a:solidFill>
-                <a:schemeClr val="lt1"/>
-              </a:solidFill>
-              <a:latin typeface="Calibri"/>
-              <a:ea typeface="Calibri"/>
-              <a:cs typeface="Calibri"/>
-              <a:sym typeface="Calibri"/>
-            </a:endParaRPr>
-          </a:p>
-        </p:txBody>
-      </p:sp>
-      <p:sp>
-        <p:nvSpPr>
-          <p:cNvPr id="63" name="Google Shape;177;p2">
-            <a:extLst>
-              <a:ext uri="{FF2B5EF4-FFF2-40B4-BE49-F238E27FC236}">
-                <a16:creationId xmlns:a16="http://schemas.microsoft.com/office/drawing/2014/main" id="{0DDCDA92-FC0B-C64D-A5DE-F07AAE08C82C}"/>
-              </a:ext>
-            </a:extLst>
-          </p:cNvPr>
-          <p:cNvSpPr/>
-          <p:nvPr/>
-        </p:nvSpPr>
-        <p:spPr>
-          <a:xfrm>
-            <a:off x="2588599" y="665490"/>
-            <a:ext cx="1480201" cy="1065841"/>
-          </a:xfrm>
-          <a:prstGeom prst="ellipse">
-            <a:avLst/>
-          </a:prstGeom>
-          <a:solidFill>
-            <a:srgbClr val="3E597D"/>
-          </a:solidFill>
-          <a:ln>
-            <a:noFill/>
-          </a:ln>
-        </p:spPr>
-        <p:txBody>
-          <a:bodyPr spcFirstLastPara="1" wrap="square" lIns="91425" tIns="45700" rIns="91425" bIns="45700" anchor="ctr" anchorCtr="0">
-            <a:noAutofit/>
-          </a:bodyPr>
-          <a:lstStyle/>
-          <a:p>
-            <a:pPr marL="0" marR="0" lvl="0" indent="0" algn="ctr" rtl="0">
-              <a:spcBef>
-                <a:spcPts val="0"/>
-              </a:spcBef>
-              <a:spcAft>
-                <a:spcPts val="0"/>
-              </a:spcAft>
-              <a:buNone/>
-            </a:pPr>
-            <a:endParaRPr>
-              <a:solidFill>
-                <a:schemeClr val="lt1"/>
-              </a:solidFill>
-              <a:latin typeface="Calibri"/>
-              <a:ea typeface="Calibri"/>
-              <a:cs typeface="Calibri"/>
-              <a:sym typeface="Calibri"/>
-            </a:endParaRPr>
-          </a:p>
-        </p:txBody>
-      </p:sp>
-      <p:sp>
-        <p:nvSpPr>
-          <p:cNvPr id="64" name="Google Shape;178;p2">
-            <a:extLst>
-              <a:ext uri="{FF2B5EF4-FFF2-40B4-BE49-F238E27FC236}">
-                <a16:creationId xmlns:a16="http://schemas.microsoft.com/office/drawing/2014/main" id="{2E787736-1FA6-6841-B0B2-D2F44DC537CE}"/>
-              </a:ext>
-            </a:extLst>
-          </p:cNvPr>
-          <p:cNvSpPr txBox="1"/>
-          <p:nvPr/>
-        </p:nvSpPr>
-        <p:spPr>
-          <a:xfrm>
-            <a:off x="2485937" y="1033356"/>
-            <a:ext cx="1724709" cy="738623"/>
-          </a:xfrm>
-          <a:prstGeom prst="rect">
-            <a:avLst/>
-          </a:prstGeom>
-          <a:noFill/>
-          <a:ln>
-            <a:noFill/>
-          </a:ln>
-        </p:spPr>
-        <p:txBody>
-          <a:bodyPr spcFirstLastPara="1" wrap="square" lIns="91425" tIns="45700" rIns="91425" bIns="45700" anchor="t" anchorCtr="0">
-            <a:spAutoFit/>
-          </a:bodyPr>
-          <a:lstStyle/>
-          <a:p>
-            <a:pPr marL="0" marR="0" lvl="0" indent="0" algn="ctr" rtl="0">
-              <a:spcBef>
-                <a:spcPts val="0"/>
-              </a:spcBef>
-              <a:spcAft>
-                <a:spcPts val="0"/>
-              </a:spcAft>
-              <a:buNone/>
-            </a:pPr>
-            <a:r>
-              <a:rPr lang="en-US" dirty="0">
-                <a:solidFill>
-                  <a:schemeClr val="lt1"/>
-                </a:solidFill>
-                <a:latin typeface="Calibri"/>
-                <a:ea typeface="Calibri"/>
-                <a:cs typeface="Calibri"/>
-                <a:sym typeface="Calibri"/>
-              </a:rPr>
-              <a:t>Non-diel migrant </a:t>
-            </a:r>
-            <a:r>
-              <a:rPr lang="en-US" dirty="0" err="1">
-                <a:solidFill>
-                  <a:schemeClr val="lt1"/>
-                </a:solidFill>
-                <a:latin typeface="Calibri"/>
-                <a:ea typeface="Calibri"/>
-                <a:cs typeface="Calibri"/>
-                <a:sym typeface="Calibri"/>
-              </a:rPr>
-              <a:t>mesopelagics</a:t>
-            </a:r>
-            <a:r>
-              <a:rPr lang="en-US" dirty="0">
-                <a:solidFill>
-                  <a:schemeClr val="lt1"/>
-                </a:solidFill>
-                <a:latin typeface="Calibri"/>
-                <a:ea typeface="Calibri"/>
-                <a:cs typeface="Calibri"/>
-                <a:sym typeface="Calibri"/>
-              </a:rPr>
-              <a:t> </a:t>
-            </a:r>
-          </a:p>
-          <a:p>
-            <a:pPr marL="0" marR="0" lvl="0" indent="0" algn="ctr" rtl="0">
-              <a:spcBef>
-                <a:spcPts val="0"/>
-              </a:spcBef>
-              <a:spcAft>
-                <a:spcPts val="0"/>
-              </a:spcAft>
-              <a:buNone/>
-            </a:pPr>
-            <a:r>
-              <a:rPr lang="en-US" dirty="0">
-                <a:solidFill>
-                  <a:schemeClr val="lt1"/>
-                </a:solidFill>
-                <a:latin typeface="Calibri"/>
-                <a:ea typeface="Calibri"/>
-                <a:cs typeface="Calibri"/>
-                <a:sym typeface="Calibri"/>
-              </a:rPr>
-              <a:t>(12)</a:t>
-            </a:r>
-            <a:endParaRPr dirty="0">
-              <a:solidFill>
-                <a:schemeClr val="lt1"/>
-              </a:solidFill>
-              <a:latin typeface="Calibri"/>
-              <a:ea typeface="Calibri"/>
-              <a:cs typeface="Calibri"/>
-              <a:sym typeface="Calibri"/>
-            </a:endParaRPr>
-          </a:p>
-        </p:txBody>
-      </p:sp>
-      <p:pic>
-        <p:nvPicPr>
-          <p:cNvPr id="67" name="Google Shape;124;p1">
-            <a:extLst>
-              <a:ext uri="{FF2B5EF4-FFF2-40B4-BE49-F238E27FC236}">
-                <a16:creationId xmlns:a16="http://schemas.microsoft.com/office/drawing/2014/main" id="{D8EA03A8-6B00-2C49-A6FA-036C1F515610}"/>
-              </a:ext>
-            </a:extLst>
-          </p:cNvPr>
-          <p:cNvPicPr preferRelativeResize="0"/>
-          <p:nvPr/>
-        </p:nvPicPr>
-        <p:blipFill rotWithShape="1">
-          <a:blip r:embed="rId4">
-            <a:alphaModFix/>
-          </a:blip>
-          <a:srcRect/>
-          <a:stretch/>
-        </p:blipFill>
-        <p:spPr>
-          <a:xfrm>
-            <a:off x="3038016" y="665491"/>
-            <a:ext cx="597559" cy="447592"/>
-          </a:xfrm>
-          <a:prstGeom prst="rect">
-            <a:avLst/>
-          </a:prstGeom>
-          <a:noFill/>
-          <a:ln>
-            <a:noFill/>
-          </a:ln>
-        </p:spPr>
-      </p:pic>
-      <p:pic>
-        <p:nvPicPr>
-          <p:cNvPr id="68" name="Google Shape;130;p1">
-            <a:extLst>
-              <a:ext uri="{FF2B5EF4-FFF2-40B4-BE49-F238E27FC236}">
-                <a16:creationId xmlns:a16="http://schemas.microsoft.com/office/drawing/2014/main" id="{C74128A3-3C35-1644-846C-397F58605B25}"/>
-              </a:ext>
-            </a:extLst>
-          </p:cNvPr>
-          <p:cNvPicPr preferRelativeResize="0"/>
-          <p:nvPr/>
-        </p:nvPicPr>
-        <p:blipFill rotWithShape="1">
-          <a:blip r:embed="rId5">
-            <a:alphaModFix/>
-          </a:blip>
-          <a:srcRect t="12447" b="48885"/>
-          <a:stretch/>
-        </p:blipFill>
-        <p:spPr>
-          <a:xfrm>
-            <a:off x="4576540" y="1732445"/>
-            <a:ext cx="1336654" cy="365930"/>
-          </a:xfrm>
-          <a:prstGeom prst="rect">
-            <a:avLst/>
-          </a:prstGeom>
-          <a:noFill/>
-          <a:ln>
-            <a:noFill/>
-          </a:ln>
-        </p:spPr>
-      </p:pic>
-      <p:pic>
-        <p:nvPicPr>
-          <p:cNvPr id="69" name="Google Shape;197;p2">
-            <a:extLst>
-              <a:ext uri="{FF2B5EF4-FFF2-40B4-BE49-F238E27FC236}">
-                <a16:creationId xmlns:a16="http://schemas.microsoft.com/office/drawing/2014/main" id="{B8AB4EAA-F908-6749-87D5-E4ECC164B3A0}"/>
-              </a:ext>
-            </a:extLst>
-          </p:cNvPr>
-          <p:cNvPicPr preferRelativeResize="0"/>
-          <p:nvPr/>
-        </p:nvPicPr>
-        <p:blipFill rotWithShape="1">
-          <a:blip r:embed="rId6">
-            <a:alphaModFix/>
-          </a:blip>
-          <a:srcRect/>
-          <a:stretch/>
-        </p:blipFill>
-        <p:spPr>
-          <a:xfrm>
-            <a:off x="5103470" y="3057477"/>
-            <a:ext cx="914775" cy="371523"/>
-          </a:xfrm>
-          <a:prstGeom prst="rect">
-            <a:avLst/>
-          </a:prstGeom>
-          <a:noFill/>
-          <a:ln>
-            <a:noFill/>
-          </a:ln>
-        </p:spPr>
-      </p:pic>
-      <p:pic>
-        <p:nvPicPr>
-          <p:cNvPr id="70" name="Google Shape;194;p2">
-            <a:extLst>
-              <a:ext uri="{FF2B5EF4-FFF2-40B4-BE49-F238E27FC236}">
-                <a16:creationId xmlns:a16="http://schemas.microsoft.com/office/drawing/2014/main" id="{328B4732-9B31-6046-9315-3D41CDF2EC2C}"/>
-              </a:ext>
-            </a:extLst>
-          </p:cNvPr>
-          <p:cNvPicPr preferRelativeResize="0"/>
-          <p:nvPr/>
-        </p:nvPicPr>
-        <p:blipFill rotWithShape="1">
-          <a:blip r:embed="rId7">
-            <a:alphaModFix/>
-          </a:blip>
-          <a:srcRect/>
-          <a:stretch/>
-        </p:blipFill>
-        <p:spPr>
-          <a:xfrm rot="21104814">
-            <a:off x="4149888" y="4394543"/>
-            <a:ext cx="978010" cy="473271"/>
-          </a:xfrm>
-          <a:prstGeom prst="rect">
-            <a:avLst/>
-          </a:prstGeom>
-          <a:noFill/>
-          <a:ln>
-            <a:noFill/>
-          </a:ln>
-        </p:spPr>
-      </p:pic>
-      <p:pic>
-        <p:nvPicPr>
-          <p:cNvPr id="72" name="Google Shape;182;p2">
-            <a:extLst>
-              <a:ext uri="{FF2B5EF4-FFF2-40B4-BE49-F238E27FC236}">
-                <a16:creationId xmlns:a16="http://schemas.microsoft.com/office/drawing/2014/main" id="{C3553E02-2938-C245-8F24-5BBED158FCA2}"/>
-              </a:ext>
-            </a:extLst>
-          </p:cNvPr>
-          <p:cNvPicPr preferRelativeResize="0"/>
-          <p:nvPr/>
-        </p:nvPicPr>
-        <p:blipFill rotWithShape="1">
-          <a:blip r:embed="rId8">
-            <a:alphaModFix/>
-            <a:duotone>
-              <a:schemeClr val="accent3">
-                <a:shade val="45000"/>
-                <a:satMod val="135000"/>
-              </a:schemeClr>
-              <a:prstClr val="white"/>
-            </a:duotone>
-          </a:blip>
-          <a:srcRect/>
-          <a:stretch/>
-        </p:blipFill>
-        <p:spPr>
-          <a:xfrm>
-            <a:off x="718187" y="3869614"/>
-            <a:ext cx="881752" cy="625653"/>
-          </a:xfrm>
-          <a:prstGeom prst="rect">
-            <a:avLst/>
-          </a:prstGeom>
-          <a:noFill/>
-          <a:ln>
-            <a:noFill/>
-          </a:ln>
-        </p:spPr>
-      </p:pic>
-      <p:pic>
-        <p:nvPicPr>
-          <p:cNvPr id="73" name="Google Shape;200;p2">
-            <a:extLst>
-              <a:ext uri="{FF2B5EF4-FFF2-40B4-BE49-F238E27FC236}">
-                <a16:creationId xmlns:a16="http://schemas.microsoft.com/office/drawing/2014/main" id="{AF487E2F-41D9-D343-B90A-B4FB29DB106E}"/>
-              </a:ext>
-            </a:extLst>
-          </p:cNvPr>
-          <p:cNvPicPr preferRelativeResize="0"/>
-          <p:nvPr/>
-        </p:nvPicPr>
-        <p:blipFill rotWithShape="1">
-          <a:blip r:embed="rId9">
-            <a:alphaModFix/>
-          </a:blip>
-          <a:srcRect/>
-          <a:stretch/>
-        </p:blipFill>
-        <p:spPr>
-          <a:xfrm>
-            <a:off x="946342" y="1392918"/>
-            <a:ext cx="763617" cy="461623"/>
-          </a:xfrm>
-          <a:prstGeom prst="rect">
-            <a:avLst/>
-          </a:prstGeom>
-          <a:noFill/>
-          <a:ln>
-            <a:noFill/>
-          </a:ln>
-        </p:spPr>
-      </p:pic>
-      <p:pic>
-        <p:nvPicPr>
-          <p:cNvPr id="6" name="Picture 5" descr="Chart, radar chart&#10;&#10;Description automatically generated">
-            <a:extLst>
-              <a:ext uri="{FF2B5EF4-FFF2-40B4-BE49-F238E27FC236}">
-                <a16:creationId xmlns:a16="http://schemas.microsoft.com/office/drawing/2014/main" id="{312DC0A5-FCFA-EDA3-DBEB-FCE6843D37CD}"/>
-              </a:ext>
-            </a:extLst>
-          </p:cNvPr>
-          <p:cNvPicPr>
-            <a:picLocks noChangeAspect="1"/>
-          </p:cNvPicPr>
-          <p:nvPr/>
-        </p:nvPicPr>
-        <p:blipFill>
-          <a:blip r:embed="rId10"/>
-          <a:stretch>
-            <a:fillRect/>
-          </a:stretch>
-        </p:blipFill>
-        <p:spPr>
-          <a:xfrm>
-            <a:off x="6325042" y="-113260"/>
-            <a:ext cx="6858000" cy="6858000"/>
-          </a:xfrm>
-          <a:prstGeom prst="rect">
-            <a:avLst/>
-          </a:prstGeom>
-        </p:spPr>
-      </p:pic>
-      <p:sp>
-        <p:nvSpPr>
-          <p:cNvPr id="46" name="Google Shape;257;gd33cc45fa0_1_0">
-            <a:extLst>
-              <a:ext uri="{FF2B5EF4-FFF2-40B4-BE49-F238E27FC236}">
-                <a16:creationId xmlns:a16="http://schemas.microsoft.com/office/drawing/2014/main" id="{101A7282-FCD2-F591-6F0D-CB111EF8C5E7}"/>
-              </a:ext>
-            </a:extLst>
-          </p:cNvPr>
-          <p:cNvSpPr txBox="1"/>
-          <p:nvPr/>
-        </p:nvSpPr>
-        <p:spPr>
-          <a:xfrm>
-            <a:off x="6575061" y="1178043"/>
-            <a:ext cx="717855" cy="369291"/>
-          </a:xfrm>
-          <a:prstGeom prst="rect">
-            <a:avLst/>
-          </a:prstGeom>
-          <a:noFill/>
-          <a:ln>
-            <a:noFill/>
-          </a:ln>
-        </p:spPr>
-        <p:txBody>
-          <a:bodyPr spcFirstLastPara="1" wrap="square" lIns="91425" tIns="45700" rIns="91425" bIns="45700" anchor="t" anchorCtr="0">
-            <a:spAutoFit/>
-          </a:bodyPr>
-          <a:lstStyle/>
-          <a:p>
-            <a:pPr marL="0" marR="0" lvl="0" indent="0" algn="ctr" rtl="0">
-              <a:spcBef>
-                <a:spcPts val="0"/>
-              </a:spcBef>
-              <a:spcAft>
-                <a:spcPts val="0"/>
-              </a:spcAft>
-              <a:buNone/>
-            </a:pPr>
-            <a:r>
-              <a:rPr lang="en-US" sz="1800" dirty="0">
-                <a:solidFill>
-                  <a:schemeClr val="tx1"/>
-                </a:solidFill>
-                <a:latin typeface="Calibri"/>
-                <a:ea typeface="Calibri"/>
-                <a:cs typeface="Calibri"/>
-                <a:sym typeface="Calibri"/>
-              </a:rPr>
-              <a:t>b)</a:t>
-            </a:r>
-            <a:endParaRPr sz="1800" dirty="0">
-              <a:solidFill>
-                <a:schemeClr val="tx1"/>
-              </a:solidFill>
-              <a:latin typeface="Calibri"/>
-              <a:ea typeface="Calibri"/>
-              <a:cs typeface="Calibri"/>
-              <a:sym typeface="Calibri"/>
-            </a:endParaRPr>
-          </a:p>
-        </p:txBody>
-      </p:sp>
-    </p:spTree>
-    <p:extLst>
-      <p:ext uri="{BB962C8B-B14F-4D97-AF65-F5344CB8AC3E}">
-        <p14:creationId xmlns:p14="http://schemas.microsoft.com/office/powerpoint/2010/main" val="4063802132"/>
+        <p14:creationId xmlns:p14="http://schemas.microsoft.com/office/powerpoint/2010/main" val="1064279355"/>
       </p:ext>
     </p:extLst>
   </p:cSld>

</xml_diff>

<commit_message>
+ Cluster code & figure 3 updated
</commit_message>
<xml_diff>
--- a/outputs_figures/ms_figures/fig3_clusters/dendrogram_radial.pptx
+++ b/outputs_figures/ms_figures/fig3_clusters/dendrogram_radial.pptx
@@ -811,7 +811,36 @@
                   <a:schemeClr val="dk1"/>
                 </a:solidFill>
               </a:rPr>
-              <a:t>USE!!! PROBABLE TRAITS, k = 8, DIVISIVE with NMDS PLOT</a:t>
+              <a:t>Most taxa were seasonal unless specified here as “resident” (#3).</a:t>
+            </a:r>
+          </a:p>
+          <a:p>
+            <a:pPr marL="0" marR="0" lvl="0" indent="0" algn="l" defTabSz="914400" rtl="0" eaLnBrk="1" fontAlgn="auto" latinLnBrk="0" hangingPunct="1">
+              <a:lnSpc>
+                <a:spcPct val="100000"/>
+              </a:lnSpc>
+              <a:spcBef>
+                <a:spcPts val="0"/>
+              </a:spcBef>
+              <a:spcAft>
+                <a:spcPts val="0"/>
+              </a:spcAft>
+              <a:buClr>
+                <a:srgbClr val="000000"/>
+              </a:buClr>
+              <a:buSzPts val="1100"/>
+              <a:buFont typeface="Arial"/>
+              <a:buNone/>
+              <a:tabLst/>
+              <a:defRPr/>
+            </a:pPr>
+            <a:r>
+              <a:rPr lang="en-US" dirty="0">
+                <a:solidFill>
+                  <a:schemeClr val="dk1"/>
+                </a:solidFill>
+              </a:rPr>
+              <a:t>Most were schooling and juvenile taxa, and these traits were not included in analyses.</a:t>
             </a:r>
           </a:p>
           <a:p>
@@ -10738,10 +10767,10 @@
       </p:grpSpPr>
       <p:pic>
         <p:nvPicPr>
-          <p:cNvPr id="5" name="Picture 4">
+          <p:cNvPr id="6" name="Picture 5" descr="Chart, scatter chart&#10;&#10;Description automatically generated">
             <a:extLst>
               <a:ext uri="{FF2B5EF4-FFF2-40B4-BE49-F238E27FC236}">
-                <a16:creationId xmlns:a16="http://schemas.microsoft.com/office/drawing/2014/main" id="{905AFFCA-9F5A-2A43-AA5A-0DA70F6C91BA}"/>
+                <a16:creationId xmlns:a16="http://schemas.microsoft.com/office/drawing/2014/main" id="{406FA895-3DD9-50C5-D0D0-A741E766AED9}"/>
               </a:ext>
             </a:extLst>
           </p:cNvPr>
@@ -10752,6 +10781,36 @@
         </p:nvPicPr>
         <p:blipFill>
           <a:blip r:embed="rId3"/>
+          <a:stretch>
+            <a:fillRect/>
+          </a:stretch>
+        </p:blipFill>
+        <p:spPr>
+          <a:xfrm>
+            <a:off x="6404516" y="357967"/>
+            <a:ext cx="5747866" cy="5747866"/>
+          </a:xfrm>
+          <a:prstGeom prst="rect">
+            <a:avLst/>
+          </a:prstGeom>
+        </p:spPr>
+      </p:pic>
+      <p:pic>
+        <p:nvPicPr>
+          <p:cNvPr id="58" name="Picture 57">
+            <a:extLst>
+              <a:ext uri="{FF2B5EF4-FFF2-40B4-BE49-F238E27FC236}">
+                <a16:creationId xmlns:a16="http://schemas.microsoft.com/office/drawing/2014/main" id="{1EF79AEB-8DEA-40CF-4AD5-6EF7A64950A1}"/>
+              </a:ext>
+            </a:extLst>
+          </p:cNvPr>
+          <p:cNvPicPr>
+            <a:picLocks noChangeAspect="1"/>
+          </p:cNvPicPr>
+          <p:nvPr/>
+        </p:nvPicPr>
+        <p:blipFill>
+          <a:blip r:embed="rId4"/>
           <a:srcRect t="714" b="714"/>
           <a:stretch/>
         </p:blipFill>
@@ -10765,41 +10824,12 @@
           </a:prstGeom>
         </p:spPr>
       </p:pic>
-      <p:pic>
-        <p:nvPicPr>
-          <p:cNvPr id="7" name="Picture 6" descr="Chart&#10;&#10;Description automatically generated">
+      <p:sp>
+        <p:nvSpPr>
+          <p:cNvPr id="59" name="Google Shape;257;gd33cc45fa0_1_0">
             <a:extLst>
               <a:ext uri="{FF2B5EF4-FFF2-40B4-BE49-F238E27FC236}">
-                <a16:creationId xmlns:a16="http://schemas.microsoft.com/office/drawing/2014/main" id="{8AB3D435-ADD5-364F-A74D-C4AB6326B275}"/>
-              </a:ext>
-            </a:extLst>
-          </p:cNvPr>
-          <p:cNvPicPr>
-            <a:picLocks noChangeAspect="1"/>
-          </p:cNvPicPr>
-          <p:nvPr/>
-        </p:nvPicPr>
-        <p:blipFill rotWithShape="1">
-          <a:blip r:embed="rId4"/>
-          <a:srcRect t="12424" r="13247" b="12961"/>
-          <a:stretch/>
-        </p:blipFill>
-        <p:spPr>
-          <a:xfrm>
-            <a:off x="6671360" y="1002324"/>
-            <a:ext cx="5374101" cy="4622256"/>
-          </a:xfrm>
-          <a:prstGeom prst="rect">
-            <a:avLst/>
-          </a:prstGeom>
-        </p:spPr>
-      </p:pic>
-      <p:sp>
-        <p:nvSpPr>
-          <p:cNvPr id="12" name="Google Shape;257;gd33cc45fa0_1_0">
-            <a:extLst>
-              <a:ext uri="{FF2B5EF4-FFF2-40B4-BE49-F238E27FC236}">
-                <a16:creationId xmlns:a16="http://schemas.microsoft.com/office/drawing/2014/main" id="{A2B5E293-3448-F54C-AECB-63767A9721CC}"/>
+                <a16:creationId xmlns:a16="http://schemas.microsoft.com/office/drawing/2014/main" id="{121BE0DC-D352-6B08-60AB-BB0DD0B771FB}"/>
               </a:ext>
             </a:extLst>
           </p:cNvPr>
@@ -10860,10 +10890,10 @@
       </p:sp>
       <p:sp>
         <p:nvSpPr>
-          <p:cNvPr id="13" name="Google Shape;257;gd33cc45fa0_1_0">
+          <p:cNvPr id="62" name="Google Shape;257;gd33cc45fa0_1_0">
             <a:extLst>
               <a:ext uri="{FF2B5EF4-FFF2-40B4-BE49-F238E27FC236}">
-                <a16:creationId xmlns:a16="http://schemas.microsoft.com/office/drawing/2014/main" id="{69362292-D34A-5244-AC91-02A3868E7C08}"/>
+                <a16:creationId xmlns:a16="http://schemas.microsoft.com/office/drawing/2014/main" id="{96847183-8397-889D-889E-AA6618D7A3B2}"/>
               </a:ext>
             </a:extLst>
           </p:cNvPr>
@@ -10872,7 +10902,7 @@
         </p:nvSpPr>
         <p:spPr>
           <a:xfrm>
-            <a:off x="6863159" y="1178043"/>
+            <a:off x="6399871" y="357966"/>
             <a:ext cx="717855" cy="369291"/>
           </a:xfrm>
           <a:prstGeom prst="rect">
@@ -10924,10 +10954,10 @@
       </p:sp>
       <p:grpSp>
         <p:nvGrpSpPr>
-          <p:cNvPr id="14" name="Google Shape;230;gd33cc45fa0_1_0">
+          <p:cNvPr id="65" name="Google Shape;230;gd33cc45fa0_1_0">
             <a:extLst>
               <a:ext uri="{FF2B5EF4-FFF2-40B4-BE49-F238E27FC236}">
-                <a16:creationId xmlns:a16="http://schemas.microsoft.com/office/drawing/2014/main" id="{0038C127-6E9E-994D-8E9A-E5B4E896E442}"/>
+                <a16:creationId xmlns:a16="http://schemas.microsoft.com/office/drawing/2014/main" id="{E61313CA-3812-0DC0-42B7-F8016B187642}"/>
               </a:ext>
             </a:extLst>
           </p:cNvPr>
@@ -10944,10 +10974,10 @@
         </p:grpSpPr>
         <p:sp>
           <p:nvSpPr>
-            <p:cNvPr id="15" name="Google Shape;231;gd33cc45fa0_1_0">
+            <p:cNvPr id="66" name="Google Shape;231;gd33cc45fa0_1_0">
               <a:extLst>
                 <a:ext uri="{FF2B5EF4-FFF2-40B4-BE49-F238E27FC236}">
-                  <a16:creationId xmlns:a16="http://schemas.microsoft.com/office/drawing/2014/main" id="{9088132D-D7E6-5F42-B32C-79B94E7D3B46}"/>
+                  <a16:creationId xmlns:a16="http://schemas.microsoft.com/office/drawing/2014/main" id="{3D6B5B2D-6A06-695C-5F10-5EBD9A542901}"/>
                 </a:ext>
               </a:extLst>
             </p:cNvPr>
@@ -11004,10 +11034,10 @@
         </p:sp>
         <p:sp>
           <p:nvSpPr>
-            <p:cNvPr id="17" name="Google Shape;232;gd33cc45fa0_1_0">
+            <p:cNvPr id="71" name="Google Shape;232;gd33cc45fa0_1_0">
               <a:extLst>
                 <a:ext uri="{FF2B5EF4-FFF2-40B4-BE49-F238E27FC236}">
-                  <a16:creationId xmlns:a16="http://schemas.microsoft.com/office/drawing/2014/main" id="{444E4E5C-601B-ED4B-848D-B9CACEFAF4CF}"/>
+                  <a16:creationId xmlns:a16="http://schemas.microsoft.com/office/drawing/2014/main" id="{B968FA31-81E6-6814-1790-2A93E51BBFAB}"/>
                 </a:ext>
               </a:extLst>
             </p:cNvPr>
@@ -11062,10 +11092,10 @@
       </p:grpSp>
       <p:grpSp>
         <p:nvGrpSpPr>
-          <p:cNvPr id="18" name="Google Shape;227;gd33cc45fa0_1_0">
+          <p:cNvPr id="74" name="Google Shape;227;gd33cc45fa0_1_0">
             <a:extLst>
               <a:ext uri="{FF2B5EF4-FFF2-40B4-BE49-F238E27FC236}">
-                <a16:creationId xmlns:a16="http://schemas.microsoft.com/office/drawing/2014/main" id="{786DF2E1-8C76-3347-BE3E-3859ECC9780B}"/>
+                <a16:creationId xmlns:a16="http://schemas.microsoft.com/office/drawing/2014/main" id="{9DDE5F83-072C-B47A-ED6F-07611D85302C}"/>
               </a:ext>
             </a:extLst>
           </p:cNvPr>
@@ -11082,10 +11112,10 @@
         </p:grpSpPr>
         <p:sp>
           <p:nvSpPr>
-            <p:cNvPr id="19" name="Google Shape;228;gd33cc45fa0_1_0">
+            <p:cNvPr id="75" name="Google Shape;228;gd33cc45fa0_1_0">
               <a:extLst>
                 <a:ext uri="{FF2B5EF4-FFF2-40B4-BE49-F238E27FC236}">
-                  <a16:creationId xmlns:a16="http://schemas.microsoft.com/office/drawing/2014/main" id="{1E5919ED-7451-2D4D-919C-E3376FD1FFA2}"/>
+                  <a16:creationId xmlns:a16="http://schemas.microsoft.com/office/drawing/2014/main" id="{3BDF60BB-E034-44A1-BB4A-E07DC42BA440}"/>
                 </a:ext>
               </a:extLst>
             </p:cNvPr>
@@ -11142,10 +11172,10 @@
         </p:sp>
         <p:sp>
           <p:nvSpPr>
-            <p:cNvPr id="20" name="Google Shape;229;gd33cc45fa0_1_0">
+            <p:cNvPr id="76" name="Google Shape;229;gd33cc45fa0_1_0">
               <a:extLst>
                 <a:ext uri="{FF2B5EF4-FFF2-40B4-BE49-F238E27FC236}">
-                  <a16:creationId xmlns:a16="http://schemas.microsoft.com/office/drawing/2014/main" id="{1BB6457D-7B3C-BD48-A099-80FC048FCE30}"/>
+                  <a16:creationId xmlns:a16="http://schemas.microsoft.com/office/drawing/2014/main" id="{D8D5DD74-B18E-E3B6-7B97-DCC73A268EF3}"/>
                 </a:ext>
               </a:extLst>
             </p:cNvPr>
@@ -11200,10 +11230,10 @@
       </p:grpSp>
       <p:grpSp>
         <p:nvGrpSpPr>
-          <p:cNvPr id="21" name="Google Shape;221;gd33cc45fa0_1_0">
+          <p:cNvPr id="77" name="Google Shape;221;gd33cc45fa0_1_0">
             <a:extLst>
               <a:ext uri="{FF2B5EF4-FFF2-40B4-BE49-F238E27FC236}">
-                <a16:creationId xmlns:a16="http://schemas.microsoft.com/office/drawing/2014/main" id="{79F1B55F-F2B0-5448-9F8D-62D6A46FA7DF}"/>
+                <a16:creationId xmlns:a16="http://schemas.microsoft.com/office/drawing/2014/main" id="{D4E42C18-FE34-F005-09B2-83946EA3D6CE}"/>
               </a:ext>
             </a:extLst>
           </p:cNvPr>
@@ -11220,10 +11250,10 @@
         </p:grpSpPr>
         <p:sp>
           <p:nvSpPr>
-            <p:cNvPr id="22" name="Google Shape;222;gd33cc45fa0_1_0">
+            <p:cNvPr id="78" name="Google Shape;222;gd33cc45fa0_1_0">
               <a:extLst>
                 <a:ext uri="{FF2B5EF4-FFF2-40B4-BE49-F238E27FC236}">
-                  <a16:creationId xmlns:a16="http://schemas.microsoft.com/office/drawing/2014/main" id="{13D9339E-2ABC-1E45-A65E-F03F0A9EB673}"/>
+                  <a16:creationId xmlns:a16="http://schemas.microsoft.com/office/drawing/2014/main" id="{696BCAA7-A48E-90DA-DF88-A3A5F688D555}"/>
                 </a:ext>
               </a:extLst>
             </p:cNvPr>
@@ -11280,10 +11310,10 @@
         </p:sp>
         <p:sp>
           <p:nvSpPr>
-            <p:cNvPr id="23" name="Google Shape;223;gd33cc45fa0_1_0">
+            <p:cNvPr id="79" name="Google Shape;223;gd33cc45fa0_1_0">
               <a:extLst>
                 <a:ext uri="{FF2B5EF4-FFF2-40B4-BE49-F238E27FC236}">
-                  <a16:creationId xmlns:a16="http://schemas.microsoft.com/office/drawing/2014/main" id="{EA4E0248-751B-3E4E-A1EC-3B2D780A3E4E}"/>
+                  <a16:creationId xmlns:a16="http://schemas.microsoft.com/office/drawing/2014/main" id="{9670A518-22A5-671A-C2E3-67360A151AB5}"/>
                 </a:ext>
               </a:extLst>
             </p:cNvPr>
@@ -11338,10 +11368,10 @@
       </p:grpSp>
       <p:grpSp>
         <p:nvGrpSpPr>
-          <p:cNvPr id="24" name="Google Shape;218;gd33cc45fa0_1_0">
+          <p:cNvPr id="80" name="Google Shape;218;gd33cc45fa0_1_0">
             <a:extLst>
               <a:ext uri="{FF2B5EF4-FFF2-40B4-BE49-F238E27FC236}">
-                <a16:creationId xmlns:a16="http://schemas.microsoft.com/office/drawing/2014/main" id="{F90BB495-5408-1740-BAED-C573012F8B20}"/>
+                <a16:creationId xmlns:a16="http://schemas.microsoft.com/office/drawing/2014/main" id="{2710E890-1A80-E4E2-561D-520AA7815E1A}"/>
               </a:ext>
             </a:extLst>
           </p:cNvPr>
@@ -11358,10 +11388,10 @@
         </p:grpSpPr>
         <p:sp>
           <p:nvSpPr>
-            <p:cNvPr id="25" name="Google Shape;219;gd33cc45fa0_1_0">
+            <p:cNvPr id="81" name="Google Shape;219;gd33cc45fa0_1_0">
               <a:extLst>
                 <a:ext uri="{FF2B5EF4-FFF2-40B4-BE49-F238E27FC236}">
-                  <a16:creationId xmlns:a16="http://schemas.microsoft.com/office/drawing/2014/main" id="{E1970BC3-4F95-A848-AE66-E40E9D013210}"/>
+                  <a16:creationId xmlns:a16="http://schemas.microsoft.com/office/drawing/2014/main" id="{BC1C4952-7315-9F3F-75F2-74B58ECE5B54}"/>
                 </a:ext>
               </a:extLst>
             </p:cNvPr>
@@ -11418,10 +11448,10 @@
         </p:sp>
         <p:sp>
           <p:nvSpPr>
-            <p:cNvPr id="26" name="Google Shape;220;gd33cc45fa0_1_0">
+            <p:cNvPr id="82" name="Google Shape;220;gd33cc45fa0_1_0">
               <a:extLst>
                 <a:ext uri="{FF2B5EF4-FFF2-40B4-BE49-F238E27FC236}">
-                  <a16:creationId xmlns:a16="http://schemas.microsoft.com/office/drawing/2014/main" id="{08419916-3FFA-154A-83E9-FCBDE963F254}"/>
+                  <a16:creationId xmlns:a16="http://schemas.microsoft.com/office/drawing/2014/main" id="{A1C29272-C283-1D66-8483-2DD0C158B5D9}"/>
                 </a:ext>
               </a:extLst>
             </p:cNvPr>
@@ -11476,10 +11506,10 @@
       </p:grpSp>
       <p:grpSp>
         <p:nvGrpSpPr>
-          <p:cNvPr id="27" name="Google Shape;215;gd33cc45fa0_1_0">
+          <p:cNvPr id="83" name="Google Shape;215;gd33cc45fa0_1_0">
             <a:extLst>
               <a:ext uri="{FF2B5EF4-FFF2-40B4-BE49-F238E27FC236}">
-                <a16:creationId xmlns:a16="http://schemas.microsoft.com/office/drawing/2014/main" id="{AC1625EF-58A6-BB4C-8B79-C6C0EC63FB53}"/>
+                <a16:creationId xmlns:a16="http://schemas.microsoft.com/office/drawing/2014/main" id="{F82EBB86-3F62-2A95-2A7A-18289C391B33}"/>
               </a:ext>
             </a:extLst>
           </p:cNvPr>
@@ -11496,10 +11526,10 @@
         </p:grpSpPr>
         <p:sp>
           <p:nvSpPr>
-            <p:cNvPr id="28" name="Google Shape;216;gd33cc45fa0_1_0">
+            <p:cNvPr id="84" name="Google Shape;216;gd33cc45fa0_1_0">
               <a:extLst>
                 <a:ext uri="{FF2B5EF4-FFF2-40B4-BE49-F238E27FC236}">
-                  <a16:creationId xmlns:a16="http://schemas.microsoft.com/office/drawing/2014/main" id="{ED8B2608-CF43-9A42-95CA-AA3E31B183F7}"/>
+                  <a16:creationId xmlns:a16="http://schemas.microsoft.com/office/drawing/2014/main" id="{BB253100-1B0F-23EE-5BE7-B895C22C28BD}"/>
                 </a:ext>
               </a:extLst>
             </p:cNvPr>
@@ -11556,10 +11586,10 @@
         </p:sp>
         <p:sp>
           <p:nvSpPr>
-            <p:cNvPr id="29" name="Google Shape;217;gd33cc45fa0_1_0">
+            <p:cNvPr id="85" name="Google Shape;217;gd33cc45fa0_1_0">
               <a:extLst>
                 <a:ext uri="{FF2B5EF4-FFF2-40B4-BE49-F238E27FC236}">
-                  <a16:creationId xmlns:a16="http://schemas.microsoft.com/office/drawing/2014/main" id="{9227393D-573C-2F41-A688-BFB44BDC406D}"/>
+                  <a16:creationId xmlns:a16="http://schemas.microsoft.com/office/drawing/2014/main" id="{1185CC7D-A271-F7A7-099F-37FF4412BBBD}"/>
                 </a:ext>
               </a:extLst>
             </p:cNvPr>
@@ -11614,10 +11644,10 @@
       </p:grpSp>
       <p:grpSp>
         <p:nvGrpSpPr>
-          <p:cNvPr id="30" name="Google Shape;212;gd33cc45fa0_1_0">
+          <p:cNvPr id="86" name="Google Shape;212;gd33cc45fa0_1_0">
             <a:extLst>
               <a:ext uri="{FF2B5EF4-FFF2-40B4-BE49-F238E27FC236}">
-                <a16:creationId xmlns:a16="http://schemas.microsoft.com/office/drawing/2014/main" id="{287846D2-0AAF-EB4C-AD7A-12366D4B0E75}"/>
+                <a16:creationId xmlns:a16="http://schemas.microsoft.com/office/drawing/2014/main" id="{5A3C18D9-4462-E7DB-4F93-D6509480BF4B}"/>
               </a:ext>
             </a:extLst>
           </p:cNvPr>
@@ -11634,10 +11664,10 @@
         </p:grpSpPr>
         <p:sp>
           <p:nvSpPr>
-            <p:cNvPr id="31" name="Google Shape;213;gd33cc45fa0_1_0">
+            <p:cNvPr id="87" name="Google Shape;213;gd33cc45fa0_1_0">
               <a:extLst>
                 <a:ext uri="{FF2B5EF4-FFF2-40B4-BE49-F238E27FC236}">
-                  <a16:creationId xmlns:a16="http://schemas.microsoft.com/office/drawing/2014/main" id="{A8E8E3E9-51DD-364A-B781-497108F49BF5}"/>
+                  <a16:creationId xmlns:a16="http://schemas.microsoft.com/office/drawing/2014/main" id="{C067D167-1A68-391D-F30F-9C6B1FB13D00}"/>
                 </a:ext>
               </a:extLst>
             </p:cNvPr>
@@ -11694,10 +11724,10 @@
         </p:sp>
         <p:sp>
           <p:nvSpPr>
-            <p:cNvPr id="32" name="Google Shape;214;gd33cc45fa0_1_0">
+            <p:cNvPr id="88" name="Google Shape;214;gd33cc45fa0_1_0">
               <a:extLst>
                 <a:ext uri="{FF2B5EF4-FFF2-40B4-BE49-F238E27FC236}">
-                  <a16:creationId xmlns:a16="http://schemas.microsoft.com/office/drawing/2014/main" id="{86C24C1C-4A4D-BE44-BB02-BD81C0E20DAF}"/>
+                  <a16:creationId xmlns:a16="http://schemas.microsoft.com/office/drawing/2014/main" id="{698DC680-0F85-520C-14D2-30864783F843}"/>
                 </a:ext>
               </a:extLst>
             </p:cNvPr>
@@ -11753,10 +11783,10 @@
       </p:grpSp>
       <p:sp>
         <p:nvSpPr>
-          <p:cNvPr id="34" name="Google Shape;167;p2">
+          <p:cNvPr id="89" name="Google Shape;167;p2">
             <a:extLst>
               <a:ext uri="{FF2B5EF4-FFF2-40B4-BE49-F238E27FC236}">
-                <a16:creationId xmlns:a16="http://schemas.microsoft.com/office/drawing/2014/main" id="{E466C6F1-0458-E94A-9666-7319E488DA3E}"/>
+                <a16:creationId xmlns:a16="http://schemas.microsoft.com/office/drawing/2014/main" id="{62428E00-D39C-8527-7BEC-68FF6B3AEC0D}"/>
               </a:ext>
             </a:extLst>
           </p:cNvPr>
@@ -11809,10 +11839,10 @@
       </p:sp>
       <p:sp>
         <p:nvSpPr>
-          <p:cNvPr id="35" name="Google Shape;168;p2">
+          <p:cNvPr id="90" name="Google Shape;168;p2">
             <a:extLst>
               <a:ext uri="{FF2B5EF4-FFF2-40B4-BE49-F238E27FC236}">
-                <a16:creationId xmlns:a16="http://schemas.microsoft.com/office/drawing/2014/main" id="{FA88B3F4-82C7-3D4B-9BE1-226C5AE9965F}"/>
+                <a16:creationId xmlns:a16="http://schemas.microsoft.com/office/drawing/2014/main" id="{20411D07-7687-0222-07E8-5CDCBC6C9155}"/>
               </a:ext>
             </a:extLst>
           </p:cNvPr>
@@ -11849,7 +11879,7 @@
                 <a:cs typeface="Calibri"/>
                 <a:sym typeface="Calibri"/>
               </a:rPr>
-              <a:t>Coast to shelf </a:t>
+              <a:t>Coast &amp; shelf </a:t>
             </a:r>
             <a:r>
               <a:rPr lang="en-US" dirty="0" err="1">
@@ -11893,10 +11923,10 @@
       </p:sp>
       <p:sp>
         <p:nvSpPr>
-          <p:cNvPr id="37" name="Google Shape;169;p2">
+          <p:cNvPr id="91" name="Google Shape;169;p2">
             <a:extLst>
               <a:ext uri="{FF2B5EF4-FFF2-40B4-BE49-F238E27FC236}">
-                <a16:creationId xmlns:a16="http://schemas.microsoft.com/office/drawing/2014/main" id="{CA10AA7F-0BFC-D841-A3D8-A071E4445737}"/>
+                <a16:creationId xmlns:a16="http://schemas.microsoft.com/office/drawing/2014/main" id="{62290F73-8B78-1C8E-274F-5756CCCD6FD9}"/>
               </a:ext>
             </a:extLst>
           </p:cNvPr>
@@ -11905,8 +11935,8 @@
         </p:nvSpPr>
         <p:spPr>
           <a:xfrm>
-            <a:off x="12783" y="2132252"/>
-            <a:ext cx="1935480" cy="1196755"/>
+            <a:off x="12783" y="2191517"/>
+            <a:ext cx="1967734" cy="901092"/>
           </a:xfrm>
           <a:prstGeom prst="ellipse">
             <a:avLst/>
@@ -11949,10 +11979,10 @@
       </p:sp>
       <p:sp>
         <p:nvSpPr>
-          <p:cNvPr id="38" name="Google Shape;170;p2">
+          <p:cNvPr id="92" name="Google Shape;170;p2">
             <a:extLst>
               <a:ext uri="{FF2B5EF4-FFF2-40B4-BE49-F238E27FC236}">
-                <a16:creationId xmlns:a16="http://schemas.microsoft.com/office/drawing/2014/main" id="{01DA6036-3081-1346-AE35-C0786A8DE16A}"/>
+                <a16:creationId xmlns:a16="http://schemas.microsoft.com/office/drawing/2014/main" id="{BD436974-732B-D505-52DE-9C6D28123FB6}"/>
               </a:ext>
             </a:extLst>
           </p:cNvPr>
@@ -11961,8 +11991,8 @@
         </p:nvSpPr>
         <p:spPr>
           <a:xfrm>
-            <a:off x="-59317" y="2431502"/>
-            <a:ext cx="2074814" cy="954067"/>
+            <a:off x="-59317" y="2534738"/>
+            <a:ext cx="2074814" cy="523180"/>
           </a:xfrm>
           <a:prstGeom prst="rect">
             <a:avLst/>
@@ -11997,7 +12027,7 @@
                 <a:cs typeface="Calibri"/>
                 <a:sym typeface="Calibri"/>
               </a:rPr>
-              <a:t>Seasonal &amp; non-diel migrating coast to shelf </a:t>
+              <a:t>Coast &amp; shelf </a:t>
             </a:r>
             <a:r>
               <a:rPr lang="en-US" dirty="0" err="1">
@@ -12011,26 +12041,18 @@
               </a:rPr>
               <a:t>epipelagics</a:t>
             </a:r>
-            <a:endParaRPr lang="en-US" dirty="0">
-              <a:solidFill>
-                <a:schemeClr val="lt1"/>
-              </a:solidFill>
-              <a:latin typeface="Calibri"/>
-              <a:ea typeface="Calibri"/>
-              <a:cs typeface="Calibri"/>
-              <a:sym typeface="Calibri"/>
-            </a:endParaRPr>
-          </a:p>
-          <a:p>
-            <a:pPr marL="0" marR="0" lvl="0" indent="0" algn="ctr" rtl="0">
-              <a:spcBef>
-                <a:spcPts val="0"/>
-              </a:spcBef>
-              <a:spcAft>
-                <a:spcPts val="0"/>
-              </a:spcAft>
-              <a:buNone/>
-            </a:pPr>
+            <a:r>
+              <a:rPr lang="en-US" dirty="0">
+                <a:solidFill>
+                  <a:schemeClr val="lt1"/>
+                </a:solidFill>
+                <a:latin typeface="Calibri"/>
+                <a:ea typeface="Calibri"/>
+                <a:cs typeface="Calibri"/>
+                <a:sym typeface="Calibri"/>
+              </a:rPr>
+              <a:t> </a:t>
+            </a:r>
             <a:r>
               <a:rPr lang="en-US" dirty="0">
                 <a:solidFill>
@@ -12048,10 +12070,10 @@
       </p:sp>
       <p:sp>
         <p:nvSpPr>
-          <p:cNvPr id="41" name="Google Shape;172;p2">
+          <p:cNvPr id="93" name="Google Shape;172;p2">
             <a:extLst>
               <a:ext uri="{FF2B5EF4-FFF2-40B4-BE49-F238E27FC236}">
-                <a16:creationId xmlns:a16="http://schemas.microsoft.com/office/drawing/2014/main" id="{EA319015-4BAE-1B48-BB5E-BA71A455A198}"/>
+                <a16:creationId xmlns:a16="http://schemas.microsoft.com/office/drawing/2014/main" id="{330283C7-12CC-9CB1-EED0-36B802310313}"/>
               </a:ext>
             </a:extLst>
           </p:cNvPr>
@@ -12060,8 +12082,8 @@
         </p:nvSpPr>
         <p:spPr>
           <a:xfrm>
-            <a:off x="55125" y="4149874"/>
-            <a:ext cx="1925392" cy="1067199"/>
+            <a:off x="160934" y="4149874"/>
+            <a:ext cx="1726017" cy="1069602"/>
           </a:xfrm>
           <a:prstGeom prst="ellipse">
             <a:avLst/>
@@ -12090,7 +12112,7 @@
               </a:spcAft>
               <a:buNone/>
             </a:pPr>
-            <a:endParaRPr>
+            <a:endParaRPr i="1">
               <a:solidFill>
                 <a:schemeClr val="lt1"/>
               </a:solidFill>
@@ -12104,10 +12126,10 @@
       </p:sp>
       <p:sp>
         <p:nvSpPr>
-          <p:cNvPr id="49" name="Google Shape;198;p2">
+          <p:cNvPr id="94" name="Google Shape;198;p2">
             <a:extLst>
               <a:ext uri="{FF2B5EF4-FFF2-40B4-BE49-F238E27FC236}">
-                <a16:creationId xmlns:a16="http://schemas.microsoft.com/office/drawing/2014/main" id="{C0983C24-5D9B-864B-B8E0-711AE73BDF6C}"/>
+                <a16:creationId xmlns:a16="http://schemas.microsoft.com/office/drawing/2014/main" id="{994B4EFC-88BF-96C3-11AC-5D3D04EEEC58}"/>
               </a:ext>
             </a:extLst>
           </p:cNvPr>
@@ -12144,7 +12166,7 @@
                 <a:cs typeface="Calibri"/>
                 <a:sym typeface="Calibri"/>
               </a:rPr>
-              <a:t>Seasonal &amp; diel migrating oceanic </a:t>
+              <a:t>Offshore &amp; oceanic </a:t>
             </a:r>
             <a:r>
               <a:rPr lang="en-US" dirty="0" err="1">
@@ -12190,10 +12212,10 @@
       </p:sp>
       <p:sp>
         <p:nvSpPr>
-          <p:cNvPr id="55" name="Google Shape;190;p2">
+          <p:cNvPr id="95" name="Google Shape;190;p2">
             <a:extLst>
               <a:ext uri="{FF2B5EF4-FFF2-40B4-BE49-F238E27FC236}">
-                <a16:creationId xmlns:a16="http://schemas.microsoft.com/office/drawing/2014/main" id="{C2518440-A5B0-4144-904D-09F12DABBD5B}"/>
+                <a16:creationId xmlns:a16="http://schemas.microsoft.com/office/drawing/2014/main" id="{3A79B08B-11D4-E03E-0CE8-207DC919375F}"/>
               </a:ext>
             </a:extLst>
           </p:cNvPr>
@@ -12202,8 +12224,8 @@
         </p:nvSpPr>
         <p:spPr>
           <a:xfrm>
-            <a:off x="4533108" y="4492515"/>
-            <a:ext cx="2004123" cy="1009540"/>
+            <a:off x="4003731" y="4429759"/>
+            <a:ext cx="2143839" cy="815937"/>
           </a:xfrm>
           <a:prstGeom prst="ellipse">
             <a:avLst/>
@@ -12246,10 +12268,10 @@
       </p:sp>
       <p:sp>
         <p:nvSpPr>
-          <p:cNvPr id="56" name="Google Shape;191;p2">
+          <p:cNvPr id="96" name="Google Shape;191;p2">
             <a:extLst>
               <a:ext uri="{FF2B5EF4-FFF2-40B4-BE49-F238E27FC236}">
-                <a16:creationId xmlns:a16="http://schemas.microsoft.com/office/drawing/2014/main" id="{1C3AC8E6-3EC1-1D4A-AE33-00868E607A3C}"/>
+                <a16:creationId xmlns:a16="http://schemas.microsoft.com/office/drawing/2014/main" id="{242E37B8-1498-DA02-DE80-9A45EDEE6EA5}"/>
               </a:ext>
             </a:extLst>
           </p:cNvPr>
@@ -12258,8 +12280,8 @@
         </p:nvSpPr>
         <p:spPr>
           <a:xfrm>
-            <a:off x="4418809" y="4763680"/>
-            <a:ext cx="2232719" cy="738623"/>
+            <a:off x="3975115" y="4712357"/>
+            <a:ext cx="2142857" cy="523180"/>
           </a:xfrm>
           <a:prstGeom prst="rect">
             <a:avLst/>
@@ -12275,15 +12297,7 @@
           </a:bodyPr>
           <a:lstStyle/>
           <a:p>
-            <a:pPr marL="0" marR="0" lvl="0" indent="0" algn="ctr" rtl="0">
-              <a:spcBef>
-                <a:spcPts val="0"/>
-              </a:spcBef>
-              <a:spcAft>
-                <a:spcPts val="0"/>
-              </a:spcAft>
-              <a:buNone/>
-            </a:pPr>
+            <a:pPr lvl="0" algn="ctr"/>
             <a:r>
               <a:rPr lang="en-US" dirty="0">
                 <a:solidFill>
@@ -12294,70 +12308,32 @@
                 <a:cs typeface="Calibri"/>
                 <a:sym typeface="Calibri"/>
               </a:rPr>
-              <a:t>Seasonal &amp; diel migrant, oceanic </a:t>
+              <a:t>Diel migrating mesopelagic</a:t>
             </a:r>
-            <a:r>
-              <a:rPr lang="en-US" dirty="0" err="1">
-                <a:solidFill>
-                  <a:schemeClr val="lt1"/>
-                </a:solidFill>
-                <a:latin typeface="Calibri"/>
-                <a:ea typeface="Calibri"/>
-                <a:cs typeface="Calibri"/>
-                <a:sym typeface="Calibri"/>
-              </a:rPr>
-              <a:t>mesopelagics</a:t>
-            </a:r>
-            <a:endParaRPr lang="en-US" dirty="0">
-              <a:solidFill>
-                <a:schemeClr val="lt1"/>
-              </a:solidFill>
-              <a:latin typeface="Calibri"/>
-              <a:ea typeface="Calibri"/>
-              <a:cs typeface="Calibri"/>
-              <a:sym typeface="Calibri"/>
-            </a:endParaRPr>
           </a:p>
           <a:p>
-            <a:pPr marL="0" marR="0" lvl="0" indent="0" algn="ctr" rtl="0">
-              <a:spcBef>
-                <a:spcPts val="0"/>
-              </a:spcBef>
-              <a:spcAft>
-                <a:spcPts val="0"/>
-              </a:spcAft>
-              <a:buNone/>
-            </a:pPr>
+            <a:pPr lvl="0" algn="ctr"/>
             <a:r>
               <a:rPr lang="en-US" dirty="0">
                 <a:solidFill>
                   <a:schemeClr val="lt1"/>
                 </a:solidFill>
                 <a:latin typeface="Calibri"/>
-                <a:ea typeface="Calibri"/>
                 <a:cs typeface="Calibri"/>
                 <a:sym typeface="Calibri"/>
               </a:rPr>
               <a:t>(88)</a:t>
             </a:r>
-            <a:endParaRPr dirty="0">
-              <a:solidFill>
-                <a:schemeClr val="lt1"/>
-              </a:solidFill>
-              <a:latin typeface="Calibri"/>
-              <a:ea typeface="Calibri"/>
-              <a:cs typeface="Calibri"/>
-              <a:sym typeface="Calibri"/>
-            </a:endParaRPr>
+            <a:endParaRPr lang="en-US" dirty="0"/>
           </a:p>
         </p:txBody>
       </p:sp>
       <p:sp>
         <p:nvSpPr>
-          <p:cNvPr id="60" name="Google Shape;173;p2">
+          <p:cNvPr id="97" name="Google Shape;173;p2">
             <a:extLst>
               <a:ext uri="{FF2B5EF4-FFF2-40B4-BE49-F238E27FC236}">
-                <a16:creationId xmlns:a16="http://schemas.microsoft.com/office/drawing/2014/main" id="{4E7BD754-C909-DC43-AE78-59B7A86E15C7}"/>
+                <a16:creationId xmlns:a16="http://schemas.microsoft.com/office/drawing/2014/main" id="{445B885C-00D0-8E09-5B44-E44A0705BE0B}"/>
               </a:ext>
             </a:extLst>
           </p:cNvPr>
@@ -12366,8 +12342,8 @@
         </p:nvSpPr>
         <p:spPr>
           <a:xfrm>
-            <a:off x="5045325" y="1958258"/>
-            <a:ext cx="2101350" cy="945866"/>
+            <a:off x="4733675" y="1996306"/>
+            <a:ext cx="1696676" cy="1002432"/>
           </a:xfrm>
           <a:prstGeom prst="ellipse">
             <a:avLst/>
@@ -12410,10 +12386,10 @@
       </p:sp>
       <p:sp>
         <p:nvSpPr>
-          <p:cNvPr id="61" name="Google Shape;174;p2">
+          <p:cNvPr id="98" name="Google Shape;174;p2">
             <a:extLst>
               <a:ext uri="{FF2B5EF4-FFF2-40B4-BE49-F238E27FC236}">
-                <a16:creationId xmlns:a16="http://schemas.microsoft.com/office/drawing/2014/main" id="{EE8AD8D3-6D0D-9744-B857-77C75986CB34}"/>
+                <a16:creationId xmlns:a16="http://schemas.microsoft.com/office/drawing/2014/main" id="{D94F9888-6BA8-2991-1392-3006F147CCE1}"/>
               </a:ext>
             </a:extLst>
           </p:cNvPr>
@@ -12422,8 +12398,8 @@
         </p:nvSpPr>
         <p:spPr>
           <a:xfrm>
-            <a:off x="5096103" y="2213419"/>
-            <a:ext cx="2070404" cy="738623"/>
+            <a:off x="4527147" y="2447099"/>
+            <a:ext cx="2070404" cy="523180"/>
           </a:xfrm>
           <a:prstGeom prst="rect">
             <a:avLst/>
@@ -12458,29 +12434,8 @@
                 <a:cs typeface="Calibri"/>
                 <a:sym typeface="Calibri"/>
               </a:rPr>
-              <a:t>Resident diel migrant, coast to shelf </a:t>
+              <a:t>Resident shelf taxa</a:t>
             </a:r>
-            <a:r>
-              <a:rPr lang="en-US" dirty="0" err="1">
-                <a:solidFill>
-                  <a:schemeClr val="lt1"/>
-                </a:solidFill>
-                <a:latin typeface="Calibri"/>
-                <a:ea typeface="Calibri"/>
-                <a:cs typeface="Calibri"/>
-                <a:sym typeface="Calibri"/>
-              </a:rPr>
-              <a:t>epipelagics</a:t>
-            </a:r>
-            <a:endParaRPr lang="en-US" dirty="0">
-              <a:solidFill>
-                <a:schemeClr val="lt1"/>
-              </a:solidFill>
-              <a:latin typeface="Calibri"/>
-              <a:ea typeface="Calibri"/>
-              <a:cs typeface="Calibri"/>
-              <a:sym typeface="Calibri"/>
-            </a:endParaRPr>
           </a:p>
           <a:p>
             <a:pPr marL="0" marR="0" lvl="0" indent="0" algn="ctr" rtl="0">
@@ -12518,10 +12473,10 @@
       </p:sp>
       <p:sp>
         <p:nvSpPr>
-          <p:cNvPr id="63" name="Google Shape;177;p2">
+          <p:cNvPr id="99" name="Google Shape;177;p2">
             <a:extLst>
               <a:ext uri="{FF2B5EF4-FFF2-40B4-BE49-F238E27FC236}">
-                <a16:creationId xmlns:a16="http://schemas.microsoft.com/office/drawing/2014/main" id="{0DDCDA92-FC0B-C64D-A5DE-F07AAE08C82C}"/>
+                <a16:creationId xmlns:a16="http://schemas.microsoft.com/office/drawing/2014/main" id="{F42D77AA-77D7-34DB-6FDE-921630F0D072}"/>
               </a:ext>
             </a:extLst>
           </p:cNvPr>
@@ -12530,8 +12485,8 @@
         </p:nvSpPr>
         <p:spPr>
           <a:xfrm>
-            <a:off x="4107129" y="727257"/>
-            <a:ext cx="1934646" cy="1065841"/>
+            <a:off x="3749563" y="727257"/>
+            <a:ext cx="1828623" cy="1002432"/>
           </a:xfrm>
           <a:prstGeom prst="ellipse">
             <a:avLst/>
@@ -12574,10 +12529,10 @@
       </p:sp>
       <p:sp>
         <p:nvSpPr>
-          <p:cNvPr id="64" name="Google Shape;178;p2">
+          <p:cNvPr id="100" name="Google Shape;178;p2">
             <a:extLst>
               <a:ext uri="{FF2B5EF4-FFF2-40B4-BE49-F238E27FC236}">
-                <a16:creationId xmlns:a16="http://schemas.microsoft.com/office/drawing/2014/main" id="{2E787736-1FA6-6841-B0B2-D2F44DC537CE}"/>
+                <a16:creationId xmlns:a16="http://schemas.microsoft.com/office/drawing/2014/main" id="{365EC367-4552-8E64-63A1-59BA5DC6985E}"/>
               </a:ext>
             </a:extLst>
           </p:cNvPr>
@@ -12586,8 +12541,8 @@
         </p:nvSpPr>
         <p:spPr>
           <a:xfrm>
-            <a:off x="4004467" y="1095123"/>
-            <a:ext cx="2101350" cy="738623"/>
+            <a:off x="3577415" y="1145923"/>
+            <a:ext cx="2101350" cy="523180"/>
           </a:xfrm>
           <a:prstGeom prst="rect">
             <a:avLst/>
@@ -12614,7 +12569,7 @@
                 <a:cs typeface="Calibri"/>
                 <a:sym typeface="Calibri"/>
               </a:rPr>
-              <a:t>Seasonal &amp; diel migrant, continental shelf broad</a:t>
+              <a:t>Seasonal shelf taxa</a:t>
             </a:r>
           </a:p>
           <a:p>
@@ -12653,10 +12608,10 @@
       </p:sp>
       <p:pic>
         <p:nvPicPr>
-          <p:cNvPr id="68" name="Google Shape;130;p1">
+          <p:cNvPr id="101" name="Google Shape;130;p1">
             <a:extLst>
               <a:ext uri="{FF2B5EF4-FFF2-40B4-BE49-F238E27FC236}">
-                <a16:creationId xmlns:a16="http://schemas.microsoft.com/office/drawing/2014/main" id="{C74128A3-3C35-1644-846C-397F58605B25}"/>
+                <a16:creationId xmlns:a16="http://schemas.microsoft.com/office/drawing/2014/main" id="{CE8D9FE4-307D-DFCD-0EFB-21E8799A710B}"/>
               </a:ext>
             </a:extLst>
           </p:cNvPr>
@@ -12672,7 +12627,7 @@
         </p:blipFill>
         <p:spPr>
           <a:xfrm>
-            <a:off x="5589739" y="1585651"/>
+            <a:off x="321482" y="2262636"/>
             <a:ext cx="1336654" cy="365930"/>
           </a:xfrm>
           <a:prstGeom prst="rect">
@@ -12686,10 +12641,10 @@
       </p:pic>
       <p:pic>
         <p:nvPicPr>
-          <p:cNvPr id="69" name="Google Shape;197;p2">
+          <p:cNvPr id="102" name="Google Shape;197;p2">
             <a:extLst>
               <a:ext uri="{FF2B5EF4-FFF2-40B4-BE49-F238E27FC236}">
-                <a16:creationId xmlns:a16="http://schemas.microsoft.com/office/drawing/2014/main" id="{B8AB4EAA-F908-6749-87D5-E4ECC164B3A0}"/>
+                <a16:creationId xmlns:a16="http://schemas.microsoft.com/office/drawing/2014/main" id="{B37F359C-D22D-8B65-C017-B53DEFF2BC54}"/>
               </a:ext>
             </a:extLst>
           </p:cNvPr>
@@ -12720,10 +12675,10 @@
       </p:pic>
       <p:pic>
         <p:nvPicPr>
-          <p:cNvPr id="72" name="Google Shape;182;p2">
+          <p:cNvPr id="103" name="Google Shape;182;p2">
             <a:extLst>
               <a:ext uri="{FF2B5EF4-FFF2-40B4-BE49-F238E27FC236}">
-                <a16:creationId xmlns:a16="http://schemas.microsoft.com/office/drawing/2014/main" id="{C3553E02-2938-C245-8F24-5BBED158FCA2}"/>
+                <a16:creationId xmlns:a16="http://schemas.microsoft.com/office/drawing/2014/main" id="{C29D13D4-F311-C645-4C14-87888D56807C}"/>
               </a:ext>
             </a:extLst>
           </p:cNvPr>
@@ -12740,7 +12695,7 @@
         </p:blipFill>
         <p:spPr>
           <a:xfrm>
-            <a:off x="509856" y="2008038"/>
+            <a:off x="519708" y="4053382"/>
             <a:ext cx="985838" cy="658619"/>
           </a:xfrm>
           <a:prstGeom prst="rect">
@@ -12754,10 +12709,10 @@
       </p:pic>
       <p:pic>
         <p:nvPicPr>
-          <p:cNvPr id="73" name="Google Shape;200;p2">
+          <p:cNvPr id="104" name="Google Shape;200;p2">
             <a:extLst>
               <a:ext uri="{FF2B5EF4-FFF2-40B4-BE49-F238E27FC236}">
-                <a16:creationId xmlns:a16="http://schemas.microsoft.com/office/drawing/2014/main" id="{AF487E2F-41D9-D343-B90A-B4FB29DB106E}"/>
+                <a16:creationId xmlns:a16="http://schemas.microsoft.com/office/drawing/2014/main" id="{494E7B68-C485-4491-5D1D-3B8910AF2EB8}"/>
               </a:ext>
             </a:extLst>
           </p:cNvPr>
@@ -12774,7 +12729,7 @@
         </p:blipFill>
         <p:spPr>
           <a:xfrm>
-            <a:off x="4667377" y="752197"/>
+            <a:off x="4196081" y="802997"/>
             <a:ext cx="763617" cy="461623"/>
           </a:xfrm>
           <a:prstGeom prst="rect">
@@ -12788,10 +12743,10 @@
       </p:pic>
       <p:pic>
         <p:nvPicPr>
-          <p:cNvPr id="43" name="Google Shape;194;p2">
+          <p:cNvPr id="105" name="Google Shape;194;p2">
             <a:extLst>
               <a:ext uri="{FF2B5EF4-FFF2-40B4-BE49-F238E27FC236}">
-                <a16:creationId xmlns:a16="http://schemas.microsoft.com/office/drawing/2014/main" id="{C72C5A8D-321B-EE09-AE5E-C1D2ED02C576}"/>
+                <a16:creationId xmlns:a16="http://schemas.microsoft.com/office/drawing/2014/main" id="{3E7CB438-81AD-6C46-2A0C-46D4F0A1B765}"/>
               </a:ext>
             </a:extLst>
           </p:cNvPr>
@@ -12807,7 +12762,7 @@
         </p:blipFill>
         <p:spPr>
           <a:xfrm rot="21104814">
-            <a:off x="5067729" y="4428663"/>
+            <a:off x="4657960" y="4357051"/>
             <a:ext cx="978010" cy="473271"/>
           </a:xfrm>
           <a:prstGeom prst="rect">
@@ -12821,10 +12776,10 @@
       </p:pic>
       <p:sp>
         <p:nvSpPr>
-          <p:cNvPr id="48" name="Google Shape;169;p2">
+          <p:cNvPr id="106" name="Google Shape;169;p2">
             <a:extLst>
               <a:ext uri="{FF2B5EF4-FFF2-40B4-BE49-F238E27FC236}">
-                <a16:creationId xmlns:a16="http://schemas.microsoft.com/office/drawing/2014/main" id="{7457EAAD-C6D5-91C8-5D71-E9C1B50331B1}"/>
+                <a16:creationId xmlns:a16="http://schemas.microsoft.com/office/drawing/2014/main" id="{A8DE283D-EC33-16BC-D434-B588FF51EF17}"/>
               </a:ext>
             </a:extLst>
           </p:cNvPr>
@@ -12833,8 +12788,8 @@
         </p:nvSpPr>
         <p:spPr>
           <a:xfrm>
-            <a:off x="877496" y="1009320"/>
-            <a:ext cx="1381851" cy="1038985"/>
+            <a:off x="766916" y="1009320"/>
+            <a:ext cx="1655458" cy="1038985"/>
           </a:xfrm>
           <a:prstGeom prst="ellipse">
             <a:avLst/>
@@ -12877,10 +12832,10 @@
       </p:sp>
       <p:sp>
         <p:nvSpPr>
-          <p:cNvPr id="50" name="Google Shape;170;p2">
+          <p:cNvPr id="107" name="Google Shape;170;p2">
             <a:extLst>
               <a:ext uri="{FF2B5EF4-FFF2-40B4-BE49-F238E27FC236}">
-                <a16:creationId xmlns:a16="http://schemas.microsoft.com/office/drawing/2014/main" id="{3844CD62-C5F6-E05B-7D31-652956DDE756}"/>
+                <a16:creationId xmlns:a16="http://schemas.microsoft.com/office/drawing/2014/main" id="{B66ADF60-0DCC-A210-31E3-0637834DC167}"/>
               </a:ext>
             </a:extLst>
           </p:cNvPr>
@@ -12917,7 +12872,7 @@
                 <a:cs typeface="Calibri"/>
                 <a:sym typeface="Calibri"/>
               </a:rPr>
-              <a:t>Non-diel migrant </a:t>
+              <a:t>Non-diel migrating </a:t>
             </a:r>
             <a:r>
               <a:rPr lang="en-US" dirty="0" err="1">
@@ -12964,10 +12919,10 @@
       </p:sp>
       <p:grpSp>
         <p:nvGrpSpPr>
-          <p:cNvPr id="52" name="Google Shape;227;gd33cc45fa0_1_0">
+          <p:cNvPr id="108" name="Google Shape;227;gd33cc45fa0_1_0">
             <a:extLst>
               <a:ext uri="{FF2B5EF4-FFF2-40B4-BE49-F238E27FC236}">
-                <a16:creationId xmlns:a16="http://schemas.microsoft.com/office/drawing/2014/main" id="{5151D4B0-6596-14C7-5931-844C6C778A79}"/>
+                <a16:creationId xmlns:a16="http://schemas.microsoft.com/office/drawing/2014/main" id="{8CACF4A8-9BD0-8102-975F-B02AAF294B61}"/>
               </a:ext>
             </a:extLst>
           </p:cNvPr>
@@ -12984,10 +12939,10 @@
         </p:grpSpPr>
         <p:sp>
           <p:nvSpPr>
-            <p:cNvPr id="53" name="Google Shape;228;gd33cc45fa0_1_0">
+            <p:cNvPr id="109" name="Google Shape;228;gd33cc45fa0_1_0">
               <a:extLst>
                 <a:ext uri="{FF2B5EF4-FFF2-40B4-BE49-F238E27FC236}">
-                  <a16:creationId xmlns:a16="http://schemas.microsoft.com/office/drawing/2014/main" id="{742AF622-3FF2-F197-15D2-C34820AB1E68}"/>
+                  <a16:creationId xmlns:a16="http://schemas.microsoft.com/office/drawing/2014/main" id="{6136CF9C-97A3-E81C-6F41-E8BCB287AD40}"/>
                 </a:ext>
               </a:extLst>
             </p:cNvPr>
@@ -13044,10 +12999,10 @@
         </p:sp>
         <p:sp>
           <p:nvSpPr>
-            <p:cNvPr id="54" name="Google Shape;229;gd33cc45fa0_1_0">
+            <p:cNvPr id="110" name="Google Shape;229;gd33cc45fa0_1_0">
               <a:extLst>
                 <a:ext uri="{FF2B5EF4-FFF2-40B4-BE49-F238E27FC236}">
-                  <a16:creationId xmlns:a16="http://schemas.microsoft.com/office/drawing/2014/main" id="{94350360-AAA5-7C01-8BD1-2B1AAB955255}"/>
+                  <a16:creationId xmlns:a16="http://schemas.microsoft.com/office/drawing/2014/main" id="{39340F40-A856-C518-AB0C-2733561AE2D7}"/>
                 </a:ext>
               </a:extLst>
             </p:cNvPr>
@@ -13102,10 +13057,10 @@
       </p:grpSp>
       <p:pic>
         <p:nvPicPr>
-          <p:cNvPr id="57" name="Google Shape;124;p1">
+          <p:cNvPr id="111" name="Google Shape;124;p1">
             <a:extLst>
               <a:ext uri="{FF2B5EF4-FFF2-40B4-BE49-F238E27FC236}">
-                <a16:creationId xmlns:a16="http://schemas.microsoft.com/office/drawing/2014/main" id="{33C76115-5F95-FEF7-221F-FD97C3AEDE7C}"/>
+                <a16:creationId xmlns:a16="http://schemas.microsoft.com/office/drawing/2014/main" id="{C344A809-8902-2426-1B1A-67B7806C4D99}"/>
               </a:ext>
             </a:extLst>
           </p:cNvPr>
@@ -13132,6 +13087,72 @@
           <a:ln>
             <a:noFill/>
           </a:ln>
+        </p:spPr>
+      </p:pic>
+      <p:pic>
+        <p:nvPicPr>
+          <p:cNvPr id="1030" name="Picture 6" descr="Capros aper">
+            <a:extLst>
+              <a:ext uri="{FF2B5EF4-FFF2-40B4-BE49-F238E27FC236}">
+                <a16:creationId xmlns:a16="http://schemas.microsoft.com/office/drawing/2014/main" id="{DA4672CA-1832-1F13-9C92-A15E00C7E1E4}"/>
+              </a:ext>
+            </a:extLst>
+          </p:cNvPr>
+          <p:cNvPicPr>
+            <a:picLocks noChangeAspect="1" noChangeArrowheads="1"/>
+          </p:cNvPicPr>
+          <p:nvPr/>
+        </p:nvPicPr>
+        <p:blipFill>
+          <a:blip r:embed="rId11">
+            <a:grayscl/>
+            <a:extLst>
+              <a:ext uri="{BEBA8EAE-BF5A-486C-A8C5-ECC9F3942E4B}">
+                <a14:imgProps xmlns:a14="http://schemas.microsoft.com/office/drawing/2010/main">
+                  <a14:imgLayer r:embed="rId12">
+                    <a14:imgEffect>
+                      <a14:backgroundRemoval t="9524" b="89418" l="6767" r="93985">
+                        <a14:foregroundMark x1="88722" y1="40212" x2="92334" y2="40938"/>
+                        <a14:foregroundMark x1="11278" y1="45503" x2="6015" y2="46561"/>
+                        <a14:foregroundMark x1="6015" y1="46561" x2="6550" y2="51835"/>
+                        <a14:backgroundMark x1="5263" y1="53439" x2="9398" y2="58201"/>
+                        <a14:backgroundMark x1="87970" y1="61905" x2="95865" y2="62963"/>
+                        <a14:backgroundMark x1="86842" y1="60847" x2="90602" y2="61905"/>
+                        <a14:backgroundMark x1="93609" y1="40212" x2="95865" y2="47619"/>
+                        <a14:backgroundMark x1="95865" y1="47619" x2="94361" y2="61376"/>
+                      </a14:backgroundRemoval>
+                    </a14:imgEffect>
+                  </a14:imgLayer>
+                </a14:imgProps>
+              </a:ext>
+              <a:ext uri="{28A0092B-C50C-407E-A947-70E740481C1C}">
+                <a14:useLocalDpi xmlns:a14="http://schemas.microsoft.com/office/drawing/2010/main" val="0"/>
+              </a:ext>
+            </a:extLst>
+          </a:blip>
+          <a:srcRect/>
+          <a:stretch>
+            <a:fillRect/>
+          </a:stretch>
+        </p:blipFill>
+        <p:spPr bwMode="auto">
+          <a:xfrm>
+            <a:off x="5114226" y="1955227"/>
+            <a:ext cx="926383" cy="658219"/>
+          </a:xfrm>
+          <a:prstGeom prst="rect">
+            <a:avLst/>
+          </a:prstGeom>
+          <a:noFill/>
+          <a:extLst>
+            <a:ext uri="{909E8E84-426E-40DD-AFC4-6F175D3DCCD1}">
+              <a14:hiddenFill xmlns:a14="http://schemas.microsoft.com/office/drawing/2010/main">
+                <a:solidFill>
+                  <a:srgbClr val="FFFFFF"/>
+                </a:solidFill>
+              </a14:hiddenFill>
+            </a:ext>
+          </a:extLst>
         </p:spPr>
       </p:pic>
     </p:spTree>
@@ -14396,15 +14417,7 @@
           </a:bodyPr>
           <a:lstStyle/>
           <a:p>
-            <a:pPr marL="0" marR="0" lvl="0" indent="0" algn="ctr" rtl="0">
-              <a:spcBef>
-                <a:spcPts val="0"/>
-              </a:spcBef>
-              <a:spcAft>
-                <a:spcPts val="0"/>
-              </a:spcAft>
-              <a:buNone/>
-            </a:pPr>
+            <a:pPr lvl="0" algn="ctr"/>
             <a:r>
               <a:rPr lang="en-US" dirty="0">
                 <a:solidFill>
@@ -14415,7 +14428,7 @@
                 <a:cs typeface="Calibri"/>
                 <a:sym typeface="Calibri"/>
               </a:rPr>
-              <a:t>Seasonal &amp; diel migrating coastal </a:t>
+              <a:t>Diel migrating, oceanic </a:t>
             </a:r>
             <a:r>
               <a:rPr lang="en-US" dirty="0" err="1">
@@ -14427,17 +14440,20 @@
                 <a:cs typeface="Calibri"/>
                 <a:sym typeface="Calibri"/>
               </a:rPr>
-              <a:t>pelagics</a:t>
+              <a:t>epipelagics</a:t>
             </a:r>
-            <a:endParaRPr lang="en-US" dirty="0">
-              <a:solidFill>
-                <a:schemeClr val="lt1"/>
-              </a:solidFill>
-              <a:latin typeface="Calibri"/>
-              <a:ea typeface="Calibri"/>
-              <a:cs typeface="Calibri"/>
-              <a:sym typeface="Calibri"/>
-            </a:endParaRPr>
+            <a:r>
+              <a:rPr lang="en-US" dirty="0">
+                <a:solidFill>
+                  <a:schemeClr val="lt1"/>
+                </a:solidFill>
+                <a:latin typeface="Calibri"/>
+                <a:ea typeface="Calibri"/>
+                <a:cs typeface="Calibri"/>
+                <a:sym typeface="Calibri"/>
+              </a:rPr>
+              <a:t> </a:t>
+            </a:r>
           </a:p>
           <a:p>
             <a:pPr marL="0" marR="0" lvl="0" indent="0" algn="ctr" rtl="0">
@@ -14700,7 +14716,7 @@
                 <a:cs typeface="Calibri"/>
                 <a:sym typeface="Calibri"/>
               </a:rPr>
-              <a:t>Coast to shelf </a:t>
+              <a:t>Coast &amp; shelf </a:t>
             </a:r>
             <a:r>
               <a:rPr lang="en-US" dirty="0" err="1">
@@ -14862,7 +14878,7 @@
                 <a:cs typeface="Calibri"/>
                 <a:sym typeface="Calibri"/>
               </a:rPr>
-              <a:t>Seasonal migrant, coast to shelf </a:t>
+              <a:t>Seasonal, coast &amp; shelf </a:t>
             </a:r>
             <a:r>
               <a:rPr lang="en-US" dirty="0" err="1">
@@ -15100,6 +15116,7 @@
         <p:blipFill rotWithShape="1">
           <a:blip r:embed="rId5">
             <a:alphaModFix/>
+            <a:grayscl/>
           </a:blip>
           <a:srcRect/>
           <a:stretch/>
@@ -15133,6 +15150,7 @@
         <p:blipFill rotWithShape="1">
           <a:blip r:embed="rId6">
             <a:alphaModFix/>
+            <a:grayscl/>
           </a:blip>
           <a:srcRect t="12447" b="48885"/>
           <a:stretch/>
@@ -15166,6 +15184,7 @@
         <p:blipFill rotWithShape="1">
           <a:blip r:embed="rId7">
             <a:alphaModFix/>
+            <a:grayscl/>
           </a:blip>
           <a:srcRect/>
           <a:stretch/>
@@ -15232,21 +15251,15 @@
         <p:blipFill rotWithShape="1">
           <a:blip r:embed="rId9">
             <a:alphaModFix/>
-            <a:duotone>
-              <a:schemeClr val="accent3">
-                <a:shade val="45000"/>
-                <a:satMod val="135000"/>
-              </a:schemeClr>
-              <a:prstClr val="white"/>
-            </a:duotone>
+            <a:grayscl/>
           </a:blip>
           <a:srcRect/>
           <a:stretch/>
         </p:blipFill>
         <p:spPr>
           <a:xfrm>
-            <a:off x="1006285" y="3869614"/>
-            <a:ext cx="881752" cy="625653"/>
+            <a:off x="908870" y="3869614"/>
+            <a:ext cx="979167" cy="736346"/>
           </a:xfrm>
           <a:prstGeom prst="rect">
             <a:avLst/>
@@ -15272,6 +15285,7 @@
         <p:blipFill rotWithShape="1">
           <a:blip r:embed="rId10">
             <a:alphaModFix/>
+            <a:grayscl/>
           </a:blip>
           <a:srcRect/>
           <a:stretch/>

</xml_diff>

<commit_message>
+ Updated Fig 3 + code
</commit_message>
<xml_diff>
--- a/outputs_figures/ms_figures/fig3_clusters/dendrogram_radial.pptx
+++ b/outputs_figures/ms_figures/fig3_clusters/dendrogram_radial.pptx
@@ -256,7 +256,7 @@
       <p15:sldGuideLst xmlns:p15="http://schemas.microsoft.com/office/powerpoint/2012/main"/>
     </p:ext>
     <p:ext uri="http://customooxmlschemas.google.com/">
-      <go:slidesCustomData xmlns="" xmlns:mc="http://schemas.openxmlformats.org/markup-compatibility/2006" xmlns:mv="urn:schemas-microsoft-com:mac:vml" xmlns:c="http://schemas.openxmlformats.org/drawingml/2006/chart" xmlns:dgm="http://schemas.openxmlformats.org/drawingml/2006/diagram" xmlns:o="urn:schemas-microsoft-com:office:office" xmlns:v="urn:schemas-microsoft-com:vml" xmlns:pvml="urn:schemas-microsoft-com:office:powerpoint" xmlns:com="http://schemas.openxmlformats.org/drawingml/2006/compatibility" xmlns:p14="http://schemas.microsoft.com/office/powerpoint/2010/main" xmlns:p15="http://schemas.microsoft.com/office/powerpoint/2012/main" xmlns:ahyp="http://schemas.microsoft.com/office/drawing/2018/hyperlinkcolor" xmlns:go="http://customooxmlschemas.google.com/" r:id="rId21" roundtripDataSignature="AMtx7mjkqRRnulKP6R/VTqMqjzmVO72BhA=="/>
+      <go:slidesCustomData xmlns:go="http://customooxmlschemas.google.com/" xmlns:ahyp="http://schemas.microsoft.com/office/drawing/2018/hyperlinkcolor" xmlns:p15="http://schemas.microsoft.com/office/powerpoint/2012/main" xmlns:p14="http://schemas.microsoft.com/office/powerpoint/2010/main" xmlns:com="http://schemas.openxmlformats.org/drawingml/2006/compatibility" xmlns:pvml="urn:schemas-microsoft-com:office:powerpoint" xmlns:v="urn:schemas-microsoft-com:vml" xmlns:o="urn:schemas-microsoft-com:office:office" xmlns:dgm="http://schemas.openxmlformats.org/drawingml/2006/diagram" xmlns:c="http://schemas.openxmlformats.org/drawingml/2006/chart" xmlns:mv="urn:schemas-microsoft-com:mac:vml" xmlns:mc="http://schemas.openxmlformats.org/markup-compatibility/2006" xmlns="" r:id="rId21" roundtripDataSignature="AMtx7mjkqRRnulKP6R/VTqMqjzmVO72BhA=="/>
     </p:ext>
   </p:extLst>
 </p:presentation>
@@ -10993,11 +10993,11 @@
               <a:avLst/>
             </a:prstGeom>
             <a:solidFill>
-              <a:srgbClr val="DD3F20"/>
+              <a:srgbClr val="D13C21"/>
             </a:solidFill>
             <a:ln w="12700" cap="flat" cmpd="sng">
               <a:solidFill>
-                <a:srgbClr val="DD3F20"/>
+                <a:srgbClr val="D13C21"/>
               </a:solidFill>
               <a:prstDash val="solid"/>
               <a:miter lim="800000"/>
@@ -11104,10 +11104,10 @@
         </p:nvGrpSpPr>
         <p:grpSpPr>
           <a:xfrm>
-            <a:off x="2438982" y="2723669"/>
-            <a:ext cx="242100" cy="307736"/>
-            <a:chOff x="5368725" y="1437354"/>
-            <a:chExt cx="242100" cy="307736"/>
+            <a:off x="2432621" y="2738659"/>
+            <a:ext cx="248461" cy="307736"/>
+            <a:chOff x="5362364" y="1452344"/>
+            <a:chExt cx="248461" cy="307736"/>
           </a:xfrm>
         </p:grpSpPr>
         <p:sp>
@@ -11131,11 +11131,11 @@
               <a:avLst/>
             </a:prstGeom>
             <a:solidFill>
-              <a:srgbClr val="EDA418"/>
+              <a:srgbClr val="E39E1C"/>
             </a:solidFill>
             <a:ln w="12700" cap="flat" cmpd="sng">
               <a:solidFill>
-                <a:srgbClr val="EDA418"/>
+                <a:srgbClr val="E39E1C"/>
               </a:solidFill>
               <a:prstDash val="solid"/>
               <a:miter lim="800000"/>
@@ -11184,7 +11184,7 @@
           </p:nvSpPr>
           <p:spPr>
             <a:xfrm>
-              <a:off x="5369859" y="1437354"/>
+              <a:off x="5362364" y="1452344"/>
               <a:ext cx="161400" cy="307736"/>
             </a:xfrm>
             <a:prstGeom prst="rect">
@@ -11242,10 +11242,10 @@
         </p:nvGrpSpPr>
         <p:grpSpPr>
           <a:xfrm>
-            <a:off x="2471511" y="3560000"/>
-            <a:ext cx="247871" cy="307736"/>
-            <a:chOff x="4824539" y="3620090"/>
-            <a:chExt cx="247871" cy="307736"/>
+            <a:off x="2477282" y="3567495"/>
+            <a:ext cx="242100" cy="307736"/>
+            <a:chOff x="4830310" y="3627585"/>
+            <a:chExt cx="242100" cy="307736"/>
           </a:xfrm>
         </p:grpSpPr>
         <p:sp>
@@ -11269,11 +11269,11 @@
               <a:avLst/>
             </a:prstGeom>
             <a:solidFill>
-              <a:srgbClr val="EDD846"/>
+              <a:srgbClr val="E3CF44"/>
             </a:solidFill>
             <a:ln w="12700" cap="flat" cmpd="sng">
               <a:solidFill>
-                <a:srgbClr val="EDD846"/>
+                <a:srgbClr val="E3CF44"/>
               </a:solidFill>
               <a:prstDash val="solid"/>
               <a:miter lim="800000"/>
@@ -11322,7 +11322,7 @@
           </p:nvSpPr>
           <p:spPr>
             <a:xfrm>
-              <a:off x="4824539" y="3620090"/>
+              <a:off x="4832034" y="3627585"/>
               <a:ext cx="161400" cy="307736"/>
             </a:xfrm>
             <a:prstGeom prst="rect">
@@ -11795,18 +11795,18 @@
         </p:nvSpPr>
         <p:spPr>
           <a:xfrm>
-            <a:off x="2204621" y="166376"/>
+            <a:off x="2339067" y="192759"/>
             <a:ext cx="1333201" cy="1038985"/>
           </a:xfrm>
           <a:prstGeom prst="ellipse">
             <a:avLst/>
           </a:prstGeom>
           <a:solidFill>
-            <a:srgbClr val="DD3F20"/>
+            <a:srgbClr val="D13C21"/>
           </a:solidFill>
           <a:ln>
             <a:solidFill>
-              <a:srgbClr val="DD3F20"/>
+              <a:srgbClr val="D13C21"/>
             </a:solidFill>
           </a:ln>
         </p:spPr>
@@ -11851,7 +11851,7 @@
         </p:nvSpPr>
         <p:spPr>
           <a:xfrm>
-            <a:off x="1960836" y="492094"/>
+            <a:off x="2095282" y="518477"/>
             <a:ext cx="1828623" cy="738623"/>
           </a:xfrm>
           <a:prstGeom prst="rect">
@@ -11942,11 +11942,11 @@
             <a:avLst/>
           </a:prstGeom>
           <a:solidFill>
-            <a:srgbClr val="EDA418"/>
+            <a:srgbClr val="E39E1C"/>
           </a:solidFill>
           <a:ln>
             <a:solidFill>
-              <a:srgbClr val="EDA418"/>
+              <a:srgbClr val="E39E1C"/>
             </a:solidFill>
           </a:ln>
         </p:spPr>
@@ -12089,11 +12089,11 @@
             <a:avLst/>
           </a:prstGeom>
           <a:solidFill>
-            <a:srgbClr val="EDD846"/>
+            <a:srgbClr val="E3CF44"/>
           </a:solidFill>
           <a:ln>
             <a:solidFill>
-              <a:srgbClr val="EDD846"/>
+              <a:srgbClr val="E3CF44"/>
             </a:solidFill>
           </a:ln>
         </p:spPr>
@@ -12485,7 +12485,7 @@
         </p:nvSpPr>
         <p:spPr>
           <a:xfrm>
-            <a:off x="3749563" y="727257"/>
+            <a:off x="3764553" y="584852"/>
             <a:ext cx="1828623" cy="1002432"/>
           </a:xfrm>
           <a:prstGeom prst="ellipse">
@@ -12541,7 +12541,7 @@
         </p:nvSpPr>
         <p:spPr>
           <a:xfrm>
-            <a:off x="3577415" y="1145923"/>
+            <a:off x="3592405" y="1003518"/>
             <a:ext cx="2101350" cy="523180"/>
           </a:xfrm>
           <a:prstGeom prst="rect">
@@ -12661,7 +12661,7 @@
         </p:blipFill>
         <p:spPr>
           <a:xfrm>
-            <a:off x="2422374" y="268329"/>
+            <a:off x="2556820" y="294712"/>
             <a:ext cx="914775" cy="371523"/>
           </a:xfrm>
           <a:prstGeom prst="rect">
@@ -12729,8 +12729,8 @@
         </p:blipFill>
         <p:spPr>
           <a:xfrm>
-            <a:off x="4196081" y="802997"/>
-            <a:ext cx="763617" cy="461623"/>
+            <a:off x="4211071" y="635576"/>
+            <a:ext cx="903155" cy="486640"/>
           </a:xfrm>
           <a:prstGeom prst="rect">
             <a:avLst/>
@@ -12788,18 +12788,18 @@
         </p:nvSpPr>
         <p:spPr>
           <a:xfrm>
-            <a:off x="766916" y="1009320"/>
-            <a:ext cx="1655458" cy="1038985"/>
+            <a:off x="731544" y="577561"/>
+            <a:ext cx="1655458" cy="1087825"/>
           </a:xfrm>
           <a:prstGeom prst="ellipse">
             <a:avLst/>
           </a:prstGeom>
           <a:solidFill>
-            <a:srgbClr val="E76E01"/>
+            <a:srgbClr val="DC6807"/>
           </a:solidFill>
           <a:ln>
             <a:solidFill>
-              <a:srgbClr val="E76E01"/>
+              <a:srgbClr val="DC6807"/>
             </a:solidFill>
           </a:ln>
         </p:spPr>
@@ -12844,7 +12844,7 @@
         </p:nvSpPr>
         <p:spPr>
           <a:xfrm>
-            <a:off x="519708" y="1358522"/>
+            <a:off x="484336" y="926763"/>
             <a:ext cx="2074814" cy="738623"/>
           </a:xfrm>
           <a:prstGeom prst="rect">
@@ -12931,9 +12931,9 @@
         </p:nvGrpSpPr>
         <p:grpSpPr>
           <a:xfrm>
-            <a:off x="2717228" y="2178647"/>
+            <a:off x="2717228" y="2186142"/>
             <a:ext cx="242100" cy="307736"/>
-            <a:chOff x="5368725" y="1437354"/>
+            <a:chOff x="5368725" y="1444849"/>
             <a:chExt cx="242100" cy="307736"/>
           </a:xfrm>
         </p:grpSpPr>
@@ -12958,11 +12958,11 @@
               <a:avLst/>
             </a:prstGeom>
             <a:solidFill>
-              <a:srgbClr val="E76E01"/>
+              <a:srgbClr val="DC6807"/>
             </a:solidFill>
             <a:ln w="12700" cap="flat" cmpd="sng">
               <a:solidFill>
-                <a:srgbClr val="E76E01"/>
+                <a:srgbClr val="DC6807"/>
               </a:solidFill>
               <a:prstDash val="solid"/>
               <a:miter lim="800000"/>
@@ -13011,7 +13011,7 @@
           </p:nvSpPr>
           <p:spPr>
             <a:xfrm>
-              <a:off x="5369859" y="1437354"/>
+              <a:off x="5369859" y="1444849"/>
               <a:ext cx="161400" cy="307736"/>
             </a:xfrm>
             <a:prstGeom prst="rect">
@@ -13077,7 +13077,7 @@
         </p:blipFill>
         <p:spPr>
           <a:xfrm>
-            <a:off x="1289392" y="1007864"/>
+            <a:off x="1254020" y="576105"/>
             <a:ext cx="597559" cy="447592"/>
           </a:xfrm>
           <a:prstGeom prst="rect">

</xml_diff>

<commit_message>
+ Updated cluster diagram colours
</commit_message>
<xml_diff>
--- a/outputs_figures/ms_figures/fig3_clusters/dendrogram_radial.pptx
+++ b/outputs_figures/ms_figures/fig3_clusters/dendrogram_radial.pptx
@@ -258,7 +258,7 @@
       <p15:sldGuideLst xmlns:p15="http://schemas.microsoft.com/office/powerpoint/2012/main"/>
     </p:ext>
     <p:ext uri="http://customooxmlschemas.google.com/">
-      <go:slidesCustomData xmlns:go="http://customooxmlschemas.google.com/" xmlns:ahyp="http://schemas.microsoft.com/office/drawing/2018/hyperlinkcolor" xmlns:p15="http://schemas.microsoft.com/office/powerpoint/2012/main" xmlns:p14="http://schemas.microsoft.com/office/powerpoint/2010/main" xmlns:com="http://schemas.openxmlformats.org/drawingml/2006/compatibility" xmlns:pvml="urn:schemas-microsoft-com:office:powerpoint" xmlns:v="urn:schemas-microsoft-com:vml" xmlns:o="urn:schemas-microsoft-com:office:office" xmlns:dgm="http://schemas.openxmlformats.org/drawingml/2006/diagram" xmlns:c="http://schemas.openxmlformats.org/drawingml/2006/chart" xmlns:mv="urn:schemas-microsoft-com:mac:vml" xmlns:mc="http://schemas.openxmlformats.org/markup-compatibility/2006" xmlns="" r:id="rId21" roundtripDataSignature="AMtx7mjkqRRnulKP6R/VTqMqjzmVO72BhA=="/>
+      <go:slidesCustomData xmlns="" xmlns:mc="http://schemas.openxmlformats.org/markup-compatibility/2006" xmlns:mv="urn:schemas-microsoft-com:mac:vml" xmlns:c="http://schemas.openxmlformats.org/drawingml/2006/chart" xmlns:dgm="http://schemas.openxmlformats.org/drawingml/2006/diagram" xmlns:o="urn:schemas-microsoft-com:office:office" xmlns:v="urn:schemas-microsoft-com:vml" xmlns:pvml="urn:schemas-microsoft-com:office:powerpoint" xmlns:com="http://schemas.openxmlformats.org/drawingml/2006/compatibility" xmlns:p14="http://schemas.microsoft.com/office/powerpoint/2010/main" xmlns:p15="http://schemas.microsoft.com/office/powerpoint/2012/main" xmlns:ahyp="http://schemas.microsoft.com/office/drawing/2018/hyperlinkcolor" xmlns:go="http://customooxmlschemas.google.com/" r:id="rId21" roundtripDataSignature="AMtx7mjkqRRnulKP6R/VTqMqjzmVO72BhA=="/>
     </p:ext>
   </p:extLst>
 </p:presentation>
@@ -15976,10 +15976,10 @@
       </p:grpSpPr>
       <p:pic>
         <p:nvPicPr>
-          <p:cNvPr id="58" name="Picture 57">
+          <p:cNvPr id="2" name="Picture 1" descr="A picture containing sunburst chart&#10;&#10;Description automatically generated">
             <a:extLst>
               <a:ext uri="{FF2B5EF4-FFF2-40B4-BE49-F238E27FC236}">
-                <a16:creationId xmlns:a16="http://schemas.microsoft.com/office/drawing/2014/main" id="{1EF79AEB-8DEA-40CF-4AD5-6EF7A64950A1}"/>
+                <a16:creationId xmlns:a16="http://schemas.microsoft.com/office/drawing/2014/main" id="{1EEE9D4E-0D73-4A48-317A-33EA521BD0EE}"/>
               </a:ext>
             </a:extLst>
           </p:cNvPr>
@@ -15988,15 +15988,15 @@
           </p:cNvPicPr>
           <p:nvPr/>
         </p:nvPicPr>
-        <p:blipFill>
+        <p:blipFill rotWithShape="1">
           <a:blip r:embed="rId3"/>
-          <a:srcRect t="714" b="714"/>
+          <a:srcRect l="3044" r="12623"/>
           <a:stretch/>
         </p:blipFill>
         <p:spPr>
           <a:xfrm>
-            <a:off x="160934" y="362700"/>
-            <a:ext cx="6023949" cy="5937891"/>
+            <a:off x="8550" y="0"/>
+            <a:ext cx="5783579" cy="6858000"/>
           </a:xfrm>
           <a:prstGeom prst="rect">
             <a:avLst/>
@@ -16005,10 +16005,10 @@
       </p:pic>
       <p:grpSp>
         <p:nvGrpSpPr>
-          <p:cNvPr id="65" name="Google Shape;230;gd33cc45fa0_1_0">
+          <p:cNvPr id="3" name="Google Shape;230;gd33cc45fa0_1_0">
             <a:extLst>
               <a:ext uri="{FF2B5EF4-FFF2-40B4-BE49-F238E27FC236}">
-                <a16:creationId xmlns:a16="http://schemas.microsoft.com/office/drawing/2014/main" id="{E61313CA-3812-0DC0-42B7-F8016B187642}"/>
+                <a16:creationId xmlns:a16="http://schemas.microsoft.com/office/drawing/2014/main" id="{32E7F706-9C2B-E06C-7A0E-9E978DB10ECD}"/>
               </a:ext>
             </a:extLst>
           </p:cNvPr>
@@ -16017,7 +16017,7 @@
         </p:nvGrpSpPr>
         <p:grpSpPr>
           <a:xfrm>
-            <a:off x="2973422" y="2354034"/>
+            <a:off x="2921348" y="2325662"/>
             <a:ext cx="255318" cy="307736"/>
             <a:chOff x="5770063" y="1882553"/>
             <a:chExt cx="245509" cy="288503"/>
@@ -16025,10 +16025,10 @@
         </p:grpSpPr>
         <p:sp>
           <p:nvSpPr>
-            <p:cNvPr id="66" name="Google Shape;231;gd33cc45fa0_1_0">
+            <p:cNvPr id="4" name="Google Shape;231;gd33cc45fa0_1_0">
               <a:extLst>
                 <a:ext uri="{FF2B5EF4-FFF2-40B4-BE49-F238E27FC236}">
-                  <a16:creationId xmlns:a16="http://schemas.microsoft.com/office/drawing/2014/main" id="{3D6B5B2D-6A06-695C-5F10-5EBD9A542901}"/>
+                  <a16:creationId xmlns:a16="http://schemas.microsoft.com/office/drawing/2014/main" id="{D836571D-1389-1753-9CE9-E6FC7CDB795F}"/>
                 </a:ext>
               </a:extLst>
             </p:cNvPr>
@@ -16085,10 +16085,10 @@
         </p:sp>
         <p:sp>
           <p:nvSpPr>
-            <p:cNvPr id="71" name="Google Shape;232;gd33cc45fa0_1_0">
+            <p:cNvPr id="5" name="Google Shape;232;gd33cc45fa0_1_0">
               <a:extLst>
                 <a:ext uri="{FF2B5EF4-FFF2-40B4-BE49-F238E27FC236}">
-                  <a16:creationId xmlns:a16="http://schemas.microsoft.com/office/drawing/2014/main" id="{B968FA31-81E6-6814-1790-2A93E51BBFAB}"/>
+                  <a16:creationId xmlns:a16="http://schemas.microsoft.com/office/drawing/2014/main" id="{DBCB63CA-C685-408C-5289-5D7BD1C6766C}"/>
                 </a:ext>
               </a:extLst>
             </p:cNvPr>
@@ -16143,10 +16143,10 @@
       </p:grpSp>
       <p:grpSp>
         <p:nvGrpSpPr>
-          <p:cNvPr id="74" name="Google Shape;227;gd33cc45fa0_1_0">
+          <p:cNvPr id="6" name="Google Shape;227;gd33cc45fa0_1_0">
             <a:extLst>
               <a:ext uri="{FF2B5EF4-FFF2-40B4-BE49-F238E27FC236}">
-                <a16:creationId xmlns:a16="http://schemas.microsoft.com/office/drawing/2014/main" id="{9DDE5F83-072C-B47A-ED6F-07611D85302C}"/>
+                <a16:creationId xmlns:a16="http://schemas.microsoft.com/office/drawing/2014/main" id="{78EEF710-FC4B-E43E-AD79-11C8436F0778}"/>
               </a:ext>
             </a:extLst>
           </p:cNvPr>
@@ -16155,7 +16155,7 @@
         </p:nvGrpSpPr>
         <p:grpSpPr>
           <a:xfrm>
-            <a:off x="2432621" y="2738659"/>
+            <a:off x="2391948" y="3583268"/>
             <a:ext cx="248461" cy="307736"/>
             <a:chOff x="5362364" y="1452344"/>
             <a:chExt cx="248461" cy="307736"/>
@@ -16163,10 +16163,10 @@
         </p:grpSpPr>
         <p:sp>
           <p:nvSpPr>
-            <p:cNvPr id="75" name="Google Shape;228;gd33cc45fa0_1_0">
+            <p:cNvPr id="7" name="Google Shape;228;gd33cc45fa0_1_0">
               <a:extLst>
                 <a:ext uri="{FF2B5EF4-FFF2-40B4-BE49-F238E27FC236}">
-                  <a16:creationId xmlns:a16="http://schemas.microsoft.com/office/drawing/2014/main" id="{3BDF60BB-E034-44A1-BB4A-E07DC42BA440}"/>
+                  <a16:creationId xmlns:a16="http://schemas.microsoft.com/office/drawing/2014/main" id="{6DA88D8E-EAC9-64EB-CC17-1B7081F5D24A}"/>
                 </a:ext>
               </a:extLst>
             </p:cNvPr>
@@ -16223,10 +16223,10 @@
         </p:sp>
         <p:sp>
           <p:nvSpPr>
-            <p:cNvPr id="76" name="Google Shape;229;gd33cc45fa0_1_0">
+            <p:cNvPr id="8" name="Google Shape;229;gd33cc45fa0_1_0">
               <a:extLst>
                 <a:ext uri="{FF2B5EF4-FFF2-40B4-BE49-F238E27FC236}">
-                  <a16:creationId xmlns:a16="http://schemas.microsoft.com/office/drawing/2014/main" id="{D8D5DD74-B18E-E3B6-7B97-DCC73A268EF3}"/>
+                  <a16:creationId xmlns:a16="http://schemas.microsoft.com/office/drawing/2014/main" id="{29046724-EC9B-635E-1F20-210F784E5820}"/>
                 </a:ext>
               </a:extLst>
             </p:cNvPr>
@@ -16270,7 +16270,7 @@
                   <a:cs typeface="Calibri"/>
                   <a:sym typeface="Calibri"/>
                 </a:rPr>
-                <a:t>4</a:t>
+                <a:t>5</a:t>
               </a:r>
               <a:endParaRPr dirty="0">
                 <a:latin typeface="Times" pitchFamily="2" charset="0"/>
@@ -16281,10 +16281,10 @@
       </p:grpSp>
       <p:grpSp>
         <p:nvGrpSpPr>
-          <p:cNvPr id="77" name="Google Shape;221;gd33cc45fa0_1_0">
+          <p:cNvPr id="9" name="Google Shape;221;gd33cc45fa0_1_0">
             <a:extLst>
               <a:ext uri="{FF2B5EF4-FFF2-40B4-BE49-F238E27FC236}">
-                <a16:creationId xmlns:a16="http://schemas.microsoft.com/office/drawing/2014/main" id="{D4E42C18-FE34-F005-09B2-83946EA3D6CE}"/>
+                <a16:creationId xmlns:a16="http://schemas.microsoft.com/office/drawing/2014/main" id="{F10EF2D4-9CC9-FC54-6402-C92F3E028B10}"/>
               </a:ext>
             </a:extLst>
           </p:cNvPr>
@@ -16293,7 +16293,7 @@
         </p:nvGrpSpPr>
         <p:grpSpPr>
           <a:xfrm>
-            <a:off x="2477282" y="3567495"/>
+            <a:off x="3761631" y="3773782"/>
             <a:ext cx="242100" cy="307736"/>
             <a:chOff x="4830310" y="3627585"/>
             <a:chExt cx="242100" cy="307736"/>
@@ -16301,10 +16301,10 @@
         </p:grpSpPr>
         <p:sp>
           <p:nvSpPr>
-            <p:cNvPr id="78" name="Google Shape;222;gd33cc45fa0_1_0">
+            <p:cNvPr id="10" name="Google Shape;222;gd33cc45fa0_1_0">
               <a:extLst>
                 <a:ext uri="{FF2B5EF4-FFF2-40B4-BE49-F238E27FC236}">
-                  <a16:creationId xmlns:a16="http://schemas.microsoft.com/office/drawing/2014/main" id="{696BCAA7-A48E-90DA-DF88-A3A5F688D555}"/>
+                  <a16:creationId xmlns:a16="http://schemas.microsoft.com/office/drawing/2014/main" id="{65C3921A-6280-9080-557F-B97344B10843}"/>
                 </a:ext>
               </a:extLst>
             </p:cNvPr>
@@ -16361,10 +16361,10 @@
         </p:sp>
         <p:sp>
           <p:nvSpPr>
-            <p:cNvPr id="79" name="Google Shape;223;gd33cc45fa0_1_0">
+            <p:cNvPr id="11" name="Google Shape;223;gd33cc45fa0_1_0">
               <a:extLst>
                 <a:ext uri="{FF2B5EF4-FFF2-40B4-BE49-F238E27FC236}">
-                  <a16:creationId xmlns:a16="http://schemas.microsoft.com/office/drawing/2014/main" id="{9670A518-22A5-671A-C2E3-67360A151AB5}"/>
+                  <a16:creationId xmlns:a16="http://schemas.microsoft.com/office/drawing/2014/main" id="{7BDC8CF8-D124-365B-B7E6-E11845B739E7}"/>
                 </a:ext>
               </a:extLst>
             </p:cNvPr>
@@ -16408,7 +16408,7 @@
                   <a:cs typeface="Calibri"/>
                   <a:sym typeface="Calibri"/>
                 </a:rPr>
-                <a:t>5</a:t>
+                <a:t>2</a:t>
               </a:r>
               <a:endParaRPr dirty="0">
                 <a:latin typeface="Times" pitchFamily="2" charset="0"/>
@@ -16419,10 +16419,10 @@
       </p:grpSp>
       <p:grpSp>
         <p:nvGrpSpPr>
-          <p:cNvPr id="80" name="Google Shape;218;gd33cc45fa0_1_0">
+          <p:cNvPr id="12" name="Google Shape;218;gd33cc45fa0_1_0">
             <a:extLst>
               <a:ext uri="{FF2B5EF4-FFF2-40B4-BE49-F238E27FC236}">
-                <a16:creationId xmlns:a16="http://schemas.microsoft.com/office/drawing/2014/main" id="{2710E890-1A80-E4E2-561D-520AA7815E1A}"/>
+                <a16:creationId xmlns:a16="http://schemas.microsoft.com/office/drawing/2014/main" id="{AC1BA98C-BDC0-7CCA-8F90-03CAD9AE2E47}"/>
               </a:ext>
             </a:extLst>
           </p:cNvPr>
@@ -16431,7 +16431,7 @@
         </p:nvGrpSpPr>
         <p:grpSpPr>
           <a:xfrm>
-            <a:off x="3655969" y="3560000"/>
+            <a:off x="3974252" y="3092609"/>
             <a:ext cx="263316" cy="307736"/>
             <a:chOff x="6779494" y="4047842"/>
             <a:chExt cx="253200" cy="288502"/>
@@ -16439,10 +16439,10 @@
         </p:grpSpPr>
         <p:sp>
           <p:nvSpPr>
-            <p:cNvPr id="81" name="Google Shape;219;gd33cc45fa0_1_0">
+            <p:cNvPr id="13" name="Google Shape;219;gd33cc45fa0_1_0">
               <a:extLst>
                 <a:ext uri="{FF2B5EF4-FFF2-40B4-BE49-F238E27FC236}">
-                  <a16:creationId xmlns:a16="http://schemas.microsoft.com/office/drawing/2014/main" id="{BC1C4952-7315-9F3F-75F2-74B58ECE5B54}"/>
+                  <a16:creationId xmlns:a16="http://schemas.microsoft.com/office/drawing/2014/main" id="{68A08CB1-5941-C651-52FA-B992E6A968B7}"/>
                 </a:ext>
               </a:extLst>
             </p:cNvPr>
@@ -16499,10 +16499,10 @@
         </p:sp>
         <p:sp>
           <p:nvSpPr>
-            <p:cNvPr id="82" name="Google Shape;220;gd33cc45fa0_1_0">
+            <p:cNvPr id="14" name="Google Shape;220;gd33cc45fa0_1_0">
               <a:extLst>
                 <a:ext uri="{FF2B5EF4-FFF2-40B4-BE49-F238E27FC236}">
-                  <a16:creationId xmlns:a16="http://schemas.microsoft.com/office/drawing/2014/main" id="{A1C29272-C283-1D66-8483-2DD0C158B5D9}"/>
+                  <a16:creationId xmlns:a16="http://schemas.microsoft.com/office/drawing/2014/main" id="{22C8D369-3DDD-DBF9-8732-17F92462FEFC}"/>
                 </a:ext>
               </a:extLst>
             </p:cNvPr>
@@ -16546,7 +16546,7 @@
                   <a:cs typeface="Calibri"/>
                   <a:sym typeface="Calibri"/>
                 </a:rPr>
-                <a:t>2</a:t>
+                <a:t>4</a:t>
               </a:r>
               <a:endParaRPr dirty="0">
                 <a:latin typeface="Times" pitchFamily="2" charset="0"/>
@@ -16557,10 +16557,10 @@
       </p:grpSp>
       <p:grpSp>
         <p:nvGrpSpPr>
-          <p:cNvPr id="83" name="Google Shape;215;gd33cc45fa0_1_0">
+          <p:cNvPr id="15" name="Google Shape;215;gd33cc45fa0_1_0">
             <a:extLst>
               <a:ext uri="{FF2B5EF4-FFF2-40B4-BE49-F238E27FC236}">
-                <a16:creationId xmlns:a16="http://schemas.microsoft.com/office/drawing/2014/main" id="{F82EBB86-3F62-2A95-2A7A-18289C391B33}"/>
+                <a16:creationId xmlns:a16="http://schemas.microsoft.com/office/drawing/2014/main" id="{7A5A2AB3-F2FB-73D7-3E8E-3ECF05483D09}"/>
               </a:ext>
             </a:extLst>
           </p:cNvPr>
@@ -16569,7 +16569,7 @@
         </p:nvGrpSpPr>
         <p:grpSpPr>
           <a:xfrm>
-            <a:off x="3764405" y="2929740"/>
+            <a:off x="3791010" y="2598364"/>
             <a:ext cx="242100" cy="307736"/>
             <a:chOff x="7175557" y="3610299"/>
             <a:chExt cx="242100" cy="307736"/>
@@ -16577,10 +16577,10 @@
         </p:grpSpPr>
         <p:sp>
           <p:nvSpPr>
-            <p:cNvPr id="84" name="Google Shape;216;gd33cc45fa0_1_0">
+            <p:cNvPr id="16" name="Google Shape;216;gd33cc45fa0_1_0">
               <a:extLst>
                 <a:ext uri="{FF2B5EF4-FFF2-40B4-BE49-F238E27FC236}">
-                  <a16:creationId xmlns:a16="http://schemas.microsoft.com/office/drawing/2014/main" id="{BB253100-1B0F-23EE-5BE7-B895C22C28BD}"/>
+                  <a16:creationId xmlns:a16="http://schemas.microsoft.com/office/drawing/2014/main" id="{F6B6EFB4-079A-DFF0-3F29-C5461A214E74}"/>
                 </a:ext>
               </a:extLst>
             </p:cNvPr>
@@ -16637,10 +16637,10 @@
         </p:sp>
         <p:sp>
           <p:nvSpPr>
-            <p:cNvPr id="85" name="Google Shape;217;gd33cc45fa0_1_0">
+            <p:cNvPr id="17" name="Google Shape;217;gd33cc45fa0_1_0">
               <a:extLst>
                 <a:ext uri="{FF2B5EF4-FFF2-40B4-BE49-F238E27FC236}">
-                  <a16:creationId xmlns:a16="http://schemas.microsoft.com/office/drawing/2014/main" id="{1185CC7D-A271-F7A7-099F-37FF4412BBBD}"/>
+                  <a16:creationId xmlns:a16="http://schemas.microsoft.com/office/drawing/2014/main" id="{09D8BD1F-6351-C3E6-04B4-6B3C1559CB03}"/>
                 </a:ext>
               </a:extLst>
             </p:cNvPr>
@@ -16695,10 +16695,10 @@
       </p:grpSp>
       <p:grpSp>
         <p:nvGrpSpPr>
-          <p:cNvPr id="86" name="Google Shape;212;gd33cc45fa0_1_0">
+          <p:cNvPr id="18" name="Google Shape;212;gd33cc45fa0_1_0">
             <a:extLst>
               <a:ext uri="{FF2B5EF4-FFF2-40B4-BE49-F238E27FC236}">
-                <a16:creationId xmlns:a16="http://schemas.microsoft.com/office/drawing/2014/main" id="{5A3C18D9-4462-E7DB-4F93-D6509480BF4B}"/>
+                <a16:creationId xmlns:a16="http://schemas.microsoft.com/office/drawing/2014/main" id="{A8DEE8E2-9974-38CE-6FB4-F2BC15A4011A}"/>
               </a:ext>
             </a:extLst>
           </p:cNvPr>
@@ -16707,7 +16707,7 @@
         </p:nvGrpSpPr>
         <p:grpSpPr>
           <a:xfrm>
-            <a:off x="3309416" y="2380324"/>
+            <a:off x="3283284" y="2325662"/>
             <a:ext cx="242100" cy="307736"/>
             <a:chOff x="6384583" y="2095900"/>
             <a:chExt cx="242100" cy="307736"/>
@@ -16715,10 +16715,10 @@
         </p:grpSpPr>
         <p:sp>
           <p:nvSpPr>
-            <p:cNvPr id="87" name="Google Shape;213;gd33cc45fa0_1_0">
+            <p:cNvPr id="19" name="Google Shape;213;gd33cc45fa0_1_0">
               <a:extLst>
                 <a:ext uri="{FF2B5EF4-FFF2-40B4-BE49-F238E27FC236}">
-                  <a16:creationId xmlns:a16="http://schemas.microsoft.com/office/drawing/2014/main" id="{C067D167-1A68-391D-F30F-9C6B1FB13D00}"/>
+                  <a16:creationId xmlns:a16="http://schemas.microsoft.com/office/drawing/2014/main" id="{8036BE39-E872-A439-BF70-B70880F5BECD}"/>
                 </a:ext>
               </a:extLst>
             </p:cNvPr>
@@ -16775,10 +16775,10 @@
         </p:sp>
         <p:sp>
           <p:nvSpPr>
-            <p:cNvPr id="88" name="Google Shape;214;gd33cc45fa0_1_0">
+            <p:cNvPr id="20" name="Google Shape;214;gd33cc45fa0_1_0">
               <a:extLst>
                 <a:ext uri="{FF2B5EF4-FFF2-40B4-BE49-F238E27FC236}">
-                  <a16:creationId xmlns:a16="http://schemas.microsoft.com/office/drawing/2014/main" id="{698DC680-0F85-520C-14D2-30864783F843}"/>
+                  <a16:creationId xmlns:a16="http://schemas.microsoft.com/office/drawing/2014/main" id="{34817CAE-D26E-28E8-FFB8-CA600CBBAAA9}"/>
                 </a:ext>
               </a:extLst>
             </p:cNvPr>
@@ -16834,10 +16834,10 @@
       </p:grpSp>
       <p:sp>
         <p:nvSpPr>
-          <p:cNvPr id="89" name="Google Shape;167;p2">
+          <p:cNvPr id="21" name="Google Shape;167;p2">
             <a:extLst>
               <a:ext uri="{FF2B5EF4-FFF2-40B4-BE49-F238E27FC236}">
-                <a16:creationId xmlns:a16="http://schemas.microsoft.com/office/drawing/2014/main" id="{62428E00-D39C-8527-7BEC-68FF6B3AEC0D}"/>
+                <a16:creationId xmlns:a16="http://schemas.microsoft.com/office/drawing/2014/main" id="{090678F0-E08C-F66A-DA46-3D1B74DD6002}"/>
               </a:ext>
             </a:extLst>
           </p:cNvPr>
@@ -16846,8 +16846,8 @@
         </p:nvSpPr>
         <p:spPr>
           <a:xfrm>
-            <a:off x="2339067" y="192759"/>
-            <a:ext cx="1333201" cy="1038985"/>
+            <a:off x="1258902" y="204972"/>
+            <a:ext cx="1792536" cy="1038985"/>
           </a:xfrm>
           <a:prstGeom prst="ellipse">
             <a:avLst/>
@@ -16890,10 +16890,178 @@
       </p:sp>
       <p:sp>
         <p:nvSpPr>
-          <p:cNvPr id="90" name="Google Shape;168;p2">
+          <p:cNvPr id="22" name="Google Shape;169;p2">
             <a:extLst>
               <a:ext uri="{FF2B5EF4-FFF2-40B4-BE49-F238E27FC236}">
-                <a16:creationId xmlns:a16="http://schemas.microsoft.com/office/drawing/2014/main" id="{20411D07-7687-0222-07E8-5CDCBC6C9155}"/>
+                <a16:creationId xmlns:a16="http://schemas.microsoft.com/office/drawing/2014/main" id="{39E4DCE4-7DD5-515D-37FD-7B5B428F4C84}"/>
+              </a:ext>
+            </a:extLst>
+          </p:cNvPr>
+          <p:cNvSpPr/>
+          <p:nvPr/>
+        </p:nvSpPr>
+        <p:spPr>
+          <a:xfrm>
+            <a:off x="74012" y="4712951"/>
+            <a:ext cx="1967734" cy="901092"/>
+          </a:xfrm>
+          <a:prstGeom prst="ellipse">
+            <a:avLst/>
+          </a:prstGeom>
+          <a:solidFill>
+            <a:srgbClr val="E39E1C"/>
+          </a:solidFill>
+          <a:ln>
+            <a:solidFill>
+              <a:srgbClr val="E39E1C"/>
+            </a:solidFill>
+          </a:ln>
+        </p:spPr>
+        <p:txBody>
+          <a:bodyPr spcFirstLastPara="1" wrap="square" lIns="91425" tIns="45700" rIns="91425" bIns="45700" anchor="ctr" anchorCtr="0">
+            <a:noAutofit/>
+          </a:bodyPr>
+          <a:lstStyle/>
+          <a:p>
+            <a:pPr marL="0" marR="0" lvl="0" indent="0" algn="ctr" rtl="0">
+              <a:spcBef>
+                <a:spcPts val="0"/>
+              </a:spcBef>
+              <a:spcAft>
+                <a:spcPts val="0"/>
+              </a:spcAft>
+              <a:buNone/>
+            </a:pPr>
+            <a:endParaRPr>
+              <a:solidFill>
+                <a:schemeClr val="lt1"/>
+              </a:solidFill>
+              <a:latin typeface="Calibri"/>
+              <a:ea typeface="Calibri"/>
+              <a:cs typeface="Calibri"/>
+              <a:sym typeface="Calibri"/>
+            </a:endParaRPr>
+          </a:p>
+        </p:txBody>
+      </p:sp>
+      <p:sp>
+        <p:nvSpPr>
+          <p:cNvPr id="23" name="Google Shape;172;p2">
+            <a:extLst>
+              <a:ext uri="{FF2B5EF4-FFF2-40B4-BE49-F238E27FC236}">
+                <a16:creationId xmlns:a16="http://schemas.microsoft.com/office/drawing/2014/main" id="{50155373-4AF3-75A8-1CA7-BAD2F1E6C934}"/>
+              </a:ext>
+            </a:extLst>
+          </p:cNvPr>
+          <p:cNvSpPr/>
+          <p:nvPr/>
+        </p:nvSpPr>
+        <p:spPr>
+          <a:xfrm>
+            <a:off x="4477147" y="4718581"/>
+            <a:ext cx="2092550" cy="999711"/>
+          </a:xfrm>
+          <a:prstGeom prst="ellipse">
+            <a:avLst/>
+          </a:prstGeom>
+          <a:solidFill>
+            <a:srgbClr val="E3CF44"/>
+          </a:solidFill>
+          <a:ln>
+            <a:solidFill>
+              <a:srgbClr val="E3CF44"/>
+            </a:solidFill>
+          </a:ln>
+        </p:spPr>
+        <p:txBody>
+          <a:bodyPr spcFirstLastPara="1" wrap="square" lIns="91425" tIns="45700" rIns="91425" bIns="45700" anchor="ctr" anchorCtr="0">
+            <a:noAutofit/>
+          </a:bodyPr>
+          <a:lstStyle/>
+          <a:p>
+            <a:pPr marL="0" marR="0" lvl="0" indent="0" algn="ctr" rtl="0">
+              <a:spcBef>
+                <a:spcPts val="0"/>
+              </a:spcBef>
+              <a:spcAft>
+                <a:spcPts val="0"/>
+              </a:spcAft>
+              <a:buNone/>
+            </a:pPr>
+            <a:endParaRPr i="1">
+              <a:solidFill>
+                <a:schemeClr val="lt1"/>
+              </a:solidFill>
+              <a:latin typeface="Calibri"/>
+              <a:ea typeface="Calibri"/>
+              <a:cs typeface="Calibri"/>
+              <a:sym typeface="Calibri"/>
+            </a:endParaRPr>
+          </a:p>
+        </p:txBody>
+      </p:sp>
+      <p:sp>
+        <p:nvSpPr>
+          <p:cNvPr id="24" name="Google Shape;190;p2">
+            <a:extLst>
+              <a:ext uri="{FF2B5EF4-FFF2-40B4-BE49-F238E27FC236}">
+                <a16:creationId xmlns:a16="http://schemas.microsoft.com/office/drawing/2014/main" id="{81F9DB0A-70FA-D41A-0B5C-FB888993720A}"/>
+              </a:ext>
+            </a:extLst>
+          </p:cNvPr>
+          <p:cNvSpPr/>
+          <p:nvPr/>
+        </p:nvSpPr>
+        <p:spPr>
+          <a:xfrm>
+            <a:off x="5336620" y="1925100"/>
+            <a:ext cx="1389314" cy="1003695"/>
+          </a:xfrm>
+          <a:prstGeom prst="ellipse">
+            <a:avLst/>
+          </a:prstGeom>
+          <a:solidFill>
+            <a:srgbClr val="59A082"/>
+          </a:solidFill>
+          <a:ln>
+            <a:solidFill>
+              <a:srgbClr val="59A082"/>
+            </a:solidFill>
+          </a:ln>
+        </p:spPr>
+        <p:txBody>
+          <a:bodyPr spcFirstLastPara="1" wrap="square" lIns="91425" tIns="45700" rIns="91425" bIns="45700" anchor="ctr" anchorCtr="0">
+            <a:noAutofit/>
+          </a:bodyPr>
+          <a:lstStyle/>
+          <a:p>
+            <a:pPr marL="0" marR="0" lvl="0" indent="0" algn="ctr" rtl="0">
+              <a:spcBef>
+                <a:spcPts val="0"/>
+              </a:spcBef>
+              <a:spcAft>
+                <a:spcPts val="0"/>
+              </a:spcAft>
+              <a:buNone/>
+            </a:pPr>
+            <a:endParaRPr>
+              <a:solidFill>
+                <a:schemeClr val="lt1"/>
+              </a:solidFill>
+              <a:latin typeface="Calibri"/>
+              <a:ea typeface="Calibri"/>
+              <a:cs typeface="Calibri"/>
+              <a:sym typeface="Calibri"/>
+            </a:endParaRPr>
+          </a:p>
+        </p:txBody>
+      </p:sp>
+      <p:sp>
+        <p:nvSpPr>
+          <p:cNvPr id="25" name="Google Shape;191;p2">
+            <a:extLst>
+              <a:ext uri="{FF2B5EF4-FFF2-40B4-BE49-F238E27FC236}">
+                <a16:creationId xmlns:a16="http://schemas.microsoft.com/office/drawing/2014/main" id="{DAADA4BF-40C7-8643-72FC-D7CDA43DD7D8}"/>
               </a:ext>
             </a:extLst>
           </p:cNvPr>
@@ -16902,8 +17070,8 @@
         </p:nvSpPr>
         <p:spPr>
           <a:xfrm>
-            <a:off x="2095282" y="518477"/>
-            <a:ext cx="1828623" cy="738623"/>
+            <a:off x="4436808" y="5065752"/>
+            <a:ext cx="2207662" cy="523180"/>
           </a:xfrm>
           <a:prstGeom prst="rect">
             <a:avLst/>
@@ -16930,7 +17098,7 @@
                 <a:cs typeface="Calibri"/>
                 <a:sym typeface="Calibri"/>
               </a:rPr>
-              <a:t>Coast &amp; shelf </a:t>
+              <a:t>#2 Diel migrating </a:t>
             </a:r>
             <a:r>
               <a:rPr lang="en-US" dirty="0" err="1">
@@ -16942,155 +17110,7 @@
                 <a:cs typeface="Calibri"/>
                 <a:sym typeface="Calibri"/>
               </a:rPr>
-              <a:t>demersals</a:t>
-            </a:r>
-            <a:endParaRPr lang="en-US" dirty="0">
-              <a:solidFill>
-                <a:schemeClr val="lt1"/>
-              </a:solidFill>
-              <a:latin typeface="Calibri"/>
-              <a:ea typeface="Calibri"/>
-              <a:cs typeface="Calibri"/>
-              <a:sym typeface="Calibri"/>
-            </a:endParaRPr>
-          </a:p>
-          <a:p>
-            <a:pPr lvl="0" algn="ctr"/>
-            <a:r>
-              <a:rPr lang="en-US" dirty="0">
-                <a:solidFill>
-                  <a:schemeClr val="lt1"/>
-                </a:solidFill>
-                <a:latin typeface="Calibri"/>
-                <a:ea typeface="Calibri"/>
-                <a:cs typeface="Calibri"/>
-                <a:sym typeface="Calibri"/>
-              </a:rPr>
-              <a:t>(14)</a:t>
-            </a:r>
-            <a:endParaRPr dirty="0"/>
-          </a:p>
-        </p:txBody>
-      </p:sp>
-      <p:sp>
-        <p:nvSpPr>
-          <p:cNvPr id="91" name="Google Shape;169;p2">
-            <a:extLst>
-              <a:ext uri="{FF2B5EF4-FFF2-40B4-BE49-F238E27FC236}">
-                <a16:creationId xmlns:a16="http://schemas.microsoft.com/office/drawing/2014/main" id="{62290F73-8B78-1C8E-274F-5756CCCD6FD9}"/>
-              </a:ext>
-            </a:extLst>
-          </p:cNvPr>
-          <p:cNvSpPr/>
-          <p:nvPr/>
-        </p:nvSpPr>
-        <p:spPr>
-          <a:xfrm>
-            <a:off x="12783" y="2191517"/>
-            <a:ext cx="1967734" cy="901092"/>
-          </a:xfrm>
-          <a:prstGeom prst="ellipse">
-            <a:avLst/>
-          </a:prstGeom>
-          <a:solidFill>
-            <a:srgbClr val="E39E1C"/>
-          </a:solidFill>
-          <a:ln>
-            <a:solidFill>
-              <a:srgbClr val="E39E1C"/>
-            </a:solidFill>
-          </a:ln>
-        </p:spPr>
-        <p:txBody>
-          <a:bodyPr spcFirstLastPara="1" wrap="square" lIns="91425" tIns="45700" rIns="91425" bIns="45700" anchor="ctr" anchorCtr="0">
-            <a:noAutofit/>
-          </a:bodyPr>
-          <a:lstStyle/>
-          <a:p>
-            <a:pPr marL="0" marR="0" lvl="0" indent="0" algn="ctr" rtl="0">
-              <a:spcBef>
-                <a:spcPts val="0"/>
-              </a:spcBef>
-              <a:spcAft>
-                <a:spcPts val="0"/>
-              </a:spcAft>
-              <a:buNone/>
-            </a:pPr>
-            <a:endParaRPr>
-              <a:solidFill>
-                <a:schemeClr val="lt1"/>
-              </a:solidFill>
-              <a:latin typeface="Calibri"/>
-              <a:ea typeface="Calibri"/>
-              <a:cs typeface="Calibri"/>
-              <a:sym typeface="Calibri"/>
-            </a:endParaRPr>
-          </a:p>
-        </p:txBody>
-      </p:sp>
-      <p:sp>
-        <p:nvSpPr>
-          <p:cNvPr id="92" name="Google Shape;170;p2">
-            <a:extLst>
-              <a:ext uri="{FF2B5EF4-FFF2-40B4-BE49-F238E27FC236}">
-                <a16:creationId xmlns:a16="http://schemas.microsoft.com/office/drawing/2014/main" id="{BD436974-732B-D505-52DE-9C6D28123FB6}"/>
-              </a:ext>
-            </a:extLst>
-          </p:cNvPr>
-          <p:cNvSpPr txBox="1"/>
-          <p:nvPr/>
-        </p:nvSpPr>
-        <p:spPr>
-          <a:xfrm>
-            <a:off x="-59317" y="2534738"/>
-            <a:ext cx="2074814" cy="523180"/>
-          </a:xfrm>
-          <a:prstGeom prst="rect">
-            <a:avLst/>
-          </a:prstGeom>
-          <a:noFill/>
-          <a:ln>
-            <a:noFill/>
-          </a:ln>
-        </p:spPr>
-        <p:txBody>
-          <a:bodyPr spcFirstLastPara="1" wrap="square" lIns="91425" tIns="45700" rIns="91425" bIns="45700" anchor="t" anchorCtr="0">
-            <a:spAutoFit/>
-          </a:bodyPr>
-          <a:lstStyle/>
-          <a:p>
-            <a:pPr marL="0" marR="0" lvl="0" indent="0" algn="ctr" rtl="0">
-              <a:spcBef>
-                <a:spcPts val="0"/>
-              </a:spcBef>
-              <a:spcAft>
-                <a:spcPts val="0"/>
-              </a:spcAft>
-              <a:buNone/>
-            </a:pPr>
-            <a:r>
-              <a:rPr lang="en-US" dirty="0">
-                <a:solidFill>
-                  <a:schemeClr val="lt1"/>
-                </a:solidFill>
-                <a:latin typeface="Calibri"/>
-                <a:ea typeface="Calibri"/>
-                <a:cs typeface="Calibri"/>
-                <a:sym typeface="Calibri"/>
-              </a:rPr>
-              <a:t>Coast &amp; shelf </a:t>
-            </a:r>
-            <a:r>
-              <a:rPr lang="en-US" dirty="0" err="1">
-                <a:solidFill>
-                  <a:schemeClr val="lt1"/>
-                </a:solidFill>
-                <a:latin typeface="Calibri"/>
-                <a:ea typeface="Calibri"/>
-                <a:cs typeface="Calibri"/>
-                <a:sym typeface="Calibri"/>
-              </a:rPr>
-              <a:t>epipelagics</a:t>
+              <a:t>mesopelagics</a:t>
             </a:r>
             <a:r>
               <a:rPr lang="en-US" dirty="0">
@@ -17113,18 +17133,18 @@
                 <a:cs typeface="Calibri"/>
                 <a:sym typeface="Calibri"/>
               </a:rPr>
-              <a:t>(51)</a:t>
+              <a:t>(88)</a:t>
             </a:r>
-            <a:endParaRPr dirty="0"/>
+            <a:endParaRPr lang="en-US" dirty="0"/>
           </a:p>
         </p:txBody>
       </p:sp>
       <p:sp>
         <p:nvSpPr>
-          <p:cNvPr id="93" name="Google Shape;172;p2">
+          <p:cNvPr id="26" name="Google Shape;173;p2">
             <a:extLst>
               <a:ext uri="{FF2B5EF4-FFF2-40B4-BE49-F238E27FC236}">
-                <a16:creationId xmlns:a16="http://schemas.microsoft.com/office/drawing/2014/main" id="{330283C7-12CC-9CB1-EED0-36B802310313}"/>
+                <a16:creationId xmlns:a16="http://schemas.microsoft.com/office/drawing/2014/main" id="{26C6BBD1-2C6D-B722-6A3D-1313502D9B01}"/>
               </a:ext>
             </a:extLst>
           </p:cNvPr>
@@ -17133,268 +17153,8 @@
         </p:nvSpPr>
         <p:spPr>
           <a:xfrm>
-            <a:off x="160934" y="4149874"/>
-            <a:ext cx="1726017" cy="1069602"/>
-          </a:xfrm>
-          <a:prstGeom prst="ellipse">
-            <a:avLst/>
-          </a:prstGeom>
-          <a:solidFill>
-            <a:srgbClr val="E3CF44"/>
-          </a:solidFill>
-          <a:ln>
-            <a:solidFill>
-              <a:srgbClr val="E3CF44"/>
-            </a:solidFill>
-          </a:ln>
-        </p:spPr>
-        <p:txBody>
-          <a:bodyPr spcFirstLastPara="1" wrap="square" lIns="91425" tIns="45700" rIns="91425" bIns="45700" anchor="ctr" anchorCtr="0">
-            <a:noAutofit/>
-          </a:bodyPr>
-          <a:lstStyle/>
-          <a:p>
-            <a:pPr marL="0" marR="0" lvl="0" indent="0" algn="ctr" rtl="0">
-              <a:spcBef>
-                <a:spcPts val="0"/>
-              </a:spcBef>
-              <a:spcAft>
-                <a:spcPts val="0"/>
-              </a:spcAft>
-              <a:buNone/>
-            </a:pPr>
-            <a:endParaRPr i="1">
-              <a:solidFill>
-                <a:schemeClr val="lt1"/>
-              </a:solidFill>
-              <a:latin typeface="Calibri"/>
-              <a:ea typeface="Calibri"/>
-              <a:cs typeface="Calibri"/>
-              <a:sym typeface="Calibri"/>
-            </a:endParaRPr>
-          </a:p>
-        </p:txBody>
-      </p:sp>
-      <p:sp>
-        <p:nvSpPr>
-          <p:cNvPr id="94" name="Google Shape;198;p2">
-            <a:extLst>
-              <a:ext uri="{FF2B5EF4-FFF2-40B4-BE49-F238E27FC236}">
-                <a16:creationId xmlns:a16="http://schemas.microsoft.com/office/drawing/2014/main" id="{994B4EFC-88BF-96C3-11AC-5D3D04EEEC58}"/>
-              </a:ext>
-            </a:extLst>
-          </p:cNvPr>
-          <p:cNvSpPr txBox="1"/>
-          <p:nvPr/>
-        </p:nvSpPr>
-        <p:spPr>
-          <a:xfrm>
-            <a:off x="15367" y="4480853"/>
-            <a:ext cx="2043058" cy="738623"/>
-          </a:xfrm>
-          <a:prstGeom prst="rect">
-            <a:avLst/>
-          </a:prstGeom>
-          <a:noFill/>
-          <a:ln>
-            <a:noFill/>
-          </a:ln>
-        </p:spPr>
-        <p:txBody>
-          <a:bodyPr spcFirstLastPara="1" wrap="square" lIns="91425" tIns="45700" rIns="91425" bIns="45700" anchor="t" anchorCtr="0">
-            <a:spAutoFit/>
-          </a:bodyPr>
-          <a:lstStyle/>
-          <a:p>
-            <a:pPr lvl="0" algn="ctr"/>
-            <a:r>
-              <a:rPr lang="en-US" dirty="0">
-                <a:solidFill>
-                  <a:schemeClr val="lt1"/>
-                </a:solidFill>
-                <a:latin typeface="Calibri"/>
-                <a:ea typeface="Calibri"/>
-                <a:cs typeface="Calibri"/>
-                <a:sym typeface="Calibri"/>
-              </a:rPr>
-              <a:t>Offshore &amp; oceanic </a:t>
-            </a:r>
-            <a:r>
-              <a:rPr lang="en-US" dirty="0" err="1">
-                <a:solidFill>
-                  <a:schemeClr val="lt1"/>
-                </a:solidFill>
-                <a:latin typeface="Calibri"/>
-                <a:ea typeface="Calibri"/>
-                <a:cs typeface="Calibri"/>
-                <a:sym typeface="Calibri"/>
-              </a:rPr>
-              <a:t>epipelagics</a:t>
-            </a:r>
-            <a:r>
-              <a:rPr lang="en-US" dirty="0">
-                <a:solidFill>
-                  <a:schemeClr val="lt1"/>
-                </a:solidFill>
-                <a:latin typeface="Calibri"/>
-                <a:ea typeface="Calibri"/>
-                <a:cs typeface="Calibri"/>
-                <a:sym typeface="Calibri"/>
-              </a:rPr>
-              <a:t> </a:t>
-            </a:r>
-          </a:p>
-          <a:p>
-            <a:pPr lvl="0" algn="ctr"/>
-            <a:r>
-              <a:rPr lang="en-US" dirty="0">
-                <a:solidFill>
-                  <a:schemeClr val="lt1"/>
-                </a:solidFill>
-                <a:latin typeface="Calibri"/>
-                <a:cs typeface="Calibri"/>
-                <a:sym typeface="Calibri"/>
-              </a:rPr>
-              <a:t>(55)</a:t>
-            </a:r>
-            <a:endParaRPr dirty="0"/>
-          </a:p>
-        </p:txBody>
-      </p:sp>
-      <p:sp>
-        <p:nvSpPr>
-          <p:cNvPr id="95" name="Google Shape;190;p2">
-            <a:extLst>
-              <a:ext uri="{FF2B5EF4-FFF2-40B4-BE49-F238E27FC236}">
-                <a16:creationId xmlns:a16="http://schemas.microsoft.com/office/drawing/2014/main" id="{3A79B08B-11D4-E03E-0CE8-207DC919375F}"/>
-              </a:ext>
-            </a:extLst>
-          </p:cNvPr>
-          <p:cNvSpPr/>
-          <p:nvPr/>
-        </p:nvSpPr>
-        <p:spPr>
-          <a:xfrm>
-            <a:off x="4003731" y="4429759"/>
-            <a:ext cx="2143839" cy="815937"/>
-          </a:xfrm>
-          <a:prstGeom prst="ellipse">
-            <a:avLst/>
-          </a:prstGeom>
-          <a:solidFill>
-            <a:srgbClr val="59A082"/>
-          </a:solidFill>
-          <a:ln>
-            <a:solidFill>
-              <a:srgbClr val="59A082"/>
-            </a:solidFill>
-          </a:ln>
-        </p:spPr>
-        <p:txBody>
-          <a:bodyPr spcFirstLastPara="1" wrap="square" lIns="91425" tIns="45700" rIns="91425" bIns="45700" anchor="ctr" anchorCtr="0">
-            <a:noAutofit/>
-          </a:bodyPr>
-          <a:lstStyle/>
-          <a:p>
-            <a:pPr marL="0" marR="0" lvl="0" indent="0" algn="ctr" rtl="0">
-              <a:spcBef>
-                <a:spcPts val="0"/>
-              </a:spcBef>
-              <a:spcAft>
-                <a:spcPts val="0"/>
-              </a:spcAft>
-              <a:buNone/>
-            </a:pPr>
-            <a:endParaRPr>
-              <a:solidFill>
-                <a:schemeClr val="lt1"/>
-              </a:solidFill>
-              <a:latin typeface="Calibri"/>
-              <a:ea typeface="Calibri"/>
-              <a:cs typeface="Calibri"/>
-              <a:sym typeface="Calibri"/>
-            </a:endParaRPr>
-          </a:p>
-        </p:txBody>
-      </p:sp>
-      <p:sp>
-        <p:nvSpPr>
-          <p:cNvPr id="96" name="Google Shape;191;p2">
-            <a:extLst>
-              <a:ext uri="{FF2B5EF4-FFF2-40B4-BE49-F238E27FC236}">
-                <a16:creationId xmlns:a16="http://schemas.microsoft.com/office/drawing/2014/main" id="{242E37B8-1498-DA02-DE80-9A45EDEE6EA5}"/>
-              </a:ext>
-            </a:extLst>
-          </p:cNvPr>
-          <p:cNvSpPr txBox="1"/>
-          <p:nvPr/>
-        </p:nvSpPr>
-        <p:spPr>
-          <a:xfrm>
-            <a:off x="3975115" y="4712357"/>
-            <a:ext cx="2142857" cy="523180"/>
-          </a:xfrm>
-          <a:prstGeom prst="rect">
-            <a:avLst/>
-          </a:prstGeom>
-          <a:noFill/>
-          <a:ln>
-            <a:noFill/>
-          </a:ln>
-        </p:spPr>
-        <p:txBody>
-          <a:bodyPr spcFirstLastPara="1" wrap="square" lIns="91425" tIns="45700" rIns="91425" bIns="45700" anchor="t" anchorCtr="0">
-            <a:spAutoFit/>
-          </a:bodyPr>
-          <a:lstStyle/>
-          <a:p>
-            <a:pPr lvl="0" algn="ctr"/>
-            <a:r>
-              <a:rPr lang="en-US" dirty="0">
-                <a:solidFill>
-                  <a:schemeClr val="lt1"/>
-                </a:solidFill>
-                <a:latin typeface="Calibri"/>
-                <a:ea typeface="Calibri"/>
-                <a:cs typeface="Calibri"/>
-                <a:sym typeface="Calibri"/>
-              </a:rPr>
-              <a:t>Diel migrating mesopelagic</a:t>
-            </a:r>
-          </a:p>
-          <a:p>
-            <a:pPr lvl="0" algn="ctr"/>
-            <a:r>
-              <a:rPr lang="en-US" dirty="0">
-                <a:solidFill>
-                  <a:schemeClr val="lt1"/>
-                </a:solidFill>
-                <a:latin typeface="Calibri"/>
-                <a:cs typeface="Calibri"/>
-                <a:sym typeface="Calibri"/>
-              </a:rPr>
-              <a:t>(88)</a:t>
-            </a:r>
-            <a:endParaRPr lang="en-US" dirty="0"/>
-          </a:p>
-        </p:txBody>
-      </p:sp>
-      <p:sp>
-        <p:nvSpPr>
-          <p:cNvPr id="97" name="Google Shape;173;p2">
-            <a:extLst>
-              <a:ext uri="{FF2B5EF4-FFF2-40B4-BE49-F238E27FC236}">
-                <a16:creationId xmlns:a16="http://schemas.microsoft.com/office/drawing/2014/main" id="{445B885C-00D0-8E09-5B44-E44A0705BE0B}"/>
-              </a:ext>
-            </a:extLst>
-          </p:cNvPr>
-          <p:cNvSpPr/>
-          <p:nvPr/>
-        </p:nvSpPr>
-        <p:spPr>
-          <a:xfrm>
-            <a:off x="4733675" y="1996306"/>
-            <a:ext cx="1696676" cy="1002432"/>
+            <a:off x="4787787" y="951022"/>
+            <a:ext cx="1781910" cy="984167"/>
           </a:xfrm>
           <a:prstGeom prst="ellipse">
             <a:avLst/>
@@ -17437,97 +17197,10 @@
       </p:sp>
       <p:sp>
         <p:nvSpPr>
-          <p:cNvPr id="98" name="Google Shape;174;p2">
+          <p:cNvPr id="27" name="Google Shape;177;p2">
             <a:extLst>
               <a:ext uri="{FF2B5EF4-FFF2-40B4-BE49-F238E27FC236}">
-                <a16:creationId xmlns:a16="http://schemas.microsoft.com/office/drawing/2014/main" id="{D94F9888-6BA8-2991-1392-3006F147CCE1}"/>
-              </a:ext>
-            </a:extLst>
-          </p:cNvPr>
-          <p:cNvSpPr txBox="1"/>
-          <p:nvPr/>
-        </p:nvSpPr>
-        <p:spPr>
-          <a:xfrm>
-            <a:off x="4527147" y="2447099"/>
-            <a:ext cx="2070404" cy="523180"/>
-          </a:xfrm>
-          <a:prstGeom prst="rect">
-            <a:avLst/>
-          </a:prstGeom>
-          <a:noFill/>
-          <a:ln>
-            <a:noFill/>
-          </a:ln>
-        </p:spPr>
-        <p:txBody>
-          <a:bodyPr spcFirstLastPara="1" wrap="square" lIns="91425" tIns="45700" rIns="91425" bIns="45700" anchor="t" anchorCtr="0">
-            <a:spAutoFit/>
-          </a:bodyPr>
-          <a:lstStyle/>
-          <a:p>
-            <a:pPr marL="0" marR="0" lvl="0" indent="0" algn="ctr" rtl="0">
-              <a:spcBef>
-                <a:spcPts val="0"/>
-              </a:spcBef>
-              <a:spcAft>
-                <a:spcPts val="0"/>
-              </a:spcAft>
-              <a:buNone/>
-            </a:pPr>
-            <a:r>
-              <a:rPr lang="en-US" dirty="0">
-                <a:solidFill>
-                  <a:schemeClr val="lt1"/>
-                </a:solidFill>
-                <a:latin typeface="Calibri"/>
-                <a:ea typeface="Calibri"/>
-                <a:cs typeface="Calibri"/>
-                <a:sym typeface="Calibri"/>
-              </a:rPr>
-              <a:t>Resident shelf taxa</a:t>
-            </a:r>
-          </a:p>
-          <a:p>
-            <a:pPr marL="0" marR="0" lvl="0" indent="0" algn="ctr" rtl="0">
-              <a:spcBef>
-                <a:spcPts val="0"/>
-              </a:spcBef>
-              <a:spcAft>
-                <a:spcPts val="0"/>
-              </a:spcAft>
-              <a:buNone/>
-            </a:pPr>
-            <a:r>
-              <a:rPr lang="en-US" dirty="0">
-                <a:solidFill>
-                  <a:schemeClr val="lt1"/>
-                </a:solidFill>
-                <a:latin typeface="Calibri"/>
-                <a:ea typeface="Calibri"/>
-                <a:cs typeface="Calibri"/>
-                <a:sym typeface="Calibri"/>
-              </a:rPr>
-              <a:t>(28)</a:t>
-            </a:r>
-            <a:endParaRPr dirty="0">
-              <a:solidFill>
-                <a:schemeClr val="lt1"/>
-              </a:solidFill>
-              <a:latin typeface="Calibri"/>
-              <a:ea typeface="Calibri"/>
-              <a:cs typeface="Calibri"/>
-              <a:sym typeface="Calibri"/>
-            </a:endParaRPr>
-          </a:p>
-        </p:txBody>
-      </p:sp>
-      <p:sp>
-        <p:nvSpPr>
-          <p:cNvPr id="99" name="Google Shape;177;p2">
-            <a:extLst>
-              <a:ext uri="{FF2B5EF4-FFF2-40B4-BE49-F238E27FC236}">
-                <a16:creationId xmlns:a16="http://schemas.microsoft.com/office/drawing/2014/main" id="{F42D77AA-77D7-34DB-6FDE-921630F0D072}"/>
+                <a16:creationId xmlns:a16="http://schemas.microsoft.com/office/drawing/2014/main" id="{3D23BA49-F113-6F1D-A1DA-2A81D8F5BCB3}"/>
               </a:ext>
             </a:extLst>
           </p:cNvPr>
@@ -17536,8 +17209,8 @@
         </p:nvSpPr>
         <p:spPr>
           <a:xfrm>
-            <a:off x="3764553" y="584852"/>
-            <a:ext cx="1828623" cy="1002432"/>
+            <a:off x="3158054" y="174037"/>
+            <a:ext cx="1727021" cy="1133240"/>
           </a:xfrm>
           <a:prstGeom prst="ellipse">
             <a:avLst/>
@@ -17578,91 +17251,12 @@
           </a:p>
         </p:txBody>
       </p:sp>
-      <p:sp>
-        <p:nvSpPr>
-          <p:cNvPr id="100" name="Google Shape;178;p2">
+      <p:pic>
+        <p:nvPicPr>
+          <p:cNvPr id="28" name="Google Shape;182;p2">
             <a:extLst>
               <a:ext uri="{FF2B5EF4-FFF2-40B4-BE49-F238E27FC236}">
-                <a16:creationId xmlns:a16="http://schemas.microsoft.com/office/drawing/2014/main" id="{365EC367-4552-8E64-63A1-59BA5DC6985E}"/>
-              </a:ext>
-            </a:extLst>
-          </p:cNvPr>
-          <p:cNvSpPr txBox="1"/>
-          <p:nvPr/>
-        </p:nvSpPr>
-        <p:spPr>
-          <a:xfrm>
-            <a:off x="3592405" y="1003518"/>
-            <a:ext cx="2101350" cy="523180"/>
-          </a:xfrm>
-          <a:prstGeom prst="rect">
-            <a:avLst/>
-          </a:prstGeom>
-          <a:noFill/>
-          <a:ln>
-            <a:noFill/>
-          </a:ln>
-        </p:spPr>
-        <p:txBody>
-          <a:bodyPr spcFirstLastPara="1" wrap="square" lIns="91425" tIns="45700" rIns="91425" bIns="45700" anchor="t" anchorCtr="0">
-            <a:spAutoFit/>
-          </a:bodyPr>
-          <a:lstStyle/>
-          <a:p>
-            <a:pPr lvl="0" algn="ctr"/>
-            <a:r>
-              <a:rPr lang="en-US" dirty="0">
-                <a:solidFill>
-                  <a:schemeClr val="lt1"/>
-                </a:solidFill>
-                <a:latin typeface="Calibri"/>
-                <a:ea typeface="Calibri"/>
-                <a:cs typeface="Calibri"/>
-                <a:sym typeface="Calibri"/>
-              </a:rPr>
-              <a:t>Seasonal shelf taxa</a:t>
-            </a:r>
-          </a:p>
-          <a:p>
-            <a:pPr marL="0" marR="0" lvl="0" indent="0" algn="ctr" rtl="0">
-              <a:spcBef>
-                <a:spcPts val="0"/>
-              </a:spcBef>
-              <a:spcAft>
-                <a:spcPts val="0"/>
-              </a:spcAft>
-              <a:buNone/>
-            </a:pPr>
-            <a:r>
-              <a:rPr lang="en-US" dirty="0">
-                <a:solidFill>
-                  <a:schemeClr val="lt1"/>
-                </a:solidFill>
-                <a:latin typeface="Calibri"/>
-                <a:ea typeface="Calibri"/>
-                <a:cs typeface="Calibri"/>
-                <a:sym typeface="Calibri"/>
-              </a:rPr>
-              <a:t>(44)</a:t>
-            </a:r>
-            <a:endParaRPr dirty="0">
-              <a:solidFill>
-                <a:schemeClr val="lt1"/>
-              </a:solidFill>
-              <a:latin typeface="Calibri"/>
-              <a:ea typeface="Calibri"/>
-              <a:cs typeface="Calibri"/>
-              <a:sym typeface="Calibri"/>
-            </a:endParaRPr>
-          </a:p>
-        </p:txBody>
-      </p:sp>
-      <p:pic>
-        <p:nvPicPr>
-          <p:cNvPr id="101" name="Google Shape;130;p1">
-            <a:extLst>
-              <a:ext uri="{FF2B5EF4-FFF2-40B4-BE49-F238E27FC236}">
-                <a16:creationId xmlns:a16="http://schemas.microsoft.com/office/drawing/2014/main" id="{CE8D9FE4-307D-DFCD-0EFB-21E8799A710B}"/>
+                <a16:creationId xmlns:a16="http://schemas.microsoft.com/office/drawing/2014/main" id="{9394C265-7511-8C28-E219-33DDC9C3ADB0}"/>
               </a:ext>
             </a:extLst>
           </p:cNvPr>
@@ -17672,39 +17266,6 @@
         <p:blipFill rotWithShape="1">
           <a:blip r:embed="rId4">
             <a:alphaModFix/>
-          </a:blip>
-          <a:srcRect t="12447" b="48885"/>
-          <a:stretch/>
-        </p:blipFill>
-        <p:spPr>
-          <a:xfrm>
-            <a:off x="321482" y="2262636"/>
-            <a:ext cx="1336654" cy="365930"/>
-          </a:xfrm>
-          <a:prstGeom prst="rect">
-            <a:avLst/>
-          </a:prstGeom>
-          <a:noFill/>
-          <a:ln>
-            <a:noFill/>
-          </a:ln>
-        </p:spPr>
-      </p:pic>
-      <p:pic>
-        <p:nvPicPr>
-          <p:cNvPr id="102" name="Google Shape;197;p2">
-            <a:extLst>
-              <a:ext uri="{FF2B5EF4-FFF2-40B4-BE49-F238E27FC236}">
-                <a16:creationId xmlns:a16="http://schemas.microsoft.com/office/drawing/2014/main" id="{B37F359C-D22D-8B65-C017-B53DEFF2BC54}"/>
-              </a:ext>
-            </a:extLst>
-          </p:cNvPr>
-          <p:cNvPicPr preferRelativeResize="0"/>
-          <p:nvPr/>
-        </p:nvPicPr>
-        <p:blipFill rotWithShape="1">
-          <a:blip r:embed="rId5">
-            <a:alphaModFix/>
             <a:grayscl/>
           </a:blip>
           <a:srcRect/>
@@ -17712,41 +17273,7 @@
         </p:blipFill>
         <p:spPr>
           <a:xfrm>
-            <a:off x="2556820" y="294712"/>
-            <a:ext cx="914775" cy="371523"/>
-          </a:xfrm>
-          <a:prstGeom prst="rect">
-            <a:avLst/>
-          </a:prstGeom>
-          <a:noFill/>
-          <a:ln>
-            <a:noFill/>
-          </a:ln>
-        </p:spPr>
-      </p:pic>
-      <p:pic>
-        <p:nvPicPr>
-          <p:cNvPr id="103" name="Google Shape;182;p2">
-            <a:extLst>
-              <a:ext uri="{FF2B5EF4-FFF2-40B4-BE49-F238E27FC236}">
-                <a16:creationId xmlns:a16="http://schemas.microsoft.com/office/drawing/2014/main" id="{C29D13D4-F311-C645-4C14-87888D56807C}"/>
-              </a:ext>
-            </a:extLst>
-          </p:cNvPr>
-          <p:cNvPicPr preferRelativeResize="0"/>
-          <p:nvPr/>
-        </p:nvPicPr>
-        <p:blipFill rotWithShape="1">
-          <a:blip r:embed="rId6">
-            <a:alphaModFix/>
-            <a:grayscl/>
-          </a:blip>
-          <a:srcRect/>
-          <a:stretch/>
-        </p:blipFill>
-        <p:spPr>
-          <a:xfrm>
-            <a:off x="519708" y="4053382"/>
+            <a:off x="592500" y="4604155"/>
             <a:ext cx="985838" cy="658619"/>
           </a:xfrm>
           <a:prstGeom prst="rect">
@@ -17760,10 +17287,10 @@
       </p:pic>
       <p:pic>
         <p:nvPicPr>
-          <p:cNvPr id="104" name="Google Shape;200;p2">
+          <p:cNvPr id="29" name="Google Shape;194;p2">
             <a:extLst>
               <a:ext uri="{FF2B5EF4-FFF2-40B4-BE49-F238E27FC236}">
-                <a16:creationId xmlns:a16="http://schemas.microsoft.com/office/drawing/2014/main" id="{494E7B68-C485-4491-5D1D-3B8910AF2EB8}"/>
+                <a16:creationId xmlns:a16="http://schemas.microsoft.com/office/drawing/2014/main" id="{165E1343-F5BE-C656-23AB-69B66952F527}"/>
               </a:ext>
             </a:extLst>
           </p:cNvPr>
@@ -17771,41 +17298,7 @@
           <p:nvPr/>
         </p:nvPicPr>
         <p:blipFill rotWithShape="1">
-          <a:blip r:embed="rId7">
-            <a:alphaModFix/>
-            <a:grayscl/>
-          </a:blip>
-          <a:srcRect/>
-          <a:stretch/>
-        </p:blipFill>
-        <p:spPr>
-          <a:xfrm>
-            <a:off x="4211071" y="635576"/>
-            <a:ext cx="903155" cy="486640"/>
-          </a:xfrm>
-          <a:prstGeom prst="rect">
-            <a:avLst/>
-          </a:prstGeom>
-          <a:noFill/>
-          <a:ln>
-            <a:noFill/>
-          </a:ln>
-        </p:spPr>
-      </p:pic>
-      <p:pic>
-        <p:nvPicPr>
-          <p:cNvPr id="105" name="Google Shape;194;p2">
-            <a:extLst>
-              <a:ext uri="{FF2B5EF4-FFF2-40B4-BE49-F238E27FC236}">
-                <a16:creationId xmlns:a16="http://schemas.microsoft.com/office/drawing/2014/main" id="{3E7CB438-81AD-6C46-2A0C-46D4F0A1B765}"/>
-              </a:ext>
-            </a:extLst>
-          </p:cNvPr>
-          <p:cNvPicPr preferRelativeResize="0"/>
-          <p:nvPr/>
-        </p:nvPicPr>
-        <p:blipFill rotWithShape="1">
-          <a:blip r:embed="rId8">
+          <a:blip r:embed="rId5">
             <a:alphaModFix/>
           </a:blip>
           <a:srcRect/>
@@ -17813,7 +17306,7 @@
         </p:blipFill>
         <p:spPr>
           <a:xfrm rot="21104814">
-            <a:off x="4657960" y="4357051"/>
+            <a:off x="5057357" y="4686175"/>
             <a:ext cx="978010" cy="473271"/>
           </a:xfrm>
           <a:prstGeom prst="rect">
@@ -17827,10 +17320,10 @@
       </p:pic>
       <p:sp>
         <p:nvSpPr>
-          <p:cNvPr id="106" name="Google Shape;169;p2">
+          <p:cNvPr id="30" name="Google Shape;169;p2">
             <a:extLst>
               <a:ext uri="{FF2B5EF4-FFF2-40B4-BE49-F238E27FC236}">
-                <a16:creationId xmlns:a16="http://schemas.microsoft.com/office/drawing/2014/main" id="{A8DE283D-EC33-16BC-D434-B588FF51EF17}"/>
+                <a16:creationId xmlns:a16="http://schemas.microsoft.com/office/drawing/2014/main" id="{8057EB66-C692-56C9-CF14-EA6D18FE24F6}"/>
               </a:ext>
             </a:extLst>
           </p:cNvPr>
@@ -17839,8 +17332,8 @@
         </p:nvSpPr>
         <p:spPr>
           <a:xfrm>
-            <a:off x="731544" y="577561"/>
-            <a:ext cx="1655458" cy="1087825"/>
+            <a:off x="12540" y="1161665"/>
+            <a:ext cx="1792536" cy="1038985"/>
           </a:xfrm>
           <a:prstGeom prst="ellipse">
             <a:avLst/>
@@ -17883,10 +17376,10 @@
       </p:sp>
       <p:sp>
         <p:nvSpPr>
-          <p:cNvPr id="107" name="Google Shape;170;p2">
+          <p:cNvPr id="31" name="Google Shape;170;p2">
             <a:extLst>
               <a:ext uri="{FF2B5EF4-FFF2-40B4-BE49-F238E27FC236}">
-                <a16:creationId xmlns:a16="http://schemas.microsoft.com/office/drawing/2014/main" id="{B66ADF60-0DCC-A210-31E3-0637834DC167}"/>
+                <a16:creationId xmlns:a16="http://schemas.microsoft.com/office/drawing/2014/main" id="{8FEE9701-50BA-90AF-D0E0-E7498E2B5DBE}"/>
               </a:ext>
             </a:extLst>
           </p:cNvPr>
@@ -17895,7 +17388,7 @@
         </p:nvSpPr>
         <p:spPr>
           <a:xfrm>
-            <a:off x="484336" y="926763"/>
+            <a:off x="2954149" y="570895"/>
             <a:ext cx="2074814" cy="738623"/>
           </a:xfrm>
           <a:prstGeom prst="rect">
@@ -17923,7 +17416,7 @@
                 <a:cs typeface="Calibri"/>
                 <a:sym typeface="Calibri"/>
               </a:rPr>
-              <a:t>Non-diel migrating </a:t>
+              <a:t>#1 Non-diel migrating </a:t>
             </a:r>
             <a:r>
               <a:rPr lang="en-US" dirty="0" err="1">
@@ -17970,10 +17463,10 @@
       </p:sp>
       <p:grpSp>
         <p:nvGrpSpPr>
-          <p:cNvPr id="108" name="Google Shape;227;gd33cc45fa0_1_0">
+          <p:cNvPr id="32" name="Google Shape;227;gd33cc45fa0_1_0">
             <a:extLst>
               <a:ext uri="{FF2B5EF4-FFF2-40B4-BE49-F238E27FC236}">
-                <a16:creationId xmlns:a16="http://schemas.microsoft.com/office/drawing/2014/main" id="{8CACF4A8-9BD0-8102-975F-B02AAF294B61}"/>
+                <a16:creationId xmlns:a16="http://schemas.microsoft.com/office/drawing/2014/main" id="{E25F1F38-9768-362B-5890-180AF3168A22}"/>
               </a:ext>
             </a:extLst>
           </p:cNvPr>
@@ -17982,7 +17475,7 @@
         </p:nvGrpSpPr>
         <p:grpSpPr>
           <a:xfrm>
-            <a:off x="2717228" y="2186142"/>
+            <a:off x="2347141" y="2822333"/>
             <a:ext cx="242100" cy="307736"/>
             <a:chOff x="5368725" y="1444849"/>
             <a:chExt cx="242100" cy="307736"/>
@@ -17990,10 +17483,10 @@
         </p:grpSpPr>
         <p:sp>
           <p:nvSpPr>
-            <p:cNvPr id="109" name="Google Shape;228;gd33cc45fa0_1_0">
+            <p:cNvPr id="33" name="Google Shape;228;gd33cc45fa0_1_0">
               <a:extLst>
                 <a:ext uri="{FF2B5EF4-FFF2-40B4-BE49-F238E27FC236}">
-                  <a16:creationId xmlns:a16="http://schemas.microsoft.com/office/drawing/2014/main" id="{6136CF9C-97A3-E81C-6F41-E8BCB287AD40}"/>
+                  <a16:creationId xmlns:a16="http://schemas.microsoft.com/office/drawing/2014/main" id="{39A40CA3-EA2D-94B8-1791-B4EBFE0A4568}"/>
                 </a:ext>
               </a:extLst>
             </p:cNvPr>
@@ -18050,10 +17543,10 @@
         </p:sp>
         <p:sp>
           <p:nvSpPr>
-            <p:cNvPr id="110" name="Google Shape;229;gd33cc45fa0_1_0">
+            <p:cNvPr id="34" name="Google Shape;229;gd33cc45fa0_1_0">
               <a:extLst>
                 <a:ext uri="{FF2B5EF4-FFF2-40B4-BE49-F238E27FC236}">
-                  <a16:creationId xmlns:a16="http://schemas.microsoft.com/office/drawing/2014/main" id="{39340F40-A856-C518-AB0C-2733561AE2D7}"/>
+                  <a16:creationId xmlns:a16="http://schemas.microsoft.com/office/drawing/2014/main" id="{7B940A58-3E33-F3EC-BBC1-13CFDC774836}"/>
                 </a:ext>
               </a:extLst>
             </p:cNvPr>
@@ -18108,10 +17601,10 @@
       </p:grpSp>
       <p:pic>
         <p:nvPicPr>
-          <p:cNvPr id="111" name="Google Shape;124;p1">
+          <p:cNvPr id="35" name="Google Shape;124;p1">
             <a:extLst>
               <a:ext uri="{FF2B5EF4-FFF2-40B4-BE49-F238E27FC236}">
-                <a16:creationId xmlns:a16="http://schemas.microsoft.com/office/drawing/2014/main" id="{C344A809-8902-2426-1B1A-67B7806C4D99}"/>
+                <a16:creationId xmlns:a16="http://schemas.microsoft.com/office/drawing/2014/main" id="{D831CBA3-6857-CCAC-02F6-7D75F2204850}"/>
               </a:ext>
             </a:extLst>
           </p:cNvPr>
@@ -18119,7 +17612,7 @@
           <p:nvPr/>
         </p:nvPicPr>
         <p:blipFill rotWithShape="1">
-          <a:blip r:embed="rId9">
+          <a:blip r:embed="rId6">
             <a:alphaModFix/>
             <a:grayscl/>
           </a:blip>
@@ -18128,7 +17621,7 @@
         </p:blipFill>
         <p:spPr>
           <a:xfrm>
-            <a:off x="1254020" y="576105"/>
+            <a:off x="3637965" y="174036"/>
             <a:ext cx="597559" cy="447592"/>
           </a:xfrm>
           <a:prstGeom prst="rect">
@@ -18140,12 +17633,427 @@
           </a:ln>
         </p:spPr>
       </p:pic>
+      <p:sp>
+        <p:nvSpPr>
+          <p:cNvPr id="36" name="Google Shape;198;p2">
+            <a:extLst>
+              <a:ext uri="{FF2B5EF4-FFF2-40B4-BE49-F238E27FC236}">
+                <a16:creationId xmlns:a16="http://schemas.microsoft.com/office/drawing/2014/main" id="{B74F5989-2130-1E09-5DFD-4A8E8BB38236}"/>
+              </a:ext>
+            </a:extLst>
+          </p:cNvPr>
+          <p:cNvSpPr txBox="1"/>
+          <p:nvPr/>
+        </p:nvSpPr>
+        <p:spPr>
+          <a:xfrm>
+            <a:off x="-112977" y="5029727"/>
+            <a:ext cx="2409003" cy="523180"/>
+          </a:xfrm>
+          <a:prstGeom prst="rect">
+            <a:avLst/>
+          </a:prstGeom>
+          <a:noFill/>
+          <a:ln>
+            <a:noFill/>
+          </a:ln>
+        </p:spPr>
+        <p:txBody>
+          <a:bodyPr spcFirstLastPara="1" wrap="square" lIns="91425" tIns="45700" rIns="91425" bIns="45700" anchor="t" anchorCtr="0">
+            <a:spAutoFit/>
+          </a:bodyPr>
+          <a:lstStyle/>
+          <a:p>
+            <a:pPr lvl="0" algn="ctr"/>
+            <a:r>
+              <a:rPr lang="en-US" dirty="0">
+                <a:solidFill>
+                  <a:schemeClr val="lt1"/>
+                </a:solidFill>
+                <a:latin typeface="Calibri"/>
+                <a:ea typeface="Calibri"/>
+                <a:cs typeface="Calibri"/>
+                <a:sym typeface="Calibri"/>
+              </a:rPr>
+              <a:t>#5 Oceanic </a:t>
+            </a:r>
+            <a:r>
+              <a:rPr lang="en-US" dirty="0" err="1">
+                <a:solidFill>
+                  <a:schemeClr val="lt1"/>
+                </a:solidFill>
+                <a:latin typeface="Calibri"/>
+                <a:ea typeface="Calibri"/>
+                <a:cs typeface="Calibri"/>
+                <a:sym typeface="Calibri"/>
+              </a:rPr>
+              <a:t>epipelagics</a:t>
+            </a:r>
+            <a:r>
+              <a:rPr lang="en-US" dirty="0">
+                <a:solidFill>
+                  <a:schemeClr val="lt1"/>
+                </a:solidFill>
+                <a:latin typeface="Calibri"/>
+                <a:ea typeface="Calibri"/>
+                <a:cs typeface="Calibri"/>
+                <a:sym typeface="Calibri"/>
+              </a:rPr>
+              <a:t> </a:t>
+            </a:r>
+          </a:p>
+          <a:p>
+            <a:pPr lvl="0" algn="ctr"/>
+            <a:r>
+              <a:rPr lang="en-US" dirty="0">
+                <a:solidFill>
+                  <a:schemeClr val="lt1"/>
+                </a:solidFill>
+                <a:latin typeface="Calibri"/>
+                <a:cs typeface="Calibri"/>
+                <a:sym typeface="Calibri"/>
+              </a:rPr>
+              <a:t>(55)</a:t>
+            </a:r>
+            <a:endParaRPr dirty="0"/>
+          </a:p>
+        </p:txBody>
+      </p:sp>
+      <p:sp>
+        <p:nvSpPr>
+          <p:cNvPr id="37" name="Google Shape;170;p2">
+            <a:extLst>
+              <a:ext uri="{FF2B5EF4-FFF2-40B4-BE49-F238E27FC236}">
+                <a16:creationId xmlns:a16="http://schemas.microsoft.com/office/drawing/2014/main" id="{FCB50FD0-A22E-4DC5-C05A-4FE83DB70824}"/>
+              </a:ext>
+            </a:extLst>
+          </p:cNvPr>
+          <p:cNvSpPr txBox="1"/>
+          <p:nvPr/>
+        </p:nvSpPr>
+        <p:spPr>
+          <a:xfrm>
+            <a:off x="4602501" y="1286871"/>
+            <a:ext cx="2161857" cy="523180"/>
+          </a:xfrm>
+          <a:prstGeom prst="rect">
+            <a:avLst/>
+          </a:prstGeom>
+          <a:noFill/>
+          <a:ln>
+            <a:noFill/>
+          </a:ln>
+        </p:spPr>
+        <p:txBody>
+          <a:bodyPr spcFirstLastPara="1" wrap="square" lIns="91425" tIns="45700" rIns="91425" bIns="45700" anchor="t" anchorCtr="0">
+            <a:spAutoFit/>
+          </a:bodyPr>
+          <a:lstStyle/>
+          <a:p>
+            <a:pPr marL="0" marR="0" lvl="0" indent="0" algn="ctr" rtl="0">
+              <a:spcBef>
+                <a:spcPts val="0"/>
+              </a:spcBef>
+              <a:spcAft>
+                <a:spcPts val="0"/>
+              </a:spcAft>
+              <a:buNone/>
+            </a:pPr>
+            <a:r>
+              <a:rPr lang="en-US" dirty="0">
+                <a:solidFill>
+                  <a:schemeClr val="lt1"/>
+                </a:solidFill>
+                <a:latin typeface="Calibri"/>
+                <a:ea typeface="Calibri"/>
+                <a:cs typeface="Calibri"/>
+                <a:sym typeface="Calibri"/>
+              </a:rPr>
+              <a:t>#3 Coast &amp; shelf </a:t>
+            </a:r>
+            <a:r>
+              <a:rPr lang="en-US" dirty="0" err="1">
+                <a:solidFill>
+                  <a:schemeClr val="lt1"/>
+                </a:solidFill>
+                <a:latin typeface="Calibri"/>
+                <a:ea typeface="Calibri"/>
+                <a:cs typeface="Calibri"/>
+                <a:sym typeface="Calibri"/>
+              </a:rPr>
+              <a:t>epipelagics</a:t>
+            </a:r>
+            <a:r>
+              <a:rPr lang="en-US" dirty="0">
+                <a:solidFill>
+                  <a:schemeClr val="lt1"/>
+                </a:solidFill>
+                <a:latin typeface="Calibri"/>
+                <a:ea typeface="Calibri"/>
+                <a:cs typeface="Calibri"/>
+                <a:sym typeface="Calibri"/>
+              </a:rPr>
+              <a:t> </a:t>
+            </a:r>
+            <a:r>
+              <a:rPr lang="en-US" dirty="0">
+                <a:solidFill>
+                  <a:schemeClr val="lt1"/>
+                </a:solidFill>
+                <a:latin typeface="Calibri"/>
+                <a:cs typeface="Calibri"/>
+                <a:sym typeface="Calibri"/>
+              </a:rPr>
+              <a:t>(51)</a:t>
+            </a:r>
+            <a:endParaRPr dirty="0"/>
+          </a:p>
+        </p:txBody>
+      </p:sp>
       <p:pic>
         <p:nvPicPr>
-          <p:cNvPr id="1030" name="Picture 6" descr="Capros aper">
+          <p:cNvPr id="38" name="Google Shape;130;p1">
             <a:extLst>
               <a:ext uri="{FF2B5EF4-FFF2-40B4-BE49-F238E27FC236}">
-                <a16:creationId xmlns:a16="http://schemas.microsoft.com/office/drawing/2014/main" id="{DA4672CA-1832-1F13-9C92-A15E00C7E1E4}"/>
+                <a16:creationId xmlns:a16="http://schemas.microsoft.com/office/drawing/2014/main" id="{59D83D3E-E387-76B3-D9AA-0702D9877B62}"/>
+              </a:ext>
+            </a:extLst>
+          </p:cNvPr>
+          <p:cNvPicPr preferRelativeResize="0"/>
+          <p:nvPr/>
+        </p:nvPicPr>
+        <p:blipFill rotWithShape="1">
+          <a:blip r:embed="rId7">
+            <a:alphaModFix/>
+          </a:blip>
+          <a:srcRect t="12447" b="48885"/>
+          <a:stretch/>
+        </p:blipFill>
+        <p:spPr>
+          <a:xfrm>
+            <a:off x="5021592" y="1007376"/>
+            <a:ext cx="1336654" cy="365930"/>
+          </a:xfrm>
+          <a:prstGeom prst="rect">
+            <a:avLst/>
+          </a:prstGeom>
+          <a:noFill/>
+          <a:ln>
+            <a:noFill/>
+          </a:ln>
+        </p:spPr>
+      </p:pic>
+      <p:sp>
+        <p:nvSpPr>
+          <p:cNvPr id="39" name="Google Shape;168;p2">
+            <a:extLst>
+              <a:ext uri="{FF2B5EF4-FFF2-40B4-BE49-F238E27FC236}">
+                <a16:creationId xmlns:a16="http://schemas.microsoft.com/office/drawing/2014/main" id="{9213EBE7-8212-0B9F-9D9D-233BC6A2C2BF}"/>
+              </a:ext>
+            </a:extLst>
+          </p:cNvPr>
+          <p:cNvSpPr txBox="1"/>
+          <p:nvPr/>
+        </p:nvSpPr>
+        <p:spPr>
+          <a:xfrm>
+            <a:off x="5094544" y="2214141"/>
+            <a:ext cx="1828623" cy="738623"/>
+          </a:xfrm>
+          <a:prstGeom prst="rect">
+            <a:avLst/>
+          </a:prstGeom>
+          <a:noFill/>
+          <a:ln>
+            <a:noFill/>
+          </a:ln>
+        </p:spPr>
+        <p:txBody>
+          <a:bodyPr spcFirstLastPara="1" wrap="square" lIns="91425" tIns="45700" rIns="91425" bIns="45700" anchor="t" anchorCtr="0">
+            <a:spAutoFit/>
+          </a:bodyPr>
+          <a:lstStyle/>
+          <a:p>
+            <a:pPr lvl="0" algn="ctr"/>
+            <a:r>
+              <a:rPr lang="en-US" dirty="0">
+                <a:solidFill>
+                  <a:schemeClr val="lt1"/>
+                </a:solidFill>
+                <a:latin typeface="Calibri"/>
+                <a:ea typeface="Calibri"/>
+                <a:cs typeface="Calibri"/>
+                <a:sym typeface="Calibri"/>
+              </a:rPr>
+              <a:t>#4 Coast &amp; shelf </a:t>
+            </a:r>
+            <a:r>
+              <a:rPr lang="en-US" dirty="0" err="1">
+                <a:solidFill>
+                  <a:schemeClr val="lt1"/>
+                </a:solidFill>
+                <a:latin typeface="Calibri"/>
+                <a:ea typeface="Calibri"/>
+                <a:cs typeface="Calibri"/>
+                <a:sym typeface="Calibri"/>
+              </a:rPr>
+              <a:t>demersals</a:t>
+            </a:r>
+            <a:endParaRPr lang="en-US" dirty="0">
+              <a:solidFill>
+                <a:schemeClr val="lt1"/>
+              </a:solidFill>
+              <a:latin typeface="Calibri"/>
+              <a:ea typeface="Calibri"/>
+              <a:cs typeface="Calibri"/>
+              <a:sym typeface="Calibri"/>
+            </a:endParaRPr>
+          </a:p>
+          <a:p>
+            <a:pPr lvl="0" algn="ctr"/>
+            <a:r>
+              <a:rPr lang="en-US" dirty="0">
+                <a:solidFill>
+                  <a:schemeClr val="lt1"/>
+                </a:solidFill>
+                <a:latin typeface="Calibri"/>
+                <a:ea typeface="Calibri"/>
+                <a:cs typeface="Calibri"/>
+                <a:sym typeface="Calibri"/>
+              </a:rPr>
+              <a:t>(14)</a:t>
+            </a:r>
+            <a:endParaRPr dirty="0"/>
+          </a:p>
+        </p:txBody>
+      </p:sp>
+      <p:pic>
+        <p:nvPicPr>
+          <p:cNvPr id="40" name="Google Shape;197;p2">
+            <a:extLst>
+              <a:ext uri="{FF2B5EF4-FFF2-40B4-BE49-F238E27FC236}">
+                <a16:creationId xmlns:a16="http://schemas.microsoft.com/office/drawing/2014/main" id="{1A7B8050-FF71-1C0D-C674-7265AE2A23C9}"/>
+              </a:ext>
+            </a:extLst>
+          </p:cNvPr>
+          <p:cNvPicPr preferRelativeResize="0"/>
+          <p:nvPr/>
+        </p:nvPicPr>
+        <p:blipFill rotWithShape="1">
+          <a:blip r:embed="rId8">
+            <a:alphaModFix/>
+            <a:grayscl/>
+          </a:blip>
+          <a:srcRect/>
+          <a:stretch/>
+        </p:blipFill>
+        <p:spPr>
+          <a:xfrm>
+            <a:off x="5556082" y="1990376"/>
+            <a:ext cx="914775" cy="371523"/>
+          </a:xfrm>
+          <a:prstGeom prst="rect">
+            <a:avLst/>
+          </a:prstGeom>
+          <a:noFill/>
+          <a:ln>
+            <a:noFill/>
+          </a:ln>
+        </p:spPr>
+      </p:pic>
+      <p:sp>
+        <p:nvSpPr>
+          <p:cNvPr id="41" name="Google Shape;174;p2">
+            <a:extLst>
+              <a:ext uri="{FF2B5EF4-FFF2-40B4-BE49-F238E27FC236}">
+                <a16:creationId xmlns:a16="http://schemas.microsoft.com/office/drawing/2014/main" id="{C94A17A9-2219-F15C-BE60-D75C5E416DEE}"/>
+              </a:ext>
+            </a:extLst>
+          </p:cNvPr>
+          <p:cNvSpPr txBox="1"/>
+          <p:nvPr/>
+        </p:nvSpPr>
+        <p:spPr>
+          <a:xfrm>
+            <a:off x="1152422" y="660359"/>
+            <a:ext cx="2070404" cy="523180"/>
+          </a:xfrm>
+          <a:prstGeom prst="rect">
+            <a:avLst/>
+          </a:prstGeom>
+          <a:noFill/>
+          <a:ln>
+            <a:noFill/>
+          </a:ln>
+        </p:spPr>
+        <p:txBody>
+          <a:bodyPr spcFirstLastPara="1" wrap="square" lIns="91425" tIns="45700" rIns="91425" bIns="45700" anchor="t" anchorCtr="0">
+            <a:spAutoFit/>
+          </a:bodyPr>
+          <a:lstStyle/>
+          <a:p>
+            <a:pPr marL="0" marR="0" lvl="0" indent="0" algn="ctr" rtl="0">
+              <a:spcBef>
+                <a:spcPts val="0"/>
+              </a:spcBef>
+              <a:spcAft>
+                <a:spcPts val="0"/>
+              </a:spcAft>
+              <a:buNone/>
+            </a:pPr>
+            <a:r>
+              <a:rPr lang="en-US" dirty="0">
+                <a:solidFill>
+                  <a:schemeClr val="lt1"/>
+                </a:solidFill>
+                <a:latin typeface="Calibri"/>
+                <a:ea typeface="Calibri"/>
+                <a:cs typeface="Calibri"/>
+                <a:sym typeface="Calibri"/>
+              </a:rPr>
+              <a:t>#7 Resident shelf taxa</a:t>
+            </a:r>
+          </a:p>
+          <a:p>
+            <a:pPr marL="0" marR="0" lvl="0" indent="0" algn="ctr" rtl="0">
+              <a:spcBef>
+                <a:spcPts val="0"/>
+              </a:spcBef>
+              <a:spcAft>
+                <a:spcPts val="0"/>
+              </a:spcAft>
+              <a:buNone/>
+            </a:pPr>
+            <a:r>
+              <a:rPr lang="en-US" dirty="0">
+                <a:solidFill>
+                  <a:schemeClr val="lt1"/>
+                </a:solidFill>
+                <a:latin typeface="Calibri"/>
+                <a:ea typeface="Calibri"/>
+                <a:cs typeface="Calibri"/>
+                <a:sym typeface="Calibri"/>
+              </a:rPr>
+              <a:t>(28)</a:t>
+            </a:r>
+            <a:endParaRPr dirty="0">
+              <a:solidFill>
+                <a:schemeClr val="lt1"/>
+              </a:solidFill>
+              <a:latin typeface="Calibri"/>
+              <a:ea typeface="Calibri"/>
+              <a:cs typeface="Calibri"/>
+              <a:sym typeface="Calibri"/>
+            </a:endParaRPr>
+          </a:p>
+        </p:txBody>
+      </p:sp>
+      <p:pic>
+        <p:nvPicPr>
+          <p:cNvPr id="42" name="Picture 6" descr="Capros aper">
+            <a:extLst>
+              <a:ext uri="{FF2B5EF4-FFF2-40B4-BE49-F238E27FC236}">
+                <a16:creationId xmlns:a16="http://schemas.microsoft.com/office/drawing/2014/main" id="{B43F2487-719B-19F0-49A3-64C1EAA4D3CB}"/>
               </a:ext>
             </a:extLst>
           </p:cNvPr>
@@ -18155,12 +18063,12 @@
           <p:nvPr/>
         </p:nvPicPr>
         <p:blipFill>
-          <a:blip r:embed="rId10">
+          <a:blip r:embed="rId9">
             <a:grayscl/>
             <a:extLst>
               <a:ext uri="{BEBA8EAE-BF5A-486C-A8C5-ECC9F3942E4B}">
                 <a14:imgProps xmlns:a14="http://schemas.microsoft.com/office/drawing/2010/main">
-                  <a14:imgLayer r:embed="rId11">
+                  <a14:imgLayer r:embed="rId10">
                     <a14:imgEffect>
                       <a14:backgroundRemoval t="9524" b="89418" l="6767" r="93985">
                         <a14:foregroundMark x1="88722" y1="40212" x2="92334" y2="40938"/>
@@ -18188,7 +18096,7 @@
         </p:blipFill>
         <p:spPr bwMode="auto">
           <a:xfrm>
-            <a:off x="5114226" y="1955227"/>
+            <a:off x="1723218" y="158835"/>
             <a:ext cx="926383" cy="658219"/>
           </a:xfrm>
           <a:prstGeom prst="rect">
@@ -18206,6 +18114,96 @@
           </a:extLst>
         </p:spPr>
       </p:pic>
+      <p:pic>
+        <p:nvPicPr>
+          <p:cNvPr id="43" name="Google Shape;200;p2">
+            <a:extLst>
+              <a:ext uri="{FF2B5EF4-FFF2-40B4-BE49-F238E27FC236}">
+                <a16:creationId xmlns:a16="http://schemas.microsoft.com/office/drawing/2014/main" id="{023BF00F-8217-EDE9-6E1A-657A0E8EFECA}"/>
+              </a:ext>
+            </a:extLst>
+          </p:cNvPr>
+          <p:cNvPicPr preferRelativeResize="0"/>
+          <p:nvPr/>
+        </p:nvPicPr>
+        <p:blipFill rotWithShape="1">
+          <a:blip r:embed="rId11">
+            <a:alphaModFix/>
+            <a:grayscl/>
+          </a:blip>
+          <a:srcRect/>
+          <a:stretch/>
+        </p:blipFill>
+        <p:spPr>
+          <a:xfrm>
+            <a:off x="503653" y="1232897"/>
+            <a:ext cx="903155" cy="486640"/>
+          </a:xfrm>
+          <a:prstGeom prst="rect">
+            <a:avLst/>
+          </a:prstGeom>
+          <a:noFill/>
+          <a:ln>
+            <a:noFill/>
+          </a:ln>
+        </p:spPr>
+      </p:pic>
+      <p:sp>
+        <p:nvSpPr>
+          <p:cNvPr id="44" name="Google Shape;178;p2">
+            <a:extLst>
+              <a:ext uri="{FF2B5EF4-FFF2-40B4-BE49-F238E27FC236}">
+                <a16:creationId xmlns:a16="http://schemas.microsoft.com/office/drawing/2014/main" id="{6292DF2C-8E44-748F-40F3-8FEBFA14620B}"/>
+              </a:ext>
+            </a:extLst>
+          </p:cNvPr>
+          <p:cNvSpPr txBox="1"/>
+          <p:nvPr/>
+        </p:nvSpPr>
+        <p:spPr>
+          <a:xfrm>
+            <a:off x="12541" y="1645227"/>
+            <a:ext cx="1710678" cy="523180"/>
+          </a:xfrm>
+          <a:prstGeom prst="rect">
+            <a:avLst/>
+          </a:prstGeom>
+          <a:noFill/>
+          <a:ln>
+            <a:noFill/>
+          </a:ln>
+        </p:spPr>
+        <p:txBody>
+          <a:bodyPr spcFirstLastPara="1" wrap="square" lIns="91425" tIns="45700" rIns="91425" bIns="45700" anchor="t" anchorCtr="0">
+            <a:spAutoFit/>
+          </a:bodyPr>
+          <a:lstStyle/>
+          <a:p>
+            <a:pPr lvl="0" algn="ctr"/>
+            <a:r>
+              <a:rPr lang="en-US" dirty="0">
+                <a:solidFill>
+                  <a:schemeClr val="lt1"/>
+                </a:solidFill>
+                <a:latin typeface="Calibri"/>
+                <a:ea typeface="Calibri"/>
+                <a:cs typeface="Calibri"/>
+                <a:sym typeface="Calibri"/>
+              </a:rPr>
+              <a:t>#6 Seasonal shelf taxa (44)</a:t>
+            </a:r>
+            <a:endParaRPr dirty="0">
+              <a:solidFill>
+                <a:schemeClr val="lt1"/>
+              </a:solidFill>
+              <a:latin typeface="Calibri"/>
+              <a:ea typeface="Calibri"/>
+              <a:cs typeface="Calibri"/>
+              <a:sym typeface="Calibri"/>
+            </a:endParaRPr>
+          </a:p>
+        </p:txBody>
+      </p:sp>
     </p:spTree>
     <p:extLst>
       <p:ext uri="{BB962C8B-B14F-4D97-AF65-F5344CB8AC3E}">

</xml_diff>